<commit_message>
Refactor decision tree notebook
</commit_message>
<xml_diff>
--- a/semester-2-2021-2022/week-6-decision-tree/Decision_Tree.pptx
+++ b/semester-2-2021-2022/week-6-decision-tree/Decision_Tree.pptx
@@ -5,7 +5,7 @@
     <p:sldMasterId id="2147483660" r:id="rId1"/>
   </p:sldMasterIdLst>
   <p:notesMasterIdLst>
-    <p:notesMasterId r:id="rId10"/>
+    <p:notesMasterId r:id="rId11"/>
   </p:notesMasterIdLst>
   <p:sldIdLst>
     <p:sldId id="256" r:id="rId2"/>
@@ -15,7 +15,8 @@
     <p:sldId id="261" r:id="rId6"/>
     <p:sldId id="263" r:id="rId7"/>
     <p:sldId id="262" r:id="rId8"/>
-    <p:sldId id="258" r:id="rId9"/>
+    <p:sldId id="265" r:id="rId9"/>
+    <p:sldId id="258" r:id="rId10"/>
   </p:sldIdLst>
   <p:sldSz cx="12192000" cy="6858000"/>
   <p:notesSz cx="6858000" cy="9144000"/>
@@ -117,6 +118,9 @@
   <p:extLst>
     <p:ext uri="{EFAFB233-063F-42B5-8137-9DF3F51BA10A}">
       <p15:sldGuideLst xmlns:p15="http://schemas.microsoft.com/office/powerpoint/2012/main"/>
+    </p:ext>
+    <p:ext uri="{2D200454-40CA-4A62-9FC3-DE9A4176ACB9}">
+      <p15:notesGuideLst xmlns:p15="http://schemas.microsoft.com/office/powerpoint/2012/main"/>
     </p:ext>
   </p:extLst>
 </p:presentation>
@@ -317,7 +321,7 @@
           <a:p>
             <a:fld id="{EB7DA543-F40B-4023-9892-3E6E3C6ABB89}" type="datetimeFigureOut">
               <a:rPr lang="en-GB" smtClean="0"/>
-              <a:t>15/01/2022</a:t>
+              <a:t>16/01/2022</a:t>
             </a:fld>
             <a:endParaRPr lang="en-GB"/>
           </a:p>
@@ -2112,7 +2116,7 @@
           <a:noFill/>
           <a:extLst>
             <a:ext uri="{909E8E84-426E-40dd-AFC4-6F175D3DCCD1}">
-              <a14:hiddenFill xmlns="" xmlns:a14="http://schemas.microsoft.com/office/drawing/2010/main">
+              <a14:hiddenFill xmlns:a14="http://schemas.microsoft.com/office/drawing/2010/main" xmlns="">
                 <a:solidFill>
                   <a:srgbClr val="FFFFFF"/>
                 </a:solidFill>
@@ -2172,7 +2176,7 @@
             </a:ln>
             <a:extLst>
               <a:ext uri="{91240B29-F687-4f45-9708-019B960494DF}">
-                <a14:hiddenLine xmlns="" xmlns:a14="http://schemas.microsoft.com/office/drawing/2010/main" w="9525">
+                <a14:hiddenLine xmlns:a14="http://schemas.microsoft.com/office/drawing/2010/main" xmlns="" w="9525">
                   <a:solidFill>
                     <a:srgbClr val="000000"/>
                   </a:solidFill>
@@ -2262,7 +2266,7 @@
             </a:ln>
             <a:extLst>
               <a:ext uri="{91240B29-F687-4f45-9708-019B960494DF}">
-                <a14:hiddenLine xmlns="" xmlns:a14="http://schemas.microsoft.com/office/drawing/2010/main" w="9525">
+                <a14:hiddenLine xmlns:a14="http://schemas.microsoft.com/office/drawing/2010/main" xmlns="" w="9525">
                   <a:solidFill>
                     <a:srgbClr val="000000"/>
                   </a:solidFill>
@@ -2352,7 +2356,7 @@
             </a:ln>
             <a:extLst>
               <a:ext uri="{91240B29-F687-4f45-9708-019B960494DF}">
-                <a14:hiddenLine xmlns="" xmlns:a14="http://schemas.microsoft.com/office/drawing/2010/main" w="9525">
+                <a14:hiddenLine xmlns:a14="http://schemas.microsoft.com/office/drawing/2010/main" xmlns="" w="9525">
                   <a:solidFill>
                     <a:srgbClr val="000000"/>
                   </a:solidFill>
@@ -2386,7 +2390,7 @@
             </a:ln>
             <a:extLst>
               <a:ext uri="{91240B29-F687-4f45-9708-019B960494DF}">
-                <a14:hiddenLine xmlns="" xmlns:a14="http://schemas.microsoft.com/office/drawing/2010/main" w="9525">
+                <a14:hiddenLine xmlns:a14="http://schemas.microsoft.com/office/drawing/2010/main" xmlns="" w="9525">
                   <a:solidFill>
                     <a:srgbClr val="000000"/>
                   </a:solidFill>
@@ -2476,7 +2480,7 @@
             </a:ln>
             <a:extLst>
               <a:ext uri="{91240B29-F687-4f45-9708-019B960494DF}">
-                <a14:hiddenLine xmlns="" xmlns:a14="http://schemas.microsoft.com/office/drawing/2010/main" w="9525">
+                <a14:hiddenLine xmlns:a14="http://schemas.microsoft.com/office/drawing/2010/main" xmlns="" w="9525">
                   <a:solidFill>
                     <a:srgbClr val="000000"/>
                   </a:solidFill>
@@ -2538,7 +2542,7 @@
             </a:ln>
             <a:extLst>
               <a:ext uri="{91240B29-F687-4f45-9708-019B960494DF}">
-                <a14:hiddenLine xmlns="" xmlns:a14="http://schemas.microsoft.com/office/drawing/2010/main" w="9525">
+                <a14:hiddenLine xmlns:a14="http://schemas.microsoft.com/office/drawing/2010/main" xmlns="" w="9525">
                   <a:solidFill>
                     <a:srgbClr val="000000"/>
                   </a:solidFill>
@@ -2600,7 +2604,7 @@
             </a:ln>
             <a:extLst>
               <a:ext uri="{91240B29-F687-4f45-9708-019B960494DF}">
-                <a14:hiddenLine xmlns="" xmlns:a14="http://schemas.microsoft.com/office/drawing/2010/main" w="9525">
+                <a14:hiddenLine xmlns:a14="http://schemas.microsoft.com/office/drawing/2010/main" xmlns="" w="9525">
                   <a:solidFill>
                     <a:srgbClr val="000000"/>
                   </a:solidFill>
@@ -2690,7 +2694,7 @@
             </a:ln>
             <a:extLst>
               <a:ext uri="{91240B29-F687-4f45-9708-019B960494DF}">
-                <a14:hiddenLine xmlns="" xmlns:a14="http://schemas.microsoft.com/office/drawing/2010/main" w="9525">
+                <a14:hiddenLine xmlns:a14="http://schemas.microsoft.com/office/drawing/2010/main" xmlns="" w="9525">
                   <a:solidFill>
                     <a:srgbClr val="000000"/>
                   </a:solidFill>
@@ -2752,7 +2756,7 @@
             </a:ln>
             <a:extLst>
               <a:ext uri="{91240B29-F687-4f45-9708-019B960494DF}">
-                <a14:hiddenLine xmlns="" xmlns:a14="http://schemas.microsoft.com/office/drawing/2010/main" w="9525">
+                <a14:hiddenLine xmlns:a14="http://schemas.microsoft.com/office/drawing/2010/main" xmlns="" w="9525">
                   <a:solidFill>
                     <a:srgbClr val="000000"/>
                   </a:solidFill>
@@ -2814,7 +2818,7 @@
             </a:ln>
             <a:extLst>
               <a:ext uri="{91240B29-F687-4f45-9708-019B960494DF}">
-                <a14:hiddenLine xmlns="" xmlns:a14="http://schemas.microsoft.com/office/drawing/2010/main" w="9525">
+                <a14:hiddenLine xmlns:a14="http://schemas.microsoft.com/office/drawing/2010/main" xmlns="" w="9525">
                   <a:solidFill>
                     <a:srgbClr val="000000"/>
                   </a:solidFill>
@@ -2904,7 +2908,7 @@
             </a:ln>
             <a:extLst>
               <a:ext uri="{91240B29-F687-4f45-9708-019B960494DF}">
-                <a14:hiddenLine xmlns="" xmlns:a14="http://schemas.microsoft.com/office/drawing/2010/main" w="9525">
+                <a14:hiddenLine xmlns:a14="http://schemas.microsoft.com/office/drawing/2010/main" xmlns="" w="9525">
                   <a:solidFill>
                     <a:srgbClr val="000000"/>
                   </a:solidFill>
@@ -2994,7 +2998,7 @@
             </a:ln>
             <a:extLst>
               <a:ext uri="{91240B29-F687-4f45-9708-019B960494DF}">
-                <a14:hiddenLine xmlns="" xmlns:a14="http://schemas.microsoft.com/office/drawing/2010/main" w="9525">
+                <a14:hiddenLine xmlns:a14="http://schemas.microsoft.com/office/drawing/2010/main" xmlns="" w="9525">
                   <a:solidFill>
                     <a:srgbClr val="000000"/>
                   </a:solidFill>
@@ -3056,7 +3060,7 @@
             </a:ln>
             <a:extLst>
               <a:ext uri="{91240B29-F687-4f45-9708-019B960494DF}">
-                <a14:hiddenLine xmlns="" xmlns:a14="http://schemas.microsoft.com/office/drawing/2010/main" w="9525">
+                <a14:hiddenLine xmlns:a14="http://schemas.microsoft.com/office/drawing/2010/main" xmlns="" w="9525">
                   <a:solidFill>
                     <a:srgbClr val="000000"/>
                   </a:solidFill>
@@ -3166,7 +3170,7 @@
             </a:ln>
             <a:extLst>
               <a:ext uri="{91240B29-F687-4f45-9708-019B960494DF}">
-                <a14:hiddenLine xmlns="" xmlns:a14="http://schemas.microsoft.com/office/drawing/2010/main" w="9525">
+                <a14:hiddenLine xmlns:a14="http://schemas.microsoft.com/office/drawing/2010/main" xmlns="" w="9525">
                   <a:solidFill>
                     <a:srgbClr val="000000"/>
                   </a:solidFill>
@@ -3228,7 +3232,7 @@
             </a:ln>
             <a:extLst>
               <a:ext uri="{91240B29-F687-4f45-9708-019B960494DF}">
-                <a14:hiddenLine xmlns="" xmlns:a14="http://schemas.microsoft.com/office/drawing/2010/main" w="9525">
+                <a14:hiddenLine xmlns:a14="http://schemas.microsoft.com/office/drawing/2010/main" xmlns="" w="9525">
                   <a:solidFill>
                     <a:srgbClr val="000000"/>
                   </a:solidFill>
@@ -3318,7 +3322,7 @@
             </a:ln>
             <a:extLst>
               <a:ext uri="{91240B29-F687-4f45-9708-019B960494DF}">
-                <a14:hiddenLine xmlns="" xmlns:a14="http://schemas.microsoft.com/office/drawing/2010/main" w="9525">
+                <a14:hiddenLine xmlns:a14="http://schemas.microsoft.com/office/drawing/2010/main" xmlns="" w="9525">
                   <a:solidFill>
                     <a:srgbClr val="000000"/>
                   </a:solidFill>
@@ -3408,7 +3412,7 @@
             </a:ln>
             <a:extLst>
               <a:ext uri="{91240B29-F687-4f45-9708-019B960494DF}">
-                <a14:hiddenLine xmlns="" xmlns:a14="http://schemas.microsoft.com/office/drawing/2010/main" w="9525">
+                <a14:hiddenLine xmlns:a14="http://schemas.microsoft.com/office/drawing/2010/main" xmlns="" w="9525">
                   <a:solidFill>
                     <a:srgbClr val="000000"/>
                   </a:solidFill>
@@ -3470,7 +3474,7 @@
             </a:ln>
             <a:extLst>
               <a:ext uri="{91240B29-F687-4f45-9708-019B960494DF}">
-                <a14:hiddenLine xmlns="" xmlns:a14="http://schemas.microsoft.com/office/drawing/2010/main" w="9525">
+                <a14:hiddenLine xmlns:a14="http://schemas.microsoft.com/office/drawing/2010/main" xmlns="" w="9525">
                   <a:solidFill>
                     <a:srgbClr val="000000"/>
                   </a:solidFill>
@@ -3560,7 +3564,7 @@
             </a:ln>
             <a:extLst>
               <a:ext uri="{91240B29-F687-4f45-9708-019B960494DF}">
-                <a14:hiddenLine xmlns="" xmlns:a14="http://schemas.microsoft.com/office/drawing/2010/main" w="9525">
+                <a14:hiddenLine xmlns:a14="http://schemas.microsoft.com/office/drawing/2010/main" xmlns="" w="9525">
                   <a:solidFill>
                     <a:srgbClr val="000000"/>
                   </a:solidFill>
@@ -3650,7 +3654,7 @@
             </a:ln>
             <a:extLst>
               <a:ext uri="{91240B29-F687-4f45-9708-019B960494DF}">
-                <a14:hiddenLine xmlns="" xmlns:a14="http://schemas.microsoft.com/office/drawing/2010/main" w="9525">
+                <a14:hiddenLine xmlns:a14="http://schemas.microsoft.com/office/drawing/2010/main" xmlns="" w="9525">
                   <a:solidFill>
                     <a:srgbClr val="000000"/>
                   </a:solidFill>
@@ -3706,7 +3710,7 @@
             </a:ln>
             <a:extLst>
               <a:ext uri="{91240B29-F687-4f45-9708-019B960494DF}">
-                <a14:hiddenLine xmlns="" xmlns:a14="http://schemas.microsoft.com/office/drawing/2010/main" w="9525">
+                <a14:hiddenLine xmlns:a14="http://schemas.microsoft.com/office/drawing/2010/main" xmlns="" w="9525">
                   <a:solidFill>
                     <a:srgbClr val="000000"/>
                   </a:solidFill>
@@ -3796,7 +3800,7 @@
             </a:ln>
             <a:extLst>
               <a:ext uri="{91240B29-F687-4f45-9708-019B960494DF}">
-                <a14:hiddenLine xmlns="" xmlns:a14="http://schemas.microsoft.com/office/drawing/2010/main" w="9525">
+                <a14:hiddenLine xmlns:a14="http://schemas.microsoft.com/office/drawing/2010/main" xmlns="" w="9525">
                   <a:solidFill>
                     <a:srgbClr val="000000"/>
                   </a:solidFill>
@@ -3852,7 +3856,7 @@
             </a:ln>
             <a:extLst>
               <a:ext uri="{91240B29-F687-4f45-9708-019B960494DF}">
-                <a14:hiddenLine xmlns="" xmlns:a14="http://schemas.microsoft.com/office/drawing/2010/main" w="9525">
+                <a14:hiddenLine xmlns:a14="http://schemas.microsoft.com/office/drawing/2010/main" xmlns="" w="9525">
                   <a:solidFill>
                     <a:srgbClr val="000000"/>
                   </a:solidFill>
@@ -3942,7 +3946,7 @@
             </a:ln>
             <a:extLst>
               <a:ext uri="{91240B29-F687-4f45-9708-019B960494DF}">
-                <a14:hiddenLine xmlns="" xmlns:a14="http://schemas.microsoft.com/office/drawing/2010/main" w="9525">
+                <a14:hiddenLine xmlns:a14="http://schemas.microsoft.com/office/drawing/2010/main" xmlns="" w="9525">
                   <a:solidFill>
                     <a:srgbClr val="000000"/>
                   </a:solidFill>
@@ -4010,7 +4014,7 @@
             </a:ln>
             <a:extLst>
               <a:ext uri="{91240B29-F687-4f45-9708-019B960494DF}">
-                <a14:hiddenLine xmlns="" xmlns:a14="http://schemas.microsoft.com/office/drawing/2010/main" w="9525">
+                <a14:hiddenLine xmlns:a14="http://schemas.microsoft.com/office/drawing/2010/main" xmlns="" w="9525">
                   <a:solidFill>
                     <a:srgbClr val="000000"/>
                   </a:solidFill>
@@ -4100,7 +4104,7 @@
             </a:ln>
             <a:extLst>
               <a:ext uri="{91240B29-F687-4f45-9708-019B960494DF}">
-                <a14:hiddenLine xmlns="" xmlns:a14="http://schemas.microsoft.com/office/drawing/2010/main" w="9525">
+                <a14:hiddenLine xmlns:a14="http://schemas.microsoft.com/office/drawing/2010/main" xmlns="" w="9525">
                   <a:solidFill>
                     <a:srgbClr val="000000"/>
                   </a:solidFill>
@@ -4168,7 +4172,7 @@
             </a:ln>
             <a:extLst>
               <a:ext uri="{91240B29-F687-4f45-9708-019B960494DF}">
-                <a14:hiddenLine xmlns="" xmlns:a14="http://schemas.microsoft.com/office/drawing/2010/main" w="9525">
+                <a14:hiddenLine xmlns:a14="http://schemas.microsoft.com/office/drawing/2010/main" xmlns="" w="9525">
                   <a:solidFill>
                     <a:srgbClr val="000000"/>
                   </a:solidFill>
@@ -4258,7 +4262,7 @@
             </a:ln>
             <a:extLst>
               <a:ext uri="{91240B29-F687-4f45-9708-019B960494DF}">
-                <a14:hiddenLine xmlns="" xmlns:a14="http://schemas.microsoft.com/office/drawing/2010/main" w="9525">
+                <a14:hiddenLine xmlns:a14="http://schemas.microsoft.com/office/drawing/2010/main" xmlns="" w="9525">
                   <a:solidFill>
                     <a:srgbClr val="000000"/>
                   </a:solidFill>
@@ -4292,7 +4296,7 @@
             </a:ln>
             <a:extLst>
               <a:ext uri="{91240B29-F687-4f45-9708-019B960494DF}">
-                <a14:hiddenLine xmlns="" xmlns:a14="http://schemas.microsoft.com/office/drawing/2010/main" w="9525">
+                <a14:hiddenLine xmlns:a14="http://schemas.microsoft.com/office/drawing/2010/main" xmlns="" w="9525">
                   <a:solidFill>
                     <a:srgbClr val="000000"/>
                   </a:solidFill>
@@ -4382,7 +4386,7 @@
             </a:ln>
             <a:extLst>
               <a:ext uri="{91240B29-F687-4f45-9708-019B960494DF}">
-                <a14:hiddenLine xmlns="" xmlns:a14="http://schemas.microsoft.com/office/drawing/2010/main" w="9525">
+                <a14:hiddenLine xmlns:a14="http://schemas.microsoft.com/office/drawing/2010/main" xmlns="" w="9525">
                   <a:solidFill>
                     <a:srgbClr val="000000"/>
                   </a:solidFill>
@@ -4444,7 +4448,7 @@
             </a:ln>
             <a:extLst>
               <a:ext uri="{91240B29-F687-4f45-9708-019B960494DF}">
-                <a14:hiddenLine xmlns="" xmlns:a14="http://schemas.microsoft.com/office/drawing/2010/main" w="9525">
+                <a14:hiddenLine xmlns:a14="http://schemas.microsoft.com/office/drawing/2010/main" xmlns="" w="9525">
                   <a:solidFill>
                     <a:srgbClr val="000000"/>
                   </a:solidFill>
@@ -4506,7 +4510,7 @@
             </a:ln>
             <a:extLst>
               <a:ext uri="{91240B29-F687-4f45-9708-019B960494DF}">
-                <a14:hiddenLine xmlns="" xmlns:a14="http://schemas.microsoft.com/office/drawing/2010/main" w="9525">
+                <a14:hiddenLine xmlns:a14="http://schemas.microsoft.com/office/drawing/2010/main" xmlns="" w="9525">
                   <a:solidFill>
                     <a:srgbClr val="000000"/>
                   </a:solidFill>
@@ -4596,7 +4600,7 @@
             </a:ln>
             <a:extLst>
               <a:ext uri="{91240B29-F687-4f45-9708-019B960494DF}">
-                <a14:hiddenLine xmlns="" xmlns:a14="http://schemas.microsoft.com/office/drawing/2010/main" w="9525">
+                <a14:hiddenLine xmlns:a14="http://schemas.microsoft.com/office/drawing/2010/main" xmlns="" w="9525">
                   <a:solidFill>
                     <a:srgbClr val="000000"/>
                   </a:solidFill>
@@ -4664,7 +4668,7 @@
             </a:ln>
             <a:extLst>
               <a:ext uri="{91240B29-F687-4f45-9708-019B960494DF}">
-                <a14:hiddenLine xmlns="" xmlns:a14="http://schemas.microsoft.com/office/drawing/2010/main" w="9525">
+                <a14:hiddenLine xmlns:a14="http://schemas.microsoft.com/office/drawing/2010/main" xmlns="" w="9525">
                   <a:solidFill>
                     <a:srgbClr val="000000"/>
                   </a:solidFill>
@@ -4726,7 +4730,7 @@
             </a:ln>
             <a:extLst>
               <a:ext uri="{91240B29-F687-4f45-9708-019B960494DF}">
-                <a14:hiddenLine xmlns="" xmlns:a14="http://schemas.microsoft.com/office/drawing/2010/main" w="9525">
+                <a14:hiddenLine xmlns:a14="http://schemas.microsoft.com/office/drawing/2010/main" xmlns="" w="9525">
                   <a:solidFill>
                     <a:srgbClr val="000000"/>
                   </a:solidFill>
@@ -4816,7 +4820,7 @@
             </a:ln>
             <a:extLst>
               <a:ext uri="{91240B29-F687-4f45-9708-019B960494DF}">
-                <a14:hiddenLine xmlns="" xmlns:a14="http://schemas.microsoft.com/office/drawing/2010/main" w="9525">
+                <a14:hiddenLine xmlns:a14="http://schemas.microsoft.com/office/drawing/2010/main" xmlns="" w="9525">
                   <a:solidFill>
                     <a:srgbClr val="000000"/>
                   </a:solidFill>
@@ -4878,7 +4882,7 @@
             </a:ln>
             <a:extLst>
               <a:ext uri="{91240B29-F687-4f45-9708-019B960494DF}">
-                <a14:hiddenLine xmlns="" xmlns:a14="http://schemas.microsoft.com/office/drawing/2010/main" w="9525">
+                <a14:hiddenLine xmlns:a14="http://schemas.microsoft.com/office/drawing/2010/main" xmlns="" w="9525">
                   <a:solidFill>
                     <a:srgbClr val="000000"/>
                   </a:solidFill>
@@ -4968,7 +4972,7 @@
             </a:ln>
             <a:extLst>
               <a:ext uri="{91240B29-F687-4f45-9708-019B960494DF}">
-                <a14:hiddenLine xmlns="" xmlns:a14="http://schemas.microsoft.com/office/drawing/2010/main" w="9525">
+                <a14:hiddenLine xmlns:a14="http://schemas.microsoft.com/office/drawing/2010/main" xmlns="" w="9525">
                   <a:solidFill>
                     <a:srgbClr val="000000"/>
                   </a:solidFill>
@@ -5030,7 +5034,7 @@
             </a:ln>
             <a:extLst>
               <a:ext uri="{91240B29-F687-4f45-9708-019B960494DF}">
-                <a14:hiddenLine xmlns="" xmlns:a14="http://schemas.microsoft.com/office/drawing/2010/main" w="9525">
+                <a14:hiddenLine xmlns:a14="http://schemas.microsoft.com/office/drawing/2010/main" xmlns="" w="9525">
                   <a:solidFill>
                     <a:srgbClr val="000000"/>
                   </a:solidFill>
@@ -5120,7 +5124,7 @@
             </a:ln>
             <a:extLst>
               <a:ext uri="{91240B29-F687-4f45-9708-019B960494DF}">
-                <a14:hiddenLine xmlns="" xmlns:a14="http://schemas.microsoft.com/office/drawing/2010/main" w="9525">
+                <a14:hiddenLine xmlns:a14="http://schemas.microsoft.com/office/drawing/2010/main" xmlns="" w="9525">
                   <a:solidFill>
                     <a:srgbClr val="000000"/>
                   </a:solidFill>
@@ -5154,7 +5158,7 @@
             </a:ln>
             <a:extLst>
               <a:ext uri="{91240B29-F687-4f45-9708-019B960494DF}">
-                <a14:hiddenLine xmlns="" xmlns:a14="http://schemas.microsoft.com/office/drawing/2010/main" w="9525">
+                <a14:hiddenLine xmlns:a14="http://schemas.microsoft.com/office/drawing/2010/main" xmlns="" w="9525">
                   <a:solidFill>
                     <a:srgbClr val="000000"/>
                   </a:solidFill>
@@ -5219,7 +5223,7 @@
             </a:ln>
             <a:extLst>
               <a:ext uri="{91240B29-F687-4f45-9708-019B960494DF}">
-                <a14:hiddenLine xmlns="" xmlns:a14="http://schemas.microsoft.com/office/drawing/2010/main" w="9525">
+                <a14:hiddenLine xmlns:a14="http://schemas.microsoft.com/office/drawing/2010/main" xmlns="" w="9525">
                   <a:solidFill>
                     <a:srgbClr val="000000"/>
                   </a:solidFill>
@@ -5309,7 +5313,7 @@
             </a:ln>
             <a:extLst>
               <a:ext uri="{91240B29-F687-4f45-9708-019B960494DF}">
-                <a14:hiddenLine xmlns="" xmlns:a14="http://schemas.microsoft.com/office/drawing/2010/main" w="9525">
+                <a14:hiddenLine xmlns:a14="http://schemas.microsoft.com/office/drawing/2010/main" xmlns="" w="9525">
                   <a:solidFill>
                     <a:srgbClr val="000000"/>
                   </a:solidFill>
@@ -5371,7 +5375,7 @@
             </a:ln>
             <a:extLst>
               <a:ext uri="{91240B29-F687-4f45-9708-019B960494DF}">
-                <a14:hiddenLine xmlns="" xmlns:a14="http://schemas.microsoft.com/office/drawing/2010/main" w="9525">
+                <a14:hiddenLine xmlns:a14="http://schemas.microsoft.com/office/drawing/2010/main" xmlns="" w="9525">
                   <a:solidFill>
                     <a:srgbClr val="000000"/>
                   </a:solidFill>
@@ -5461,7 +5465,7 @@
             </a:ln>
             <a:extLst>
               <a:ext uri="{91240B29-F687-4f45-9708-019B960494DF}">
-                <a14:hiddenLine xmlns="" xmlns:a14="http://schemas.microsoft.com/office/drawing/2010/main" w="9525">
+                <a14:hiddenLine xmlns:a14="http://schemas.microsoft.com/office/drawing/2010/main" xmlns="" w="9525">
                   <a:solidFill>
                     <a:srgbClr val="000000"/>
                   </a:solidFill>
@@ -5551,7 +5555,7 @@
             </a:ln>
             <a:extLst>
               <a:ext uri="{91240B29-F687-4f45-9708-019B960494DF}">
-                <a14:hiddenLine xmlns="" xmlns:a14="http://schemas.microsoft.com/office/drawing/2010/main" w="9525">
+                <a14:hiddenLine xmlns:a14="http://schemas.microsoft.com/office/drawing/2010/main" xmlns="" w="9525">
                   <a:solidFill>
                     <a:srgbClr val="000000"/>
                   </a:solidFill>
@@ -5616,7 +5620,7 @@
             </a:ln>
             <a:extLst>
               <a:ext uri="{91240B29-F687-4f45-9708-019B960494DF}">
-                <a14:hiddenLine xmlns="" xmlns:a14="http://schemas.microsoft.com/office/drawing/2010/main" w="9525">
+                <a14:hiddenLine xmlns:a14="http://schemas.microsoft.com/office/drawing/2010/main" xmlns="" w="9525">
                   <a:solidFill>
                     <a:srgbClr val="000000"/>
                   </a:solidFill>
@@ -5678,7 +5682,7 @@
             </a:ln>
             <a:extLst>
               <a:ext uri="{91240B29-F687-4f45-9708-019B960494DF}">
-                <a14:hiddenLine xmlns="" xmlns:a14="http://schemas.microsoft.com/office/drawing/2010/main" w="9525">
+                <a14:hiddenLine xmlns:a14="http://schemas.microsoft.com/office/drawing/2010/main" xmlns="" w="9525">
                   <a:solidFill>
                     <a:srgbClr val="000000"/>
                   </a:solidFill>
@@ -5768,7 +5772,7 @@
             </a:ln>
             <a:extLst>
               <a:ext uri="{91240B29-F687-4f45-9708-019B960494DF}">
-                <a14:hiddenLine xmlns="" xmlns:a14="http://schemas.microsoft.com/office/drawing/2010/main" w="9525">
+                <a14:hiddenLine xmlns:a14="http://schemas.microsoft.com/office/drawing/2010/main" xmlns="" w="9525">
                   <a:solidFill>
                     <a:srgbClr val="000000"/>
                   </a:solidFill>
@@ -5858,7 +5862,7 @@
             </a:ln>
             <a:extLst>
               <a:ext uri="{91240B29-F687-4f45-9708-019B960494DF}">
-                <a14:hiddenLine xmlns="" xmlns:a14="http://schemas.microsoft.com/office/drawing/2010/main" w="9525">
+                <a14:hiddenLine xmlns:a14="http://schemas.microsoft.com/office/drawing/2010/main" xmlns="" w="9525">
                   <a:solidFill>
                     <a:srgbClr val="000000"/>
                   </a:solidFill>
@@ -5920,7 +5924,7 @@
             </a:ln>
             <a:extLst>
               <a:ext uri="{91240B29-F687-4f45-9708-019B960494DF}">
-                <a14:hiddenLine xmlns="" xmlns:a14="http://schemas.microsoft.com/office/drawing/2010/main" w="9525">
+                <a14:hiddenLine xmlns:a14="http://schemas.microsoft.com/office/drawing/2010/main" xmlns="" w="9525">
                   <a:solidFill>
                     <a:srgbClr val="000000"/>
                   </a:solidFill>
@@ -6040,7 +6044,7 @@
             </a:ln>
             <a:extLst>
               <a:ext uri="{91240B29-F687-4f45-9708-019B960494DF}">
-                <a14:hiddenLine xmlns="" xmlns:a14="http://schemas.microsoft.com/office/drawing/2010/main" w="9525">
+                <a14:hiddenLine xmlns:a14="http://schemas.microsoft.com/office/drawing/2010/main" xmlns="" w="9525">
                   <a:solidFill>
                     <a:srgbClr val="000000"/>
                   </a:solidFill>
@@ -6108,7 +6112,7 @@
             </a:ln>
             <a:extLst>
               <a:ext uri="{91240B29-F687-4f45-9708-019B960494DF}">
-                <a14:hiddenLine xmlns="" xmlns:a14="http://schemas.microsoft.com/office/drawing/2010/main" w="9525">
+                <a14:hiddenLine xmlns:a14="http://schemas.microsoft.com/office/drawing/2010/main" xmlns="" w="9525">
                   <a:solidFill>
                     <a:srgbClr val="000000"/>
                   </a:solidFill>
@@ -6198,7 +6202,7 @@
             </a:ln>
             <a:extLst>
               <a:ext uri="{91240B29-F687-4f45-9708-019B960494DF}">
-                <a14:hiddenLine xmlns="" xmlns:a14="http://schemas.microsoft.com/office/drawing/2010/main" w="9525">
+                <a14:hiddenLine xmlns:a14="http://schemas.microsoft.com/office/drawing/2010/main" xmlns="" w="9525">
                   <a:solidFill>
                     <a:srgbClr val="000000"/>
                   </a:solidFill>
@@ -6338,7 +6342,7 @@
           <a:p>
             <a:fld id="{D0D65A25-5B34-480B-8A82-D452FDC7444D}" type="datetimeFigureOut">
               <a:rPr lang="es-ES" smtClean="0"/>
-              <a:t>15/01/2022</a:t>
+              <a:t>16/01/2022</a:t>
             </a:fld>
             <a:endParaRPr lang="es-ES" dirty="0"/>
           </a:p>
@@ -6604,7 +6608,7 @@
           <a:p>
             <a:fld id="{D0D65A25-5B34-480B-8A82-D452FDC7444D}" type="datetimeFigureOut">
               <a:rPr lang="es-ES" smtClean="0"/>
-              <a:t>15/01/2022</a:t>
+              <a:t>16/01/2022</a:t>
             </a:fld>
             <a:endParaRPr lang="es-ES" dirty="0"/>
           </a:p>
@@ -6800,7 +6804,7 @@
           <a:p>
             <a:fld id="{D0D65A25-5B34-480B-8A82-D452FDC7444D}" type="datetimeFigureOut">
               <a:rPr lang="es-ES" smtClean="0"/>
-              <a:t>15/01/2022</a:t>
+              <a:t>16/01/2022</a:t>
             </a:fld>
             <a:endParaRPr lang="es-ES" dirty="0"/>
           </a:p>
@@ -7063,7 +7067,7 @@
           <a:p>
             <a:fld id="{D0D65A25-5B34-480B-8A82-D452FDC7444D}" type="datetimeFigureOut">
               <a:rPr lang="es-ES" smtClean="0"/>
-              <a:t>15/01/2022</a:t>
+              <a:t>16/01/2022</a:t>
             </a:fld>
             <a:endParaRPr lang="es-ES" dirty="0"/>
           </a:p>
@@ -7497,7 +7501,7 @@
           <a:p>
             <a:fld id="{D0D65A25-5B34-480B-8A82-D452FDC7444D}" type="datetimeFigureOut">
               <a:rPr lang="es-ES" smtClean="0"/>
-              <a:t>15/01/2022</a:t>
+              <a:t>16/01/2022</a:t>
             </a:fld>
             <a:endParaRPr lang="es-ES" dirty="0"/>
           </a:p>
@@ -8043,7 +8047,7 @@
           <a:p>
             <a:fld id="{D0D65A25-5B34-480B-8A82-D452FDC7444D}" type="datetimeFigureOut">
               <a:rPr lang="es-ES" smtClean="0"/>
-              <a:t>15/01/2022</a:t>
+              <a:t>16/01/2022</a:t>
             </a:fld>
             <a:endParaRPr lang="es-ES" dirty="0"/>
           </a:p>
@@ -8760,7 +8764,7 @@
           <a:p>
             <a:fld id="{D0D65A25-5B34-480B-8A82-D452FDC7444D}" type="datetimeFigureOut">
               <a:rPr lang="es-ES" smtClean="0"/>
-              <a:t>15/01/2022</a:t>
+              <a:t>16/01/2022</a:t>
             </a:fld>
             <a:endParaRPr lang="es-ES" dirty="0"/>
           </a:p>
@@ -8930,7 +8934,7 @@
           <a:p>
             <a:fld id="{D0D65A25-5B34-480B-8A82-D452FDC7444D}" type="datetimeFigureOut">
               <a:rPr lang="es-ES" smtClean="0"/>
-              <a:t>15/01/2022</a:t>
+              <a:t>16/01/2022</a:t>
             </a:fld>
             <a:endParaRPr lang="es-ES" dirty="0"/>
           </a:p>
@@ -9110,7 +9114,7 @@
           <a:p>
             <a:fld id="{D0D65A25-5B34-480B-8A82-D452FDC7444D}" type="datetimeFigureOut">
               <a:rPr lang="es-ES" smtClean="0"/>
-              <a:t>15/01/2022</a:t>
+              <a:t>16/01/2022</a:t>
             </a:fld>
             <a:endParaRPr lang="es-ES" dirty="0"/>
           </a:p>
@@ -9280,7 +9284,7 @@
           <a:p>
             <a:fld id="{D0D65A25-5B34-480B-8A82-D452FDC7444D}" type="datetimeFigureOut">
               <a:rPr lang="es-ES" smtClean="0"/>
-              <a:t>15/01/2022</a:t>
+              <a:t>16/01/2022</a:t>
             </a:fld>
             <a:endParaRPr lang="es-ES" dirty="0"/>
           </a:p>
@@ -9530,7 +9534,7 @@
           <a:p>
             <a:fld id="{D0D65A25-5B34-480B-8A82-D452FDC7444D}" type="datetimeFigureOut">
               <a:rPr lang="es-ES" smtClean="0"/>
-              <a:t>15/01/2022</a:t>
+              <a:t>16/01/2022</a:t>
             </a:fld>
             <a:endParaRPr lang="es-ES" dirty="0"/>
           </a:p>
@@ -9762,7 +9766,7 @@
           <a:p>
             <a:fld id="{D0D65A25-5B34-480B-8A82-D452FDC7444D}" type="datetimeFigureOut">
               <a:rPr lang="es-ES" smtClean="0"/>
-              <a:t>15/01/2022</a:t>
+              <a:t>16/01/2022</a:t>
             </a:fld>
             <a:endParaRPr lang="es-ES" dirty="0"/>
           </a:p>
@@ -10143,7 +10147,7 @@
           <a:p>
             <a:fld id="{D0D65A25-5B34-480B-8A82-D452FDC7444D}" type="datetimeFigureOut">
               <a:rPr lang="es-ES" smtClean="0"/>
-              <a:t>15/01/2022</a:t>
+              <a:t>16/01/2022</a:t>
             </a:fld>
             <a:endParaRPr lang="es-ES" dirty="0"/>
           </a:p>
@@ -10261,7 +10265,7 @@
           <a:p>
             <a:fld id="{D0D65A25-5B34-480B-8A82-D452FDC7444D}" type="datetimeFigureOut">
               <a:rPr lang="es-ES" smtClean="0"/>
-              <a:t>15/01/2022</a:t>
+              <a:t>16/01/2022</a:t>
             </a:fld>
             <a:endParaRPr lang="es-ES" dirty="0"/>
           </a:p>
@@ -10356,7 +10360,7 @@
           <a:p>
             <a:fld id="{D0D65A25-5B34-480B-8A82-D452FDC7444D}" type="datetimeFigureOut">
               <a:rPr lang="es-ES" smtClean="0"/>
-              <a:t>15/01/2022</a:t>
+              <a:t>16/01/2022</a:t>
             </a:fld>
             <a:endParaRPr lang="es-ES" dirty="0"/>
           </a:p>
@@ -10605,7 +10609,7 @@
           <a:p>
             <a:fld id="{D0D65A25-5B34-480B-8A82-D452FDC7444D}" type="datetimeFigureOut">
               <a:rPr lang="es-ES" smtClean="0"/>
-              <a:t>15/01/2022</a:t>
+              <a:t>16/01/2022</a:t>
             </a:fld>
             <a:endParaRPr lang="es-ES" dirty="0"/>
           </a:p>
@@ -10884,7 +10888,7 @@
           <a:p>
             <a:fld id="{D0D65A25-5B34-480B-8A82-D452FDC7444D}" type="datetimeFigureOut">
               <a:rPr lang="es-ES" smtClean="0"/>
-              <a:t>15/01/2022</a:t>
+              <a:t>16/01/2022</a:t>
             </a:fld>
             <a:endParaRPr lang="es-ES" dirty="0"/>
           </a:p>
@@ -11000,7 +11004,7 @@
           <a:noFill/>
           <a:extLst>
             <a:ext uri="{909E8E84-426E-40dd-AFC4-6F175D3DCCD1}">
-              <a14:hiddenFill xmlns="" xmlns:a14="http://schemas.microsoft.com/office/drawing/2010/main">
+              <a14:hiddenFill xmlns:a14="http://schemas.microsoft.com/office/drawing/2010/main" xmlns="">
                 <a:solidFill>
                   <a:srgbClr val="FFFFFF"/>
                 </a:solidFill>
@@ -11074,7 +11078,7 @@
               </a:ln>
               <a:extLst>
                 <a:ext uri="{91240B29-F687-4f45-9708-019B960494DF}">
-                  <a14:hiddenLine xmlns="" xmlns:a14="http://schemas.microsoft.com/office/drawing/2010/main" w="9525">
+                  <a14:hiddenLine xmlns:a14="http://schemas.microsoft.com/office/drawing/2010/main" xmlns="" w="9525">
                     <a:solidFill>
                       <a:srgbClr val="000000"/>
                     </a:solidFill>
@@ -11164,7 +11168,7 @@
               </a:ln>
               <a:extLst>
                 <a:ext uri="{91240B29-F687-4f45-9708-019B960494DF}">
-                  <a14:hiddenLine xmlns="" xmlns:a14="http://schemas.microsoft.com/office/drawing/2010/main" w="9525">
+                  <a14:hiddenLine xmlns:a14="http://schemas.microsoft.com/office/drawing/2010/main" xmlns="" w="9525">
                     <a:solidFill>
                       <a:srgbClr val="000000"/>
                     </a:solidFill>
@@ -11254,7 +11258,7 @@
               </a:ln>
               <a:extLst>
                 <a:ext uri="{91240B29-F687-4f45-9708-019B960494DF}">
-                  <a14:hiddenLine xmlns="" xmlns:a14="http://schemas.microsoft.com/office/drawing/2010/main" w="9525">
+                  <a14:hiddenLine xmlns:a14="http://schemas.microsoft.com/office/drawing/2010/main" xmlns="" w="9525">
                     <a:solidFill>
                       <a:srgbClr val="000000"/>
                     </a:solidFill>
@@ -11316,7 +11320,7 @@
               </a:ln>
               <a:extLst>
                 <a:ext uri="{91240B29-F687-4f45-9708-019B960494DF}">
-                  <a14:hiddenLine xmlns="" xmlns:a14="http://schemas.microsoft.com/office/drawing/2010/main" w="9525">
+                  <a14:hiddenLine xmlns:a14="http://schemas.microsoft.com/office/drawing/2010/main" xmlns="" w="9525">
                     <a:solidFill>
                       <a:srgbClr val="000000"/>
                     </a:solidFill>
@@ -11406,7 +11410,7 @@
               </a:ln>
               <a:extLst>
                 <a:ext uri="{91240B29-F687-4f45-9708-019B960494DF}">
-                  <a14:hiddenLine xmlns="" xmlns:a14="http://schemas.microsoft.com/office/drawing/2010/main" w="9525">
+                  <a14:hiddenLine xmlns:a14="http://schemas.microsoft.com/office/drawing/2010/main" xmlns="" w="9525">
                     <a:solidFill>
                       <a:srgbClr val="000000"/>
                     </a:solidFill>
@@ -11468,7 +11472,7 @@
               </a:ln>
               <a:extLst>
                 <a:ext uri="{91240B29-F687-4f45-9708-019B960494DF}">
-                  <a14:hiddenLine xmlns="" xmlns:a14="http://schemas.microsoft.com/office/drawing/2010/main" w="9525">
+                  <a14:hiddenLine xmlns:a14="http://schemas.microsoft.com/office/drawing/2010/main" xmlns="" w="9525">
                     <a:solidFill>
                       <a:srgbClr val="000000"/>
                     </a:solidFill>
@@ -11530,7 +11534,7 @@
               </a:ln>
               <a:extLst>
                 <a:ext uri="{91240B29-F687-4f45-9708-019B960494DF}">
-                  <a14:hiddenLine xmlns="" xmlns:a14="http://schemas.microsoft.com/office/drawing/2010/main" w="9525">
+                  <a14:hiddenLine xmlns:a14="http://schemas.microsoft.com/office/drawing/2010/main" xmlns="" w="9525">
                     <a:solidFill>
                       <a:srgbClr val="000000"/>
                     </a:solidFill>
@@ -11620,7 +11624,7 @@
               </a:ln>
               <a:extLst>
                 <a:ext uri="{91240B29-F687-4f45-9708-019B960494DF}">
-                  <a14:hiddenLine xmlns="" xmlns:a14="http://schemas.microsoft.com/office/drawing/2010/main" w="9525">
+                  <a14:hiddenLine xmlns:a14="http://schemas.microsoft.com/office/drawing/2010/main" xmlns="" w="9525">
                     <a:solidFill>
                       <a:srgbClr val="000000"/>
                     </a:solidFill>
@@ -11710,7 +11714,7 @@
               </a:ln>
               <a:extLst>
                 <a:ext uri="{91240B29-F687-4f45-9708-019B960494DF}">
-                  <a14:hiddenLine xmlns="" xmlns:a14="http://schemas.microsoft.com/office/drawing/2010/main" w="9525">
+                  <a14:hiddenLine xmlns:a14="http://schemas.microsoft.com/office/drawing/2010/main" xmlns="" w="9525">
                     <a:solidFill>
                       <a:srgbClr val="000000"/>
                     </a:solidFill>
@@ -11772,7 +11776,7 @@
               </a:ln>
               <a:extLst>
                 <a:ext uri="{91240B29-F687-4f45-9708-019B960494DF}">
-                  <a14:hiddenLine xmlns="" xmlns:a14="http://schemas.microsoft.com/office/drawing/2010/main" w="9525">
+                  <a14:hiddenLine xmlns:a14="http://schemas.microsoft.com/office/drawing/2010/main" xmlns="" w="9525">
                     <a:solidFill>
                       <a:srgbClr val="000000"/>
                     </a:solidFill>
@@ -11882,7 +11886,7 @@
               </a:ln>
               <a:extLst>
                 <a:ext uri="{91240B29-F687-4f45-9708-019B960494DF}">
-                  <a14:hiddenLine xmlns="" xmlns:a14="http://schemas.microsoft.com/office/drawing/2010/main" w="9525">
+                  <a14:hiddenLine xmlns:a14="http://schemas.microsoft.com/office/drawing/2010/main" xmlns="" w="9525">
                     <a:solidFill>
                       <a:srgbClr val="000000"/>
                     </a:solidFill>
@@ -11966,7 +11970,7 @@
               </a:ln>
               <a:extLst>
                 <a:ext uri="{91240B29-F687-4f45-9708-019B960494DF}">
-                  <a14:hiddenLine xmlns="" xmlns:a14="http://schemas.microsoft.com/office/drawing/2010/main" w="9525">
+                  <a14:hiddenLine xmlns:a14="http://schemas.microsoft.com/office/drawing/2010/main" xmlns="" w="9525">
                     <a:solidFill>
                       <a:srgbClr val="000000"/>
                     </a:solidFill>
@@ -12028,7 +12032,7 @@
               </a:ln>
               <a:extLst>
                 <a:ext uri="{91240B29-F687-4f45-9708-019B960494DF}">
-                  <a14:hiddenLine xmlns="" xmlns:a14="http://schemas.microsoft.com/office/drawing/2010/main" w="9525">
+                  <a14:hiddenLine xmlns:a14="http://schemas.microsoft.com/office/drawing/2010/main" xmlns="" w="9525">
                     <a:solidFill>
                       <a:srgbClr val="000000"/>
                     </a:solidFill>
@@ -12090,7 +12094,7 @@
               </a:ln>
               <a:extLst>
                 <a:ext uri="{91240B29-F687-4f45-9708-019B960494DF}">
-                  <a14:hiddenLine xmlns="" xmlns:a14="http://schemas.microsoft.com/office/drawing/2010/main" w="9525">
+                  <a14:hiddenLine xmlns:a14="http://schemas.microsoft.com/office/drawing/2010/main" xmlns="" w="9525">
                     <a:solidFill>
                       <a:srgbClr val="000000"/>
                     </a:solidFill>
@@ -12180,7 +12184,7 @@
               </a:ln>
               <a:extLst>
                 <a:ext uri="{91240B29-F687-4f45-9708-019B960494DF}">
-                  <a14:hiddenLine xmlns="" xmlns:a14="http://schemas.microsoft.com/office/drawing/2010/main" w="9525">
+                  <a14:hiddenLine xmlns:a14="http://schemas.microsoft.com/office/drawing/2010/main" xmlns="" w="9525">
                     <a:solidFill>
                       <a:srgbClr val="000000"/>
                     </a:solidFill>
@@ -12214,7 +12218,7 @@
               </a:ln>
               <a:extLst>
                 <a:ext uri="{91240B29-F687-4f45-9708-019B960494DF}">
-                  <a14:hiddenLine xmlns="" xmlns:a14="http://schemas.microsoft.com/office/drawing/2010/main" w="9525">
+                  <a14:hiddenLine xmlns:a14="http://schemas.microsoft.com/office/drawing/2010/main" xmlns="" w="9525">
                     <a:solidFill>
                       <a:srgbClr val="000000"/>
                     </a:solidFill>
@@ -12279,7 +12283,7 @@
               </a:ln>
               <a:extLst>
                 <a:ext uri="{91240B29-F687-4f45-9708-019B960494DF}">
-                  <a14:hiddenLine xmlns="" xmlns:a14="http://schemas.microsoft.com/office/drawing/2010/main" w="9525">
+                  <a14:hiddenLine xmlns:a14="http://schemas.microsoft.com/office/drawing/2010/main" xmlns="" w="9525">
                     <a:solidFill>
                       <a:srgbClr val="000000"/>
                     </a:solidFill>
@@ -12369,7 +12373,7 @@
               </a:ln>
               <a:extLst>
                 <a:ext uri="{91240B29-F687-4f45-9708-019B960494DF}">
-                  <a14:hiddenLine xmlns="" xmlns:a14="http://schemas.microsoft.com/office/drawing/2010/main" w="9525">
+                  <a14:hiddenLine xmlns:a14="http://schemas.microsoft.com/office/drawing/2010/main" xmlns="" w="9525">
                     <a:solidFill>
                       <a:srgbClr val="000000"/>
                     </a:solidFill>
@@ -12431,7 +12435,7 @@
               </a:ln>
               <a:extLst>
                 <a:ext uri="{91240B29-F687-4f45-9708-019B960494DF}">
-                  <a14:hiddenLine xmlns="" xmlns:a14="http://schemas.microsoft.com/office/drawing/2010/main" w="9525">
+                  <a14:hiddenLine xmlns:a14="http://schemas.microsoft.com/office/drawing/2010/main" xmlns="" w="9525">
                     <a:solidFill>
                       <a:srgbClr val="000000"/>
                     </a:solidFill>
@@ -12521,7 +12525,7 @@
               </a:ln>
               <a:extLst>
                 <a:ext uri="{91240B29-F687-4f45-9708-019B960494DF}">
-                  <a14:hiddenLine xmlns="" xmlns:a14="http://schemas.microsoft.com/office/drawing/2010/main" w="9525">
+                  <a14:hiddenLine xmlns:a14="http://schemas.microsoft.com/office/drawing/2010/main" xmlns="" w="9525">
                     <a:solidFill>
                       <a:srgbClr val="000000"/>
                     </a:solidFill>
@@ -12586,7 +12590,7 @@
               </a:ln>
               <a:extLst>
                 <a:ext uri="{91240B29-F687-4f45-9708-019B960494DF}">
-                  <a14:hiddenLine xmlns="" xmlns:a14="http://schemas.microsoft.com/office/drawing/2010/main" w="9525">
+                  <a14:hiddenLine xmlns:a14="http://schemas.microsoft.com/office/drawing/2010/main" xmlns="" w="9525">
                     <a:solidFill>
                       <a:srgbClr val="000000"/>
                     </a:solidFill>
@@ -12648,7 +12652,7 @@
               </a:ln>
               <a:extLst>
                 <a:ext uri="{91240B29-F687-4f45-9708-019B960494DF}">
-                  <a14:hiddenLine xmlns="" xmlns:a14="http://schemas.microsoft.com/office/drawing/2010/main" w="9525">
+                  <a14:hiddenLine xmlns:a14="http://schemas.microsoft.com/office/drawing/2010/main" xmlns="" w="9525">
                     <a:solidFill>
                       <a:srgbClr val="000000"/>
                     </a:solidFill>
@@ -12738,7 +12742,7 @@
               </a:ln>
               <a:extLst>
                 <a:ext uri="{91240B29-F687-4f45-9708-019B960494DF}">
-                  <a14:hiddenLine xmlns="" xmlns:a14="http://schemas.microsoft.com/office/drawing/2010/main" w="9525">
+                  <a14:hiddenLine xmlns:a14="http://schemas.microsoft.com/office/drawing/2010/main" xmlns="" w="9525">
                     <a:solidFill>
                       <a:srgbClr val="000000"/>
                     </a:solidFill>
@@ -12828,7 +12832,7 @@
               </a:ln>
               <a:extLst>
                 <a:ext uri="{91240B29-F687-4f45-9708-019B960494DF}">
-                  <a14:hiddenLine xmlns="" xmlns:a14="http://schemas.microsoft.com/office/drawing/2010/main" w="9525">
+                  <a14:hiddenLine xmlns:a14="http://schemas.microsoft.com/office/drawing/2010/main" xmlns="" w="9525">
                     <a:solidFill>
                       <a:srgbClr val="000000"/>
                     </a:solidFill>
@@ -12893,7 +12897,7 @@
               </a:ln>
               <a:extLst>
                 <a:ext uri="{91240B29-F687-4f45-9708-019B960494DF}">
-                  <a14:hiddenLine xmlns="" xmlns:a14="http://schemas.microsoft.com/office/drawing/2010/main" w="9525">
+                  <a14:hiddenLine xmlns:a14="http://schemas.microsoft.com/office/drawing/2010/main" xmlns="" w="9525">
                     <a:solidFill>
                       <a:srgbClr val="000000"/>
                     </a:solidFill>
@@ -13013,7 +13017,7 @@
               </a:ln>
               <a:extLst>
                 <a:ext uri="{91240B29-F687-4f45-9708-019B960494DF}">
-                  <a14:hiddenLine xmlns="" xmlns:a14="http://schemas.microsoft.com/office/drawing/2010/main" w="9525">
+                  <a14:hiddenLine xmlns:a14="http://schemas.microsoft.com/office/drawing/2010/main" xmlns="" w="9525">
                     <a:solidFill>
                       <a:srgbClr val="000000"/>
                     </a:solidFill>
@@ -13111,7 +13115,7 @@
               </a:ln>
               <a:extLst>
                 <a:ext uri="{91240B29-F687-4f45-9708-019B960494DF}">
-                  <a14:hiddenLine xmlns="" xmlns:a14="http://schemas.microsoft.com/office/drawing/2010/main" w="9525">
+                  <a14:hiddenLine xmlns:a14="http://schemas.microsoft.com/office/drawing/2010/main" xmlns="" w="9525">
                     <a:solidFill>
                       <a:srgbClr val="000000"/>
                     </a:solidFill>
@@ -13226,7 +13230,7 @@
               </a:ln>
               <a:extLst>
                 <a:ext uri="{91240B29-F687-4f45-9708-019B960494DF}">
-                  <a14:hiddenLine xmlns="" xmlns:a14="http://schemas.microsoft.com/office/drawing/2010/main" w="9525">
+                  <a14:hiddenLine xmlns:a14="http://schemas.microsoft.com/office/drawing/2010/main" xmlns="" w="9525">
                     <a:solidFill>
                       <a:srgbClr val="000000"/>
                     </a:solidFill>
@@ -13316,7 +13320,7 @@
               </a:ln>
               <a:extLst>
                 <a:ext uri="{91240B29-F687-4f45-9708-019B960494DF}">
-                  <a14:hiddenLine xmlns="" xmlns:a14="http://schemas.microsoft.com/office/drawing/2010/main" w="9525">
+                  <a14:hiddenLine xmlns:a14="http://schemas.microsoft.com/office/drawing/2010/main" xmlns="" w="9525">
                     <a:solidFill>
                       <a:srgbClr val="000000"/>
                     </a:solidFill>
@@ -13381,7 +13385,7 @@
               </a:ln>
               <a:extLst>
                 <a:ext uri="{91240B29-F687-4f45-9708-019B960494DF}">
-                  <a14:hiddenLine xmlns="" xmlns:a14="http://schemas.microsoft.com/office/drawing/2010/main" w="9525">
+                  <a14:hiddenLine xmlns:a14="http://schemas.microsoft.com/office/drawing/2010/main" xmlns="" w="9525">
                     <a:solidFill>
                       <a:srgbClr val="000000"/>
                     </a:solidFill>
@@ -13471,7 +13475,7 @@
               </a:ln>
               <a:extLst>
                 <a:ext uri="{91240B29-F687-4f45-9708-019B960494DF}">
-                  <a14:hiddenLine xmlns="" xmlns:a14="http://schemas.microsoft.com/office/drawing/2010/main" w="9525">
+                  <a14:hiddenLine xmlns:a14="http://schemas.microsoft.com/office/drawing/2010/main" xmlns="" w="9525">
                     <a:solidFill>
                       <a:srgbClr val="000000"/>
                     </a:solidFill>
@@ -13539,7 +13543,7 @@
               </a:ln>
               <a:extLst>
                 <a:ext uri="{91240B29-F687-4f45-9708-019B960494DF}">
-                  <a14:hiddenLine xmlns="" xmlns:a14="http://schemas.microsoft.com/office/drawing/2010/main" w="9525">
+                  <a14:hiddenLine xmlns:a14="http://schemas.microsoft.com/office/drawing/2010/main" xmlns="" w="9525">
                     <a:solidFill>
                       <a:srgbClr val="000000"/>
                     </a:solidFill>
@@ -13629,7 +13633,7 @@
               </a:ln>
               <a:extLst>
                 <a:ext uri="{91240B29-F687-4f45-9708-019B960494DF}">
-                  <a14:hiddenLine xmlns="" xmlns:a14="http://schemas.microsoft.com/office/drawing/2010/main" w="9525">
+                  <a14:hiddenLine xmlns:a14="http://schemas.microsoft.com/office/drawing/2010/main" xmlns="" w="9525">
                     <a:solidFill>
                       <a:srgbClr val="000000"/>
                     </a:solidFill>
@@ -13697,7 +13701,7 @@
               </a:ln>
               <a:extLst>
                 <a:ext uri="{91240B29-F687-4f45-9708-019B960494DF}">
-                  <a14:hiddenLine xmlns="" xmlns:a14="http://schemas.microsoft.com/office/drawing/2010/main" w="9525">
+                  <a14:hiddenLine xmlns:a14="http://schemas.microsoft.com/office/drawing/2010/main" xmlns="" w="9525">
                     <a:solidFill>
                       <a:srgbClr val="000000"/>
                     </a:solidFill>
@@ -13787,7 +13791,7 @@
               </a:ln>
               <a:extLst>
                 <a:ext uri="{91240B29-F687-4f45-9708-019B960494DF}">
-                  <a14:hiddenLine xmlns="" xmlns:a14="http://schemas.microsoft.com/office/drawing/2010/main" w="9525">
+                  <a14:hiddenLine xmlns:a14="http://schemas.microsoft.com/office/drawing/2010/main" xmlns="" w="9525">
                     <a:solidFill>
                       <a:srgbClr val="000000"/>
                     </a:solidFill>
@@ -13821,7 +13825,7 @@
               </a:ln>
               <a:extLst>
                 <a:ext uri="{91240B29-F687-4f45-9708-019B960494DF}">
-                  <a14:hiddenLine xmlns="" xmlns:a14="http://schemas.microsoft.com/office/drawing/2010/main" w="9525">
+                  <a14:hiddenLine xmlns:a14="http://schemas.microsoft.com/office/drawing/2010/main" xmlns="" w="9525">
                     <a:solidFill>
                       <a:srgbClr val="000000"/>
                     </a:solidFill>
@@ -13961,7 +13965,7 @@
           <a:p>
             <a:fld id="{D0D65A25-5B34-480B-8A82-D452FDC7444D}" type="datetimeFigureOut">
               <a:rPr lang="es-ES" smtClean="0"/>
-              <a:t>15/01/2022</a:t>
+              <a:t>16/01/2022</a:t>
             </a:fld>
             <a:endParaRPr lang="es-ES" dirty="0"/>
           </a:p>
@@ -14704,13 +14708,13 @@
   <p:clrMapOvr>
     <a:masterClrMapping/>
   </p:clrMapOvr>
-  <mc:AlternateContent xmlns:mc="http://schemas.openxmlformats.org/markup-compatibility/2006">
-    <mc:Choice xmlns:p14="http://schemas.microsoft.com/office/powerpoint/2010/main" Requires="p14">
+  <mc:AlternateContent xmlns:mc="http://schemas.openxmlformats.org/markup-compatibility/2006" xmlns:p14="http://schemas.microsoft.com/office/powerpoint/2010/main">
+    <mc:Choice Requires="p14">
       <p:transition spd="slow" p14:dur="2000">
         <p14:vortex dir="r"/>
       </p:transition>
     </mc:Choice>
-    <mc:Fallback>
+    <mc:Fallback xmlns="">
       <p:transition spd="slow">
         <p:fade/>
       </p:transition>
@@ -16097,13 +16101,13 @@
   <p:clrMapOvr>
     <a:masterClrMapping/>
   </p:clrMapOvr>
-  <mc:AlternateContent xmlns:mc="http://schemas.openxmlformats.org/markup-compatibility/2006">
-    <mc:Choice xmlns:p14="http://schemas.microsoft.com/office/powerpoint/2010/main" Requires="p14">
+  <mc:AlternateContent xmlns:mc="http://schemas.openxmlformats.org/markup-compatibility/2006" xmlns:p14="http://schemas.microsoft.com/office/powerpoint/2010/main">
+    <mc:Choice Requires="p14">
       <p:transition spd="slow" p14:dur="1500">
         <p:split orient="vert"/>
       </p:transition>
     </mc:Choice>
-    <mc:Fallback>
+    <mc:Fallback xmlns="">
       <p:transition spd="slow">
         <p:split orient="vert"/>
       </p:transition>
@@ -19802,6 +19806,81 @@
           <p:cNvPr id="2" name="Title 1">
             <a:extLst>
               <a:ext uri="{FF2B5EF4-FFF2-40B4-BE49-F238E27FC236}">
+                <a16:creationId xmlns:a16="http://schemas.microsoft.com/office/drawing/2014/main" id="{78E9AE0E-9D47-4B15-B5D7-F81CA2BDB645}"/>
+              </a:ext>
+            </a:extLst>
+          </p:cNvPr>
+          <p:cNvSpPr>
+            <a:spLocks noGrp="1"/>
+          </p:cNvSpPr>
+          <p:nvPr>
+            <p:ph type="title"/>
+          </p:nvPr>
+        </p:nvSpPr>
+        <p:spPr>
+          <a:xfrm>
+            <a:off x="1143001" y="2689715"/>
+            <a:ext cx="9905998" cy="1478570"/>
+          </a:xfrm>
+        </p:spPr>
+        <p:txBody>
+          <a:bodyPr/>
+          <a:lstStyle/>
+          <a:p>
+            <a:r>
+              <a:rPr lang="en-GB" dirty="0"/>
+              <a:t>Live coding</a:t>
+            </a:r>
+            <a:r>
+              <a:rPr lang="es-ES" dirty="0"/>
+              <a:t>: </a:t>
+            </a:r>
+            <a:r>
+              <a:rPr lang="en-GB" dirty="0"/>
+              <a:t>titanic survival - Decision tree</a:t>
+            </a:r>
+            <a:endParaRPr lang="en-US" dirty="0"/>
+          </a:p>
+        </p:txBody>
+      </p:sp>
+    </p:spTree>
+    <p:extLst>
+      <p:ext uri="{BB962C8B-B14F-4D97-AF65-F5344CB8AC3E}">
+        <p14:creationId xmlns:p14="http://schemas.microsoft.com/office/powerpoint/2010/main" val="530779773"/>
+      </p:ext>
+    </p:extLst>
+  </p:cSld>
+  <p:clrMapOvr>
+    <a:masterClrMapping/>
+  </p:clrMapOvr>
+  <p:transition spd="slow">
+    <p:push dir="u"/>
+  </p:transition>
+</p:sld>
+</file>
+
+<file path=ppt/slides/slide9.xml><?xml version="1.0" encoding="utf-8"?>
+<p:sld xmlns:a="http://schemas.openxmlformats.org/drawingml/2006/main" xmlns:r="http://schemas.openxmlformats.org/officeDocument/2006/relationships" xmlns:p="http://schemas.openxmlformats.org/presentationml/2006/main">
+  <p:cSld>
+    <p:spTree>
+      <p:nvGrpSpPr>
+        <p:cNvPr id="1" name=""/>
+        <p:cNvGrpSpPr/>
+        <p:nvPr/>
+      </p:nvGrpSpPr>
+      <p:grpSpPr>
+        <a:xfrm>
+          <a:off x="0" y="0"/>
+          <a:ext cx="0" cy="0"/>
+          <a:chOff x="0" y="0"/>
+          <a:chExt cx="0" cy="0"/>
+        </a:xfrm>
+      </p:grpSpPr>
+      <p:sp>
+        <p:nvSpPr>
+          <p:cNvPr id="2" name="Title 1">
+            <a:extLst>
+              <a:ext uri="{FF2B5EF4-FFF2-40B4-BE49-F238E27FC236}">
                 <a16:creationId xmlns:a16="http://schemas.microsoft.com/office/drawing/2014/main" id="{B5107FA5-1280-47C6-A7F3-56691ACA32F5}"/>
               </a:ext>
             </a:extLst>

</xml_diff>

<commit_message>
Complete first part of power point
</commit_message>
<xml_diff>
--- a/semester-2-2021-2022/week-6-decision-tree/Decision_Tree.pptx
+++ b/semester-2-2021-2022/week-6-decision-tree/Decision_Tree.pptx
@@ -325,7 +325,7 @@
           <a:p>
             <a:fld id="{EB7DA543-F40B-4023-9892-3E6E3C6ABB89}" type="datetimeFigureOut">
               <a:rPr lang="en-GB" smtClean="0"/>
-              <a:t>16/01/2022</a:t>
+              <a:t>18/01/2022</a:t>
             </a:fld>
             <a:endParaRPr lang="en-GB"/>
           </a:p>
@@ -862,6 +862,94 @@
 </p:notes>
 </file>
 
+<file path=ppt/notesSlides/notesSlide12.xml><?xml version="1.0" encoding="utf-8"?>
+<p:notes xmlns:a="http://schemas.openxmlformats.org/drawingml/2006/main" xmlns:r="http://schemas.openxmlformats.org/officeDocument/2006/relationships" xmlns:p="http://schemas.openxmlformats.org/presentationml/2006/main">
+  <p:cSld>
+    <p:spTree>
+      <p:nvGrpSpPr>
+        <p:cNvPr id="1" name=""/>
+        <p:cNvGrpSpPr/>
+        <p:nvPr/>
+      </p:nvGrpSpPr>
+      <p:grpSpPr>
+        <a:xfrm>
+          <a:off x="0" y="0"/>
+          <a:ext cx="0" cy="0"/>
+          <a:chOff x="0" y="0"/>
+          <a:chExt cx="0" cy="0"/>
+        </a:xfrm>
+      </p:grpSpPr>
+      <p:sp>
+        <p:nvSpPr>
+          <p:cNvPr id="2" name="Slide Image Placeholder 1"/>
+          <p:cNvSpPr>
+            <a:spLocks noGrp="1" noRot="1" noChangeAspect="1"/>
+          </p:cNvSpPr>
+          <p:nvPr>
+            <p:ph type="sldImg"/>
+          </p:nvPr>
+        </p:nvSpPr>
+        <p:spPr/>
+      </p:sp>
+      <p:sp>
+        <p:nvSpPr>
+          <p:cNvPr id="3" name="Notes Placeholder 2"/>
+          <p:cNvSpPr>
+            <a:spLocks noGrp="1"/>
+          </p:cNvSpPr>
+          <p:nvPr>
+            <p:ph type="body" idx="1"/>
+          </p:nvPr>
+        </p:nvSpPr>
+        <p:spPr/>
+        <p:txBody>
+          <a:bodyPr/>
+          <a:lstStyle/>
+          <a:p>
+            <a:r>
+              <a:rPr lang="es-ES" dirty="0"/>
+              <a:t>c</a:t>
+            </a:r>
+            <a:endParaRPr lang="en-US" dirty="0"/>
+          </a:p>
+        </p:txBody>
+      </p:sp>
+      <p:sp>
+        <p:nvSpPr>
+          <p:cNvPr id="4" name="Slide Number Placeholder 3"/>
+          <p:cNvSpPr>
+            <a:spLocks noGrp="1"/>
+          </p:cNvSpPr>
+          <p:nvPr>
+            <p:ph type="sldNum" sz="quarter" idx="5"/>
+          </p:nvPr>
+        </p:nvSpPr>
+        <p:spPr/>
+        <p:txBody>
+          <a:bodyPr/>
+          <a:lstStyle/>
+          <a:p>
+            <a:fld id="{76682F04-6A67-4696-8350-ADB5B2C9822D}" type="slidenum">
+              <a:rPr lang="en-GB" smtClean="0"/>
+              <a:t>12</a:t>
+            </a:fld>
+            <a:endParaRPr lang="en-GB"/>
+          </a:p>
+        </p:txBody>
+      </p:sp>
+    </p:spTree>
+    <p:extLst>
+      <p:ext uri="{BB962C8B-B14F-4D97-AF65-F5344CB8AC3E}">
+        <p14:creationId xmlns:p14="http://schemas.microsoft.com/office/powerpoint/2010/main" val="1880085481"/>
+      </p:ext>
+    </p:extLst>
+  </p:cSld>
+  <p:clrMapOvr>
+    <a:masterClrMapping/>
+  </p:clrMapOvr>
+</p:notes>
+</file>
+
 <file path=ppt/notesSlides/notesSlide2.xml><?xml version="1.0" encoding="utf-8"?>
 <p:notes xmlns:a="http://schemas.openxmlformats.org/drawingml/2006/main" xmlns:r="http://schemas.openxmlformats.org/officeDocument/2006/relationships" xmlns:p="http://schemas.openxmlformats.org/presentationml/2006/main">
   <p:cSld>
@@ -2414,7 +2502,15 @@
           <a:p>
             <a:r>
               <a:rPr lang="en-GB" dirty="0"/>
-              <a:t>Knowing this property, the decision tree tries different attributes and test their Information Gain, this is the change in entropy. The attribute that can lower the most our uncertainty data will be our best choice.</a:t>
+              <a:t>Knowing this property, the decision tree tries different attributes and test their Information Gain, this is the change in entropy. The attribute that can lower the most our uncertainty data will be our best choice. In this case, attribute B will be </a:t>
+            </a:r>
+            <a:r>
+              <a:rPr lang="en-GB" dirty="0" err="1"/>
+              <a:t>choosen</a:t>
+            </a:r>
+            <a:r>
+              <a:rPr lang="en-GB" dirty="0"/>
+              <a:t>.</a:t>
             </a:r>
           </a:p>
           <a:p>
@@ -2514,7 +2610,7 @@
           <a:noFill/>
           <a:extLst>
             <a:ext uri="{909E8E84-426E-40dd-AFC4-6F175D3DCCD1}">
-              <a14:hiddenFill xmlns="" xmlns:a14="http://schemas.microsoft.com/office/drawing/2010/main">
+              <a14:hiddenFill xmlns:a14="http://schemas.microsoft.com/office/drawing/2010/main" xmlns="">
                 <a:solidFill>
                   <a:srgbClr val="FFFFFF"/>
                 </a:solidFill>
@@ -2574,7 +2670,7 @@
             </a:ln>
             <a:extLst>
               <a:ext uri="{91240B29-F687-4f45-9708-019B960494DF}">
-                <a14:hiddenLine xmlns="" xmlns:a14="http://schemas.microsoft.com/office/drawing/2010/main" w="9525">
+                <a14:hiddenLine xmlns:a14="http://schemas.microsoft.com/office/drawing/2010/main" xmlns="" w="9525">
                   <a:solidFill>
                     <a:srgbClr val="000000"/>
                   </a:solidFill>
@@ -2664,7 +2760,7 @@
             </a:ln>
             <a:extLst>
               <a:ext uri="{91240B29-F687-4f45-9708-019B960494DF}">
-                <a14:hiddenLine xmlns="" xmlns:a14="http://schemas.microsoft.com/office/drawing/2010/main" w="9525">
+                <a14:hiddenLine xmlns:a14="http://schemas.microsoft.com/office/drawing/2010/main" xmlns="" w="9525">
                   <a:solidFill>
                     <a:srgbClr val="000000"/>
                   </a:solidFill>
@@ -2754,7 +2850,7 @@
             </a:ln>
             <a:extLst>
               <a:ext uri="{91240B29-F687-4f45-9708-019B960494DF}">
-                <a14:hiddenLine xmlns="" xmlns:a14="http://schemas.microsoft.com/office/drawing/2010/main" w="9525">
+                <a14:hiddenLine xmlns:a14="http://schemas.microsoft.com/office/drawing/2010/main" xmlns="" w="9525">
                   <a:solidFill>
                     <a:srgbClr val="000000"/>
                   </a:solidFill>
@@ -2788,7 +2884,7 @@
             </a:ln>
             <a:extLst>
               <a:ext uri="{91240B29-F687-4f45-9708-019B960494DF}">
-                <a14:hiddenLine xmlns="" xmlns:a14="http://schemas.microsoft.com/office/drawing/2010/main" w="9525">
+                <a14:hiddenLine xmlns:a14="http://schemas.microsoft.com/office/drawing/2010/main" xmlns="" w="9525">
                   <a:solidFill>
                     <a:srgbClr val="000000"/>
                   </a:solidFill>
@@ -2878,7 +2974,7 @@
             </a:ln>
             <a:extLst>
               <a:ext uri="{91240B29-F687-4f45-9708-019B960494DF}">
-                <a14:hiddenLine xmlns="" xmlns:a14="http://schemas.microsoft.com/office/drawing/2010/main" w="9525">
+                <a14:hiddenLine xmlns:a14="http://schemas.microsoft.com/office/drawing/2010/main" xmlns="" w="9525">
                   <a:solidFill>
                     <a:srgbClr val="000000"/>
                   </a:solidFill>
@@ -2940,7 +3036,7 @@
             </a:ln>
             <a:extLst>
               <a:ext uri="{91240B29-F687-4f45-9708-019B960494DF}">
-                <a14:hiddenLine xmlns="" xmlns:a14="http://schemas.microsoft.com/office/drawing/2010/main" w="9525">
+                <a14:hiddenLine xmlns:a14="http://schemas.microsoft.com/office/drawing/2010/main" xmlns="" w="9525">
                   <a:solidFill>
                     <a:srgbClr val="000000"/>
                   </a:solidFill>
@@ -3002,7 +3098,7 @@
             </a:ln>
             <a:extLst>
               <a:ext uri="{91240B29-F687-4f45-9708-019B960494DF}">
-                <a14:hiddenLine xmlns="" xmlns:a14="http://schemas.microsoft.com/office/drawing/2010/main" w="9525">
+                <a14:hiddenLine xmlns:a14="http://schemas.microsoft.com/office/drawing/2010/main" xmlns="" w="9525">
                   <a:solidFill>
                     <a:srgbClr val="000000"/>
                   </a:solidFill>
@@ -3092,7 +3188,7 @@
             </a:ln>
             <a:extLst>
               <a:ext uri="{91240B29-F687-4f45-9708-019B960494DF}">
-                <a14:hiddenLine xmlns="" xmlns:a14="http://schemas.microsoft.com/office/drawing/2010/main" w="9525">
+                <a14:hiddenLine xmlns:a14="http://schemas.microsoft.com/office/drawing/2010/main" xmlns="" w="9525">
                   <a:solidFill>
                     <a:srgbClr val="000000"/>
                   </a:solidFill>
@@ -3154,7 +3250,7 @@
             </a:ln>
             <a:extLst>
               <a:ext uri="{91240B29-F687-4f45-9708-019B960494DF}">
-                <a14:hiddenLine xmlns="" xmlns:a14="http://schemas.microsoft.com/office/drawing/2010/main" w="9525">
+                <a14:hiddenLine xmlns:a14="http://schemas.microsoft.com/office/drawing/2010/main" xmlns="" w="9525">
                   <a:solidFill>
                     <a:srgbClr val="000000"/>
                   </a:solidFill>
@@ -3216,7 +3312,7 @@
             </a:ln>
             <a:extLst>
               <a:ext uri="{91240B29-F687-4f45-9708-019B960494DF}">
-                <a14:hiddenLine xmlns="" xmlns:a14="http://schemas.microsoft.com/office/drawing/2010/main" w="9525">
+                <a14:hiddenLine xmlns:a14="http://schemas.microsoft.com/office/drawing/2010/main" xmlns="" w="9525">
                   <a:solidFill>
                     <a:srgbClr val="000000"/>
                   </a:solidFill>
@@ -3306,7 +3402,7 @@
             </a:ln>
             <a:extLst>
               <a:ext uri="{91240B29-F687-4f45-9708-019B960494DF}">
-                <a14:hiddenLine xmlns="" xmlns:a14="http://schemas.microsoft.com/office/drawing/2010/main" w="9525">
+                <a14:hiddenLine xmlns:a14="http://schemas.microsoft.com/office/drawing/2010/main" xmlns="" w="9525">
                   <a:solidFill>
                     <a:srgbClr val="000000"/>
                   </a:solidFill>
@@ -3396,7 +3492,7 @@
             </a:ln>
             <a:extLst>
               <a:ext uri="{91240B29-F687-4f45-9708-019B960494DF}">
-                <a14:hiddenLine xmlns="" xmlns:a14="http://schemas.microsoft.com/office/drawing/2010/main" w="9525">
+                <a14:hiddenLine xmlns:a14="http://schemas.microsoft.com/office/drawing/2010/main" xmlns="" w="9525">
                   <a:solidFill>
                     <a:srgbClr val="000000"/>
                   </a:solidFill>
@@ -3458,7 +3554,7 @@
             </a:ln>
             <a:extLst>
               <a:ext uri="{91240B29-F687-4f45-9708-019B960494DF}">
-                <a14:hiddenLine xmlns="" xmlns:a14="http://schemas.microsoft.com/office/drawing/2010/main" w="9525">
+                <a14:hiddenLine xmlns:a14="http://schemas.microsoft.com/office/drawing/2010/main" xmlns="" w="9525">
                   <a:solidFill>
                     <a:srgbClr val="000000"/>
                   </a:solidFill>
@@ -3568,7 +3664,7 @@
             </a:ln>
             <a:extLst>
               <a:ext uri="{91240B29-F687-4f45-9708-019B960494DF}">
-                <a14:hiddenLine xmlns="" xmlns:a14="http://schemas.microsoft.com/office/drawing/2010/main" w="9525">
+                <a14:hiddenLine xmlns:a14="http://schemas.microsoft.com/office/drawing/2010/main" xmlns="" w="9525">
                   <a:solidFill>
                     <a:srgbClr val="000000"/>
                   </a:solidFill>
@@ -3630,7 +3726,7 @@
             </a:ln>
             <a:extLst>
               <a:ext uri="{91240B29-F687-4f45-9708-019B960494DF}">
-                <a14:hiddenLine xmlns="" xmlns:a14="http://schemas.microsoft.com/office/drawing/2010/main" w="9525">
+                <a14:hiddenLine xmlns:a14="http://schemas.microsoft.com/office/drawing/2010/main" xmlns="" w="9525">
                   <a:solidFill>
                     <a:srgbClr val="000000"/>
                   </a:solidFill>
@@ -3720,7 +3816,7 @@
             </a:ln>
             <a:extLst>
               <a:ext uri="{91240B29-F687-4f45-9708-019B960494DF}">
-                <a14:hiddenLine xmlns="" xmlns:a14="http://schemas.microsoft.com/office/drawing/2010/main" w="9525">
+                <a14:hiddenLine xmlns:a14="http://schemas.microsoft.com/office/drawing/2010/main" xmlns="" w="9525">
                   <a:solidFill>
                     <a:srgbClr val="000000"/>
                   </a:solidFill>
@@ -3810,7 +3906,7 @@
             </a:ln>
             <a:extLst>
               <a:ext uri="{91240B29-F687-4f45-9708-019B960494DF}">
-                <a14:hiddenLine xmlns="" xmlns:a14="http://schemas.microsoft.com/office/drawing/2010/main" w="9525">
+                <a14:hiddenLine xmlns:a14="http://schemas.microsoft.com/office/drawing/2010/main" xmlns="" w="9525">
                   <a:solidFill>
                     <a:srgbClr val="000000"/>
                   </a:solidFill>
@@ -3872,7 +3968,7 @@
             </a:ln>
             <a:extLst>
               <a:ext uri="{91240B29-F687-4f45-9708-019B960494DF}">
-                <a14:hiddenLine xmlns="" xmlns:a14="http://schemas.microsoft.com/office/drawing/2010/main" w="9525">
+                <a14:hiddenLine xmlns:a14="http://schemas.microsoft.com/office/drawing/2010/main" xmlns="" w="9525">
                   <a:solidFill>
                     <a:srgbClr val="000000"/>
                   </a:solidFill>
@@ -3962,7 +4058,7 @@
             </a:ln>
             <a:extLst>
               <a:ext uri="{91240B29-F687-4f45-9708-019B960494DF}">
-                <a14:hiddenLine xmlns="" xmlns:a14="http://schemas.microsoft.com/office/drawing/2010/main" w="9525">
+                <a14:hiddenLine xmlns:a14="http://schemas.microsoft.com/office/drawing/2010/main" xmlns="" w="9525">
                   <a:solidFill>
                     <a:srgbClr val="000000"/>
                   </a:solidFill>
@@ -4052,7 +4148,7 @@
             </a:ln>
             <a:extLst>
               <a:ext uri="{91240B29-F687-4f45-9708-019B960494DF}">
-                <a14:hiddenLine xmlns="" xmlns:a14="http://schemas.microsoft.com/office/drawing/2010/main" w="9525">
+                <a14:hiddenLine xmlns:a14="http://schemas.microsoft.com/office/drawing/2010/main" xmlns="" w="9525">
                   <a:solidFill>
                     <a:srgbClr val="000000"/>
                   </a:solidFill>
@@ -4108,7 +4204,7 @@
             </a:ln>
             <a:extLst>
               <a:ext uri="{91240B29-F687-4f45-9708-019B960494DF}">
-                <a14:hiddenLine xmlns="" xmlns:a14="http://schemas.microsoft.com/office/drawing/2010/main" w="9525">
+                <a14:hiddenLine xmlns:a14="http://schemas.microsoft.com/office/drawing/2010/main" xmlns="" w="9525">
                   <a:solidFill>
                     <a:srgbClr val="000000"/>
                   </a:solidFill>
@@ -4198,7 +4294,7 @@
             </a:ln>
             <a:extLst>
               <a:ext uri="{91240B29-F687-4f45-9708-019B960494DF}">
-                <a14:hiddenLine xmlns="" xmlns:a14="http://schemas.microsoft.com/office/drawing/2010/main" w="9525">
+                <a14:hiddenLine xmlns:a14="http://schemas.microsoft.com/office/drawing/2010/main" xmlns="" w="9525">
                   <a:solidFill>
                     <a:srgbClr val="000000"/>
                   </a:solidFill>
@@ -4254,7 +4350,7 @@
             </a:ln>
             <a:extLst>
               <a:ext uri="{91240B29-F687-4f45-9708-019B960494DF}">
-                <a14:hiddenLine xmlns="" xmlns:a14="http://schemas.microsoft.com/office/drawing/2010/main" w="9525">
+                <a14:hiddenLine xmlns:a14="http://schemas.microsoft.com/office/drawing/2010/main" xmlns="" w="9525">
                   <a:solidFill>
                     <a:srgbClr val="000000"/>
                   </a:solidFill>
@@ -4344,7 +4440,7 @@
             </a:ln>
             <a:extLst>
               <a:ext uri="{91240B29-F687-4f45-9708-019B960494DF}">
-                <a14:hiddenLine xmlns="" xmlns:a14="http://schemas.microsoft.com/office/drawing/2010/main" w="9525">
+                <a14:hiddenLine xmlns:a14="http://schemas.microsoft.com/office/drawing/2010/main" xmlns="" w="9525">
                   <a:solidFill>
                     <a:srgbClr val="000000"/>
                   </a:solidFill>
@@ -4412,7 +4508,7 @@
             </a:ln>
             <a:extLst>
               <a:ext uri="{91240B29-F687-4f45-9708-019B960494DF}">
-                <a14:hiddenLine xmlns="" xmlns:a14="http://schemas.microsoft.com/office/drawing/2010/main" w="9525">
+                <a14:hiddenLine xmlns:a14="http://schemas.microsoft.com/office/drawing/2010/main" xmlns="" w="9525">
                   <a:solidFill>
                     <a:srgbClr val="000000"/>
                   </a:solidFill>
@@ -4502,7 +4598,7 @@
             </a:ln>
             <a:extLst>
               <a:ext uri="{91240B29-F687-4f45-9708-019B960494DF}">
-                <a14:hiddenLine xmlns="" xmlns:a14="http://schemas.microsoft.com/office/drawing/2010/main" w="9525">
+                <a14:hiddenLine xmlns:a14="http://schemas.microsoft.com/office/drawing/2010/main" xmlns="" w="9525">
                   <a:solidFill>
                     <a:srgbClr val="000000"/>
                   </a:solidFill>
@@ -4570,7 +4666,7 @@
             </a:ln>
             <a:extLst>
               <a:ext uri="{91240B29-F687-4f45-9708-019B960494DF}">
-                <a14:hiddenLine xmlns="" xmlns:a14="http://schemas.microsoft.com/office/drawing/2010/main" w="9525">
+                <a14:hiddenLine xmlns:a14="http://schemas.microsoft.com/office/drawing/2010/main" xmlns="" w="9525">
                   <a:solidFill>
                     <a:srgbClr val="000000"/>
                   </a:solidFill>
@@ -4660,7 +4756,7 @@
             </a:ln>
             <a:extLst>
               <a:ext uri="{91240B29-F687-4f45-9708-019B960494DF}">
-                <a14:hiddenLine xmlns="" xmlns:a14="http://schemas.microsoft.com/office/drawing/2010/main" w="9525">
+                <a14:hiddenLine xmlns:a14="http://schemas.microsoft.com/office/drawing/2010/main" xmlns="" w="9525">
                   <a:solidFill>
                     <a:srgbClr val="000000"/>
                   </a:solidFill>
@@ -4694,7 +4790,7 @@
             </a:ln>
             <a:extLst>
               <a:ext uri="{91240B29-F687-4f45-9708-019B960494DF}">
-                <a14:hiddenLine xmlns="" xmlns:a14="http://schemas.microsoft.com/office/drawing/2010/main" w="9525">
+                <a14:hiddenLine xmlns:a14="http://schemas.microsoft.com/office/drawing/2010/main" xmlns="" w="9525">
                   <a:solidFill>
                     <a:srgbClr val="000000"/>
                   </a:solidFill>
@@ -4784,7 +4880,7 @@
             </a:ln>
             <a:extLst>
               <a:ext uri="{91240B29-F687-4f45-9708-019B960494DF}">
-                <a14:hiddenLine xmlns="" xmlns:a14="http://schemas.microsoft.com/office/drawing/2010/main" w="9525">
+                <a14:hiddenLine xmlns:a14="http://schemas.microsoft.com/office/drawing/2010/main" xmlns="" w="9525">
                   <a:solidFill>
                     <a:srgbClr val="000000"/>
                   </a:solidFill>
@@ -4846,7 +4942,7 @@
             </a:ln>
             <a:extLst>
               <a:ext uri="{91240B29-F687-4f45-9708-019B960494DF}">
-                <a14:hiddenLine xmlns="" xmlns:a14="http://schemas.microsoft.com/office/drawing/2010/main" w="9525">
+                <a14:hiddenLine xmlns:a14="http://schemas.microsoft.com/office/drawing/2010/main" xmlns="" w="9525">
                   <a:solidFill>
                     <a:srgbClr val="000000"/>
                   </a:solidFill>
@@ -4908,7 +5004,7 @@
             </a:ln>
             <a:extLst>
               <a:ext uri="{91240B29-F687-4f45-9708-019B960494DF}">
-                <a14:hiddenLine xmlns="" xmlns:a14="http://schemas.microsoft.com/office/drawing/2010/main" w="9525">
+                <a14:hiddenLine xmlns:a14="http://schemas.microsoft.com/office/drawing/2010/main" xmlns="" w="9525">
                   <a:solidFill>
                     <a:srgbClr val="000000"/>
                   </a:solidFill>
@@ -4998,7 +5094,7 @@
             </a:ln>
             <a:extLst>
               <a:ext uri="{91240B29-F687-4f45-9708-019B960494DF}">
-                <a14:hiddenLine xmlns="" xmlns:a14="http://schemas.microsoft.com/office/drawing/2010/main" w="9525">
+                <a14:hiddenLine xmlns:a14="http://schemas.microsoft.com/office/drawing/2010/main" xmlns="" w="9525">
                   <a:solidFill>
                     <a:srgbClr val="000000"/>
                   </a:solidFill>
@@ -5066,7 +5162,7 @@
             </a:ln>
             <a:extLst>
               <a:ext uri="{91240B29-F687-4f45-9708-019B960494DF}">
-                <a14:hiddenLine xmlns="" xmlns:a14="http://schemas.microsoft.com/office/drawing/2010/main" w="9525">
+                <a14:hiddenLine xmlns:a14="http://schemas.microsoft.com/office/drawing/2010/main" xmlns="" w="9525">
                   <a:solidFill>
                     <a:srgbClr val="000000"/>
                   </a:solidFill>
@@ -5128,7 +5224,7 @@
             </a:ln>
             <a:extLst>
               <a:ext uri="{91240B29-F687-4f45-9708-019B960494DF}">
-                <a14:hiddenLine xmlns="" xmlns:a14="http://schemas.microsoft.com/office/drawing/2010/main" w="9525">
+                <a14:hiddenLine xmlns:a14="http://schemas.microsoft.com/office/drawing/2010/main" xmlns="" w="9525">
                   <a:solidFill>
                     <a:srgbClr val="000000"/>
                   </a:solidFill>
@@ -5218,7 +5314,7 @@
             </a:ln>
             <a:extLst>
               <a:ext uri="{91240B29-F687-4f45-9708-019B960494DF}">
-                <a14:hiddenLine xmlns="" xmlns:a14="http://schemas.microsoft.com/office/drawing/2010/main" w="9525">
+                <a14:hiddenLine xmlns:a14="http://schemas.microsoft.com/office/drawing/2010/main" xmlns="" w="9525">
                   <a:solidFill>
                     <a:srgbClr val="000000"/>
                   </a:solidFill>
@@ -5280,7 +5376,7 @@
             </a:ln>
             <a:extLst>
               <a:ext uri="{91240B29-F687-4f45-9708-019B960494DF}">
-                <a14:hiddenLine xmlns="" xmlns:a14="http://schemas.microsoft.com/office/drawing/2010/main" w="9525">
+                <a14:hiddenLine xmlns:a14="http://schemas.microsoft.com/office/drawing/2010/main" xmlns="" w="9525">
                   <a:solidFill>
                     <a:srgbClr val="000000"/>
                   </a:solidFill>
@@ -5370,7 +5466,7 @@
             </a:ln>
             <a:extLst>
               <a:ext uri="{91240B29-F687-4f45-9708-019B960494DF}">
-                <a14:hiddenLine xmlns="" xmlns:a14="http://schemas.microsoft.com/office/drawing/2010/main" w="9525">
+                <a14:hiddenLine xmlns:a14="http://schemas.microsoft.com/office/drawing/2010/main" xmlns="" w="9525">
                   <a:solidFill>
                     <a:srgbClr val="000000"/>
                   </a:solidFill>
@@ -5432,7 +5528,7 @@
             </a:ln>
             <a:extLst>
               <a:ext uri="{91240B29-F687-4f45-9708-019B960494DF}">
-                <a14:hiddenLine xmlns="" xmlns:a14="http://schemas.microsoft.com/office/drawing/2010/main" w="9525">
+                <a14:hiddenLine xmlns:a14="http://schemas.microsoft.com/office/drawing/2010/main" xmlns="" w="9525">
                   <a:solidFill>
                     <a:srgbClr val="000000"/>
                   </a:solidFill>
@@ -5522,7 +5618,7 @@
             </a:ln>
             <a:extLst>
               <a:ext uri="{91240B29-F687-4f45-9708-019B960494DF}">
-                <a14:hiddenLine xmlns="" xmlns:a14="http://schemas.microsoft.com/office/drawing/2010/main" w="9525">
+                <a14:hiddenLine xmlns:a14="http://schemas.microsoft.com/office/drawing/2010/main" xmlns="" w="9525">
                   <a:solidFill>
                     <a:srgbClr val="000000"/>
                   </a:solidFill>
@@ -5556,7 +5652,7 @@
             </a:ln>
             <a:extLst>
               <a:ext uri="{91240B29-F687-4f45-9708-019B960494DF}">
-                <a14:hiddenLine xmlns="" xmlns:a14="http://schemas.microsoft.com/office/drawing/2010/main" w="9525">
+                <a14:hiddenLine xmlns:a14="http://schemas.microsoft.com/office/drawing/2010/main" xmlns="" w="9525">
                   <a:solidFill>
                     <a:srgbClr val="000000"/>
                   </a:solidFill>
@@ -5621,7 +5717,7 @@
             </a:ln>
             <a:extLst>
               <a:ext uri="{91240B29-F687-4f45-9708-019B960494DF}">
-                <a14:hiddenLine xmlns="" xmlns:a14="http://schemas.microsoft.com/office/drawing/2010/main" w="9525">
+                <a14:hiddenLine xmlns:a14="http://schemas.microsoft.com/office/drawing/2010/main" xmlns="" w="9525">
                   <a:solidFill>
                     <a:srgbClr val="000000"/>
                   </a:solidFill>
@@ -5711,7 +5807,7 @@
             </a:ln>
             <a:extLst>
               <a:ext uri="{91240B29-F687-4f45-9708-019B960494DF}">
-                <a14:hiddenLine xmlns="" xmlns:a14="http://schemas.microsoft.com/office/drawing/2010/main" w="9525">
+                <a14:hiddenLine xmlns:a14="http://schemas.microsoft.com/office/drawing/2010/main" xmlns="" w="9525">
                   <a:solidFill>
                     <a:srgbClr val="000000"/>
                   </a:solidFill>
@@ -5773,7 +5869,7 @@
             </a:ln>
             <a:extLst>
               <a:ext uri="{91240B29-F687-4f45-9708-019B960494DF}">
-                <a14:hiddenLine xmlns="" xmlns:a14="http://schemas.microsoft.com/office/drawing/2010/main" w="9525">
+                <a14:hiddenLine xmlns:a14="http://schemas.microsoft.com/office/drawing/2010/main" xmlns="" w="9525">
                   <a:solidFill>
                     <a:srgbClr val="000000"/>
                   </a:solidFill>
@@ -5863,7 +5959,7 @@
             </a:ln>
             <a:extLst>
               <a:ext uri="{91240B29-F687-4f45-9708-019B960494DF}">
-                <a14:hiddenLine xmlns="" xmlns:a14="http://schemas.microsoft.com/office/drawing/2010/main" w="9525">
+                <a14:hiddenLine xmlns:a14="http://schemas.microsoft.com/office/drawing/2010/main" xmlns="" w="9525">
                   <a:solidFill>
                     <a:srgbClr val="000000"/>
                   </a:solidFill>
@@ -5953,7 +6049,7 @@
             </a:ln>
             <a:extLst>
               <a:ext uri="{91240B29-F687-4f45-9708-019B960494DF}">
-                <a14:hiddenLine xmlns="" xmlns:a14="http://schemas.microsoft.com/office/drawing/2010/main" w="9525">
+                <a14:hiddenLine xmlns:a14="http://schemas.microsoft.com/office/drawing/2010/main" xmlns="" w="9525">
                   <a:solidFill>
                     <a:srgbClr val="000000"/>
                   </a:solidFill>
@@ -6018,7 +6114,7 @@
             </a:ln>
             <a:extLst>
               <a:ext uri="{91240B29-F687-4f45-9708-019B960494DF}">
-                <a14:hiddenLine xmlns="" xmlns:a14="http://schemas.microsoft.com/office/drawing/2010/main" w="9525">
+                <a14:hiddenLine xmlns:a14="http://schemas.microsoft.com/office/drawing/2010/main" xmlns="" w="9525">
                   <a:solidFill>
                     <a:srgbClr val="000000"/>
                   </a:solidFill>
@@ -6080,7 +6176,7 @@
             </a:ln>
             <a:extLst>
               <a:ext uri="{91240B29-F687-4f45-9708-019B960494DF}">
-                <a14:hiddenLine xmlns="" xmlns:a14="http://schemas.microsoft.com/office/drawing/2010/main" w="9525">
+                <a14:hiddenLine xmlns:a14="http://schemas.microsoft.com/office/drawing/2010/main" xmlns="" w="9525">
                   <a:solidFill>
                     <a:srgbClr val="000000"/>
                   </a:solidFill>
@@ -6170,7 +6266,7 @@
             </a:ln>
             <a:extLst>
               <a:ext uri="{91240B29-F687-4f45-9708-019B960494DF}">
-                <a14:hiddenLine xmlns="" xmlns:a14="http://schemas.microsoft.com/office/drawing/2010/main" w="9525">
+                <a14:hiddenLine xmlns:a14="http://schemas.microsoft.com/office/drawing/2010/main" xmlns="" w="9525">
                   <a:solidFill>
                     <a:srgbClr val="000000"/>
                   </a:solidFill>
@@ -6260,7 +6356,7 @@
             </a:ln>
             <a:extLst>
               <a:ext uri="{91240B29-F687-4f45-9708-019B960494DF}">
-                <a14:hiddenLine xmlns="" xmlns:a14="http://schemas.microsoft.com/office/drawing/2010/main" w="9525">
+                <a14:hiddenLine xmlns:a14="http://schemas.microsoft.com/office/drawing/2010/main" xmlns="" w="9525">
                   <a:solidFill>
                     <a:srgbClr val="000000"/>
                   </a:solidFill>
@@ -6322,7 +6418,7 @@
             </a:ln>
             <a:extLst>
               <a:ext uri="{91240B29-F687-4f45-9708-019B960494DF}">
-                <a14:hiddenLine xmlns="" xmlns:a14="http://schemas.microsoft.com/office/drawing/2010/main" w="9525">
+                <a14:hiddenLine xmlns:a14="http://schemas.microsoft.com/office/drawing/2010/main" xmlns="" w="9525">
                   <a:solidFill>
                     <a:srgbClr val="000000"/>
                   </a:solidFill>
@@ -6442,7 +6538,7 @@
             </a:ln>
             <a:extLst>
               <a:ext uri="{91240B29-F687-4f45-9708-019B960494DF}">
-                <a14:hiddenLine xmlns="" xmlns:a14="http://schemas.microsoft.com/office/drawing/2010/main" w="9525">
+                <a14:hiddenLine xmlns:a14="http://schemas.microsoft.com/office/drawing/2010/main" xmlns="" w="9525">
                   <a:solidFill>
                     <a:srgbClr val="000000"/>
                   </a:solidFill>
@@ -6510,7 +6606,7 @@
             </a:ln>
             <a:extLst>
               <a:ext uri="{91240B29-F687-4f45-9708-019B960494DF}">
-                <a14:hiddenLine xmlns="" xmlns:a14="http://schemas.microsoft.com/office/drawing/2010/main" w="9525">
+                <a14:hiddenLine xmlns:a14="http://schemas.microsoft.com/office/drawing/2010/main" xmlns="" w="9525">
                   <a:solidFill>
                     <a:srgbClr val="000000"/>
                   </a:solidFill>
@@ -6600,7 +6696,7 @@
             </a:ln>
             <a:extLst>
               <a:ext uri="{91240B29-F687-4f45-9708-019B960494DF}">
-                <a14:hiddenLine xmlns="" xmlns:a14="http://schemas.microsoft.com/office/drawing/2010/main" w="9525">
+                <a14:hiddenLine xmlns:a14="http://schemas.microsoft.com/office/drawing/2010/main" xmlns="" w="9525">
                   <a:solidFill>
                     <a:srgbClr val="000000"/>
                   </a:solidFill>
@@ -6740,7 +6836,7 @@
           <a:p>
             <a:fld id="{D0D65A25-5B34-480B-8A82-D452FDC7444D}" type="datetimeFigureOut">
               <a:rPr lang="es-ES" smtClean="0"/>
-              <a:t>16/01/2022</a:t>
+              <a:t>18/01/2022</a:t>
             </a:fld>
             <a:endParaRPr lang="es-ES" dirty="0"/>
           </a:p>
@@ -7006,7 +7102,7 @@
           <a:p>
             <a:fld id="{D0D65A25-5B34-480B-8A82-D452FDC7444D}" type="datetimeFigureOut">
               <a:rPr lang="es-ES" smtClean="0"/>
-              <a:t>16/01/2022</a:t>
+              <a:t>18/01/2022</a:t>
             </a:fld>
             <a:endParaRPr lang="es-ES" dirty="0"/>
           </a:p>
@@ -7202,7 +7298,7 @@
           <a:p>
             <a:fld id="{D0D65A25-5B34-480B-8A82-D452FDC7444D}" type="datetimeFigureOut">
               <a:rPr lang="es-ES" smtClean="0"/>
-              <a:t>16/01/2022</a:t>
+              <a:t>18/01/2022</a:t>
             </a:fld>
             <a:endParaRPr lang="es-ES" dirty="0"/>
           </a:p>
@@ -7465,7 +7561,7 @@
           <a:p>
             <a:fld id="{D0D65A25-5B34-480B-8A82-D452FDC7444D}" type="datetimeFigureOut">
               <a:rPr lang="es-ES" smtClean="0"/>
-              <a:t>16/01/2022</a:t>
+              <a:t>18/01/2022</a:t>
             </a:fld>
             <a:endParaRPr lang="es-ES" dirty="0"/>
           </a:p>
@@ -7899,7 +7995,7 @@
           <a:p>
             <a:fld id="{D0D65A25-5B34-480B-8A82-D452FDC7444D}" type="datetimeFigureOut">
               <a:rPr lang="es-ES" smtClean="0"/>
-              <a:t>16/01/2022</a:t>
+              <a:t>18/01/2022</a:t>
             </a:fld>
             <a:endParaRPr lang="es-ES" dirty="0"/>
           </a:p>
@@ -8445,7 +8541,7 @@
           <a:p>
             <a:fld id="{D0D65A25-5B34-480B-8A82-D452FDC7444D}" type="datetimeFigureOut">
               <a:rPr lang="es-ES" smtClean="0"/>
-              <a:t>16/01/2022</a:t>
+              <a:t>18/01/2022</a:t>
             </a:fld>
             <a:endParaRPr lang="es-ES" dirty="0"/>
           </a:p>
@@ -9162,7 +9258,7 @@
           <a:p>
             <a:fld id="{D0D65A25-5B34-480B-8A82-D452FDC7444D}" type="datetimeFigureOut">
               <a:rPr lang="es-ES" smtClean="0"/>
-              <a:t>16/01/2022</a:t>
+              <a:t>18/01/2022</a:t>
             </a:fld>
             <a:endParaRPr lang="es-ES" dirty="0"/>
           </a:p>
@@ -9332,7 +9428,7 @@
           <a:p>
             <a:fld id="{D0D65A25-5B34-480B-8A82-D452FDC7444D}" type="datetimeFigureOut">
               <a:rPr lang="es-ES" smtClean="0"/>
-              <a:t>16/01/2022</a:t>
+              <a:t>18/01/2022</a:t>
             </a:fld>
             <a:endParaRPr lang="es-ES" dirty="0"/>
           </a:p>
@@ -9512,7 +9608,7 @@
           <a:p>
             <a:fld id="{D0D65A25-5B34-480B-8A82-D452FDC7444D}" type="datetimeFigureOut">
               <a:rPr lang="es-ES" smtClean="0"/>
-              <a:t>16/01/2022</a:t>
+              <a:t>18/01/2022</a:t>
             </a:fld>
             <a:endParaRPr lang="es-ES" dirty="0"/>
           </a:p>
@@ -9682,7 +9778,7 @@
           <a:p>
             <a:fld id="{D0D65A25-5B34-480B-8A82-D452FDC7444D}" type="datetimeFigureOut">
               <a:rPr lang="es-ES" smtClean="0"/>
-              <a:t>16/01/2022</a:t>
+              <a:t>18/01/2022</a:t>
             </a:fld>
             <a:endParaRPr lang="es-ES" dirty="0"/>
           </a:p>
@@ -9932,7 +10028,7 @@
           <a:p>
             <a:fld id="{D0D65A25-5B34-480B-8A82-D452FDC7444D}" type="datetimeFigureOut">
               <a:rPr lang="es-ES" smtClean="0"/>
-              <a:t>16/01/2022</a:t>
+              <a:t>18/01/2022</a:t>
             </a:fld>
             <a:endParaRPr lang="es-ES" dirty="0"/>
           </a:p>
@@ -10164,7 +10260,7 @@
           <a:p>
             <a:fld id="{D0D65A25-5B34-480B-8A82-D452FDC7444D}" type="datetimeFigureOut">
               <a:rPr lang="es-ES" smtClean="0"/>
-              <a:t>16/01/2022</a:t>
+              <a:t>18/01/2022</a:t>
             </a:fld>
             <a:endParaRPr lang="es-ES" dirty="0"/>
           </a:p>
@@ -10545,7 +10641,7 @@
           <a:p>
             <a:fld id="{D0D65A25-5B34-480B-8A82-D452FDC7444D}" type="datetimeFigureOut">
               <a:rPr lang="es-ES" smtClean="0"/>
-              <a:t>16/01/2022</a:t>
+              <a:t>18/01/2022</a:t>
             </a:fld>
             <a:endParaRPr lang="es-ES" dirty="0"/>
           </a:p>
@@ -10663,7 +10759,7 @@
           <a:p>
             <a:fld id="{D0D65A25-5B34-480B-8A82-D452FDC7444D}" type="datetimeFigureOut">
               <a:rPr lang="es-ES" smtClean="0"/>
-              <a:t>16/01/2022</a:t>
+              <a:t>18/01/2022</a:t>
             </a:fld>
             <a:endParaRPr lang="es-ES" dirty="0"/>
           </a:p>
@@ -10758,7 +10854,7 @@
           <a:p>
             <a:fld id="{D0D65A25-5B34-480B-8A82-D452FDC7444D}" type="datetimeFigureOut">
               <a:rPr lang="es-ES" smtClean="0"/>
-              <a:t>16/01/2022</a:t>
+              <a:t>18/01/2022</a:t>
             </a:fld>
             <a:endParaRPr lang="es-ES" dirty="0"/>
           </a:p>
@@ -11007,7 +11103,7 @@
           <a:p>
             <a:fld id="{D0D65A25-5B34-480B-8A82-D452FDC7444D}" type="datetimeFigureOut">
               <a:rPr lang="es-ES" smtClean="0"/>
-              <a:t>16/01/2022</a:t>
+              <a:t>18/01/2022</a:t>
             </a:fld>
             <a:endParaRPr lang="es-ES" dirty="0"/>
           </a:p>
@@ -11286,7 +11382,7 @@
           <a:p>
             <a:fld id="{D0D65A25-5B34-480B-8A82-D452FDC7444D}" type="datetimeFigureOut">
               <a:rPr lang="es-ES" smtClean="0"/>
-              <a:t>16/01/2022</a:t>
+              <a:t>18/01/2022</a:t>
             </a:fld>
             <a:endParaRPr lang="es-ES" dirty="0"/>
           </a:p>
@@ -11402,7 +11498,7 @@
           <a:noFill/>
           <a:extLst>
             <a:ext uri="{909E8E84-426E-40dd-AFC4-6F175D3DCCD1}">
-              <a14:hiddenFill xmlns="" xmlns:a14="http://schemas.microsoft.com/office/drawing/2010/main">
+              <a14:hiddenFill xmlns:a14="http://schemas.microsoft.com/office/drawing/2010/main" xmlns="">
                 <a:solidFill>
                   <a:srgbClr val="FFFFFF"/>
                 </a:solidFill>
@@ -11476,7 +11572,7 @@
               </a:ln>
               <a:extLst>
                 <a:ext uri="{91240B29-F687-4f45-9708-019B960494DF}">
-                  <a14:hiddenLine xmlns="" xmlns:a14="http://schemas.microsoft.com/office/drawing/2010/main" w="9525">
+                  <a14:hiddenLine xmlns:a14="http://schemas.microsoft.com/office/drawing/2010/main" xmlns="" w="9525">
                     <a:solidFill>
                       <a:srgbClr val="000000"/>
                     </a:solidFill>
@@ -11566,7 +11662,7 @@
               </a:ln>
               <a:extLst>
                 <a:ext uri="{91240B29-F687-4f45-9708-019B960494DF}">
-                  <a14:hiddenLine xmlns="" xmlns:a14="http://schemas.microsoft.com/office/drawing/2010/main" w="9525">
+                  <a14:hiddenLine xmlns:a14="http://schemas.microsoft.com/office/drawing/2010/main" xmlns="" w="9525">
                     <a:solidFill>
                       <a:srgbClr val="000000"/>
                     </a:solidFill>
@@ -11656,7 +11752,7 @@
               </a:ln>
               <a:extLst>
                 <a:ext uri="{91240B29-F687-4f45-9708-019B960494DF}">
-                  <a14:hiddenLine xmlns="" xmlns:a14="http://schemas.microsoft.com/office/drawing/2010/main" w="9525">
+                  <a14:hiddenLine xmlns:a14="http://schemas.microsoft.com/office/drawing/2010/main" xmlns="" w="9525">
                     <a:solidFill>
                       <a:srgbClr val="000000"/>
                     </a:solidFill>
@@ -11718,7 +11814,7 @@
               </a:ln>
               <a:extLst>
                 <a:ext uri="{91240B29-F687-4f45-9708-019B960494DF}">
-                  <a14:hiddenLine xmlns="" xmlns:a14="http://schemas.microsoft.com/office/drawing/2010/main" w="9525">
+                  <a14:hiddenLine xmlns:a14="http://schemas.microsoft.com/office/drawing/2010/main" xmlns="" w="9525">
                     <a:solidFill>
                       <a:srgbClr val="000000"/>
                     </a:solidFill>
@@ -11808,7 +11904,7 @@
               </a:ln>
               <a:extLst>
                 <a:ext uri="{91240B29-F687-4f45-9708-019B960494DF}">
-                  <a14:hiddenLine xmlns="" xmlns:a14="http://schemas.microsoft.com/office/drawing/2010/main" w="9525">
+                  <a14:hiddenLine xmlns:a14="http://schemas.microsoft.com/office/drawing/2010/main" xmlns="" w="9525">
                     <a:solidFill>
                       <a:srgbClr val="000000"/>
                     </a:solidFill>
@@ -11870,7 +11966,7 @@
               </a:ln>
               <a:extLst>
                 <a:ext uri="{91240B29-F687-4f45-9708-019B960494DF}">
-                  <a14:hiddenLine xmlns="" xmlns:a14="http://schemas.microsoft.com/office/drawing/2010/main" w="9525">
+                  <a14:hiddenLine xmlns:a14="http://schemas.microsoft.com/office/drawing/2010/main" xmlns="" w="9525">
                     <a:solidFill>
                       <a:srgbClr val="000000"/>
                     </a:solidFill>
@@ -11932,7 +12028,7 @@
               </a:ln>
               <a:extLst>
                 <a:ext uri="{91240B29-F687-4f45-9708-019B960494DF}">
-                  <a14:hiddenLine xmlns="" xmlns:a14="http://schemas.microsoft.com/office/drawing/2010/main" w="9525">
+                  <a14:hiddenLine xmlns:a14="http://schemas.microsoft.com/office/drawing/2010/main" xmlns="" w="9525">
                     <a:solidFill>
                       <a:srgbClr val="000000"/>
                     </a:solidFill>
@@ -12022,7 +12118,7 @@
               </a:ln>
               <a:extLst>
                 <a:ext uri="{91240B29-F687-4f45-9708-019B960494DF}">
-                  <a14:hiddenLine xmlns="" xmlns:a14="http://schemas.microsoft.com/office/drawing/2010/main" w="9525">
+                  <a14:hiddenLine xmlns:a14="http://schemas.microsoft.com/office/drawing/2010/main" xmlns="" w="9525">
                     <a:solidFill>
                       <a:srgbClr val="000000"/>
                     </a:solidFill>
@@ -12112,7 +12208,7 @@
               </a:ln>
               <a:extLst>
                 <a:ext uri="{91240B29-F687-4f45-9708-019B960494DF}">
-                  <a14:hiddenLine xmlns="" xmlns:a14="http://schemas.microsoft.com/office/drawing/2010/main" w="9525">
+                  <a14:hiddenLine xmlns:a14="http://schemas.microsoft.com/office/drawing/2010/main" xmlns="" w="9525">
                     <a:solidFill>
                       <a:srgbClr val="000000"/>
                     </a:solidFill>
@@ -12174,7 +12270,7 @@
               </a:ln>
               <a:extLst>
                 <a:ext uri="{91240B29-F687-4f45-9708-019B960494DF}">
-                  <a14:hiddenLine xmlns="" xmlns:a14="http://schemas.microsoft.com/office/drawing/2010/main" w="9525">
+                  <a14:hiddenLine xmlns:a14="http://schemas.microsoft.com/office/drawing/2010/main" xmlns="" w="9525">
                     <a:solidFill>
                       <a:srgbClr val="000000"/>
                     </a:solidFill>
@@ -12284,7 +12380,7 @@
               </a:ln>
               <a:extLst>
                 <a:ext uri="{91240B29-F687-4f45-9708-019B960494DF}">
-                  <a14:hiddenLine xmlns="" xmlns:a14="http://schemas.microsoft.com/office/drawing/2010/main" w="9525">
+                  <a14:hiddenLine xmlns:a14="http://schemas.microsoft.com/office/drawing/2010/main" xmlns="" w="9525">
                     <a:solidFill>
                       <a:srgbClr val="000000"/>
                     </a:solidFill>
@@ -12368,7 +12464,7 @@
               </a:ln>
               <a:extLst>
                 <a:ext uri="{91240B29-F687-4f45-9708-019B960494DF}">
-                  <a14:hiddenLine xmlns="" xmlns:a14="http://schemas.microsoft.com/office/drawing/2010/main" w="9525">
+                  <a14:hiddenLine xmlns:a14="http://schemas.microsoft.com/office/drawing/2010/main" xmlns="" w="9525">
                     <a:solidFill>
                       <a:srgbClr val="000000"/>
                     </a:solidFill>
@@ -12430,7 +12526,7 @@
               </a:ln>
               <a:extLst>
                 <a:ext uri="{91240B29-F687-4f45-9708-019B960494DF}">
-                  <a14:hiddenLine xmlns="" xmlns:a14="http://schemas.microsoft.com/office/drawing/2010/main" w="9525">
+                  <a14:hiddenLine xmlns:a14="http://schemas.microsoft.com/office/drawing/2010/main" xmlns="" w="9525">
                     <a:solidFill>
                       <a:srgbClr val="000000"/>
                     </a:solidFill>
@@ -12492,7 +12588,7 @@
               </a:ln>
               <a:extLst>
                 <a:ext uri="{91240B29-F687-4f45-9708-019B960494DF}">
-                  <a14:hiddenLine xmlns="" xmlns:a14="http://schemas.microsoft.com/office/drawing/2010/main" w="9525">
+                  <a14:hiddenLine xmlns:a14="http://schemas.microsoft.com/office/drawing/2010/main" xmlns="" w="9525">
                     <a:solidFill>
                       <a:srgbClr val="000000"/>
                     </a:solidFill>
@@ -12582,7 +12678,7 @@
               </a:ln>
               <a:extLst>
                 <a:ext uri="{91240B29-F687-4f45-9708-019B960494DF}">
-                  <a14:hiddenLine xmlns="" xmlns:a14="http://schemas.microsoft.com/office/drawing/2010/main" w="9525">
+                  <a14:hiddenLine xmlns:a14="http://schemas.microsoft.com/office/drawing/2010/main" xmlns="" w="9525">
                     <a:solidFill>
                       <a:srgbClr val="000000"/>
                     </a:solidFill>
@@ -12616,7 +12712,7 @@
               </a:ln>
               <a:extLst>
                 <a:ext uri="{91240B29-F687-4f45-9708-019B960494DF}">
-                  <a14:hiddenLine xmlns="" xmlns:a14="http://schemas.microsoft.com/office/drawing/2010/main" w="9525">
+                  <a14:hiddenLine xmlns:a14="http://schemas.microsoft.com/office/drawing/2010/main" xmlns="" w="9525">
                     <a:solidFill>
                       <a:srgbClr val="000000"/>
                     </a:solidFill>
@@ -12681,7 +12777,7 @@
               </a:ln>
               <a:extLst>
                 <a:ext uri="{91240B29-F687-4f45-9708-019B960494DF}">
-                  <a14:hiddenLine xmlns="" xmlns:a14="http://schemas.microsoft.com/office/drawing/2010/main" w="9525">
+                  <a14:hiddenLine xmlns:a14="http://schemas.microsoft.com/office/drawing/2010/main" xmlns="" w="9525">
                     <a:solidFill>
                       <a:srgbClr val="000000"/>
                     </a:solidFill>
@@ -12771,7 +12867,7 @@
               </a:ln>
               <a:extLst>
                 <a:ext uri="{91240B29-F687-4f45-9708-019B960494DF}">
-                  <a14:hiddenLine xmlns="" xmlns:a14="http://schemas.microsoft.com/office/drawing/2010/main" w="9525">
+                  <a14:hiddenLine xmlns:a14="http://schemas.microsoft.com/office/drawing/2010/main" xmlns="" w="9525">
                     <a:solidFill>
                       <a:srgbClr val="000000"/>
                     </a:solidFill>
@@ -12833,7 +12929,7 @@
               </a:ln>
               <a:extLst>
                 <a:ext uri="{91240B29-F687-4f45-9708-019B960494DF}">
-                  <a14:hiddenLine xmlns="" xmlns:a14="http://schemas.microsoft.com/office/drawing/2010/main" w="9525">
+                  <a14:hiddenLine xmlns:a14="http://schemas.microsoft.com/office/drawing/2010/main" xmlns="" w="9525">
                     <a:solidFill>
                       <a:srgbClr val="000000"/>
                     </a:solidFill>
@@ -12923,7 +13019,7 @@
               </a:ln>
               <a:extLst>
                 <a:ext uri="{91240B29-F687-4f45-9708-019B960494DF}">
-                  <a14:hiddenLine xmlns="" xmlns:a14="http://schemas.microsoft.com/office/drawing/2010/main" w="9525">
+                  <a14:hiddenLine xmlns:a14="http://schemas.microsoft.com/office/drawing/2010/main" xmlns="" w="9525">
                     <a:solidFill>
                       <a:srgbClr val="000000"/>
                     </a:solidFill>
@@ -12988,7 +13084,7 @@
               </a:ln>
               <a:extLst>
                 <a:ext uri="{91240B29-F687-4f45-9708-019B960494DF}">
-                  <a14:hiddenLine xmlns="" xmlns:a14="http://schemas.microsoft.com/office/drawing/2010/main" w="9525">
+                  <a14:hiddenLine xmlns:a14="http://schemas.microsoft.com/office/drawing/2010/main" xmlns="" w="9525">
                     <a:solidFill>
                       <a:srgbClr val="000000"/>
                     </a:solidFill>
@@ -13050,7 +13146,7 @@
               </a:ln>
               <a:extLst>
                 <a:ext uri="{91240B29-F687-4f45-9708-019B960494DF}">
-                  <a14:hiddenLine xmlns="" xmlns:a14="http://schemas.microsoft.com/office/drawing/2010/main" w="9525">
+                  <a14:hiddenLine xmlns:a14="http://schemas.microsoft.com/office/drawing/2010/main" xmlns="" w="9525">
                     <a:solidFill>
                       <a:srgbClr val="000000"/>
                     </a:solidFill>
@@ -13140,7 +13236,7 @@
               </a:ln>
               <a:extLst>
                 <a:ext uri="{91240B29-F687-4f45-9708-019B960494DF}">
-                  <a14:hiddenLine xmlns="" xmlns:a14="http://schemas.microsoft.com/office/drawing/2010/main" w="9525">
+                  <a14:hiddenLine xmlns:a14="http://schemas.microsoft.com/office/drawing/2010/main" xmlns="" w="9525">
                     <a:solidFill>
                       <a:srgbClr val="000000"/>
                     </a:solidFill>
@@ -13230,7 +13326,7 @@
               </a:ln>
               <a:extLst>
                 <a:ext uri="{91240B29-F687-4f45-9708-019B960494DF}">
-                  <a14:hiddenLine xmlns="" xmlns:a14="http://schemas.microsoft.com/office/drawing/2010/main" w="9525">
+                  <a14:hiddenLine xmlns:a14="http://schemas.microsoft.com/office/drawing/2010/main" xmlns="" w="9525">
                     <a:solidFill>
                       <a:srgbClr val="000000"/>
                     </a:solidFill>
@@ -13295,7 +13391,7 @@
               </a:ln>
               <a:extLst>
                 <a:ext uri="{91240B29-F687-4f45-9708-019B960494DF}">
-                  <a14:hiddenLine xmlns="" xmlns:a14="http://schemas.microsoft.com/office/drawing/2010/main" w="9525">
+                  <a14:hiddenLine xmlns:a14="http://schemas.microsoft.com/office/drawing/2010/main" xmlns="" w="9525">
                     <a:solidFill>
                       <a:srgbClr val="000000"/>
                     </a:solidFill>
@@ -13415,7 +13511,7 @@
               </a:ln>
               <a:extLst>
                 <a:ext uri="{91240B29-F687-4f45-9708-019B960494DF}">
-                  <a14:hiddenLine xmlns="" xmlns:a14="http://schemas.microsoft.com/office/drawing/2010/main" w="9525">
+                  <a14:hiddenLine xmlns:a14="http://schemas.microsoft.com/office/drawing/2010/main" xmlns="" w="9525">
                     <a:solidFill>
                       <a:srgbClr val="000000"/>
                     </a:solidFill>
@@ -13513,7 +13609,7 @@
               </a:ln>
               <a:extLst>
                 <a:ext uri="{91240B29-F687-4f45-9708-019B960494DF}">
-                  <a14:hiddenLine xmlns="" xmlns:a14="http://schemas.microsoft.com/office/drawing/2010/main" w="9525">
+                  <a14:hiddenLine xmlns:a14="http://schemas.microsoft.com/office/drawing/2010/main" xmlns="" w="9525">
                     <a:solidFill>
                       <a:srgbClr val="000000"/>
                     </a:solidFill>
@@ -13628,7 +13724,7 @@
               </a:ln>
               <a:extLst>
                 <a:ext uri="{91240B29-F687-4f45-9708-019B960494DF}">
-                  <a14:hiddenLine xmlns="" xmlns:a14="http://schemas.microsoft.com/office/drawing/2010/main" w="9525">
+                  <a14:hiddenLine xmlns:a14="http://schemas.microsoft.com/office/drawing/2010/main" xmlns="" w="9525">
                     <a:solidFill>
                       <a:srgbClr val="000000"/>
                     </a:solidFill>
@@ -13718,7 +13814,7 @@
               </a:ln>
               <a:extLst>
                 <a:ext uri="{91240B29-F687-4f45-9708-019B960494DF}">
-                  <a14:hiddenLine xmlns="" xmlns:a14="http://schemas.microsoft.com/office/drawing/2010/main" w="9525">
+                  <a14:hiddenLine xmlns:a14="http://schemas.microsoft.com/office/drawing/2010/main" xmlns="" w="9525">
                     <a:solidFill>
                       <a:srgbClr val="000000"/>
                     </a:solidFill>
@@ -13783,7 +13879,7 @@
               </a:ln>
               <a:extLst>
                 <a:ext uri="{91240B29-F687-4f45-9708-019B960494DF}">
-                  <a14:hiddenLine xmlns="" xmlns:a14="http://schemas.microsoft.com/office/drawing/2010/main" w="9525">
+                  <a14:hiddenLine xmlns:a14="http://schemas.microsoft.com/office/drawing/2010/main" xmlns="" w="9525">
                     <a:solidFill>
                       <a:srgbClr val="000000"/>
                     </a:solidFill>
@@ -13873,7 +13969,7 @@
               </a:ln>
               <a:extLst>
                 <a:ext uri="{91240B29-F687-4f45-9708-019B960494DF}">
-                  <a14:hiddenLine xmlns="" xmlns:a14="http://schemas.microsoft.com/office/drawing/2010/main" w="9525">
+                  <a14:hiddenLine xmlns:a14="http://schemas.microsoft.com/office/drawing/2010/main" xmlns="" w="9525">
                     <a:solidFill>
                       <a:srgbClr val="000000"/>
                     </a:solidFill>
@@ -13941,7 +14037,7 @@
               </a:ln>
               <a:extLst>
                 <a:ext uri="{91240B29-F687-4f45-9708-019B960494DF}">
-                  <a14:hiddenLine xmlns="" xmlns:a14="http://schemas.microsoft.com/office/drawing/2010/main" w="9525">
+                  <a14:hiddenLine xmlns:a14="http://schemas.microsoft.com/office/drawing/2010/main" xmlns="" w="9525">
                     <a:solidFill>
                       <a:srgbClr val="000000"/>
                     </a:solidFill>
@@ -14031,7 +14127,7 @@
               </a:ln>
               <a:extLst>
                 <a:ext uri="{91240B29-F687-4f45-9708-019B960494DF}">
-                  <a14:hiddenLine xmlns="" xmlns:a14="http://schemas.microsoft.com/office/drawing/2010/main" w="9525">
+                  <a14:hiddenLine xmlns:a14="http://schemas.microsoft.com/office/drawing/2010/main" xmlns="" w="9525">
                     <a:solidFill>
                       <a:srgbClr val="000000"/>
                     </a:solidFill>
@@ -14099,7 +14195,7 @@
               </a:ln>
               <a:extLst>
                 <a:ext uri="{91240B29-F687-4f45-9708-019B960494DF}">
-                  <a14:hiddenLine xmlns="" xmlns:a14="http://schemas.microsoft.com/office/drawing/2010/main" w="9525">
+                  <a14:hiddenLine xmlns:a14="http://schemas.microsoft.com/office/drawing/2010/main" xmlns="" w="9525">
                     <a:solidFill>
                       <a:srgbClr val="000000"/>
                     </a:solidFill>
@@ -14189,7 +14285,7 @@
               </a:ln>
               <a:extLst>
                 <a:ext uri="{91240B29-F687-4f45-9708-019B960494DF}">
-                  <a14:hiddenLine xmlns="" xmlns:a14="http://schemas.microsoft.com/office/drawing/2010/main" w="9525">
+                  <a14:hiddenLine xmlns:a14="http://schemas.microsoft.com/office/drawing/2010/main" xmlns="" w="9525">
                     <a:solidFill>
                       <a:srgbClr val="000000"/>
                     </a:solidFill>
@@ -14223,7 +14319,7 @@
               </a:ln>
               <a:extLst>
                 <a:ext uri="{91240B29-F687-4f45-9708-019B960494DF}">
-                  <a14:hiddenLine xmlns="" xmlns:a14="http://schemas.microsoft.com/office/drawing/2010/main" w="9525">
+                  <a14:hiddenLine xmlns:a14="http://schemas.microsoft.com/office/drawing/2010/main" xmlns="" w="9525">
                     <a:solidFill>
                       <a:srgbClr val="000000"/>
                     </a:solidFill>
@@ -14363,7 +14459,7 @@
           <a:p>
             <a:fld id="{D0D65A25-5B34-480B-8A82-D452FDC7444D}" type="datetimeFigureOut">
               <a:rPr lang="es-ES" smtClean="0"/>
-              <a:t>16/01/2022</a:t>
+              <a:t>18/01/2022</a:t>
             </a:fld>
             <a:endParaRPr lang="es-ES" dirty="0"/>
           </a:p>
@@ -15842,8 +15938,8 @@
           </p:txBody>
         </p:sp>
       </p:grpSp>
-      <mc:AlternateContent xmlns:mc="http://schemas.openxmlformats.org/markup-compatibility/2006">
-        <mc:Choice xmlns:a14="http://schemas.microsoft.com/office/drawing/2010/main" Requires="a14">
+      <mc:AlternateContent xmlns:mc="http://schemas.openxmlformats.org/markup-compatibility/2006" xmlns:a14="http://schemas.microsoft.com/office/drawing/2010/main">
+        <mc:Choice Requires="a14">
           <p:sp>
             <p:nvSpPr>
               <p:cNvPr id="38" name="TextBox 37">
@@ -15872,6 +15968,7 @@
               </a:bodyPr>
               <a:lstStyle/>
               <a:p>
+                <a:pPr/>
                 <a14:m>
                   <m:oMathPara xmlns:m="http://schemas.openxmlformats.org/officeDocument/2006/math">
                     <m:oMathParaPr>
@@ -16014,6 +16111,7 @@
                 </a:endParaRPr>
               </a:p>
               <a:p>
+                <a:pPr/>
                 <a14:m>
                   <m:oMathPara xmlns:m="http://schemas.openxmlformats.org/officeDocument/2006/math">
                     <m:oMathParaPr>
@@ -16040,7 +16138,7 @@
             </p:txBody>
           </p:sp>
         </mc:Choice>
-        <mc:Fallback>
+        <mc:Fallback xmlns="">
           <p:sp>
             <p:nvSpPr>
               <p:cNvPr id="38" name="TextBox 37">
@@ -16085,8 +16183,8 @@
           </p:sp>
         </mc:Fallback>
       </mc:AlternateContent>
-      <mc:AlternateContent xmlns:mc="http://schemas.openxmlformats.org/markup-compatibility/2006">
-        <mc:Choice xmlns:a14="http://schemas.microsoft.com/office/drawing/2010/main" Requires="a14">
+      <mc:AlternateContent xmlns:mc="http://schemas.openxmlformats.org/markup-compatibility/2006" xmlns:a14="http://schemas.microsoft.com/office/drawing/2010/main">
+        <mc:Choice Requires="a14">
           <p:sp>
             <p:nvSpPr>
               <p:cNvPr id="26" name="TextBox 25">
@@ -16115,6 +16213,7 @@
               </a:bodyPr>
               <a:lstStyle/>
               <a:p>
+                <a:pPr/>
                 <a14:m>
                   <m:oMathPara xmlns:m="http://schemas.openxmlformats.org/officeDocument/2006/math">
                     <m:oMathParaPr>
@@ -16151,6 +16250,7 @@
                 <a:endParaRPr lang="es-ES" b="0" dirty="0"/>
               </a:p>
               <a:p>
+                <a:pPr/>
                 <a14:m>
                   <m:oMathPara xmlns:m="http://schemas.openxmlformats.org/officeDocument/2006/math">
                     <m:oMathParaPr>
@@ -16275,7 +16375,7 @@
             </p:txBody>
           </p:sp>
         </mc:Choice>
-        <mc:Fallback>
+        <mc:Fallback xmlns="">
           <p:sp>
             <p:nvSpPr>
               <p:cNvPr id="26" name="TextBox 25">
@@ -16912,8 +17012,8 @@
           </p:txBody>
         </p:sp>
       </p:grpSp>
-      <mc:AlternateContent xmlns:mc="http://schemas.openxmlformats.org/markup-compatibility/2006">
-        <mc:Choice xmlns:a14="http://schemas.microsoft.com/office/drawing/2010/main" Requires="a14">
+      <mc:AlternateContent xmlns:mc="http://schemas.openxmlformats.org/markup-compatibility/2006" xmlns:a14="http://schemas.microsoft.com/office/drawing/2010/main">
+        <mc:Choice Requires="a14">
           <p:sp>
             <p:nvSpPr>
               <p:cNvPr id="38" name="TextBox 37">
@@ -16942,6 +17042,7 @@
               </a:bodyPr>
               <a:lstStyle/>
               <a:p>
+                <a:pPr/>
                 <a14:m>
                   <m:oMathPara xmlns:m="http://schemas.openxmlformats.org/officeDocument/2006/math">
                     <m:oMathParaPr>
@@ -17084,6 +17185,7 @@
                 </a:endParaRPr>
               </a:p>
               <a:p>
+                <a:pPr/>
                 <a14:m>
                   <m:oMathPara xmlns:m="http://schemas.openxmlformats.org/officeDocument/2006/math">
                     <m:oMathParaPr>
@@ -17110,7 +17212,7 @@
             </p:txBody>
           </p:sp>
         </mc:Choice>
-        <mc:Fallback>
+        <mc:Fallback xmlns="">
           <p:sp>
             <p:nvSpPr>
               <p:cNvPr id="38" name="TextBox 37">
@@ -17155,8 +17257,8 @@
           </p:sp>
         </mc:Fallback>
       </mc:AlternateContent>
-      <mc:AlternateContent xmlns:mc="http://schemas.openxmlformats.org/markup-compatibility/2006">
-        <mc:Choice xmlns:a14="http://schemas.microsoft.com/office/drawing/2010/main" Requires="a14">
+      <mc:AlternateContent xmlns:mc="http://schemas.openxmlformats.org/markup-compatibility/2006" xmlns:a14="http://schemas.microsoft.com/office/drawing/2010/main">
+        <mc:Choice Requires="a14">
           <p:sp>
             <p:nvSpPr>
               <p:cNvPr id="26" name="TextBox 25">
@@ -17185,6 +17287,7 @@
               </a:bodyPr>
               <a:lstStyle/>
               <a:p>
+                <a:pPr/>
                 <a14:m>
                   <m:oMathPara xmlns:m="http://schemas.openxmlformats.org/officeDocument/2006/math">
                     <m:oMathParaPr>
@@ -17221,6 +17324,7 @@
                 <a:endParaRPr lang="es-ES" b="0" dirty="0"/>
               </a:p>
               <a:p>
+                <a:pPr/>
                 <a14:m>
                   <m:oMathPara xmlns:m="http://schemas.openxmlformats.org/officeDocument/2006/math">
                     <m:oMathParaPr>
@@ -17345,7 +17449,7 @@
             </p:txBody>
           </p:sp>
         </mc:Choice>
-        <mc:Fallback>
+        <mc:Fallback xmlns="">
           <p:sp>
             <p:nvSpPr>
               <p:cNvPr id="26" name="TextBox 25">
@@ -18306,6 +18410,62 @@
           <a:chExt cx="0" cy="0"/>
         </a:xfrm>
       </p:grpSpPr>
+      <p:pic>
+        <p:nvPicPr>
+          <p:cNvPr id="4" name="Picture 3" descr="A picture containing transport, satellite, night sky&#10;&#10;Description automatically generated">
+            <a:extLst>
+              <a:ext uri="{FF2B5EF4-FFF2-40B4-BE49-F238E27FC236}">
+                <a16:creationId xmlns:a16="http://schemas.microsoft.com/office/drawing/2014/main" id="{03098901-3E53-4F90-B835-FB5BD040DB1D}"/>
+              </a:ext>
+            </a:extLst>
+          </p:cNvPr>
+          <p:cNvPicPr>
+            <a:picLocks noChangeAspect="1"/>
+          </p:cNvPicPr>
+          <p:nvPr/>
+        </p:nvPicPr>
+        <p:blipFill rotWithShape="1">
+          <a:blip r:embed="rId3">
+            <a:extLst>
+              <a:ext uri="{28A0092B-C50C-407E-A947-70E740481C1C}">
+                <a14:useLocalDpi xmlns:a14="http://schemas.microsoft.com/office/drawing/2010/main" val="0"/>
+              </a:ext>
+            </a:extLst>
+          </a:blip>
+          <a:srcRect t="35130" b="11607"/>
+          <a:stretch/>
+        </p:blipFill>
+        <p:spPr>
+          <a:xfrm>
+            <a:off x="1141411" y="606426"/>
+            <a:ext cx="9912354" cy="3299778"/>
+          </a:xfrm>
+          <a:prstGeom prst="round2DiagRect">
+            <a:avLst>
+              <a:gd name="adj1" fmla="val 4860"/>
+              <a:gd name="adj2" fmla="val 0"/>
+            </a:avLst>
+          </a:prstGeom>
+          <a:noFill/>
+          <a:ln w="19050" cap="sq">
+            <a:solidFill>
+              <a:schemeClr val="tx2">
+                <a:lumMod val="60000"/>
+                <a:lumOff val="40000"/>
+                <a:alpha val="60000"/>
+              </a:schemeClr>
+            </a:solidFill>
+            <a:miter lim="800000"/>
+          </a:ln>
+          <a:effectLst>
+            <a:outerShdw blurRad="88900" dist="38100" dir="5400000" algn="t" rotWithShape="0">
+              <a:prstClr val="black">
+                <a:alpha val="40000"/>
+              </a:prstClr>
+            </a:outerShdw>
+          </a:effectLst>
+        </p:spPr>
+      </p:pic>
       <p:sp>
         <p:nvSpPr>
           <p:cNvPr id="2" name="Title 1">
@@ -18324,12 +18484,14 @@
         </p:nvSpPr>
         <p:spPr>
           <a:xfrm>
-            <a:off x="1143001" y="2689715"/>
-            <a:ext cx="9905998" cy="1478570"/>
+            <a:off x="1141410" y="4304664"/>
+            <a:ext cx="9912355" cy="819355"/>
           </a:xfrm>
         </p:spPr>
         <p:txBody>
-          <a:bodyPr/>
+          <a:bodyPr anchor="b">
+            <a:normAutofit/>
+          </a:bodyPr>
           <a:lstStyle/>
           <a:p>
             <a:r>
@@ -18427,10 +18589,87 @@
         </p:nvSpPr>
         <p:spPr/>
         <p:txBody>
-          <a:bodyPr/>
+          <a:bodyPr>
+            <a:normAutofit/>
+          </a:bodyPr>
           <a:lstStyle/>
           <a:p>
-            <a:endParaRPr lang="en-GB" dirty="0"/>
+            <a:r>
+              <a:rPr lang="en-GB" sz="1200" dirty="0">
+                <a:hlinkClick r:id="rId2"/>
+              </a:rPr>
+              <a:t>https://www.geeksforgeeks.org/decision-tree/?ref=rp</a:t>
+            </a:r>
+            <a:endParaRPr lang="en-GB" sz="1200" dirty="0"/>
+          </a:p>
+          <a:p>
+            <a:r>
+              <a:rPr lang="en-GB" sz="1200" dirty="0">
+                <a:hlinkClick r:id="rId3"/>
+              </a:rPr>
+              <a:t>https://www.ryanxin.cn/archives/283</a:t>
+            </a:r>
+            <a:endParaRPr lang="en-GB" sz="1200" dirty="0"/>
+          </a:p>
+          <a:p>
+            <a:r>
+              <a:rPr lang="en-GB" sz="1200" dirty="0">
+                <a:hlinkClick r:id="rId4"/>
+              </a:rPr>
+              <a:t>https://www.geeksforgeeks.org/decision-tree-introduction-example/</a:t>
+            </a:r>
+            <a:endParaRPr lang="en-GB" sz="1200" dirty="0"/>
+          </a:p>
+          <a:p>
+            <a:r>
+              <a:rPr lang="en-GB" sz="1200" dirty="0">
+                <a:hlinkClick r:id="rId5"/>
+              </a:rPr>
+              <a:t>https://www.geeksforgeeks.org/decision-tree-implementation-python/</a:t>
+            </a:r>
+            <a:endParaRPr lang="en-GB" sz="1200" dirty="0"/>
+          </a:p>
+          <a:p>
+            <a:r>
+              <a:rPr lang="en-GB" sz="1200" dirty="0">
+                <a:hlinkClick r:id="rId6"/>
+              </a:rPr>
+              <a:t>https://zhuanlan.zhihu.com/p/30059442</a:t>
+            </a:r>
+            <a:endParaRPr lang="en-GB" sz="1200" dirty="0"/>
+          </a:p>
+          <a:p>
+            <a:r>
+              <a:rPr lang="en-GB" sz="1200" dirty="0">
+                <a:hlinkClick r:id="rId7"/>
+              </a:rPr>
+              <a:t>https://www.jianshu.com/p/655d8e555494</a:t>
+            </a:r>
+            <a:endParaRPr lang="en-GB" sz="1200" dirty="0"/>
+          </a:p>
+          <a:p>
+            <a:r>
+              <a:rPr lang="en-GB" sz="1200" dirty="0">
+                <a:hlinkClick r:id="rId8"/>
+              </a:rPr>
+              <a:t>https://blog.csdn.net/jiaoyangwm/article/details/79525237</a:t>
+            </a:r>
+            <a:endParaRPr lang="en-GB" sz="1200" dirty="0"/>
+          </a:p>
+          <a:p>
+            <a:r>
+              <a:rPr lang="en-GB" sz="1200">
+                <a:hlinkClick r:id="rId9"/>
+              </a:rPr>
+              <a:t>https://www.kaggle.com/c/titanic/overview</a:t>
+            </a:r>
+            <a:endParaRPr lang="en-GB" sz="1200"/>
+          </a:p>
+          <a:p>
+            <a:endParaRPr lang="en-GB" sz="1200" dirty="0"/>
+          </a:p>
+          <a:p>
+            <a:endParaRPr lang="en-GB" sz="1200" dirty="0"/>
           </a:p>
         </p:txBody>
       </p:sp>
@@ -18533,7 +18772,7 @@
                   <a:schemeClr val="bg1"/>
                 </a:solidFill>
               </a:rPr>
-              <a:t>How probable would you </a:t>
+              <a:t>How probable would you Have </a:t>
             </a:r>
             <a:r>
               <a:rPr lang="en-GB" sz="2800" dirty="0">
@@ -18541,7 +18780,7 @@
                   <a:srgbClr val="FF0000"/>
                 </a:solidFill>
               </a:rPr>
-              <a:t>survive</a:t>
+              <a:t>survived</a:t>
             </a:r>
             <a:r>
               <a:rPr lang="en-GB" sz="2800" dirty="0">
@@ -23833,8 +24072,8 @@
           </a:p>
         </p:txBody>
       </p:sp>
-      <mc:AlternateContent xmlns:mc="http://schemas.openxmlformats.org/markup-compatibility/2006">
-        <mc:Choice xmlns:a14="http://schemas.microsoft.com/office/drawing/2010/main" Requires="a14">
+      <mc:AlternateContent xmlns:mc="http://schemas.openxmlformats.org/markup-compatibility/2006" xmlns:a14="http://schemas.microsoft.com/office/drawing/2010/main">
+        <mc:Choice Requires="a14">
           <p:sp>
             <p:nvSpPr>
               <p:cNvPr id="4" name="TextBox 3">
@@ -23863,6 +24102,7 @@
               </a:bodyPr>
               <a:lstStyle/>
               <a:p>
+                <a:pPr/>
                 <a14:m>
                   <m:oMathPara xmlns:m="http://schemas.openxmlformats.org/officeDocument/2006/math">
                     <m:oMathParaPr>
@@ -23930,6 +24170,7 @@
                 <a:endParaRPr lang="es-ES" b="0" dirty="0"/>
               </a:p>
               <a:p>
+                <a:pPr/>
                 <a14:m>
                   <m:oMathPara xmlns:m="http://schemas.openxmlformats.org/officeDocument/2006/math">
                     <m:oMathParaPr>
@@ -24146,7 +24387,7 @@
             </p:txBody>
           </p:sp>
         </mc:Choice>
-        <mc:Fallback>
+        <mc:Fallback xmlns="">
           <p:sp>
             <p:nvSpPr>
               <p:cNvPr id="4" name="TextBox 3">
@@ -25020,8 +25261,8 @@
           </p:txBody>
         </p:sp>
       </p:grpSp>
-      <mc:AlternateContent xmlns:mc="http://schemas.openxmlformats.org/markup-compatibility/2006">
-        <mc:Choice xmlns:a14="http://schemas.microsoft.com/office/drawing/2010/main" Requires="a14">
+      <mc:AlternateContent xmlns:mc="http://schemas.openxmlformats.org/markup-compatibility/2006" xmlns:a14="http://schemas.microsoft.com/office/drawing/2010/main">
+        <mc:Choice Requires="a14">
           <p:sp>
             <p:nvSpPr>
               <p:cNvPr id="38" name="TextBox 37">
@@ -25050,6 +25291,7 @@
               </a:bodyPr>
               <a:lstStyle/>
               <a:p>
+                <a:pPr/>
                 <a14:m>
                   <m:oMathPara xmlns:m="http://schemas.openxmlformats.org/officeDocument/2006/math">
                     <m:oMathParaPr>
@@ -25206,6 +25448,7 @@
                 </a:endParaRPr>
               </a:p>
               <a:p>
+                <a:pPr/>
                 <a14:m>
                   <m:oMathPara xmlns:m="http://schemas.openxmlformats.org/officeDocument/2006/math">
                     <m:oMathParaPr>
@@ -25232,7 +25475,7 @@
             </p:txBody>
           </p:sp>
         </mc:Choice>
-        <mc:Fallback>
+        <mc:Fallback xmlns="">
           <p:sp>
             <p:nvSpPr>
               <p:cNvPr id="38" name="TextBox 37">
@@ -25662,8 +25905,8 @@
           </a:p>
         </p:txBody>
       </p:sp>
-      <mc:AlternateContent xmlns:mc="http://schemas.openxmlformats.org/markup-compatibility/2006">
-        <mc:Choice xmlns:a14="http://schemas.microsoft.com/office/drawing/2010/main" Requires="a14">
+      <mc:AlternateContent xmlns:mc="http://schemas.openxmlformats.org/markup-compatibility/2006" xmlns:a14="http://schemas.microsoft.com/office/drawing/2010/main">
+        <mc:Choice Requires="a14">
           <p:sp>
             <p:nvSpPr>
               <p:cNvPr id="4" name="TextBox 3">
@@ -25692,6 +25935,7 @@
               </a:bodyPr>
               <a:lstStyle/>
               <a:p>
+                <a:pPr/>
                 <a14:m>
                   <m:oMathPara xmlns:m="http://schemas.openxmlformats.org/officeDocument/2006/math">
                     <m:oMathParaPr>
@@ -25759,6 +26003,7 @@
                 <a:endParaRPr lang="es-ES" b="0" dirty="0"/>
               </a:p>
               <a:p>
+                <a:pPr/>
                 <a14:m>
                   <m:oMathPara xmlns:m="http://schemas.openxmlformats.org/officeDocument/2006/math">
                     <m:oMathParaPr>
@@ -25975,7 +26220,7 @@
             </p:txBody>
           </p:sp>
         </mc:Choice>
-        <mc:Fallback>
+        <mc:Fallback xmlns="">
           <p:sp>
             <p:nvSpPr>
               <p:cNvPr id="4" name="TextBox 3">
@@ -26849,8 +27094,8 @@
           </p:txBody>
         </p:sp>
       </p:grpSp>
-      <mc:AlternateContent xmlns:mc="http://schemas.openxmlformats.org/markup-compatibility/2006">
-        <mc:Choice xmlns:a14="http://schemas.microsoft.com/office/drawing/2010/main" Requires="a14">
+      <mc:AlternateContent xmlns:mc="http://schemas.openxmlformats.org/markup-compatibility/2006" xmlns:a14="http://schemas.microsoft.com/office/drawing/2010/main">
+        <mc:Choice Requires="a14">
           <p:sp>
             <p:nvSpPr>
               <p:cNvPr id="38" name="TextBox 37">
@@ -26879,6 +27124,7 @@
               </a:bodyPr>
               <a:lstStyle/>
               <a:p>
+                <a:pPr/>
                 <a14:m>
                   <m:oMathPara xmlns:m="http://schemas.openxmlformats.org/officeDocument/2006/math">
                     <m:oMathParaPr>
@@ -27122,6 +27368,7 @@
                 </a:endParaRPr>
               </a:p>
               <a:p>
+                <a:pPr/>
                 <a14:m>
                   <m:oMathPara xmlns:m="http://schemas.openxmlformats.org/officeDocument/2006/math">
                     <m:oMathParaPr>
@@ -27148,7 +27395,7 @@
             </p:txBody>
           </p:sp>
         </mc:Choice>
-        <mc:Fallback>
+        <mc:Fallback xmlns="">
           <p:sp>
             <p:nvSpPr>
               <p:cNvPr id="38" name="TextBox 37">

</xml_diff>

<commit_message>
Added random forest part of ppt
</commit_message>
<xml_diff>
--- a/semester-2-2021-2022/week-6-decision-tree/Decision_Tree.pptx
+++ b/semester-2-2021-2022/week-6-decision-tree/Decision_Tree.pptx
@@ -5,7 +5,7 @@
     <p:sldMasterId id="2147483660" r:id="rId1"/>
   </p:sldMasterIdLst>
   <p:notesMasterIdLst>
-    <p:notesMasterId r:id="rId15"/>
+    <p:notesMasterId r:id="rId20"/>
   </p:notesMasterIdLst>
   <p:sldIdLst>
     <p:sldId id="256" r:id="rId2"/>
@@ -20,7 +20,12 @@
     <p:sldId id="269" r:id="rId11"/>
     <p:sldId id="270" r:id="rId12"/>
     <p:sldId id="265" r:id="rId13"/>
-    <p:sldId id="258" r:id="rId14"/>
+    <p:sldId id="271" r:id="rId14"/>
+    <p:sldId id="273" r:id="rId15"/>
+    <p:sldId id="275" r:id="rId16"/>
+    <p:sldId id="276" r:id="rId17"/>
+    <p:sldId id="277" r:id="rId18"/>
+    <p:sldId id="258" r:id="rId19"/>
   </p:sldIdLst>
   <p:sldSz cx="12192000" cy="6858000"/>
   <p:notesSz cx="6858000" cy="9144000"/>
@@ -325,7 +330,7 @@
           <a:p>
             <a:fld id="{EB7DA543-F40B-4023-9892-3E6E3C6ABB89}" type="datetimeFigureOut">
               <a:rPr lang="en-GB" smtClean="0"/>
-              <a:t>18/01/2022</a:t>
+              <a:t>01/02/2022</a:t>
             </a:fld>
             <a:endParaRPr lang="en-GB"/>
           </a:p>
@@ -950,6 +955,448 @@
 </p:notes>
 </file>
 
+<file path=ppt/notesSlides/notesSlide13.xml><?xml version="1.0" encoding="utf-8"?>
+<p:notes xmlns:a="http://schemas.openxmlformats.org/drawingml/2006/main" xmlns:r="http://schemas.openxmlformats.org/officeDocument/2006/relationships" xmlns:p="http://schemas.openxmlformats.org/presentationml/2006/main">
+  <p:cSld>
+    <p:spTree>
+      <p:nvGrpSpPr>
+        <p:cNvPr id="1" name=""/>
+        <p:cNvGrpSpPr/>
+        <p:nvPr/>
+      </p:nvGrpSpPr>
+      <p:grpSpPr>
+        <a:xfrm>
+          <a:off x="0" y="0"/>
+          <a:ext cx="0" cy="0"/>
+          <a:chOff x="0" y="0"/>
+          <a:chExt cx="0" cy="0"/>
+        </a:xfrm>
+      </p:grpSpPr>
+      <p:sp>
+        <p:nvSpPr>
+          <p:cNvPr id="2" name="Slide Image Placeholder 1"/>
+          <p:cNvSpPr>
+            <a:spLocks noGrp="1" noRot="1" noChangeAspect="1"/>
+          </p:cNvSpPr>
+          <p:nvPr>
+            <p:ph type="sldImg"/>
+          </p:nvPr>
+        </p:nvSpPr>
+        <p:spPr/>
+      </p:sp>
+      <p:sp>
+        <p:nvSpPr>
+          <p:cNvPr id="3" name="Notes Placeholder 2"/>
+          <p:cNvSpPr>
+            <a:spLocks noGrp="1"/>
+          </p:cNvSpPr>
+          <p:nvPr>
+            <p:ph type="body" idx="1"/>
+          </p:nvPr>
+        </p:nvSpPr>
+        <p:spPr/>
+        <p:txBody>
+          <a:bodyPr/>
+          <a:lstStyle/>
+          <a:p>
+            <a:r>
+              <a:rPr lang="en-US" dirty="0"/>
+              <a:t>Thus, is there any way to combat the overfitting of a decision tree? Here is where random forest enters.</a:t>
+            </a:r>
+          </a:p>
+        </p:txBody>
+      </p:sp>
+      <p:sp>
+        <p:nvSpPr>
+          <p:cNvPr id="4" name="Slide Number Placeholder 3"/>
+          <p:cNvSpPr>
+            <a:spLocks noGrp="1"/>
+          </p:cNvSpPr>
+          <p:nvPr>
+            <p:ph type="sldNum" sz="quarter" idx="5"/>
+          </p:nvPr>
+        </p:nvSpPr>
+        <p:spPr/>
+        <p:txBody>
+          <a:bodyPr/>
+          <a:lstStyle/>
+          <a:p>
+            <a:fld id="{76682F04-6A67-4696-8350-ADB5B2C9822D}" type="slidenum">
+              <a:rPr lang="en-GB" smtClean="0"/>
+              <a:t>13</a:t>
+            </a:fld>
+            <a:endParaRPr lang="en-GB"/>
+          </a:p>
+        </p:txBody>
+      </p:sp>
+    </p:spTree>
+    <p:extLst>
+      <p:ext uri="{BB962C8B-B14F-4D97-AF65-F5344CB8AC3E}">
+        <p14:creationId xmlns:p14="http://schemas.microsoft.com/office/powerpoint/2010/main" val="280514024"/>
+      </p:ext>
+    </p:extLst>
+  </p:cSld>
+  <p:clrMapOvr>
+    <a:masterClrMapping/>
+  </p:clrMapOvr>
+</p:notes>
+</file>
+
+<file path=ppt/notesSlides/notesSlide14.xml><?xml version="1.0" encoding="utf-8"?>
+<p:notes xmlns:a="http://schemas.openxmlformats.org/drawingml/2006/main" xmlns:r="http://schemas.openxmlformats.org/officeDocument/2006/relationships" xmlns:p="http://schemas.openxmlformats.org/presentationml/2006/main">
+  <p:cSld>
+    <p:spTree>
+      <p:nvGrpSpPr>
+        <p:cNvPr id="1" name=""/>
+        <p:cNvGrpSpPr/>
+        <p:nvPr/>
+      </p:nvGrpSpPr>
+      <p:grpSpPr>
+        <a:xfrm>
+          <a:off x="0" y="0"/>
+          <a:ext cx="0" cy="0"/>
+          <a:chOff x="0" y="0"/>
+          <a:chExt cx="0" cy="0"/>
+        </a:xfrm>
+      </p:grpSpPr>
+      <p:sp>
+        <p:nvSpPr>
+          <p:cNvPr id="2" name="Slide Image Placeholder 1"/>
+          <p:cNvSpPr>
+            <a:spLocks noGrp="1" noRot="1" noChangeAspect="1"/>
+          </p:cNvSpPr>
+          <p:nvPr>
+            <p:ph type="sldImg"/>
+          </p:nvPr>
+        </p:nvSpPr>
+        <p:spPr/>
+      </p:sp>
+      <p:sp>
+        <p:nvSpPr>
+          <p:cNvPr id="3" name="Notes Placeholder 2"/>
+          <p:cNvSpPr>
+            <a:spLocks noGrp="1"/>
+          </p:cNvSpPr>
+          <p:nvPr>
+            <p:ph type="body" idx="1"/>
+          </p:nvPr>
+        </p:nvSpPr>
+        <p:spPr/>
+        <p:txBody>
+          <a:bodyPr/>
+          <a:lstStyle/>
+          <a:p>
+            <a:r>
+              <a:rPr lang="en-US" dirty="0"/>
+              <a:t>This is achieved by ensemble methods. Ensemble methods is just a solution that data scientist found to reduce overfitting and models with high variance, by creating various instances of a model and decide on the final model by majority voting of the instances. This is the way we are doing it in random forest, our solution will be to create various decision trees so that they vote on the final model of decision tree. Hence, forest, because of various tree. In specific, the method applied in random forest is called bagging. Bagging is bootstrap aggregation. The idea here is to create subsets of features and data picking randomly with replacement. Then, each collection of data is used to create its own decision tree. </a:t>
+            </a:r>
+          </a:p>
+          <a:p>
+            <a:endParaRPr lang="en-US" dirty="0"/>
+          </a:p>
+        </p:txBody>
+      </p:sp>
+      <p:sp>
+        <p:nvSpPr>
+          <p:cNvPr id="4" name="Slide Number Placeholder 3"/>
+          <p:cNvSpPr>
+            <a:spLocks noGrp="1"/>
+          </p:cNvSpPr>
+          <p:nvPr>
+            <p:ph type="sldNum" sz="quarter" idx="5"/>
+          </p:nvPr>
+        </p:nvSpPr>
+        <p:spPr/>
+        <p:txBody>
+          <a:bodyPr/>
+          <a:lstStyle/>
+          <a:p>
+            <a:fld id="{76682F04-6A67-4696-8350-ADB5B2C9822D}" type="slidenum">
+              <a:rPr lang="en-GB" smtClean="0"/>
+              <a:t>14</a:t>
+            </a:fld>
+            <a:endParaRPr lang="en-GB"/>
+          </a:p>
+        </p:txBody>
+      </p:sp>
+    </p:spTree>
+    <p:extLst>
+      <p:ext uri="{BB962C8B-B14F-4D97-AF65-F5344CB8AC3E}">
+        <p14:creationId xmlns:p14="http://schemas.microsoft.com/office/powerpoint/2010/main" val="4114499901"/>
+      </p:ext>
+    </p:extLst>
+  </p:cSld>
+  <p:clrMapOvr>
+    <a:masterClrMapping/>
+  </p:clrMapOvr>
+</p:notes>
+</file>
+
+<file path=ppt/notesSlides/notesSlide15.xml><?xml version="1.0" encoding="utf-8"?>
+<p:notes xmlns:a="http://schemas.openxmlformats.org/drawingml/2006/main" xmlns:r="http://schemas.openxmlformats.org/officeDocument/2006/relationships" xmlns:p="http://schemas.openxmlformats.org/presentationml/2006/main">
+  <p:cSld>
+    <p:spTree>
+      <p:nvGrpSpPr>
+        <p:cNvPr id="1" name=""/>
+        <p:cNvGrpSpPr/>
+        <p:nvPr/>
+      </p:nvGrpSpPr>
+      <p:grpSpPr>
+        <a:xfrm>
+          <a:off x="0" y="0"/>
+          <a:ext cx="0" cy="0"/>
+          <a:chOff x="0" y="0"/>
+          <a:chExt cx="0" cy="0"/>
+        </a:xfrm>
+      </p:grpSpPr>
+      <p:sp>
+        <p:nvSpPr>
+          <p:cNvPr id="2" name="Slide Image Placeholder 1"/>
+          <p:cNvSpPr>
+            <a:spLocks noGrp="1" noRot="1" noChangeAspect="1"/>
+          </p:cNvSpPr>
+          <p:nvPr>
+            <p:ph type="sldImg"/>
+          </p:nvPr>
+        </p:nvSpPr>
+        <p:spPr/>
+      </p:sp>
+      <p:sp>
+        <p:nvSpPr>
+          <p:cNvPr id="3" name="Notes Placeholder 2"/>
+          <p:cNvSpPr>
+            <a:spLocks noGrp="1"/>
+          </p:cNvSpPr>
+          <p:nvPr>
+            <p:ph type="body" idx="1"/>
+          </p:nvPr>
+        </p:nvSpPr>
+        <p:spPr/>
+        <p:txBody>
+          <a:bodyPr/>
+          <a:lstStyle/>
+          <a:p>
+            <a:r>
+              <a:rPr lang="en-US" dirty="0"/>
+              <a:t>Decision forest relies heavily in this method, bagging to create mini decision trees individually. Apart of bagging, decision forest’s final step is to call for votes by majority, to decide the optimized node. As they say, two is more than the sum of one, we get a better tree after multiple trees. The resulting one is more robust to variations in data, hence better performance. Here we have a visualization of random forest simplified.</a:t>
+            </a:r>
+          </a:p>
+          <a:p>
+            <a:endParaRPr lang="en-US" dirty="0"/>
+          </a:p>
+        </p:txBody>
+      </p:sp>
+      <p:sp>
+        <p:nvSpPr>
+          <p:cNvPr id="4" name="Slide Number Placeholder 3"/>
+          <p:cNvSpPr>
+            <a:spLocks noGrp="1"/>
+          </p:cNvSpPr>
+          <p:nvPr>
+            <p:ph type="sldNum" sz="quarter" idx="5"/>
+          </p:nvPr>
+        </p:nvSpPr>
+        <p:spPr/>
+        <p:txBody>
+          <a:bodyPr/>
+          <a:lstStyle/>
+          <a:p>
+            <a:fld id="{76682F04-6A67-4696-8350-ADB5B2C9822D}" type="slidenum">
+              <a:rPr lang="en-GB" smtClean="0"/>
+              <a:t>15</a:t>
+            </a:fld>
+            <a:endParaRPr lang="en-GB"/>
+          </a:p>
+        </p:txBody>
+      </p:sp>
+    </p:spTree>
+    <p:extLst>
+      <p:ext uri="{BB962C8B-B14F-4D97-AF65-F5344CB8AC3E}">
+        <p14:creationId xmlns:p14="http://schemas.microsoft.com/office/powerpoint/2010/main" val="2137517616"/>
+      </p:ext>
+    </p:extLst>
+  </p:cSld>
+  <p:clrMapOvr>
+    <a:masterClrMapping/>
+  </p:clrMapOvr>
+</p:notes>
+</file>
+
+<file path=ppt/notesSlides/notesSlide16.xml><?xml version="1.0" encoding="utf-8"?>
+<p:notes xmlns:a="http://schemas.openxmlformats.org/drawingml/2006/main" xmlns:r="http://schemas.openxmlformats.org/officeDocument/2006/relationships" xmlns:p="http://schemas.openxmlformats.org/presentationml/2006/main">
+  <p:cSld>
+    <p:spTree>
+      <p:nvGrpSpPr>
+        <p:cNvPr id="1" name=""/>
+        <p:cNvGrpSpPr/>
+        <p:nvPr/>
+      </p:nvGrpSpPr>
+      <p:grpSpPr>
+        <a:xfrm>
+          <a:off x="0" y="0"/>
+          <a:ext cx="0" cy="0"/>
+          <a:chOff x="0" y="0"/>
+          <a:chExt cx="0" cy="0"/>
+        </a:xfrm>
+      </p:grpSpPr>
+      <p:sp>
+        <p:nvSpPr>
+          <p:cNvPr id="2" name="Slide Image Placeholder 1"/>
+          <p:cNvSpPr>
+            <a:spLocks noGrp="1" noRot="1" noChangeAspect="1"/>
+          </p:cNvSpPr>
+          <p:nvPr>
+            <p:ph type="sldImg"/>
+          </p:nvPr>
+        </p:nvSpPr>
+        <p:spPr/>
+      </p:sp>
+      <p:sp>
+        <p:nvSpPr>
+          <p:cNvPr id="3" name="Notes Placeholder 2"/>
+          <p:cNvSpPr>
+            <a:spLocks noGrp="1"/>
+          </p:cNvSpPr>
+          <p:nvPr>
+            <p:ph type="body" idx="1"/>
+          </p:nvPr>
+        </p:nvSpPr>
+        <p:spPr/>
+        <p:txBody>
+          <a:bodyPr/>
+          <a:lstStyle/>
+          <a:p>
+            <a:r>
+              <a:rPr lang="en-US" dirty="0"/>
+              <a:t>The pros and cons of random forest based on decision tree are the following. First, of course, is that it decreases overfitting and high variance, that is the main purpose. Second is that it can handle high dimension data with good performance. Third is that it is not sensible to missing values. In contrast, it trades the accuracy with regression model, even worse than decision tree as it is a gathering and mean of multiple trees, it lacks accuracy.</a:t>
+            </a:r>
+          </a:p>
+        </p:txBody>
+      </p:sp>
+      <p:sp>
+        <p:nvSpPr>
+          <p:cNvPr id="4" name="Slide Number Placeholder 3"/>
+          <p:cNvSpPr>
+            <a:spLocks noGrp="1"/>
+          </p:cNvSpPr>
+          <p:nvPr>
+            <p:ph type="sldNum" sz="quarter" idx="5"/>
+          </p:nvPr>
+        </p:nvSpPr>
+        <p:spPr/>
+        <p:txBody>
+          <a:bodyPr/>
+          <a:lstStyle/>
+          <a:p>
+            <a:fld id="{76682F04-6A67-4696-8350-ADB5B2C9822D}" type="slidenum">
+              <a:rPr lang="en-GB" smtClean="0"/>
+              <a:t>16</a:t>
+            </a:fld>
+            <a:endParaRPr lang="en-GB"/>
+          </a:p>
+        </p:txBody>
+      </p:sp>
+    </p:spTree>
+    <p:extLst>
+      <p:ext uri="{BB962C8B-B14F-4D97-AF65-F5344CB8AC3E}">
+        <p14:creationId xmlns:p14="http://schemas.microsoft.com/office/powerpoint/2010/main" val="4235491159"/>
+      </p:ext>
+    </p:extLst>
+  </p:cSld>
+  <p:clrMapOvr>
+    <a:masterClrMapping/>
+  </p:clrMapOvr>
+</p:notes>
+</file>
+
+<file path=ppt/notesSlides/notesSlide17.xml><?xml version="1.0" encoding="utf-8"?>
+<p:notes xmlns:a="http://schemas.openxmlformats.org/drawingml/2006/main" xmlns:r="http://schemas.openxmlformats.org/officeDocument/2006/relationships" xmlns:p="http://schemas.openxmlformats.org/presentationml/2006/main">
+  <p:cSld>
+    <p:spTree>
+      <p:nvGrpSpPr>
+        <p:cNvPr id="1" name=""/>
+        <p:cNvGrpSpPr/>
+        <p:nvPr/>
+      </p:nvGrpSpPr>
+      <p:grpSpPr>
+        <a:xfrm>
+          <a:off x="0" y="0"/>
+          <a:ext cx="0" cy="0"/>
+          <a:chOff x="0" y="0"/>
+          <a:chExt cx="0" cy="0"/>
+        </a:xfrm>
+      </p:grpSpPr>
+      <p:sp>
+        <p:nvSpPr>
+          <p:cNvPr id="2" name="Slide Image Placeholder 1"/>
+          <p:cNvSpPr>
+            <a:spLocks noGrp="1" noRot="1" noChangeAspect="1"/>
+          </p:cNvSpPr>
+          <p:nvPr>
+            <p:ph type="sldImg"/>
+          </p:nvPr>
+        </p:nvSpPr>
+        <p:spPr/>
+      </p:sp>
+      <p:sp>
+        <p:nvSpPr>
+          <p:cNvPr id="3" name="Notes Placeholder 2"/>
+          <p:cNvSpPr>
+            <a:spLocks noGrp="1"/>
+          </p:cNvSpPr>
+          <p:nvPr>
+            <p:ph type="body" idx="1"/>
+          </p:nvPr>
+        </p:nvSpPr>
+        <p:spPr/>
+        <p:txBody>
+          <a:bodyPr/>
+          <a:lstStyle/>
+          <a:p>
+            <a:r>
+              <a:rPr lang="es-ES" dirty="0"/>
+              <a:t>c</a:t>
+            </a:r>
+            <a:endParaRPr lang="en-US" dirty="0"/>
+          </a:p>
+        </p:txBody>
+      </p:sp>
+      <p:sp>
+        <p:nvSpPr>
+          <p:cNvPr id="4" name="Slide Number Placeholder 3"/>
+          <p:cNvSpPr>
+            <a:spLocks noGrp="1"/>
+          </p:cNvSpPr>
+          <p:nvPr>
+            <p:ph type="sldNum" sz="quarter" idx="5"/>
+          </p:nvPr>
+        </p:nvSpPr>
+        <p:spPr/>
+        <p:txBody>
+          <a:bodyPr/>
+          <a:lstStyle/>
+          <a:p>
+            <a:fld id="{76682F04-6A67-4696-8350-ADB5B2C9822D}" type="slidenum">
+              <a:rPr lang="en-GB" smtClean="0"/>
+              <a:t>17</a:t>
+            </a:fld>
+            <a:endParaRPr lang="en-GB"/>
+          </a:p>
+        </p:txBody>
+      </p:sp>
+    </p:spTree>
+    <p:extLst>
+      <p:ext uri="{BB962C8B-B14F-4D97-AF65-F5344CB8AC3E}">
+        <p14:creationId xmlns:p14="http://schemas.microsoft.com/office/powerpoint/2010/main" val="3224957016"/>
+      </p:ext>
+    </p:extLst>
+  </p:cSld>
+  <p:clrMapOvr>
+    <a:masterClrMapping/>
+  </p:clrMapOvr>
+</p:notes>
+</file>
+
 <file path=ppt/notesSlides/notesSlide2.xml><?xml version="1.0" encoding="utf-8"?>
 <p:notes xmlns:a="http://schemas.openxmlformats.org/drawingml/2006/main" xmlns:r="http://schemas.openxmlformats.org/officeDocument/2006/relationships" xmlns:p="http://schemas.openxmlformats.org/presentationml/2006/main">
   <p:cSld>
@@ -2610,7 +3057,7 @@
           <a:noFill/>
           <a:extLst>
             <a:ext uri="{909E8E84-426E-40dd-AFC4-6F175D3DCCD1}">
-              <a14:hiddenFill xmlns:a14="http://schemas.microsoft.com/office/drawing/2010/main" xmlns="">
+              <a14:hiddenFill xmlns="" xmlns:a14="http://schemas.microsoft.com/office/drawing/2010/main">
                 <a:solidFill>
                   <a:srgbClr val="FFFFFF"/>
                 </a:solidFill>
@@ -2670,7 +3117,7 @@
             </a:ln>
             <a:extLst>
               <a:ext uri="{91240B29-F687-4f45-9708-019B960494DF}">
-                <a14:hiddenLine xmlns:a14="http://schemas.microsoft.com/office/drawing/2010/main" xmlns="" w="9525">
+                <a14:hiddenLine xmlns="" xmlns:a14="http://schemas.microsoft.com/office/drawing/2010/main" w="9525">
                   <a:solidFill>
                     <a:srgbClr val="000000"/>
                   </a:solidFill>
@@ -2760,7 +3207,7 @@
             </a:ln>
             <a:extLst>
               <a:ext uri="{91240B29-F687-4f45-9708-019B960494DF}">
-                <a14:hiddenLine xmlns:a14="http://schemas.microsoft.com/office/drawing/2010/main" xmlns="" w="9525">
+                <a14:hiddenLine xmlns="" xmlns:a14="http://schemas.microsoft.com/office/drawing/2010/main" w="9525">
                   <a:solidFill>
                     <a:srgbClr val="000000"/>
                   </a:solidFill>
@@ -2850,7 +3297,7 @@
             </a:ln>
             <a:extLst>
               <a:ext uri="{91240B29-F687-4f45-9708-019B960494DF}">
-                <a14:hiddenLine xmlns:a14="http://schemas.microsoft.com/office/drawing/2010/main" xmlns="" w="9525">
+                <a14:hiddenLine xmlns="" xmlns:a14="http://schemas.microsoft.com/office/drawing/2010/main" w="9525">
                   <a:solidFill>
                     <a:srgbClr val="000000"/>
                   </a:solidFill>
@@ -2884,7 +3331,7 @@
             </a:ln>
             <a:extLst>
               <a:ext uri="{91240B29-F687-4f45-9708-019B960494DF}">
-                <a14:hiddenLine xmlns:a14="http://schemas.microsoft.com/office/drawing/2010/main" xmlns="" w="9525">
+                <a14:hiddenLine xmlns="" xmlns:a14="http://schemas.microsoft.com/office/drawing/2010/main" w="9525">
                   <a:solidFill>
                     <a:srgbClr val="000000"/>
                   </a:solidFill>
@@ -2974,7 +3421,7 @@
             </a:ln>
             <a:extLst>
               <a:ext uri="{91240B29-F687-4f45-9708-019B960494DF}">
-                <a14:hiddenLine xmlns:a14="http://schemas.microsoft.com/office/drawing/2010/main" xmlns="" w="9525">
+                <a14:hiddenLine xmlns="" xmlns:a14="http://schemas.microsoft.com/office/drawing/2010/main" w="9525">
                   <a:solidFill>
                     <a:srgbClr val="000000"/>
                   </a:solidFill>
@@ -3036,7 +3483,7 @@
             </a:ln>
             <a:extLst>
               <a:ext uri="{91240B29-F687-4f45-9708-019B960494DF}">
-                <a14:hiddenLine xmlns:a14="http://schemas.microsoft.com/office/drawing/2010/main" xmlns="" w="9525">
+                <a14:hiddenLine xmlns="" xmlns:a14="http://schemas.microsoft.com/office/drawing/2010/main" w="9525">
                   <a:solidFill>
                     <a:srgbClr val="000000"/>
                   </a:solidFill>
@@ -3098,7 +3545,7 @@
             </a:ln>
             <a:extLst>
               <a:ext uri="{91240B29-F687-4f45-9708-019B960494DF}">
-                <a14:hiddenLine xmlns:a14="http://schemas.microsoft.com/office/drawing/2010/main" xmlns="" w="9525">
+                <a14:hiddenLine xmlns="" xmlns:a14="http://schemas.microsoft.com/office/drawing/2010/main" w="9525">
                   <a:solidFill>
                     <a:srgbClr val="000000"/>
                   </a:solidFill>
@@ -3188,7 +3635,7 @@
             </a:ln>
             <a:extLst>
               <a:ext uri="{91240B29-F687-4f45-9708-019B960494DF}">
-                <a14:hiddenLine xmlns:a14="http://schemas.microsoft.com/office/drawing/2010/main" xmlns="" w="9525">
+                <a14:hiddenLine xmlns="" xmlns:a14="http://schemas.microsoft.com/office/drawing/2010/main" w="9525">
                   <a:solidFill>
                     <a:srgbClr val="000000"/>
                   </a:solidFill>
@@ -3250,7 +3697,7 @@
             </a:ln>
             <a:extLst>
               <a:ext uri="{91240B29-F687-4f45-9708-019B960494DF}">
-                <a14:hiddenLine xmlns:a14="http://schemas.microsoft.com/office/drawing/2010/main" xmlns="" w="9525">
+                <a14:hiddenLine xmlns="" xmlns:a14="http://schemas.microsoft.com/office/drawing/2010/main" w="9525">
                   <a:solidFill>
                     <a:srgbClr val="000000"/>
                   </a:solidFill>
@@ -3312,7 +3759,7 @@
             </a:ln>
             <a:extLst>
               <a:ext uri="{91240B29-F687-4f45-9708-019B960494DF}">
-                <a14:hiddenLine xmlns:a14="http://schemas.microsoft.com/office/drawing/2010/main" xmlns="" w="9525">
+                <a14:hiddenLine xmlns="" xmlns:a14="http://schemas.microsoft.com/office/drawing/2010/main" w="9525">
                   <a:solidFill>
                     <a:srgbClr val="000000"/>
                   </a:solidFill>
@@ -3402,7 +3849,7 @@
             </a:ln>
             <a:extLst>
               <a:ext uri="{91240B29-F687-4f45-9708-019B960494DF}">
-                <a14:hiddenLine xmlns:a14="http://schemas.microsoft.com/office/drawing/2010/main" xmlns="" w="9525">
+                <a14:hiddenLine xmlns="" xmlns:a14="http://schemas.microsoft.com/office/drawing/2010/main" w="9525">
                   <a:solidFill>
                     <a:srgbClr val="000000"/>
                   </a:solidFill>
@@ -3492,7 +3939,7 @@
             </a:ln>
             <a:extLst>
               <a:ext uri="{91240B29-F687-4f45-9708-019B960494DF}">
-                <a14:hiddenLine xmlns:a14="http://schemas.microsoft.com/office/drawing/2010/main" xmlns="" w="9525">
+                <a14:hiddenLine xmlns="" xmlns:a14="http://schemas.microsoft.com/office/drawing/2010/main" w="9525">
                   <a:solidFill>
                     <a:srgbClr val="000000"/>
                   </a:solidFill>
@@ -3554,7 +4001,7 @@
             </a:ln>
             <a:extLst>
               <a:ext uri="{91240B29-F687-4f45-9708-019B960494DF}">
-                <a14:hiddenLine xmlns:a14="http://schemas.microsoft.com/office/drawing/2010/main" xmlns="" w="9525">
+                <a14:hiddenLine xmlns="" xmlns:a14="http://schemas.microsoft.com/office/drawing/2010/main" w="9525">
                   <a:solidFill>
                     <a:srgbClr val="000000"/>
                   </a:solidFill>
@@ -3664,7 +4111,7 @@
             </a:ln>
             <a:extLst>
               <a:ext uri="{91240B29-F687-4f45-9708-019B960494DF}">
-                <a14:hiddenLine xmlns:a14="http://schemas.microsoft.com/office/drawing/2010/main" xmlns="" w="9525">
+                <a14:hiddenLine xmlns="" xmlns:a14="http://schemas.microsoft.com/office/drawing/2010/main" w="9525">
                   <a:solidFill>
                     <a:srgbClr val="000000"/>
                   </a:solidFill>
@@ -3726,7 +4173,7 @@
             </a:ln>
             <a:extLst>
               <a:ext uri="{91240B29-F687-4f45-9708-019B960494DF}">
-                <a14:hiddenLine xmlns:a14="http://schemas.microsoft.com/office/drawing/2010/main" xmlns="" w="9525">
+                <a14:hiddenLine xmlns="" xmlns:a14="http://schemas.microsoft.com/office/drawing/2010/main" w="9525">
                   <a:solidFill>
                     <a:srgbClr val="000000"/>
                   </a:solidFill>
@@ -3816,7 +4263,7 @@
             </a:ln>
             <a:extLst>
               <a:ext uri="{91240B29-F687-4f45-9708-019B960494DF}">
-                <a14:hiddenLine xmlns:a14="http://schemas.microsoft.com/office/drawing/2010/main" xmlns="" w="9525">
+                <a14:hiddenLine xmlns="" xmlns:a14="http://schemas.microsoft.com/office/drawing/2010/main" w="9525">
                   <a:solidFill>
                     <a:srgbClr val="000000"/>
                   </a:solidFill>
@@ -3906,7 +4353,7 @@
             </a:ln>
             <a:extLst>
               <a:ext uri="{91240B29-F687-4f45-9708-019B960494DF}">
-                <a14:hiddenLine xmlns:a14="http://schemas.microsoft.com/office/drawing/2010/main" xmlns="" w="9525">
+                <a14:hiddenLine xmlns="" xmlns:a14="http://schemas.microsoft.com/office/drawing/2010/main" w="9525">
                   <a:solidFill>
                     <a:srgbClr val="000000"/>
                   </a:solidFill>
@@ -3968,7 +4415,7 @@
             </a:ln>
             <a:extLst>
               <a:ext uri="{91240B29-F687-4f45-9708-019B960494DF}">
-                <a14:hiddenLine xmlns:a14="http://schemas.microsoft.com/office/drawing/2010/main" xmlns="" w="9525">
+                <a14:hiddenLine xmlns="" xmlns:a14="http://schemas.microsoft.com/office/drawing/2010/main" w="9525">
                   <a:solidFill>
                     <a:srgbClr val="000000"/>
                   </a:solidFill>
@@ -4058,7 +4505,7 @@
             </a:ln>
             <a:extLst>
               <a:ext uri="{91240B29-F687-4f45-9708-019B960494DF}">
-                <a14:hiddenLine xmlns:a14="http://schemas.microsoft.com/office/drawing/2010/main" xmlns="" w="9525">
+                <a14:hiddenLine xmlns="" xmlns:a14="http://schemas.microsoft.com/office/drawing/2010/main" w="9525">
                   <a:solidFill>
                     <a:srgbClr val="000000"/>
                   </a:solidFill>
@@ -4148,7 +4595,7 @@
             </a:ln>
             <a:extLst>
               <a:ext uri="{91240B29-F687-4f45-9708-019B960494DF}">
-                <a14:hiddenLine xmlns:a14="http://schemas.microsoft.com/office/drawing/2010/main" xmlns="" w="9525">
+                <a14:hiddenLine xmlns="" xmlns:a14="http://schemas.microsoft.com/office/drawing/2010/main" w="9525">
                   <a:solidFill>
                     <a:srgbClr val="000000"/>
                   </a:solidFill>
@@ -4204,7 +4651,7 @@
             </a:ln>
             <a:extLst>
               <a:ext uri="{91240B29-F687-4f45-9708-019B960494DF}">
-                <a14:hiddenLine xmlns:a14="http://schemas.microsoft.com/office/drawing/2010/main" xmlns="" w="9525">
+                <a14:hiddenLine xmlns="" xmlns:a14="http://schemas.microsoft.com/office/drawing/2010/main" w="9525">
                   <a:solidFill>
                     <a:srgbClr val="000000"/>
                   </a:solidFill>
@@ -4294,7 +4741,7 @@
             </a:ln>
             <a:extLst>
               <a:ext uri="{91240B29-F687-4f45-9708-019B960494DF}">
-                <a14:hiddenLine xmlns:a14="http://schemas.microsoft.com/office/drawing/2010/main" xmlns="" w="9525">
+                <a14:hiddenLine xmlns="" xmlns:a14="http://schemas.microsoft.com/office/drawing/2010/main" w="9525">
                   <a:solidFill>
                     <a:srgbClr val="000000"/>
                   </a:solidFill>
@@ -4350,7 +4797,7 @@
             </a:ln>
             <a:extLst>
               <a:ext uri="{91240B29-F687-4f45-9708-019B960494DF}">
-                <a14:hiddenLine xmlns:a14="http://schemas.microsoft.com/office/drawing/2010/main" xmlns="" w="9525">
+                <a14:hiddenLine xmlns="" xmlns:a14="http://schemas.microsoft.com/office/drawing/2010/main" w="9525">
                   <a:solidFill>
                     <a:srgbClr val="000000"/>
                   </a:solidFill>
@@ -4440,7 +4887,7 @@
             </a:ln>
             <a:extLst>
               <a:ext uri="{91240B29-F687-4f45-9708-019B960494DF}">
-                <a14:hiddenLine xmlns:a14="http://schemas.microsoft.com/office/drawing/2010/main" xmlns="" w="9525">
+                <a14:hiddenLine xmlns="" xmlns:a14="http://schemas.microsoft.com/office/drawing/2010/main" w="9525">
                   <a:solidFill>
                     <a:srgbClr val="000000"/>
                   </a:solidFill>
@@ -4508,7 +4955,7 @@
             </a:ln>
             <a:extLst>
               <a:ext uri="{91240B29-F687-4f45-9708-019B960494DF}">
-                <a14:hiddenLine xmlns:a14="http://schemas.microsoft.com/office/drawing/2010/main" xmlns="" w="9525">
+                <a14:hiddenLine xmlns="" xmlns:a14="http://schemas.microsoft.com/office/drawing/2010/main" w="9525">
                   <a:solidFill>
                     <a:srgbClr val="000000"/>
                   </a:solidFill>
@@ -4598,7 +5045,7 @@
             </a:ln>
             <a:extLst>
               <a:ext uri="{91240B29-F687-4f45-9708-019B960494DF}">
-                <a14:hiddenLine xmlns:a14="http://schemas.microsoft.com/office/drawing/2010/main" xmlns="" w="9525">
+                <a14:hiddenLine xmlns="" xmlns:a14="http://schemas.microsoft.com/office/drawing/2010/main" w="9525">
                   <a:solidFill>
                     <a:srgbClr val="000000"/>
                   </a:solidFill>
@@ -4666,7 +5113,7 @@
             </a:ln>
             <a:extLst>
               <a:ext uri="{91240B29-F687-4f45-9708-019B960494DF}">
-                <a14:hiddenLine xmlns:a14="http://schemas.microsoft.com/office/drawing/2010/main" xmlns="" w="9525">
+                <a14:hiddenLine xmlns="" xmlns:a14="http://schemas.microsoft.com/office/drawing/2010/main" w="9525">
                   <a:solidFill>
                     <a:srgbClr val="000000"/>
                   </a:solidFill>
@@ -4756,7 +5203,7 @@
             </a:ln>
             <a:extLst>
               <a:ext uri="{91240B29-F687-4f45-9708-019B960494DF}">
-                <a14:hiddenLine xmlns:a14="http://schemas.microsoft.com/office/drawing/2010/main" xmlns="" w="9525">
+                <a14:hiddenLine xmlns="" xmlns:a14="http://schemas.microsoft.com/office/drawing/2010/main" w="9525">
                   <a:solidFill>
                     <a:srgbClr val="000000"/>
                   </a:solidFill>
@@ -4790,7 +5237,7 @@
             </a:ln>
             <a:extLst>
               <a:ext uri="{91240B29-F687-4f45-9708-019B960494DF}">
-                <a14:hiddenLine xmlns:a14="http://schemas.microsoft.com/office/drawing/2010/main" xmlns="" w="9525">
+                <a14:hiddenLine xmlns="" xmlns:a14="http://schemas.microsoft.com/office/drawing/2010/main" w="9525">
                   <a:solidFill>
                     <a:srgbClr val="000000"/>
                   </a:solidFill>
@@ -4880,7 +5327,7 @@
             </a:ln>
             <a:extLst>
               <a:ext uri="{91240B29-F687-4f45-9708-019B960494DF}">
-                <a14:hiddenLine xmlns:a14="http://schemas.microsoft.com/office/drawing/2010/main" xmlns="" w="9525">
+                <a14:hiddenLine xmlns="" xmlns:a14="http://schemas.microsoft.com/office/drawing/2010/main" w="9525">
                   <a:solidFill>
                     <a:srgbClr val="000000"/>
                   </a:solidFill>
@@ -4942,7 +5389,7 @@
             </a:ln>
             <a:extLst>
               <a:ext uri="{91240B29-F687-4f45-9708-019B960494DF}">
-                <a14:hiddenLine xmlns:a14="http://schemas.microsoft.com/office/drawing/2010/main" xmlns="" w="9525">
+                <a14:hiddenLine xmlns="" xmlns:a14="http://schemas.microsoft.com/office/drawing/2010/main" w="9525">
                   <a:solidFill>
                     <a:srgbClr val="000000"/>
                   </a:solidFill>
@@ -5004,7 +5451,7 @@
             </a:ln>
             <a:extLst>
               <a:ext uri="{91240B29-F687-4f45-9708-019B960494DF}">
-                <a14:hiddenLine xmlns:a14="http://schemas.microsoft.com/office/drawing/2010/main" xmlns="" w="9525">
+                <a14:hiddenLine xmlns="" xmlns:a14="http://schemas.microsoft.com/office/drawing/2010/main" w="9525">
                   <a:solidFill>
                     <a:srgbClr val="000000"/>
                   </a:solidFill>
@@ -5094,7 +5541,7 @@
             </a:ln>
             <a:extLst>
               <a:ext uri="{91240B29-F687-4f45-9708-019B960494DF}">
-                <a14:hiddenLine xmlns:a14="http://schemas.microsoft.com/office/drawing/2010/main" xmlns="" w="9525">
+                <a14:hiddenLine xmlns="" xmlns:a14="http://schemas.microsoft.com/office/drawing/2010/main" w="9525">
                   <a:solidFill>
                     <a:srgbClr val="000000"/>
                   </a:solidFill>
@@ -5162,7 +5609,7 @@
             </a:ln>
             <a:extLst>
               <a:ext uri="{91240B29-F687-4f45-9708-019B960494DF}">
-                <a14:hiddenLine xmlns:a14="http://schemas.microsoft.com/office/drawing/2010/main" xmlns="" w="9525">
+                <a14:hiddenLine xmlns="" xmlns:a14="http://schemas.microsoft.com/office/drawing/2010/main" w="9525">
                   <a:solidFill>
                     <a:srgbClr val="000000"/>
                   </a:solidFill>
@@ -5224,7 +5671,7 @@
             </a:ln>
             <a:extLst>
               <a:ext uri="{91240B29-F687-4f45-9708-019B960494DF}">
-                <a14:hiddenLine xmlns:a14="http://schemas.microsoft.com/office/drawing/2010/main" xmlns="" w="9525">
+                <a14:hiddenLine xmlns="" xmlns:a14="http://schemas.microsoft.com/office/drawing/2010/main" w="9525">
                   <a:solidFill>
                     <a:srgbClr val="000000"/>
                   </a:solidFill>
@@ -5314,7 +5761,7 @@
             </a:ln>
             <a:extLst>
               <a:ext uri="{91240B29-F687-4f45-9708-019B960494DF}">
-                <a14:hiddenLine xmlns:a14="http://schemas.microsoft.com/office/drawing/2010/main" xmlns="" w="9525">
+                <a14:hiddenLine xmlns="" xmlns:a14="http://schemas.microsoft.com/office/drawing/2010/main" w="9525">
                   <a:solidFill>
                     <a:srgbClr val="000000"/>
                   </a:solidFill>
@@ -5376,7 +5823,7 @@
             </a:ln>
             <a:extLst>
               <a:ext uri="{91240B29-F687-4f45-9708-019B960494DF}">
-                <a14:hiddenLine xmlns:a14="http://schemas.microsoft.com/office/drawing/2010/main" xmlns="" w="9525">
+                <a14:hiddenLine xmlns="" xmlns:a14="http://schemas.microsoft.com/office/drawing/2010/main" w="9525">
                   <a:solidFill>
                     <a:srgbClr val="000000"/>
                   </a:solidFill>
@@ -5466,7 +5913,7 @@
             </a:ln>
             <a:extLst>
               <a:ext uri="{91240B29-F687-4f45-9708-019B960494DF}">
-                <a14:hiddenLine xmlns:a14="http://schemas.microsoft.com/office/drawing/2010/main" xmlns="" w="9525">
+                <a14:hiddenLine xmlns="" xmlns:a14="http://schemas.microsoft.com/office/drawing/2010/main" w="9525">
                   <a:solidFill>
                     <a:srgbClr val="000000"/>
                   </a:solidFill>
@@ -5528,7 +5975,7 @@
             </a:ln>
             <a:extLst>
               <a:ext uri="{91240B29-F687-4f45-9708-019B960494DF}">
-                <a14:hiddenLine xmlns:a14="http://schemas.microsoft.com/office/drawing/2010/main" xmlns="" w="9525">
+                <a14:hiddenLine xmlns="" xmlns:a14="http://schemas.microsoft.com/office/drawing/2010/main" w="9525">
                   <a:solidFill>
                     <a:srgbClr val="000000"/>
                   </a:solidFill>
@@ -5618,7 +6065,7 @@
             </a:ln>
             <a:extLst>
               <a:ext uri="{91240B29-F687-4f45-9708-019B960494DF}">
-                <a14:hiddenLine xmlns:a14="http://schemas.microsoft.com/office/drawing/2010/main" xmlns="" w="9525">
+                <a14:hiddenLine xmlns="" xmlns:a14="http://schemas.microsoft.com/office/drawing/2010/main" w="9525">
                   <a:solidFill>
                     <a:srgbClr val="000000"/>
                   </a:solidFill>
@@ -5652,7 +6099,7 @@
             </a:ln>
             <a:extLst>
               <a:ext uri="{91240B29-F687-4f45-9708-019B960494DF}">
-                <a14:hiddenLine xmlns:a14="http://schemas.microsoft.com/office/drawing/2010/main" xmlns="" w="9525">
+                <a14:hiddenLine xmlns="" xmlns:a14="http://schemas.microsoft.com/office/drawing/2010/main" w="9525">
                   <a:solidFill>
                     <a:srgbClr val="000000"/>
                   </a:solidFill>
@@ -5717,7 +6164,7 @@
             </a:ln>
             <a:extLst>
               <a:ext uri="{91240B29-F687-4f45-9708-019B960494DF}">
-                <a14:hiddenLine xmlns:a14="http://schemas.microsoft.com/office/drawing/2010/main" xmlns="" w="9525">
+                <a14:hiddenLine xmlns="" xmlns:a14="http://schemas.microsoft.com/office/drawing/2010/main" w="9525">
                   <a:solidFill>
                     <a:srgbClr val="000000"/>
                   </a:solidFill>
@@ -5807,7 +6254,7 @@
             </a:ln>
             <a:extLst>
               <a:ext uri="{91240B29-F687-4f45-9708-019B960494DF}">
-                <a14:hiddenLine xmlns:a14="http://schemas.microsoft.com/office/drawing/2010/main" xmlns="" w="9525">
+                <a14:hiddenLine xmlns="" xmlns:a14="http://schemas.microsoft.com/office/drawing/2010/main" w="9525">
                   <a:solidFill>
                     <a:srgbClr val="000000"/>
                   </a:solidFill>
@@ -5869,7 +6316,7 @@
             </a:ln>
             <a:extLst>
               <a:ext uri="{91240B29-F687-4f45-9708-019B960494DF}">
-                <a14:hiddenLine xmlns:a14="http://schemas.microsoft.com/office/drawing/2010/main" xmlns="" w="9525">
+                <a14:hiddenLine xmlns="" xmlns:a14="http://schemas.microsoft.com/office/drawing/2010/main" w="9525">
                   <a:solidFill>
                     <a:srgbClr val="000000"/>
                   </a:solidFill>
@@ -5959,7 +6406,7 @@
             </a:ln>
             <a:extLst>
               <a:ext uri="{91240B29-F687-4f45-9708-019B960494DF}">
-                <a14:hiddenLine xmlns:a14="http://schemas.microsoft.com/office/drawing/2010/main" xmlns="" w="9525">
+                <a14:hiddenLine xmlns="" xmlns:a14="http://schemas.microsoft.com/office/drawing/2010/main" w="9525">
                   <a:solidFill>
                     <a:srgbClr val="000000"/>
                   </a:solidFill>
@@ -6049,7 +6496,7 @@
             </a:ln>
             <a:extLst>
               <a:ext uri="{91240B29-F687-4f45-9708-019B960494DF}">
-                <a14:hiddenLine xmlns:a14="http://schemas.microsoft.com/office/drawing/2010/main" xmlns="" w="9525">
+                <a14:hiddenLine xmlns="" xmlns:a14="http://schemas.microsoft.com/office/drawing/2010/main" w="9525">
                   <a:solidFill>
                     <a:srgbClr val="000000"/>
                   </a:solidFill>
@@ -6114,7 +6561,7 @@
             </a:ln>
             <a:extLst>
               <a:ext uri="{91240B29-F687-4f45-9708-019B960494DF}">
-                <a14:hiddenLine xmlns:a14="http://schemas.microsoft.com/office/drawing/2010/main" xmlns="" w="9525">
+                <a14:hiddenLine xmlns="" xmlns:a14="http://schemas.microsoft.com/office/drawing/2010/main" w="9525">
                   <a:solidFill>
                     <a:srgbClr val="000000"/>
                   </a:solidFill>
@@ -6176,7 +6623,7 @@
             </a:ln>
             <a:extLst>
               <a:ext uri="{91240B29-F687-4f45-9708-019B960494DF}">
-                <a14:hiddenLine xmlns:a14="http://schemas.microsoft.com/office/drawing/2010/main" xmlns="" w="9525">
+                <a14:hiddenLine xmlns="" xmlns:a14="http://schemas.microsoft.com/office/drawing/2010/main" w="9525">
                   <a:solidFill>
                     <a:srgbClr val="000000"/>
                   </a:solidFill>
@@ -6266,7 +6713,7 @@
             </a:ln>
             <a:extLst>
               <a:ext uri="{91240B29-F687-4f45-9708-019B960494DF}">
-                <a14:hiddenLine xmlns:a14="http://schemas.microsoft.com/office/drawing/2010/main" xmlns="" w="9525">
+                <a14:hiddenLine xmlns="" xmlns:a14="http://schemas.microsoft.com/office/drawing/2010/main" w="9525">
                   <a:solidFill>
                     <a:srgbClr val="000000"/>
                   </a:solidFill>
@@ -6356,7 +6803,7 @@
             </a:ln>
             <a:extLst>
               <a:ext uri="{91240B29-F687-4f45-9708-019B960494DF}">
-                <a14:hiddenLine xmlns:a14="http://schemas.microsoft.com/office/drawing/2010/main" xmlns="" w="9525">
+                <a14:hiddenLine xmlns="" xmlns:a14="http://schemas.microsoft.com/office/drawing/2010/main" w="9525">
                   <a:solidFill>
                     <a:srgbClr val="000000"/>
                   </a:solidFill>
@@ -6418,7 +6865,7 @@
             </a:ln>
             <a:extLst>
               <a:ext uri="{91240B29-F687-4f45-9708-019B960494DF}">
-                <a14:hiddenLine xmlns:a14="http://schemas.microsoft.com/office/drawing/2010/main" xmlns="" w="9525">
+                <a14:hiddenLine xmlns="" xmlns:a14="http://schemas.microsoft.com/office/drawing/2010/main" w="9525">
                   <a:solidFill>
                     <a:srgbClr val="000000"/>
                   </a:solidFill>
@@ -6538,7 +6985,7 @@
             </a:ln>
             <a:extLst>
               <a:ext uri="{91240B29-F687-4f45-9708-019B960494DF}">
-                <a14:hiddenLine xmlns:a14="http://schemas.microsoft.com/office/drawing/2010/main" xmlns="" w="9525">
+                <a14:hiddenLine xmlns="" xmlns:a14="http://schemas.microsoft.com/office/drawing/2010/main" w="9525">
                   <a:solidFill>
                     <a:srgbClr val="000000"/>
                   </a:solidFill>
@@ -6606,7 +7053,7 @@
             </a:ln>
             <a:extLst>
               <a:ext uri="{91240B29-F687-4f45-9708-019B960494DF}">
-                <a14:hiddenLine xmlns:a14="http://schemas.microsoft.com/office/drawing/2010/main" xmlns="" w="9525">
+                <a14:hiddenLine xmlns="" xmlns:a14="http://schemas.microsoft.com/office/drawing/2010/main" w="9525">
                   <a:solidFill>
                     <a:srgbClr val="000000"/>
                   </a:solidFill>
@@ -6696,7 +7143,7 @@
             </a:ln>
             <a:extLst>
               <a:ext uri="{91240B29-F687-4f45-9708-019B960494DF}">
-                <a14:hiddenLine xmlns:a14="http://schemas.microsoft.com/office/drawing/2010/main" xmlns="" w="9525">
+                <a14:hiddenLine xmlns="" xmlns:a14="http://schemas.microsoft.com/office/drawing/2010/main" w="9525">
                   <a:solidFill>
                     <a:srgbClr val="000000"/>
                   </a:solidFill>
@@ -6836,7 +7283,7 @@
           <a:p>
             <a:fld id="{D0D65A25-5B34-480B-8A82-D452FDC7444D}" type="datetimeFigureOut">
               <a:rPr lang="es-ES" smtClean="0"/>
-              <a:t>18/01/2022</a:t>
+              <a:t>01/02/2022</a:t>
             </a:fld>
             <a:endParaRPr lang="es-ES" dirty="0"/>
           </a:p>
@@ -7102,7 +7549,7 @@
           <a:p>
             <a:fld id="{D0D65A25-5B34-480B-8A82-D452FDC7444D}" type="datetimeFigureOut">
               <a:rPr lang="es-ES" smtClean="0"/>
-              <a:t>18/01/2022</a:t>
+              <a:t>01/02/2022</a:t>
             </a:fld>
             <a:endParaRPr lang="es-ES" dirty="0"/>
           </a:p>
@@ -7298,7 +7745,7 @@
           <a:p>
             <a:fld id="{D0D65A25-5B34-480B-8A82-D452FDC7444D}" type="datetimeFigureOut">
               <a:rPr lang="es-ES" smtClean="0"/>
-              <a:t>18/01/2022</a:t>
+              <a:t>01/02/2022</a:t>
             </a:fld>
             <a:endParaRPr lang="es-ES" dirty="0"/>
           </a:p>
@@ -7561,7 +8008,7 @@
           <a:p>
             <a:fld id="{D0D65A25-5B34-480B-8A82-D452FDC7444D}" type="datetimeFigureOut">
               <a:rPr lang="es-ES" smtClean="0"/>
-              <a:t>18/01/2022</a:t>
+              <a:t>01/02/2022</a:t>
             </a:fld>
             <a:endParaRPr lang="es-ES" dirty="0"/>
           </a:p>
@@ -7995,7 +8442,7 @@
           <a:p>
             <a:fld id="{D0D65A25-5B34-480B-8A82-D452FDC7444D}" type="datetimeFigureOut">
               <a:rPr lang="es-ES" smtClean="0"/>
-              <a:t>18/01/2022</a:t>
+              <a:t>01/02/2022</a:t>
             </a:fld>
             <a:endParaRPr lang="es-ES" dirty="0"/>
           </a:p>
@@ -8541,7 +8988,7 @@
           <a:p>
             <a:fld id="{D0D65A25-5B34-480B-8A82-D452FDC7444D}" type="datetimeFigureOut">
               <a:rPr lang="es-ES" smtClean="0"/>
-              <a:t>18/01/2022</a:t>
+              <a:t>01/02/2022</a:t>
             </a:fld>
             <a:endParaRPr lang="es-ES" dirty="0"/>
           </a:p>
@@ -9258,7 +9705,7 @@
           <a:p>
             <a:fld id="{D0D65A25-5B34-480B-8A82-D452FDC7444D}" type="datetimeFigureOut">
               <a:rPr lang="es-ES" smtClean="0"/>
-              <a:t>18/01/2022</a:t>
+              <a:t>01/02/2022</a:t>
             </a:fld>
             <a:endParaRPr lang="es-ES" dirty="0"/>
           </a:p>
@@ -9428,7 +9875,7 @@
           <a:p>
             <a:fld id="{D0D65A25-5B34-480B-8A82-D452FDC7444D}" type="datetimeFigureOut">
               <a:rPr lang="es-ES" smtClean="0"/>
-              <a:t>18/01/2022</a:t>
+              <a:t>01/02/2022</a:t>
             </a:fld>
             <a:endParaRPr lang="es-ES" dirty="0"/>
           </a:p>
@@ -9608,7 +10055,7 @@
           <a:p>
             <a:fld id="{D0D65A25-5B34-480B-8A82-D452FDC7444D}" type="datetimeFigureOut">
               <a:rPr lang="es-ES" smtClean="0"/>
-              <a:t>18/01/2022</a:t>
+              <a:t>01/02/2022</a:t>
             </a:fld>
             <a:endParaRPr lang="es-ES" dirty="0"/>
           </a:p>
@@ -9778,7 +10225,7 @@
           <a:p>
             <a:fld id="{D0D65A25-5B34-480B-8A82-D452FDC7444D}" type="datetimeFigureOut">
               <a:rPr lang="es-ES" smtClean="0"/>
-              <a:t>18/01/2022</a:t>
+              <a:t>01/02/2022</a:t>
             </a:fld>
             <a:endParaRPr lang="es-ES" dirty="0"/>
           </a:p>
@@ -10028,7 +10475,7 @@
           <a:p>
             <a:fld id="{D0D65A25-5B34-480B-8A82-D452FDC7444D}" type="datetimeFigureOut">
               <a:rPr lang="es-ES" smtClean="0"/>
-              <a:t>18/01/2022</a:t>
+              <a:t>01/02/2022</a:t>
             </a:fld>
             <a:endParaRPr lang="es-ES" dirty="0"/>
           </a:p>
@@ -10260,7 +10707,7 @@
           <a:p>
             <a:fld id="{D0D65A25-5B34-480B-8A82-D452FDC7444D}" type="datetimeFigureOut">
               <a:rPr lang="es-ES" smtClean="0"/>
-              <a:t>18/01/2022</a:t>
+              <a:t>01/02/2022</a:t>
             </a:fld>
             <a:endParaRPr lang="es-ES" dirty="0"/>
           </a:p>
@@ -10641,7 +11088,7 @@
           <a:p>
             <a:fld id="{D0D65A25-5B34-480B-8A82-D452FDC7444D}" type="datetimeFigureOut">
               <a:rPr lang="es-ES" smtClean="0"/>
-              <a:t>18/01/2022</a:t>
+              <a:t>01/02/2022</a:t>
             </a:fld>
             <a:endParaRPr lang="es-ES" dirty="0"/>
           </a:p>
@@ -10759,7 +11206,7 @@
           <a:p>
             <a:fld id="{D0D65A25-5B34-480B-8A82-D452FDC7444D}" type="datetimeFigureOut">
               <a:rPr lang="es-ES" smtClean="0"/>
-              <a:t>18/01/2022</a:t>
+              <a:t>01/02/2022</a:t>
             </a:fld>
             <a:endParaRPr lang="es-ES" dirty="0"/>
           </a:p>
@@ -10854,7 +11301,7 @@
           <a:p>
             <a:fld id="{D0D65A25-5B34-480B-8A82-D452FDC7444D}" type="datetimeFigureOut">
               <a:rPr lang="es-ES" smtClean="0"/>
-              <a:t>18/01/2022</a:t>
+              <a:t>01/02/2022</a:t>
             </a:fld>
             <a:endParaRPr lang="es-ES" dirty="0"/>
           </a:p>
@@ -11103,7 +11550,7 @@
           <a:p>
             <a:fld id="{D0D65A25-5B34-480B-8A82-D452FDC7444D}" type="datetimeFigureOut">
               <a:rPr lang="es-ES" smtClean="0"/>
-              <a:t>18/01/2022</a:t>
+              <a:t>01/02/2022</a:t>
             </a:fld>
             <a:endParaRPr lang="es-ES" dirty="0"/>
           </a:p>
@@ -11382,7 +11829,7 @@
           <a:p>
             <a:fld id="{D0D65A25-5B34-480B-8A82-D452FDC7444D}" type="datetimeFigureOut">
               <a:rPr lang="es-ES" smtClean="0"/>
-              <a:t>18/01/2022</a:t>
+              <a:t>01/02/2022</a:t>
             </a:fld>
             <a:endParaRPr lang="es-ES" dirty="0"/>
           </a:p>
@@ -11498,7 +11945,7 @@
           <a:noFill/>
           <a:extLst>
             <a:ext uri="{909E8E84-426E-40dd-AFC4-6F175D3DCCD1}">
-              <a14:hiddenFill xmlns:a14="http://schemas.microsoft.com/office/drawing/2010/main" xmlns="">
+              <a14:hiddenFill xmlns="" xmlns:a14="http://schemas.microsoft.com/office/drawing/2010/main">
                 <a:solidFill>
                   <a:srgbClr val="FFFFFF"/>
                 </a:solidFill>
@@ -11572,7 +12019,7 @@
               </a:ln>
               <a:extLst>
                 <a:ext uri="{91240B29-F687-4f45-9708-019B960494DF}">
-                  <a14:hiddenLine xmlns:a14="http://schemas.microsoft.com/office/drawing/2010/main" xmlns="" w="9525">
+                  <a14:hiddenLine xmlns="" xmlns:a14="http://schemas.microsoft.com/office/drawing/2010/main" w="9525">
                     <a:solidFill>
                       <a:srgbClr val="000000"/>
                     </a:solidFill>
@@ -11662,7 +12109,7 @@
               </a:ln>
               <a:extLst>
                 <a:ext uri="{91240B29-F687-4f45-9708-019B960494DF}">
-                  <a14:hiddenLine xmlns:a14="http://schemas.microsoft.com/office/drawing/2010/main" xmlns="" w="9525">
+                  <a14:hiddenLine xmlns="" xmlns:a14="http://schemas.microsoft.com/office/drawing/2010/main" w="9525">
                     <a:solidFill>
                       <a:srgbClr val="000000"/>
                     </a:solidFill>
@@ -11752,7 +12199,7 @@
               </a:ln>
               <a:extLst>
                 <a:ext uri="{91240B29-F687-4f45-9708-019B960494DF}">
-                  <a14:hiddenLine xmlns:a14="http://schemas.microsoft.com/office/drawing/2010/main" xmlns="" w="9525">
+                  <a14:hiddenLine xmlns="" xmlns:a14="http://schemas.microsoft.com/office/drawing/2010/main" w="9525">
                     <a:solidFill>
                       <a:srgbClr val="000000"/>
                     </a:solidFill>
@@ -11814,7 +12261,7 @@
               </a:ln>
               <a:extLst>
                 <a:ext uri="{91240B29-F687-4f45-9708-019B960494DF}">
-                  <a14:hiddenLine xmlns:a14="http://schemas.microsoft.com/office/drawing/2010/main" xmlns="" w="9525">
+                  <a14:hiddenLine xmlns="" xmlns:a14="http://schemas.microsoft.com/office/drawing/2010/main" w="9525">
                     <a:solidFill>
                       <a:srgbClr val="000000"/>
                     </a:solidFill>
@@ -11904,7 +12351,7 @@
               </a:ln>
               <a:extLst>
                 <a:ext uri="{91240B29-F687-4f45-9708-019B960494DF}">
-                  <a14:hiddenLine xmlns:a14="http://schemas.microsoft.com/office/drawing/2010/main" xmlns="" w="9525">
+                  <a14:hiddenLine xmlns="" xmlns:a14="http://schemas.microsoft.com/office/drawing/2010/main" w="9525">
                     <a:solidFill>
                       <a:srgbClr val="000000"/>
                     </a:solidFill>
@@ -11966,7 +12413,7 @@
               </a:ln>
               <a:extLst>
                 <a:ext uri="{91240B29-F687-4f45-9708-019B960494DF}">
-                  <a14:hiddenLine xmlns:a14="http://schemas.microsoft.com/office/drawing/2010/main" xmlns="" w="9525">
+                  <a14:hiddenLine xmlns="" xmlns:a14="http://schemas.microsoft.com/office/drawing/2010/main" w="9525">
                     <a:solidFill>
                       <a:srgbClr val="000000"/>
                     </a:solidFill>
@@ -12028,7 +12475,7 @@
               </a:ln>
               <a:extLst>
                 <a:ext uri="{91240B29-F687-4f45-9708-019B960494DF}">
-                  <a14:hiddenLine xmlns:a14="http://schemas.microsoft.com/office/drawing/2010/main" xmlns="" w="9525">
+                  <a14:hiddenLine xmlns="" xmlns:a14="http://schemas.microsoft.com/office/drawing/2010/main" w="9525">
                     <a:solidFill>
                       <a:srgbClr val="000000"/>
                     </a:solidFill>
@@ -12118,7 +12565,7 @@
               </a:ln>
               <a:extLst>
                 <a:ext uri="{91240B29-F687-4f45-9708-019B960494DF}">
-                  <a14:hiddenLine xmlns:a14="http://schemas.microsoft.com/office/drawing/2010/main" xmlns="" w="9525">
+                  <a14:hiddenLine xmlns="" xmlns:a14="http://schemas.microsoft.com/office/drawing/2010/main" w="9525">
                     <a:solidFill>
                       <a:srgbClr val="000000"/>
                     </a:solidFill>
@@ -12208,7 +12655,7 @@
               </a:ln>
               <a:extLst>
                 <a:ext uri="{91240B29-F687-4f45-9708-019B960494DF}">
-                  <a14:hiddenLine xmlns:a14="http://schemas.microsoft.com/office/drawing/2010/main" xmlns="" w="9525">
+                  <a14:hiddenLine xmlns="" xmlns:a14="http://schemas.microsoft.com/office/drawing/2010/main" w="9525">
                     <a:solidFill>
                       <a:srgbClr val="000000"/>
                     </a:solidFill>
@@ -12270,7 +12717,7 @@
               </a:ln>
               <a:extLst>
                 <a:ext uri="{91240B29-F687-4f45-9708-019B960494DF}">
-                  <a14:hiddenLine xmlns:a14="http://schemas.microsoft.com/office/drawing/2010/main" xmlns="" w="9525">
+                  <a14:hiddenLine xmlns="" xmlns:a14="http://schemas.microsoft.com/office/drawing/2010/main" w="9525">
                     <a:solidFill>
                       <a:srgbClr val="000000"/>
                     </a:solidFill>
@@ -12380,7 +12827,7 @@
               </a:ln>
               <a:extLst>
                 <a:ext uri="{91240B29-F687-4f45-9708-019B960494DF}">
-                  <a14:hiddenLine xmlns:a14="http://schemas.microsoft.com/office/drawing/2010/main" xmlns="" w="9525">
+                  <a14:hiddenLine xmlns="" xmlns:a14="http://schemas.microsoft.com/office/drawing/2010/main" w="9525">
                     <a:solidFill>
                       <a:srgbClr val="000000"/>
                     </a:solidFill>
@@ -12464,7 +12911,7 @@
               </a:ln>
               <a:extLst>
                 <a:ext uri="{91240B29-F687-4f45-9708-019B960494DF}">
-                  <a14:hiddenLine xmlns:a14="http://schemas.microsoft.com/office/drawing/2010/main" xmlns="" w="9525">
+                  <a14:hiddenLine xmlns="" xmlns:a14="http://schemas.microsoft.com/office/drawing/2010/main" w="9525">
                     <a:solidFill>
                       <a:srgbClr val="000000"/>
                     </a:solidFill>
@@ -12526,7 +12973,7 @@
               </a:ln>
               <a:extLst>
                 <a:ext uri="{91240B29-F687-4f45-9708-019B960494DF}">
-                  <a14:hiddenLine xmlns:a14="http://schemas.microsoft.com/office/drawing/2010/main" xmlns="" w="9525">
+                  <a14:hiddenLine xmlns="" xmlns:a14="http://schemas.microsoft.com/office/drawing/2010/main" w="9525">
                     <a:solidFill>
                       <a:srgbClr val="000000"/>
                     </a:solidFill>
@@ -12588,7 +13035,7 @@
               </a:ln>
               <a:extLst>
                 <a:ext uri="{91240B29-F687-4f45-9708-019B960494DF}">
-                  <a14:hiddenLine xmlns:a14="http://schemas.microsoft.com/office/drawing/2010/main" xmlns="" w="9525">
+                  <a14:hiddenLine xmlns="" xmlns:a14="http://schemas.microsoft.com/office/drawing/2010/main" w="9525">
                     <a:solidFill>
                       <a:srgbClr val="000000"/>
                     </a:solidFill>
@@ -12678,7 +13125,7 @@
               </a:ln>
               <a:extLst>
                 <a:ext uri="{91240B29-F687-4f45-9708-019B960494DF}">
-                  <a14:hiddenLine xmlns:a14="http://schemas.microsoft.com/office/drawing/2010/main" xmlns="" w="9525">
+                  <a14:hiddenLine xmlns="" xmlns:a14="http://schemas.microsoft.com/office/drawing/2010/main" w="9525">
                     <a:solidFill>
                       <a:srgbClr val="000000"/>
                     </a:solidFill>
@@ -12712,7 +13159,7 @@
               </a:ln>
               <a:extLst>
                 <a:ext uri="{91240B29-F687-4f45-9708-019B960494DF}">
-                  <a14:hiddenLine xmlns:a14="http://schemas.microsoft.com/office/drawing/2010/main" xmlns="" w="9525">
+                  <a14:hiddenLine xmlns="" xmlns:a14="http://schemas.microsoft.com/office/drawing/2010/main" w="9525">
                     <a:solidFill>
                       <a:srgbClr val="000000"/>
                     </a:solidFill>
@@ -12777,7 +13224,7 @@
               </a:ln>
               <a:extLst>
                 <a:ext uri="{91240B29-F687-4f45-9708-019B960494DF}">
-                  <a14:hiddenLine xmlns:a14="http://schemas.microsoft.com/office/drawing/2010/main" xmlns="" w="9525">
+                  <a14:hiddenLine xmlns="" xmlns:a14="http://schemas.microsoft.com/office/drawing/2010/main" w="9525">
                     <a:solidFill>
                       <a:srgbClr val="000000"/>
                     </a:solidFill>
@@ -12867,7 +13314,7 @@
               </a:ln>
               <a:extLst>
                 <a:ext uri="{91240B29-F687-4f45-9708-019B960494DF}">
-                  <a14:hiddenLine xmlns:a14="http://schemas.microsoft.com/office/drawing/2010/main" xmlns="" w="9525">
+                  <a14:hiddenLine xmlns="" xmlns:a14="http://schemas.microsoft.com/office/drawing/2010/main" w="9525">
                     <a:solidFill>
                       <a:srgbClr val="000000"/>
                     </a:solidFill>
@@ -12929,7 +13376,7 @@
               </a:ln>
               <a:extLst>
                 <a:ext uri="{91240B29-F687-4f45-9708-019B960494DF}">
-                  <a14:hiddenLine xmlns:a14="http://schemas.microsoft.com/office/drawing/2010/main" xmlns="" w="9525">
+                  <a14:hiddenLine xmlns="" xmlns:a14="http://schemas.microsoft.com/office/drawing/2010/main" w="9525">
                     <a:solidFill>
                       <a:srgbClr val="000000"/>
                     </a:solidFill>
@@ -13019,7 +13466,7 @@
               </a:ln>
               <a:extLst>
                 <a:ext uri="{91240B29-F687-4f45-9708-019B960494DF}">
-                  <a14:hiddenLine xmlns:a14="http://schemas.microsoft.com/office/drawing/2010/main" xmlns="" w="9525">
+                  <a14:hiddenLine xmlns="" xmlns:a14="http://schemas.microsoft.com/office/drawing/2010/main" w="9525">
                     <a:solidFill>
                       <a:srgbClr val="000000"/>
                     </a:solidFill>
@@ -13084,7 +13531,7 @@
               </a:ln>
               <a:extLst>
                 <a:ext uri="{91240B29-F687-4f45-9708-019B960494DF}">
-                  <a14:hiddenLine xmlns:a14="http://schemas.microsoft.com/office/drawing/2010/main" xmlns="" w="9525">
+                  <a14:hiddenLine xmlns="" xmlns:a14="http://schemas.microsoft.com/office/drawing/2010/main" w="9525">
                     <a:solidFill>
                       <a:srgbClr val="000000"/>
                     </a:solidFill>
@@ -13146,7 +13593,7 @@
               </a:ln>
               <a:extLst>
                 <a:ext uri="{91240B29-F687-4f45-9708-019B960494DF}">
-                  <a14:hiddenLine xmlns:a14="http://schemas.microsoft.com/office/drawing/2010/main" xmlns="" w="9525">
+                  <a14:hiddenLine xmlns="" xmlns:a14="http://schemas.microsoft.com/office/drawing/2010/main" w="9525">
                     <a:solidFill>
                       <a:srgbClr val="000000"/>
                     </a:solidFill>
@@ -13236,7 +13683,7 @@
               </a:ln>
               <a:extLst>
                 <a:ext uri="{91240B29-F687-4f45-9708-019B960494DF}">
-                  <a14:hiddenLine xmlns:a14="http://schemas.microsoft.com/office/drawing/2010/main" xmlns="" w="9525">
+                  <a14:hiddenLine xmlns="" xmlns:a14="http://schemas.microsoft.com/office/drawing/2010/main" w="9525">
                     <a:solidFill>
                       <a:srgbClr val="000000"/>
                     </a:solidFill>
@@ -13326,7 +13773,7 @@
               </a:ln>
               <a:extLst>
                 <a:ext uri="{91240B29-F687-4f45-9708-019B960494DF}">
-                  <a14:hiddenLine xmlns:a14="http://schemas.microsoft.com/office/drawing/2010/main" xmlns="" w="9525">
+                  <a14:hiddenLine xmlns="" xmlns:a14="http://schemas.microsoft.com/office/drawing/2010/main" w="9525">
                     <a:solidFill>
                       <a:srgbClr val="000000"/>
                     </a:solidFill>
@@ -13391,7 +13838,7 @@
               </a:ln>
               <a:extLst>
                 <a:ext uri="{91240B29-F687-4f45-9708-019B960494DF}">
-                  <a14:hiddenLine xmlns:a14="http://schemas.microsoft.com/office/drawing/2010/main" xmlns="" w="9525">
+                  <a14:hiddenLine xmlns="" xmlns:a14="http://schemas.microsoft.com/office/drawing/2010/main" w="9525">
                     <a:solidFill>
                       <a:srgbClr val="000000"/>
                     </a:solidFill>
@@ -13511,7 +13958,7 @@
               </a:ln>
               <a:extLst>
                 <a:ext uri="{91240B29-F687-4f45-9708-019B960494DF}">
-                  <a14:hiddenLine xmlns:a14="http://schemas.microsoft.com/office/drawing/2010/main" xmlns="" w="9525">
+                  <a14:hiddenLine xmlns="" xmlns:a14="http://schemas.microsoft.com/office/drawing/2010/main" w="9525">
                     <a:solidFill>
                       <a:srgbClr val="000000"/>
                     </a:solidFill>
@@ -13609,7 +14056,7 @@
               </a:ln>
               <a:extLst>
                 <a:ext uri="{91240B29-F687-4f45-9708-019B960494DF}">
-                  <a14:hiddenLine xmlns:a14="http://schemas.microsoft.com/office/drawing/2010/main" xmlns="" w="9525">
+                  <a14:hiddenLine xmlns="" xmlns:a14="http://schemas.microsoft.com/office/drawing/2010/main" w="9525">
                     <a:solidFill>
                       <a:srgbClr val="000000"/>
                     </a:solidFill>
@@ -13724,7 +14171,7 @@
               </a:ln>
               <a:extLst>
                 <a:ext uri="{91240B29-F687-4f45-9708-019B960494DF}">
-                  <a14:hiddenLine xmlns:a14="http://schemas.microsoft.com/office/drawing/2010/main" xmlns="" w="9525">
+                  <a14:hiddenLine xmlns="" xmlns:a14="http://schemas.microsoft.com/office/drawing/2010/main" w="9525">
                     <a:solidFill>
                       <a:srgbClr val="000000"/>
                     </a:solidFill>
@@ -13814,7 +14261,7 @@
               </a:ln>
               <a:extLst>
                 <a:ext uri="{91240B29-F687-4f45-9708-019B960494DF}">
-                  <a14:hiddenLine xmlns:a14="http://schemas.microsoft.com/office/drawing/2010/main" xmlns="" w="9525">
+                  <a14:hiddenLine xmlns="" xmlns:a14="http://schemas.microsoft.com/office/drawing/2010/main" w="9525">
                     <a:solidFill>
                       <a:srgbClr val="000000"/>
                     </a:solidFill>
@@ -13879,7 +14326,7 @@
               </a:ln>
               <a:extLst>
                 <a:ext uri="{91240B29-F687-4f45-9708-019B960494DF}">
-                  <a14:hiddenLine xmlns:a14="http://schemas.microsoft.com/office/drawing/2010/main" xmlns="" w="9525">
+                  <a14:hiddenLine xmlns="" xmlns:a14="http://schemas.microsoft.com/office/drawing/2010/main" w="9525">
                     <a:solidFill>
                       <a:srgbClr val="000000"/>
                     </a:solidFill>
@@ -13969,7 +14416,7 @@
               </a:ln>
               <a:extLst>
                 <a:ext uri="{91240B29-F687-4f45-9708-019B960494DF}">
-                  <a14:hiddenLine xmlns:a14="http://schemas.microsoft.com/office/drawing/2010/main" xmlns="" w="9525">
+                  <a14:hiddenLine xmlns="" xmlns:a14="http://schemas.microsoft.com/office/drawing/2010/main" w="9525">
                     <a:solidFill>
                       <a:srgbClr val="000000"/>
                     </a:solidFill>
@@ -14037,7 +14484,7 @@
               </a:ln>
               <a:extLst>
                 <a:ext uri="{91240B29-F687-4f45-9708-019B960494DF}">
-                  <a14:hiddenLine xmlns:a14="http://schemas.microsoft.com/office/drawing/2010/main" xmlns="" w="9525">
+                  <a14:hiddenLine xmlns="" xmlns:a14="http://schemas.microsoft.com/office/drawing/2010/main" w="9525">
                     <a:solidFill>
                       <a:srgbClr val="000000"/>
                     </a:solidFill>
@@ -14127,7 +14574,7 @@
               </a:ln>
               <a:extLst>
                 <a:ext uri="{91240B29-F687-4f45-9708-019B960494DF}">
-                  <a14:hiddenLine xmlns:a14="http://schemas.microsoft.com/office/drawing/2010/main" xmlns="" w="9525">
+                  <a14:hiddenLine xmlns="" xmlns:a14="http://schemas.microsoft.com/office/drawing/2010/main" w="9525">
                     <a:solidFill>
                       <a:srgbClr val="000000"/>
                     </a:solidFill>
@@ -14195,7 +14642,7 @@
               </a:ln>
               <a:extLst>
                 <a:ext uri="{91240B29-F687-4f45-9708-019B960494DF}">
-                  <a14:hiddenLine xmlns:a14="http://schemas.microsoft.com/office/drawing/2010/main" xmlns="" w="9525">
+                  <a14:hiddenLine xmlns="" xmlns:a14="http://schemas.microsoft.com/office/drawing/2010/main" w="9525">
                     <a:solidFill>
                       <a:srgbClr val="000000"/>
                     </a:solidFill>
@@ -14285,7 +14732,7 @@
               </a:ln>
               <a:extLst>
                 <a:ext uri="{91240B29-F687-4f45-9708-019B960494DF}">
-                  <a14:hiddenLine xmlns:a14="http://schemas.microsoft.com/office/drawing/2010/main" xmlns="" w="9525">
+                  <a14:hiddenLine xmlns="" xmlns:a14="http://schemas.microsoft.com/office/drawing/2010/main" w="9525">
                     <a:solidFill>
                       <a:srgbClr val="000000"/>
                     </a:solidFill>
@@ -14319,7 +14766,7 @@
               </a:ln>
               <a:extLst>
                 <a:ext uri="{91240B29-F687-4f45-9708-019B960494DF}">
-                  <a14:hiddenLine xmlns:a14="http://schemas.microsoft.com/office/drawing/2010/main" xmlns="" w="9525">
+                  <a14:hiddenLine xmlns="" xmlns:a14="http://schemas.microsoft.com/office/drawing/2010/main" w="9525">
                     <a:solidFill>
                       <a:srgbClr val="000000"/>
                     </a:solidFill>
@@ -14459,7 +14906,7 @@
           <a:p>
             <a:fld id="{D0D65A25-5B34-480B-8A82-D452FDC7444D}" type="datetimeFigureOut">
               <a:rPr lang="es-ES" smtClean="0"/>
-              <a:t>18/01/2022</a:t>
+              <a:t>01/02/2022</a:t>
             </a:fld>
             <a:endParaRPr lang="es-ES" dirty="0"/>
           </a:p>
@@ -16430,6 +16877,9 @@
   <p:clrMapOvr>
     <a:masterClrMapping/>
   </p:clrMapOvr>
+  <p:transition spd="slow">
+    <p:push dir="u"/>
+  </p:transition>
   <p:timing>
     <p:tnLst>
       <p:par>
@@ -18494,6 +18944,7 @@
           </a:bodyPr>
           <a:lstStyle/>
           <a:p>
+            <a:pPr algn="ctr"/>
             <a:r>
               <a:rPr lang="en-GB" dirty="0"/>
               <a:t>Live coding</a:t>
@@ -18545,6 +18996,741 @@
       </p:grpSpPr>
       <p:sp>
         <p:nvSpPr>
+          <p:cNvPr id="4" name="标题 1">
+            <a:extLst>
+              <a:ext uri="{FF2B5EF4-FFF2-40B4-BE49-F238E27FC236}">
+                <a16:creationId xmlns:a16="http://schemas.microsoft.com/office/drawing/2014/main" id="{88E1C844-5AAB-472C-9B07-82DE6E1E1188}"/>
+              </a:ext>
+            </a:extLst>
+          </p:cNvPr>
+          <p:cNvSpPr txBox="1">
+            <a:spLocks/>
+          </p:cNvSpPr>
+          <p:nvPr/>
+        </p:nvSpPr>
+        <p:spPr>
+          <a:xfrm>
+            <a:off x="1347890" y="2004865"/>
+            <a:ext cx="9905998" cy="1478570"/>
+          </a:xfrm>
+          <a:prstGeom prst="rect">
+            <a:avLst/>
+          </a:prstGeom>
+        </p:spPr>
+        <p:txBody>
+          <a:bodyPr vert="horz" lIns="91440" tIns="45720" rIns="91440" bIns="45720" rtlCol="0" anchor="b">
+            <a:normAutofit/>
+          </a:bodyPr>
+          <a:lstStyle>
+            <a:lvl1pPr algn="l" defTabSz="914400" rtl="0" eaLnBrk="1" latinLnBrk="0" hangingPunct="1">
+              <a:lnSpc>
+                <a:spcPct val="90000"/>
+              </a:lnSpc>
+              <a:spcBef>
+                <a:spcPct val="0"/>
+              </a:spcBef>
+              <a:buNone/>
+              <a:defRPr sz="3600" kern="1200" cap="all" baseline="0">
+                <a:solidFill>
+                  <a:schemeClr val="tx1"/>
+                </a:solidFill>
+                <a:latin typeface="+mj-lt"/>
+                <a:ea typeface="+mj-ea"/>
+                <a:cs typeface="+mj-cs"/>
+              </a:defRPr>
+            </a:lvl1pPr>
+          </a:lstStyle>
+          <a:p>
+            <a:pPr algn="ctr"/>
+            <a:r>
+              <a:rPr lang="en-US" dirty="0">
+                <a:solidFill>
+                  <a:schemeClr val="bg2"/>
+                </a:solidFill>
+                <a:latin typeface="Avenir Next" panose="020B0503020202020204"/>
+              </a:rPr>
+              <a:t>Random forest</a:t>
+            </a:r>
+          </a:p>
+        </p:txBody>
+      </p:sp>
+    </p:spTree>
+    <p:extLst>
+      <p:ext uri="{BB962C8B-B14F-4D97-AF65-F5344CB8AC3E}">
+        <p14:creationId xmlns:p14="http://schemas.microsoft.com/office/powerpoint/2010/main" val="4196402920"/>
+      </p:ext>
+    </p:extLst>
+  </p:cSld>
+  <p:clrMapOvr>
+    <a:masterClrMapping/>
+  </p:clrMapOvr>
+  <p:transition spd="med">
+    <p:pull/>
+  </p:transition>
+</p:sld>
+</file>
+
+<file path=ppt/slides/slide14.xml><?xml version="1.0" encoding="utf-8"?>
+<p:sld xmlns:a="http://schemas.openxmlformats.org/drawingml/2006/main" xmlns:r="http://schemas.openxmlformats.org/officeDocument/2006/relationships" xmlns:p="http://schemas.openxmlformats.org/presentationml/2006/main">
+  <p:cSld>
+    <p:spTree>
+      <p:nvGrpSpPr>
+        <p:cNvPr id="1" name=""/>
+        <p:cNvGrpSpPr/>
+        <p:nvPr/>
+      </p:nvGrpSpPr>
+      <p:grpSpPr>
+        <a:xfrm>
+          <a:off x="0" y="0"/>
+          <a:ext cx="0" cy="0"/>
+          <a:chOff x="0" y="0"/>
+          <a:chExt cx="0" cy="0"/>
+        </a:xfrm>
+      </p:grpSpPr>
+      <p:sp>
+        <p:nvSpPr>
+          <p:cNvPr id="2" name="Title 1">
+            <a:extLst>
+              <a:ext uri="{FF2B5EF4-FFF2-40B4-BE49-F238E27FC236}">
+                <a16:creationId xmlns:a16="http://schemas.microsoft.com/office/drawing/2014/main" id="{39FA6BAA-90B6-46BA-9A3B-7D22F3DFFB1C}"/>
+              </a:ext>
+            </a:extLst>
+          </p:cNvPr>
+          <p:cNvSpPr>
+            <a:spLocks noGrp="1"/>
+          </p:cNvSpPr>
+          <p:nvPr>
+            <p:ph type="title"/>
+          </p:nvPr>
+        </p:nvSpPr>
+        <p:spPr/>
+        <p:txBody>
+          <a:bodyPr/>
+          <a:lstStyle/>
+          <a:p>
+            <a:pPr algn="ctr"/>
+            <a:r>
+              <a:rPr lang="en-US" dirty="0"/>
+              <a:t>bagging</a:t>
+            </a:r>
+          </a:p>
+        </p:txBody>
+      </p:sp>
+      <p:sp>
+        <p:nvSpPr>
+          <p:cNvPr id="3" name="Content Placeholder 2">
+            <a:extLst>
+              <a:ext uri="{FF2B5EF4-FFF2-40B4-BE49-F238E27FC236}">
+                <a16:creationId xmlns:a16="http://schemas.microsoft.com/office/drawing/2014/main" id="{0A5C8ED0-CE87-49A1-9B24-7144EC9E66F7}"/>
+              </a:ext>
+            </a:extLst>
+          </p:cNvPr>
+          <p:cNvSpPr>
+            <a:spLocks noGrp="1"/>
+          </p:cNvSpPr>
+          <p:nvPr>
+            <p:ph idx="1"/>
+          </p:nvPr>
+        </p:nvSpPr>
+        <p:spPr/>
+        <p:txBody>
+          <a:bodyPr/>
+          <a:lstStyle/>
+          <a:p>
+            <a:r>
+              <a:rPr lang="en-US" dirty="0"/>
+              <a:t>Ensemble methods</a:t>
+            </a:r>
+          </a:p>
+          <a:p>
+            <a:r>
+              <a:rPr lang="en-US" dirty="0"/>
+              <a:t>Bagging = Bootstrap + Aggregation</a:t>
+            </a:r>
+          </a:p>
+          <a:p>
+            <a:r>
+              <a:rPr lang="en-US" dirty="0"/>
+              <a:t>Subset of data and features randomly with replacement</a:t>
+            </a:r>
+          </a:p>
+          <a:p>
+            <a:endParaRPr lang="en-US" dirty="0"/>
+          </a:p>
+          <a:p>
+            <a:endParaRPr lang="en-US" dirty="0"/>
+          </a:p>
+        </p:txBody>
+      </p:sp>
+    </p:spTree>
+    <p:extLst>
+      <p:ext uri="{BB962C8B-B14F-4D97-AF65-F5344CB8AC3E}">
+        <p14:creationId xmlns:p14="http://schemas.microsoft.com/office/powerpoint/2010/main" val="4054030806"/>
+      </p:ext>
+    </p:extLst>
+  </p:cSld>
+  <p:clrMapOvr>
+    <a:masterClrMapping/>
+  </p:clrMapOvr>
+  <p:transition spd="slow">
+    <p:push dir="u"/>
+  </p:transition>
+</p:sld>
+</file>
+
+<file path=ppt/slides/slide15.xml><?xml version="1.0" encoding="utf-8"?>
+<p:sld xmlns:a="http://schemas.openxmlformats.org/drawingml/2006/main" xmlns:r="http://schemas.openxmlformats.org/officeDocument/2006/relationships" xmlns:p="http://schemas.openxmlformats.org/presentationml/2006/main">
+  <p:cSld>
+    <p:spTree>
+      <p:nvGrpSpPr>
+        <p:cNvPr id="1" name=""/>
+        <p:cNvGrpSpPr/>
+        <p:nvPr/>
+      </p:nvGrpSpPr>
+      <p:grpSpPr>
+        <a:xfrm>
+          <a:off x="0" y="0"/>
+          <a:ext cx="0" cy="0"/>
+          <a:chOff x="0" y="0"/>
+          <a:chExt cx="0" cy="0"/>
+        </a:xfrm>
+      </p:grpSpPr>
+      <p:sp>
+        <p:nvSpPr>
+          <p:cNvPr id="2" name="Title 1">
+            <a:extLst>
+              <a:ext uri="{FF2B5EF4-FFF2-40B4-BE49-F238E27FC236}">
+                <a16:creationId xmlns:a16="http://schemas.microsoft.com/office/drawing/2014/main" id="{39FA6BAA-90B6-46BA-9A3B-7D22F3DFFB1C}"/>
+              </a:ext>
+            </a:extLst>
+          </p:cNvPr>
+          <p:cNvSpPr>
+            <a:spLocks noGrp="1"/>
+          </p:cNvSpPr>
+          <p:nvPr>
+            <p:ph type="title"/>
+          </p:nvPr>
+        </p:nvSpPr>
+        <p:spPr>
+          <a:xfrm>
+            <a:off x="1141413" y="618518"/>
+            <a:ext cx="9905998" cy="1478570"/>
+          </a:xfrm>
+        </p:spPr>
+        <p:txBody>
+          <a:bodyPr anchor="ctr">
+            <a:normAutofit/>
+          </a:bodyPr>
+          <a:lstStyle/>
+          <a:p>
+            <a:pPr algn="ctr"/>
+            <a:r>
+              <a:rPr lang="en-US" dirty="0"/>
+              <a:t>Decision forest</a:t>
+            </a:r>
+          </a:p>
+        </p:txBody>
+      </p:sp>
+      <p:sp>
+        <p:nvSpPr>
+          <p:cNvPr id="3" name="Content Placeholder 2">
+            <a:extLst>
+              <a:ext uri="{FF2B5EF4-FFF2-40B4-BE49-F238E27FC236}">
+                <a16:creationId xmlns:a16="http://schemas.microsoft.com/office/drawing/2014/main" id="{0A5C8ED0-CE87-49A1-9B24-7144EC9E66F7}"/>
+              </a:ext>
+            </a:extLst>
+          </p:cNvPr>
+          <p:cNvSpPr>
+            <a:spLocks noGrp="1"/>
+          </p:cNvSpPr>
+          <p:nvPr>
+            <p:ph sz="half" idx="1"/>
+          </p:nvPr>
+        </p:nvSpPr>
+        <p:spPr>
+          <a:xfrm>
+            <a:off x="1141410" y="2249486"/>
+            <a:ext cx="4878389" cy="3541714"/>
+          </a:xfrm>
+        </p:spPr>
+        <p:txBody>
+          <a:bodyPr>
+            <a:normAutofit/>
+          </a:bodyPr>
+          <a:lstStyle/>
+          <a:p>
+            <a:r>
+              <a:rPr lang="en-US" dirty="0"/>
+              <a:t>Bagging</a:t>
+            </a:r>
+          </a:p>
+          <a:p>
+            <a:r>
+              <a:rPr lang="en-US" dirty="0"/>
+              <a:t>Vote by majority the optimized split</a:t>
+            </a:r>
+          </a:p>
+          <a:p>
+            <a:r>
+              <a:rPr lang="en-US" dirty="0"/>
+              <a:t>More robust</a:t>
+            </a:r>
+          </a:p>
+          <a:p>
+            <a:endParaRPr lang="en-US" dirty="0"/>
+          </a:p>
+          <a:p>
+            <a:endParaRPr lang="en-US" dirty="0"/>
+          </a:p>
+        </p:txBody>
+      </p:sp>
+      <p:pic>
+        <p:nvPicPr>
+          <p:cNvPr id="5" name="Picture 4" descr="Chart, diagram, radar chart&#10;&#10;Description automatically generated">
+            <a:extLst>
+              <a:ext uri="{FF2B5EF4-FFF2-40B4-BE49-F238E27FC236}">
+                <a16:creationId xmlns:a16="http://schemas.microsoft.com/office/drawing/2014/main" id="{8BEEF8D1-96D4-4998-9A7B-4A86ADABBC92}"/>
+              </a:ext>
+            </a:extLst>
+          </p:cNvPr>
+          <p:cNvPicPr>
+            <a:picLocks noChangeAspect="1"/>
+          </p:cNvPicPr>
+          <p:nvPr/>
+        </p:nvPicPr>
+        <p:blipFill rotWithShape="1">
+          <a:blip r:embed="rId3">
+            <a:extLst>
+              <a:ext uri="{28A0092B-C50C-407E-A947-70E740481C1C}">
+                <a14:useLocalDpi xmlns:a14="http://schemas.microsoft.com/office/drawing/2010/main" val="0"/>
+              </a:ext>
+            </a:extLst>
+          </a:blip>
+          <a:srcRect l="1270" r="711"/>
+          <a:stretch/>
+        </p:blipFill>
+        <p:spPr>
+          <a:xfrm>
+            <a:off x="6287386" y="1962409"/>
+            <a:ext cx="4628707" cy="3541714"/>
+          </a:xfrm>
+          <a:prstGeom prst="rect">
+            <a:avLst/>
+          </a:prstGeom>
+          <a:noFill/>
+        </p:spPr>
+      </p:pic>
+      <p:sp>
+        <p:nvSpPr>
+          <p:cNvPr id="6" name="TextBox 5">
+            <a:extLst>
+              <a:ext uri="{FF2B5EF4-FFF2-40B4-BE49-F238E27FC236}">
+                <a16:creationId xmlns:a16="http://schemas.microsoft.com/office/drawing/2014/main" id="{779DDFBA-A3A8-4C03-B4E0-D026DF271D1D}"/>
+              </a:ext>
+            </a:extLst>
+          </p:cNvPr>
+          <p:cNvSpPr txBox="1"/>
+          <p:nvPr/>
+        </p:nvSpPr>
+        <p:spPr>
+          <a:xfrm>
+            <a:off x="6494720" y="5181142"/>
+            <a:ext cx="4788970" cy="461665"/>
+          </a:xfrm>
+          <a:prstGeom prst="rect">
+            <a:avLst/>
+          </a:prstGeom>
+          <a:noFill/>
+        </p:spPr>
+        <p:txBody>
+          <a:bodyPr wrap="square" rtlCol="0">
+            <a:spAutoFit/>
+          </a:bodyPr>
+          <a:lstStyle/>
+          <a:p>
+            <a:r>
+              <a:rPr lang="en-US" sz="1200" dirty="0">
+                <a:solidFill>
+                  <a:schemeClr val="bg1">
+                    <a:lumMod val="50000"/>
+                  </a:schemeClr>
+                </a:solidFill>
+              </a:rPr>
+              <a:t>Source: https://www.kdnuggets.com/2017/10/random-forests-explained.html</a:t>
+            </a:r>
+          </a:p>
+        </p:txBody>
+      </p:sp>
+    </p:spTree>
+    <p:extLst>
+      <p:ext uri="{BB962C8B-B14F-4D97-AF65-F5344CB8AC3E}">
+        <p14:creationId xmlns:p14="http://schemas.microsoft.com/office/powerpoint/2010/main" val="4203881851"/>
+      </p:ext>
+    </p:extLst>
+  </p:cSld>
+  <p:clrMapOvr>
+    <a:masterClrMapping/>
+  </p:clrMapOvr>
+  <p:transition spd="slow">
+    <p:push dir="u"/>
+  </p:transition>
+</p:sld>
+</file>
+
+<file path=ppt/slides/slide16.xml><?xml version="1.0" encoding="utf-8"?>
+<p:sld xmlns:a="http://schemas.openxmlformats.org/drawingml/2006/main" xmlns:r="http://schemas.openxmlformats.org/officeDocument/2006/relationships" xmlns:p="http://schemas.openxmlformats.org/presentationml/2006/main">
+  <p:cSld>
+    <p:spTree>
+      <p:nvGrpSpPr>
+        <p:cNvPr id="1" name=""/>
+        <p:cNvGrpSpPr/>
+        <p:nvPr/>
+      </p:nvGrpSpPr>
+      <p:grpSpPr>
+        <a:xfrm>
+          <a:off x="0" y="0"/>
+          <a:ext cx="0" cy="0"/>
+          <a:chOff x="0" y="0"/>
+          <a:chExt cx="0" cy="0"/>
+        </a:xfrm>
+      </p:grpSpPr>
+      <p:sp>
+        <p:nvSpPr>
+          <p:cNvPr id="2" name="Title 1">
+            <a:extLst>
+              <a:ext uri="{FF2B5EF4-FFF2-40B4-BE49-F238E27FC236}">
+                <a16:creationId xmlns:a16="http://schemas.microsoft.com/office/drawing/2014/main" id="{4ABC5BE4-E794-42E3-B101-52B4088075AF}"/>
+              </a:ext>
+            </a:extLst>
+          </p:cNvPr>
+          <p:cNvSpPr>
+            <a:spLocks noGrp="1"/>
+          </p:cNvSpPr>
+          <p:nvPr>
+            <p:ph type="title"/>
+          </p:nvPr>
+        </p:nvSpPr>
+        <p:spPr/>
+        <p:txBody>
+          <a:bodyPr/>
+          <a:lstStyle/>
+          <a:p>
+            <a:pPr algn="ctr"/>
+            <a:r>
+              <a:rPr lang="en-GB" dirty="0"/>
+              <a:t>Pros and cons</a:t>
+            </a:r>
+            <a:endParaRPr lang="en-US" dirty="0"/>
+          </a:p>
+        </p:txBody>
+      </p:sp>
+      <p:sp>
+        <p:nvSpPr>
+          <p:cNvPr id="3" name="Text Placeholder 2">
+            <a:extLst>
+              <a:ext uri="{FF2B5EF4-FFF2-40B4-BE49-F238E27FC236}">
+                <a16:creationId xmlns:a16="http://schemas.microsoft.com/office/drawing/2014/main" id="{B8345F90-AA07-4E0A-947E-0A412407B4C0}"/>
+              </a:ext>
+            </a:extLst>
+          </p:cNvPr>
+          <p:cNvSpPr>
+            <a:spLocks noGrp="1"/>
+          </p:cNvSpPr>
+          <p:nvPr>
+            <p:ph type="body" idx="1"/>
+          </p:nvPr>
+        </p:nvSpPr>
+        <p:spPr/>
+        <p:txBody>
+          <a:bodyPr/>
+          <a:lstStyle/>
+          <a:p>
+            <a:pPr algn="ctr"/>
+            <a:r>
+              <a:rPr lang="en-GB" dirty="0"/>
+              <a:t>Pros</a:t>
+            </a:r>
+            <a:endParaRPr lang="en-US" dirty="0"/>
+          </a:p>
+        </p:txBody>
+      </p:sp>
+      <p:sp>
+        <p:nvSpPr>
+          <p:cNvPr id="4" name="Content Placeholder 3">
+            <a:extLst>
+              <a:ext uri="{FF2B5EF4-FFF2-40B4-BE49-F238E27FC236}">
+                <a16:creationId xmlns:a16="http://schemas.microsoft.com/office/drawing/2014/main" id="{16E41B12-BF31-4F8A-A525-382D6974AAD8}"/>
+              </a:ext>
+            </a:extLst>
+          </p:cNvPr>
+          <p:cNvSpPr>
+            <a:spLocks noGrp="1"/>
+          </p:cNvSpPr>
+          <p:nvPr>
+            <p:ph sz="half" idx="2"/>
+          </p:nvPr>
+        </p:nvSpPr>
+        <p:spPr/>
+        <p:txBody>
+          <a:bodyPr>
+            <a:normAutofit/>
+          </a:bodyPr>
+          <a:lstStyle/>
+          <a:p>
+            <a:r>
+              <a:rPr lang="en-GB" sz="1800" dirty="0"/>
+              <a:t>Decrease overfitting and high variance</a:t>
+            </a:r>
+          </a:p>
+          <a:p>
+            <a:r>
+              <a:rPr lang="en-GB" sz="1800" dirty="0"/>
+              <a:t>Handles higher dimensionality data well</a:t>
+            </a:r>
+          </a:p>
+          <a:p>
+            <a:r>
+              <a:rPr lang="en-GB" sz="1800" dirty="0"/>
+              <a:t>Robust to missing values and maintains accuracy</a:t>
+            </a:r>
+          </a:p>
+          <a:p>
+            <a:endParaRPr lang="en-GB" sz="1800" dirty="0"/>
+          </a:p>
+        </p:txBody>
+      </p:sp>
+      <p:sp>
+        <p:nvSpPr>
+          <p:cNvPr id="5" name="Text Placeholder 4">
+            <a:extLst>
+              <a:ext uri="{FF2B5EF4-FFF2-40B4-BE49-F238E27FC236}">
+                <a16:creationId xmlns:a16="http://schemas.microsoft.com/office/drawing/2014/main" id="{7C365443-D584-4E49-9E47-8A991C5C64CE}"/>
+              </a:ext>
+            </a:extLst>
+          </p:cNvPr>
+          <p:cNvSpPr>
+            <a:spLocks noGrp="1"/>
+          </p:cNvSpPr>
+          <p:nvPr>
+            <p:ph type="body" sz="quarter" idx="3"/>
+          </p:nvPr>
+        </p:nvSpPr>
+        <p:spPr/>
+        <p:txBody>
+          <a:bodyPr/>
+          <a:lstStyle/>
+          <a:p>
+            <a:pPr algn="ctr"/>
+            <a:r>
+              <a:rPr lang="en-GB" dirty="0"/>
+              <a:t>Cons</a:t>
+            </a:r>
+            <a:endParaRPr lang="en-US" dirty="0"/>
+          </a:p>
+        </p:txBody>
+      </p:sp>
+      <p:sp>
+        <p:nvSpPr>
+          <p:cNvPr id="6" name="Content Placeholder 5">
+            <a:extLst>
+              <a:ext uri="{FF2B5EF4-FFF2-40B4-BE49-F238E27FC236}">
+                <a16:creationId xmlns:a16="http://schemas.microsoft.com/office/drawing/2014/main" id="{28369F63-A76E-4DEF-96BC-A5E393E64715}"/>
+              </a:ext>
+            </a:extLst>
+          </p:cNvPr>
+          <p:cNvSpPr>
+            <a:spLocks noGrp="1"/>
+          </p:cNvSpPr>
+          <p:nvPr>
+            <p:ph sz="quarter" idx="4"/>
+          </p:nvPr>
+        </p:nvSpPr>
+        <p:spPr/>
+        <p:txBody>
+          <a:bodyPr>
+            <a:normAutofit/>
+          </a:bodyPr>
+          <a:lstStyle/>
+          <a:p>
+            <a:r>
+              <a:rPr lang="en-GB" sz="1800" dirty="0"/>
+              <a:t>Inaccurate with regression predictions</a:t>
+            </a:r>
+          </a:p>
+          <a:p>
+            <a:endParaRPr lang="en-US" sz="1800" dirty="0"/>
+          </a:p>
+        </p:txBody>
+      </p:sp>
+    </p:spTree>
+    <p:extLst>
+      <p:ext uri="{BB962C8B-B14F-4D97-AF65-F5344CB8AC3E}">
+        <p14:creationId xmlns:p14="http://schemas.microsoft.com/office/powerpoint/2010/main" val="650632965"/>
+      </p:ext>
+    </p:extLst>
+  </p:cSld>
+  <p:clrMapOvr>
+    <a:masterClrMapping/>
+  </p:clrMapOvr>
+  <p:transition spd="slow">
+    <p:push dir="u"/>
+  </p:transition>
+</p:sld>
+</file>
+
+<file path=ppt/slides/slide17.xml><?xml version="1.0" encoding="utf-8"?>
+<p:sld xmlns:a="http://schemas.openxmlformats.org/drawingml/2006/main" xmlns:r="http://schemas.openxmlformats.org/officeDocument/2006/relationships" xmlns:p="http://schemas.openxmlformats.org/presentationml/2006/main">
+  <p:cSld>
+    <p:spTree>
+      <p:nvGrpSpPr>
+        <p:cNvPr id="1" name=""/>
+        <p:cNvGrpSpPr/>
+        <p:nvPr/>
+      </p:nvGrpSpPr>
+      <p:grpSpPr>
+        <a:xfrm>
+          <a:off x="0" y="0"/>
+          <a:ext cx="0" cy="0"/>
+          <a:chOff x="0" y="0"/>
+          <a:chExt cx="0" cy="0"/>
+        </a:xfrm>
+      </p:grpSpPr>
+      <p:pic>
+        <p:nvPicPr>
+          <p:cNvPr id="4" name="Picture 3" descr="A picture containing transport, satellite, night sky&#10;&#10;Description automatically generated">
+            <a:extLst>
+              <a:ext uri="{FF2B5EF4-FFF2-40B4-BE49-F238E27FC236}">
+                <a16:creationId xmlns:a16="http://schemas.microsoft.com/office/drawing/2014/main" id="{03098901-3E53-4F90-B835-FB5BD040DB1D}"/>
+              </a:ext>
+            </a:extLst>
+          </p:cNvPr>
+          <p:cNvPicPr>
+            <a:picLocks noChangeAspect="1"/>
+          </p:cNvPicPr>
+          <p:nvPr/>
+        </p:nvPicPr>
+        <p:blipFill rotWithShape="1">
+          <a:blip r:embed="rId3">
+            <a:extLst>
+              <a:ext uri="{28A0092B-C50C-407E-A947-70E740481C1C}">
+                <a14:useLocalDpi xmlns:a14="http://schemas.microsoft.com/office/drawing/2010/main" val="0"/>
+              </a:ext>
+            </a:extLst>
+          </a:blip>
+          <a:srcRect t="35130" b="11607"/>
+          <a:stretch/>
+        </p:blipFill>
+        <p:spPr>
+          <a:xfrm>
+            <a:off x="1141411" y="606426"/>
+            <a:ext cx="9912354" cy="3299778"/>
+          </a:xfrm>
+          <a:prstGeom prst="round2DiagRect">
+            <a:avLst>
+              <a:gd name="adj1" fmla="val 4860"/>
+              <a:gd name="adj2" fmla="val 0"/>
+            </a:avLst>
+          </a:prstGeom>
+          <a:noFill/>
+          <a:ln w="19050" cap="sq">
+            <a:solidFill>
+              <a:schemeClr val="tx2">
+                <a:lumMod val="60000"/>
+                <a:lumOff val="40000"/>
+                <a:alpha val="60000"/>
+              </a:schemeClr>
+            </a:solidFill>
+            <a:miter lim="800000"/>
+          </a:ln>
+          <a:effectLst>
+            <a:outerShdw blurRad="88900" dist="38100" dir="5400000" algn="t" rotWithShape="0">
+              <a:prstClr val="black">
+                <a:alpha val="40000"/>
+              </a:prstClr>
+            </a:outerShdw>
+          </a:effectLst>
+        </p:spPr>
+      </p:pic>
+      <p:sp>
+        <p:nvSpPr>
+          <p:cNvPr id="2" name="Title 1">
+            <a:extLst>
+              <a:ext uri="{FF2B5EF4-FFF2-40B4-BE49-F238E27FC236}">
+                <a16:creationId xmlns:a16="http://schemas.microsoft.com/office/drawing/2014/main" id="{78E9AE0E-9D47-4B15-B5D7-F81CA2BDB645}"/>
+              </a:ext>
+            </a:extLst>
+          </p:cNvPr>
+          <p:cNvSpPr>
+            <a:spLocks noGrp="1"/>
+          </p:cNvSpPr>
+          <p:nvPr>
+            <p:ph type="title"/>
+          </p:nvPr>
+        </p:nvSpPr>
+        <p:spPr>
+          <a:xfrm>
+            <a:off x="1141410" y="4304664"/>
+            <a:ext cx="9912355" cy="819355"/>
+          </a:xfrm>
+        </p:spPr>
+        <p:txBody>
+          <a:bodyPr anchor="b">
+            <a:normAutofit/>
+          </a:bodyPr>
+          <a:lstStyle/>
+          <a:p>
+            <a:pPr algn="ctr"/>
+            <a:r>
+              <a:rPr lang="en-GB" dirty="0"/>
+              <a:t>Live coding</a:t>
+            </a:r>
+            <a:r>
+              <a:rPr lang="es-ES" dirty="0"/>
+              <a:t>: </a:t>
+            </a:r>
+            <a:r>
+              <a:rPr lang="en-GB" dirty="0"/>
+              <a:t>titanic survival – decision forest</a:t>
+            </a:r>
+            <a:endParaRPr lang="en-US" dirty="0"/>
+          </a:p>
+        </p:txBody>
+      </p:sp>
+    </p:spTree>
+    <p:extLst>
+      <p:ext uri="{BB962C8B-B14F-4D97-AF65-F5344CB8AC3E}">
+        <p14:creationId xmlns:p14="http://schemas.microsoft.com/office/powerpoint/2010/main" val="3970435771"/>
+      </p:ext>
+    </p:extLst>
+  </p:cSld>
+  <p:clrMapOvr>
+    <a:masterClrMapping/>
+  </p:clrMapOvr>
+  <p:transition spd="slow">
+    <p:push dir="u"/>
+  </p:transition>
+</p:sld>
+</file>
+
+<file path=ppt/slides/slide18.xml><?xml version="1.0" encoding="utf-8"?>
+<p:sld xmlns:a="http://schemas.openxmlformats.org/drawingml/2006/main" xmlns:r="http://schemas.openxmlformats.org/officeDocument/2006/relationships" xmlns:p="http://schemas.openxmlformats.org/presentationml/2006/main">
+  <p:cSld>
+    <p:spTree>
+      <p:nvGrpSpPr>
+        <p:cNvPr id="1" name=""/>
+        <p:cNvGrpSpPr/>
+        <p:nvPr/>
+      </p:nvGrpSpPr>
+      <p:grpSpPr>
+        <a:xfrm>
+          <a:off x="0" y="0"/>
+          <a:ext cx="0" cy="0"/>
+          <a:chOff x="0" y="0"/>
+          <a:chExt cx="0" cy="0"/>
+        </a:xfrm>
+      </p:grpSpPr>
+      <p:sp>
+        <p:nvSpPr>
           <p:cNvPr id="2" name="Title 1">
             <a:extLst>
               <a:ext uri="{FF2B5EF4-FFF2-40B4-BE49-F238E27FC236}">
@@ -18595,75 +19781,51 @@
           <a:lstStyle/>
           <a:p>
             <a:r>
-              <a:rPr lang="en-GB" sz="1200" dirty="0">
-                <a:hlinkClick r:id="rId2"/>
-              </a:rPr>
+              <a:rPr lang="en-GB" sz="1200" dirty="0"/>
               <a:t>https://www.geeksforgeeks.org/decision-tree/?ref=rp</a:t>
             </a:r>
-            <a:endParaRPr lang="en-GB" sz="1200" dirty="0"/>
-          </a:p>
-          <a:p>
-            <a:r>
-              <a:rPr lang="en-GB" sz="1200" dirty="0">
-                <a:hlinkClick r:id="rId3"/>
-              </a:rPr>
+          </a:p>
+          <a:p>
+            <a:r>
+              <a:rPr lang="en-GB" sz="1200" dirty="0"/>
               <a:t>https://www.ryanxin.cn/archives/283</a:t>
             </a:r>
-            <a:endParaRPr lang="en-GB" sz="1200" dirty="0"/>
-          </a:p>
-          <a:p>
-            <a:r>
-              <a:rPr lang="en-GB" sz="1200" dirty="0">
-                <a:hlinkClick r:id="rId4"/>
-              </a:rPr>
+          </a:p>
+          <a:p>
+            <a:r>
+              <a:rPr lang="en-GB" sz="1200" dirty="0"/>
               <a:t>https://www.geeksforgeeks.org/decision-tree-introduction-example/</a:t>
             </a:r>
-            <a:endParaRPr lang="en-GB" sz="1200" dirty="0"/>
-          </a:p>
-          <a:p>
-            <a:r>
-              <a:rPr lang="en-GB" sz="1200" dirty="0">
-                <a:hlinkClick r:id="rId5"/>
-              </a:rPr>
+          </a:p>
+          <a:p>
+            <a:r>
+              <a:rPr lang="en-GB" sz="1200" dirty="0"/>
               <a:t>https://www.geeksforgeeks.org/decision-tree-implementation-python/</a:t>
             </a:r>
-            <a:endParaRPr lang="en-GB" sz="1200" dirty="0"/>
-          </a:p>
-          <a:p>
-            <a:r>
-              <a:rPr lang="en-GB" sz="1200" dirty="0">
-                <a:hlinkClick r:id="rId6"/>
-              </a:rPr>
+          </a:p>
+          <a:p>
+            <a:r>
+              <a:rPr lang="en-GB" sz="1200" dirty="0"/>
               <a:t>https://zhuanlan.zhihu.com/p/30059442</a:t>
             </a:r>
-            <a:endParaRPr lang="en-GB" sz="1200" dirty="0"/>
-          </a:p>
-          <a:p>
-            <a:r>
-              <a:rPr lang="en-GB" sz="1200" dirty="0">
-                <a:hlinkClick r:id="rId7"/>
-              </a:rPr>
+          </a:p>
+          <a:p>
+            <a:r>
+              <a:rPr lang="en-GB" sz="1200" dirty="0"/>
               <a:t>https://www.jianshu.com/p/655d8e555494</a:t>
             </a:r>
-            <a:endParaRPr lang="en-GB" sz="1200" dirty="0"/>
-          </a:p>
-          <a:p>
-            <a:r>
-              <a:rPr lang="en-GB" sz="1200" dirty="0">
-                <a:hlinkClick r:id="rId8"/>
-              </a:rPr>
+          </a:p>
+          <a:p>
+            <a:r>
+              <a:rPr lang="en-GB" sz="1200" dirty="0"/>
               <a:t>https://blog.csdn.net/jiaoyangwm/article/details/79525237</a:t>
             </a:r>
-            <a:endParaRPr lang="en-GB" sz="1200" dirty="0"/>
-          </a:p>
-          <a:p>
-            <a:r>
-              <a:rPr lang="en-GB" sz="1200">
-                <a:hlinkClick r:id="rId9"/>
-              </a:rPr>
+          </a:p>
+          <a:p>
+            <a:r>
+              <a:rPr lang="en-GB" sz="1200" dirty="0"/>
               <a:t>https://www.kaggle.com/c/titanic/overview</a:t>
             </a:r>
-            <a:endParaRPr lang="en-GB" sz="1200"/>
           </a:p>
           <a:p>
             <a:endParaRPr lang="en-GB" sz="1200" dirty="0"/>
@@ -19074,31 +20236,6 @@
           <a:chExt cx="0" cy="0"/>
         </a:xfrm>
       </p:grpSpPr>
-      <p:sp>
-        <p:nvSpPr>
-          <p:cNvPr id="3" name="Text Placeholder 2">
-            <a:extLst>
-              <a:ext uri="{FF2B5EF4-FFF2-40B4-BE49-F238E27FC236}">
-                <a16:creationId xmlns:a16="http://schemas.microsoft.com/office/drawing/2014/main" id="{04F04056-55A1-4FB5-A02A-AD9C69D8C07C}"/>
-              </a:ext>
-            </a:extLst>
-          </p:cNvPr>
-          <p:cNvSpPr>
-            <a:spLocks noGrp="1"/>
-          </p:cNvSpPr>
-          <p:nvPr>
-            <p:ph type="body" idx="1"/>
-          </p:nvPr>
-        </p:nvSpPr>
-        <p:spPr/>
-        <p:txBody>
-          <a:bodyPr/>
-          <a:lstStyle/>
-          <a:p>
-            <a:endParaRPr lang="en-GB" dirty="0"/>
-          </a:p>
-        </p:txBody>
-      </p:sp>
       <p:sp>
         <p:nvSpPr>
           <p:cNvPr id="4" name="标题 1">
@@ -20284,18 +21421,9 @@
   <p:clrMapOvr>
     <a:masterClrMapping/>
   </p:clrMapOvr>
-  <mc:AlternateContent xmlns:mc="http://schemas.openxmlformats.org/markup-compatibility/2006" xmlns:p14="http://schemas.microsoft.com/office/powerpoint/2010/main">
-    <mc:Choice Requires="p14">
-      <p:transition spd="slow" p14:dur="1500">
-        <p:split orient="vert"/>
-      </p:transition>
-    </mc:Choice>
-    <mc:Fallback xmlns="">
-      <p:transition spd="slow">
-        <p:split orient="vert"/>
-      </p:transition>
-    </mc:Fallback>
-  </mc:AlternateContent>
+  <p:transition spd="slow">
+    <p:push dir="u"/>
+  </p:transition>
   <p:timing>
     <p:tnLst>
       <p:par>

</xml_diff>

<commit_message>
End the ppt for this workshop
</commit_message>
<xml_diff>
--- a/semester-2-2021-2022/week-6-decision-tree/Decision_Tree.pptx
+++ b/semester-2-2021-2022/week-6-decision-tree/Decision_Tree.pptx
@@ -5,7 +5,7 @@
     <p:sldMasterId id="2147483660" r:id="rId1"/>
   </p:sldMasterIdLst>
   <p:notesMasterIdLst>
-    <p:notesMasterId r:id="rId20"/>
+    <p:notesMasterId r:id="rId21"/>
   </p:notesMasterIdLst>
   <p:sldIdLst>
     <p:sldId id="256" r:id="rId2"/>
@@ -25,7 +25,8 @@
     <p:sldId id="275" r:id="rId16"/>
     <p:sldId id="276" r:id="rId17"/>
     <p:sldId id="277" r:id="rId18"/>
-    <p:sldId id="258" r:id="rId19"/>
+    <p:sldId id="278" r:id="rId19"/>
+    <p:sldId id="258" r:id="rId20"/>
   </p:sldIdLst>
   <p:sldSz cx="12192000" cy="6858000"/>
   <p:notesSz cx="6858000" cy="9144000"/>
@@ -1397,6 +1398,121 @@
 </p:notes>
 </file>
 
+<file path=ppt/notesSlides/notesSlide18.xml><?xml version="1.0" encoding="utf-8"?>
+<p:notes xmlns:a="http://schemas.openxmlformats.org/drawingml/2006/main" xmlns:r="http://schemas.openxmlformats.org/officeDocument/2006/relationships" xmlns:p="http://schemas.openxmlformats.org/presentationml/2006/main">
+  <p:cSld>
+    <p:spTree>
+      <p:nvGrpSpPr>
+        <p:cNvPr id="1" name=""/>
+        <p:cNvGrpSpPr/>
+        <p:nvPr/>
+      </p:nvGrpSpPr>
+      <p:grpSpPr>
+        <a:xfrm>
+          <a:off x="0" y="0"/>
+          <a:ext cx="0" cy="0"/>
+          <a:chOff x="0" y="0"/>
+          <a:chExt cx="0" cy="0"/>
+        </a:xfrm>
+      </p:grpSpPr>
+      <p:sp>
+        <p:nvSpPr>
+          <p:cNvPr id="2" name="Slide Image Placeholder 1"/>
+          <p:cNvSpPr>
+            <a:spLocks noGrp="1" noRot="1" noChangeAspect="1"/>
+          </p:cNvSpPr>
+          <p:nvPr>
+            <p:ph type="sldImg"/>
+          </p:nvPr>
+        </p:nvSpPr>
+        <p:spPr/>
+      </p:sp>
+      <p:sp>
+        <p:nvSpPr>
+          <p:cNvPr id="3" name="Notes Placeholder 2"/>
+          <p:cNvSpPr>
+            <a:spLocks noGrp="1"/>
+          </p:cNvSpPr>
+          <p:nvPr>
+            <p:ph type="body" idx="1"/>
+          </p:nvPr>
+        </p:nvSpPr>
+        <p:spPr/>
+        <p:txBody>
+          <a:bodyPr/>
+          <a:lstStyle/>
+          <a:p>
+            <a:pPr marL="0" marR="0" lvl="0" indent="0" algn="l" defTabSz="914400" rtl="0" eaLnBrk="1" fontAlgn="auto" latinLnBrk="0" hangingPunct="1">
+              <a:lnSpc>
+                <a:spcPct val="100000"/>
+              </a:lnSpc>
+              <a:spcBef>
+                <a:spcPts val="0"/>
+              </a:spcBef>
+              <a:spcAft>
+                <a:spcPts val="0"/>
+              </a:spcAft>
+              <a:buClrTx/>
+              <a:buSzTx/>
+              <a:buFontTx/>
+              <a:buNone/>
+              <a:tabLst/>
+              <a:defRPr/>
+            </a:pPr>
+            <a:r>
+              <a:rPr lang="en-US" dirty="0"/>
+              <a:t>And that brings to the end of today’s workshop. Please don’t be afraid to ask questions if any, I will try to answer them as I can </a:t>
+            </a:r>
+            <a:r>
+              <a:rPr lang="en-US" dirty="0" err="1"/>
+              <a:t>haha</a:t>
+            </a:r>
+            <a:r>
+              <a:rPr lang="en-US" dirty="0"/>
+              <a:t>.</a:t>
+            </a:r>
+          </a:p>
+          <a:p>
+            <a:endParaRPr lang="en-US" dirty="0"/>
+          </a:p>
+        </p:txBody>
+      </p:sp>
+      <p:sp>
+        <p:nvSpPr>
+          <p:cNvPr id="4" name="Slide Number Placeholder 3"/>
+          <p:cNvSpPr>
+            <a:spLocks noGrp="1"/>
+          </p:cNvSpPr>
+          <p:nvPr>
+            <p:ph type="sldNum" sz="quarter" idx="5"/>
+          </p:nvPr>
+        </p:nvSpPr>
+        <p:spPr/>
+        <p:txBody>
+          <a:bodyPr/>
+          <a:lstStyle/>
+          <a:p>
+            <a:fld id="{76682F04-6A67-4696-8350-ADB5B2C9822D}" type="slidenum">
+              <a:rPr lang="en-GB" smtClean="0"/>
+              <a:t>18</a:t>
+            </a:fld>
+            <a:endParaRPr lang="en-GB"/>
+          </a:p>
+        </p:txBody>
+      </p:sp>
+    </p:spTree>
+    <p:extLst>
+      <p:ext uri="{BB962C8B-B14F-4D97-AF65-F5344CB8AC3E}">
+        <p14:creationId xmlns:p14="http://schemas.microsoft.com/office/powerpoint/2010/main" val="193471804"/>
+      </p:ext>
+    </p:extLst>
+  </p:cSld>
+  <p:clrMapOvr>
+    <a:masterClrMapping/>
+  </p:clrMapOvr>
+</p:notes>
+</file>
+
 <file path=ppt/notesSlides/notesSlide2.xml><?xml version="1.0" encoding="utf-8"?>
 <p:notes xmlns:a="http://schemas.openxmlformats.org/drawingml/2006/main" xmlns:r="http://schemas.openxmlformats.org/officeDocument/2006/relationships" xmlns:p="http://schemas.openxmlformats.org/presentationml/2006/main">
   <p:cSld>
@@ -3057,7 +3173,7 @@
           <a:noFill/>
           <a:extLst>
             <a:ext uri="{909E8E84-426E-40dd-AFC4-6F175D3DCCD1}">
-              <a14:hiddenFill xmlns="" xmlns:a14="http://schemas.microsoft.com/office/drawing/2010/main">
+              <a14:hiddenFill xmlns:a14="http://schemas.microsoft.com/office/drawing/2010/main" xmlns="">
                 <a:solidFill>
                   <a:srgbClr val="FFFFFF"/>
                 </a:solidFill>
@@ -3117,7 +3233,7 @@
             </a:ln>
             <a:extLst>
               <a:ext uri="{91240B29-F687-4f45-9708-019B960494DF}">
-                <a14:hiddenLine xmlns="" xmlns:a14="http://schemas.microsoft.com/office/drawing/2010/main" w="9525">
+                <a14:hiddenLine xmlns:a14="http://schemas.microsoft.com/office/drawing/2010/main" xmlns="" w="9525">
                   <a:solidFill>
                     <a:srgbClr val="000000"/>
                   </a:solidFill>
@@ -3207,7 +3323,7 @@
             </a:ln>
             <a:extLst>
               <a:ext uri="{91240B29-F687-4f45-9708-019B960494DF}">
-                <a14:hiddenLine xmlns="" xmlns:a14="http://schemas.microsoft.com/office/drawing/2010/main" w="9525">
+                <a14:hiddenLine xmlns:a14="http://schemas.microsoft.com/office/drawing/2010/main" xmlns="" w="9525">
                   <a:solidFill>
                     <a:srgbClr val="000000"/>
                   </a:solidFill>
@@ -3297,7 +3413,7 @@
             </a:ln>
             <a:extLst>
               <a:ext uri="{91240B29-F687-4f45-9708-019B960494DF}">
-                <a14:hiddenLine xmlns="" xmlns:a14="http://schemas.microsoft.com/office/drawing/2010/main" w="9525">
+                <a14:hiddenLine xmlns:a14="http://schemas.microsoft.com/office/drawing/2010/main" xmlns="" w="9525">
                   <a:solidFill>
                     <a:srgbClr val="000000"/>
                   </a:solidFill>
@@ -3331,7 +3447,7 @@
             </a:ln>
             <a:extLst>
               <a:ext uri="{91240B29-F687-4f45-9708-019B960494DF}">
-                <a14:hiddenLine xmlns="" xmlns:a14="http://schemas.microsoft.com/office/drawing/2010/main" w="9525">
+                <a14:hiddenLine xmlns:a14="http://schemas.microsoft.com/office/drawing/2010/main" xmlns="" w="9525">
                   <a:solidFill>
                     <a:srgbClr val="000000"/>
                   </a:solidFill>
@@ -3421,7 +3537,7 @@
             </a:ln>
             <a:extLst>
               <a:ext uri="{91240B29-F687-4f45-9708-019B960494DF}">
-                <a14:hiddenLine xmlns="" xmlns:a14="http://schemas.microsoft.com/office/drawing/2010/main" w="9525">
+                <a14:hiddenLine xmlns:a14="http://schemas.microsoft.com/office/drawing/2010/main" xmlns="" w="9525">
                   <a:solidFill>
                     <a:srgbClr val="000000"/>
                   </a:solidFill>
@@ -3483,7 +3599,7 @@
             </a:ln>
             <a:extLst>
               <a:ext uri="{91240B29-F687-4f45-9708-019B960494DF}">
-                <a14:hiddenLine xmlns="" xmlns:a14="http://schemas.microsoft.com/office/drawing/2010/main" w="9525">
+                <a14:hiddenLine xmlns:a14="http://schemas.microsoft.com/office/drawing/2010/main" xmlns="" w="9525">
                   <a:solidFill>
                     <a:srgbClr val="000000"/>
                   </a:solidFill>
@@ -3545,7 +3661,7 @@
             </a:ln>
             <a:extLst>
               <a:ext uri="{91240B29-F687-4f45-9708-019B960494DF}">
-                <a14:hiddenLine xmlns="" xmlns:a14="http://schemas.microsoft.com/office/drawing/2010/main" w="9525">
+                <a14:hiddenLine xmlns:a14="http://schemas.microsoft.com/office/drawing/2010/main" xmlns="" w="9525">
                   <a:solidFill>
                     <a:srgbClr val="000000"/>
                   </a:solidFill>
@@ -3635,7 +3751,7 @@
             </a:ln>
             <a:extLst>
               <a:ext uri="{91240B29-F687-4f45-9708-019B960494DF}">
-                <a14:hiddenLine xmlns="" xmlns:a14="http://schemas.microsoft.com/office/drawing/2010/main" w="9525">
+                <a14:hiddenLine xmlns:a14="http://schemas.microsoft.com/office/drawing/2010/main" xmlns="" w="9525">
                   <a:solidFill>
                     <a:srgbClr val="000000"/>
                   </a:solidFill>
@@ -3697,7 +3813,7 @@
             </a:ln>
             <a:extLst>
               <a:ext uri="{91240B29-F687-4f45-9708-019B960494DF}">
-                <a14:hiddenLine xmlns="" xmlns:a14="http://schemas.microsoft.com/office/drawing/2010/main" w="9525">
+                <a14:hiddenLine xmlns:a14="http://schemas.microsoft.com/office/drawing/2010/main" xmlns="" w="9525">
                   <a:solidFill>
                     <a:srgbClr val="000000"/>
                   </a:solidFill>
@@ -3759,7 +3875,7 @@
             </a:ln>
             <a:extLst>
               <a:ext uri="{91240B29-F687-4f45-9708-019B960494DF}">
-                <a14:hiddenLine xmlns="" xmlns:a14="http://schemas.microsoft.com/office/drawing/2010/main" w="9525">
+                <a14:hiddenLine xmlns:a14="http://schemas.microsoft.com/office/drawing/2010/main" xmlns="" w="9525">
                   <a:solidFill>
                     <a:srgbClr val="000000"/>
                   </a:solidFill>
@@ -3849,7 +3965,7 @@
             </a:ln>
             <a:extLst>
               <a:ext uri="{91240B29-F687-4f45-9708-019B960494DF}">
-                <a14:hiddenLine xmlns="" xmlns:a14="http://schemas.microsoft.com/office/drawing/2010/main" w="9525">
+                <a14:hiddenLine xmlns:a14="http://schemas.microsoft.com/office/drawing/2010/main" xmlns="" w="9525">
                   <a:solidFill>
                     <a:srgbClr val="000000"/>
                   </a:solidFill>
@@ -3939,7 +4055,7 @@
             </a:ln>
             <a:extLst>
               <a:ext uri="{91240B29-F687-4f45-9708-019B960494DF}">
-                <a14:hiddenLine xmlns="" xmlns:a14="http://schemas.microsoft.com/office/drawing/2010/main" w="9525">
+                <a14:hiddenLine xmlns:a14="http://schemas.microsoft.com/office/drawing/2010/main" xmlns="" w="9525">
                   <a:solidFill>
                     <a:srgbClr val="000000"/>
                   </a:solidFill>
@@ -4001,7 +4117,7 @@
             </a:ln>
             <a:extLst>
               <a:ext uri="{91240B29-F687-4f45-9708-019B960494DF}">
-                <a14:hiddenLine xmlns="" xmlns:a14="http://schemas.microsoft.com/office/drawing/2010/main" w="9525">
+                <a14:hiddenLine xmlns:a14="http://schemas.microsoft.com/office/drawing/2010/main" xmlns="" w="9525">
                   <a:solidFill>
                     <a:srgbClr val="000000"/>
                   </a:solidFill>
@@ -4111,7 +4227,7 @@
             </a:ln>
             <a:extLst>
               <a:ext uri="{91240B29-F687-4f45-9708-019B960494DF}">
-                <a14:hiddenLine xmlns="" xmlns:a14="http://schemas.microsoft.com/office/drawing/2010/main" w="9525">
+                <a14:hiddenLine xmlns:a14="http://schemas.microsoft.com/office/drawing/2010/main" xmlns="" w="9525">
                   <a:solidFill>
                     <a:srgbClr val="000000"/>
                   </a:solidFill>
@@ -4173,7 +4289,7 @@
             </a:ln>
             <a:extLst>
               <a:ext uri="{91240B29-F687-4f45-9708-019B960494DF}">
-                <a14:hiddenLine xmlns="" xmlns:a14="http://schemas.microsoft.com/office/drawing/2010/main" w="9525">
+                <a14:hiddenLine xmlns:a14="http://schemas.microsoft.com/office/drawing/2010/main" xmlns="" w="9525">
                   <a:solidFill>
                     <a:srgbClr val="000000"/>
                   </a:solidFill>
@@ -4263,7 +4379,7 @@
             </a:ln>
             <a:extLst>
               <a:ext uri="{91240B29-F687-4f45-9708-019B960494DF}">
-                <a14:hiddenLine xmlns="" xmlns:a14="http://schemas.microsoft.com/office/drawing/2010/main" w="9525">
+                <a14:hiddenLine xmlns:a14="http://schemas.microsoft.com/office/drawing/2010/main" xmlns="" w="9525">
                   <a:solidFill>
                     <a:srgbClr val="000000"/>
                   </a:solidFill>
@@ -4353,7 +4469,7 @@
             </a:ln>
             <a:extLst>
               <a:ext uri="{91240B29-F687-4f45-9708-019B960494DF}">
-                <a14:hiddenLine xmlns="" xmlns:a14="http://schemas.microsoft.com/office/drawing/2010/main" w="9525">
+                <a14:hiddenLine xmlns:a14="http://schemas.microsoft.com/office/drawing/2010/main" xmlns="" w="9525">
                   <a:solidFill>
                     <a:srgbClr val="000000"/>
                   </a:solidFill>
@@ -4415,7 +4531,7 @@
             </a:ln>
             <a:extLst>
               <a:ext uri="{91240B29-F687-4f45-9708-019B960494DF}">
-                <a14:hiddenLine xmlns="" xmlns:a14="http://schemas.microsoft.com/office/drawing/2010/main" w="9525">
+                <a14:hiddenLine xmlns:a14="http://schemas.microsoft.com/office/drawing/2010/main" xmlns="" w="9525">
                   <a:solidFill>
                     <a:srgbClr val="000000"/>
                   </a:solidFill>
@@ -4505,7 +4621,7 @@
             </a:ln>
             <a:extLst>
               <a:ext uri="{91240B29-F687-4f45-9708-019B960494DF}">
-                <a14:hiddenLine xmlns="" xmlns:a14="http://schemas.microsoft.com/office/drawing/2010/main" w="9525">
+                <a14:hiddenLine xmlns:a14="http://schemas.microsoft.com/office/drawing/2010/main" xmlns="" w="9525">
                   <a:solidFill>
                     <a:srgbClr val="000000"/>
                   </a:solidFill>
@@ -4595,7 +4711,7 @@
             </a:ln>
             <a:extLst>
               <a:ext uri="{91240B29-F687-4f45-9708-019B960494DF}">
-                <a14:hiddenLine xmlns="" xmlns:a14="http://schemas.microsoft.com/office/drawing/2010/main" w="9525">
+                <a14:hiddenLine xmlns:a14="http://schemas.microsoft.com/office/drawing/2010/main" xmlns="" w="9525">
                   <a:solidFill>
                     <a:srgbClr val="000000"/>
                   </a:solidFill>
@@ -4651,7 +4767,7 @@
             </a:ln>
             <a:extLst>
               <a:ext uri="{91240B29-F687-4f45-9708-019B960494DF}">
-                <a14:hiddenLine xmlns="" xmlns:a14="http://schemas.microsoft.com/office/drawing/2010/main" w="9525">
+                <a14:hiddenLine xmlns:a14="http://schemas.microsoft.com/office/drawing/2010/main" xmlns="" w="9525">
                   <a:solidFill>
                     <a:srgbClr val="000000"/>
                   </a:solidFill>
@@ -4741,7 +4857,7 @@
             </a:ln>
             <a:extLst>
               <a:ext uri="{91240B29-F687-4f45-9708-019B960494DF}">
-                <a14:hiddenLine xmlns="" xmlns:a14="http://schemas.microsoft.com/office/drawing/2010/main" w="9525">
+                <a14:hiddenLine xmlns:a14="http://schemas.microsoft.com/office/drawing/2010/main" xmlns="" w="9525">
                   <a:solidFill>
                     <a:srgbClr val="000000"/>
                   </a:solidFill>
@@ -4797,7 +4913,7 @@
             </a:ln>
             <a:extLst>
               <a:ext uri="{91240B29-F687-4f45-9708-019B960494DF}">
-                <a14:hiddenLine xmlns="" xmlns:a14="http://schemas.microsoft.com/office/drawing/2010/main" w="9525">
+                <a14:hiddenLine xmlns:a14="http://schemas.microsoft.com/office/drawing/2010/main" xmlns="" w="9525">
                   <a:solidFill>
                     <a:srgbClr val="000000"/>
                   </a:solidFill>
@@ -4887,7 +5003,7 @@
             </a:ln>
             <a:extLst>
               <a:ext uri="{91240B29-F687-4f45-9708-019B960494DF}">
-                <a14:hiddenLine xmlns="" xmlns:a14="http://schemas.microsoft.com/office/drawing/2010/main" w="9525">
+                <a14:hiddenLine xmlns:a14="http://schemas.microsoft.com/office/drawing/2010/main" xmlns="" w="9525">
                   <a:solidFill>
                     <a:srgbClr val="000000"/>
                   </a:solidFill>
@@ -4955,7 +5071,7 @@
             </a:ln>
             <a:extLst>
               <a:ext uri="{91240B29-F687-4f45-9708-019B960494DF}">
-                <a14:hiddenLine xmlns="" xmlns:a14="http://schemas.microsoft.com/office/drawing/2010/main" w="9525">
+                <a14:hiddenLine xmlns:a14="http://schemas.microsoft.com/office/drawing/2010/main" xmlns="" w="9525">
                   <a:solidFill>
                     <a:srgbClr val="000000"/>
                   </a:solidFill>
@@ -5045,7 +5161,7 @@
             </a:ln>
             <a:extLst>
               <a:ext uri="{91240B29-F687-4f45-9708-019B960494DF}">
-                <a14:hiddenLine xmlns="" xmlns:a14="http://schemas.microsoft.com/office/drawing/2010/main" w="9525">
+                <a14:hiddenLine xmlns:a14="http://schemas.microsoft.com/office/drawing/2010/main" xmlns="" w="9525">
                   <a:solidFill>
                     <a:srgbClr val="000000"/>
                   </a:solidFill>
@@ -5113,7 +5229,7 @@
             </a:ln>
             <a:extLst>
               <a:ext uri="{91240B29-F687-4f45-9708-019B960494DF}">
-                <a14:hiddenLine xmlns="" xmlns:a14="http://schemas.microsoft.com/office/drawing/2010/main" w="9525">
+                <a14:hiddenLine xmlns:a14="http://schemas.microsoft.com/office/drawing/2010/main" xmlns="" w="9525">
                   <a:solidFill>
                     <a:srgbClr val="000000"/>
                   </a:solidFill>
@@ -5203,7 +5319,7 @@
             </a:ln>
             <a:extLst>
               <a:ext uri="{91240B29-F687-4f45-9708-019B960494DF}">
-                <a14:hiddenLine xmlns="" xmlns:a14="http://schemas.microsoft.com/office/drawing/2010/main" w="9525">
+                <a14:hiddenLine xmlns:a14="http://schemas.microsoft.com/office/drawing/2010/main" xmlns="" w="9525">
                   <a:solidFill>
                     <a:srgbClr val="000000"/>
                   </a:solidFill>
@@ -5237,7 +5353,7 @@
             </a:ln>
             <a:extLst>
               <a:ext uri="{91240B29-F687-4f45-9708-019B960494DF}">
-                <a14:hiddenLine xmlns="" xmlns:a14="http://schemas.microsoft.com/office/drawing/2010/main" w="9525">
+                <a14:hiddenLine xmlns:a14="http://schemas.microsoft.com/office/drawing/2010/main" xmlns="" w="9525">
                   <a:solidFill>
                     <a:srgbClr val="000000"/>
                   </a:solidFill>
@@ -5327,7 +5443,7 @@
             </a:ln>
             <a:extLst>
               <a:ext uri="{91240B29-F687-4f45-9708-019B960494DF}">
-                <a14:hiddenLine xmlns="" xmlns:a14="http://schemas.microsoft.com/office/drawing/2010/main" w="9525">
+                <a14:hiddenLine xmlns:a14="http://schemas.microsoft.com/office/drawing/2010/main" xmlns="" w="9525">
                   <a:solidFill>
                     <a:srgbClr val="000000"/>
                   </a:solidFill>
@@ -5389,7 +5505,7 @@
             </a:ln>
             <a:extLst>
               <a:ext uri="{91240B29-F687-4f45-9708-019B960494DF}">
-                <a14:hiddenLine xmlns="" xmlns:a14="http://schemas.microsoft.com/office/drawing/2010/main" w="9525">
+                <a14:hiddenLine xmlns:a14="http://schemas.microsoft.com/office/drawing/2010/main" xmlns="" w="9525">
                   <a:solidFill>
                     <a:srgbClr val="000000"/>
                   </a:solidFill>
@@ -5451,7 +5567,7 @@
             </a:ln>
             <a:extLst>
               <a:ext uri="{91240B29-F687-4f45-9708-019B960494DF}">
-                <a14:hiddenLine xmlns="" xmlns:a14="http://schemas.microsoft.com/office/drawing/2010/main" w="9525">
+                <a14:hiddenLine xmlns:a14="http://schemas.microsoft.com/office/drawing/2010/main" xmlns="" w="9525">
                   <a:solidFill>
                     <a:srgbClr val="000000"/>
                   </a:solidFill>
@@ -5541,7 +5657,7 @@
             </a:ln>
             <a:extLst>
               <a:ext uri="{91240B29-F687-4f45-9708-019B960494DF}">
-                <a14:hiddenLine xmlns="" xmlns:a14="http://schemas.microsoft.com/office/drawing/2010/main" w="9525">
+                <a14:hiddenLine xmlns:a14="http://schemas.microsoft.com/office/drawing/2010/main" xmlns="" w="9525">
                   <a:solidFill>
                     <a:srgbClr val="000000"/>
                   </a:solidFill>
@@ -5609,7 +5725,7 @@
             </a:ln>
             <a:extLst>
               <a:ext uri="{91240B29-F687-4f45-9708-019B960494DF}">
-                <a14:hiddenLine xmlns="" xmlns:a14="http://schemas.microsoft.com/office/drawing/2010/main" w="9525">
+                <a14:hiddenLine xmlns:a14="http://schemas.microsoft.com/office/drawing/2010/main" xmlns="" w="9525">
                   <a:solidFill>
                     <a:srgbClr val="000000"/>
                   </a:solidFill>
@@ -5671,7 +5787,7 @@
             </a:ln>
             <a:extLst>
               <a:ext uri="{91240B29-F687-4f45-9708-019B960494DF}">
-                <a14:hiddenLine xmlns="" xmlns:a14="http://schemas.microsoft.com/office/drawing/2010/main" w="9525">
+                <a14:hiddenLine xmlns:a14="http://schemas.microsoft.com/office/drawing/2010/main" xmlns="" w="9525">
                   <a:solidFill>
                     <a:srgbClr val="000000"/>
                   </a:solidFill>
@@ -5761,7 +5877,7 @@
             </a:ln>
             <a:extLst>
               <a:ext uri="{91240B29-F687-4f45-9708-019B960494DF}">
-                <a14:hiddenLine xmlns="" xmlns:a14="http://schemas.microsoft.com/office/drawing/2010/main" w="9525">
+                <a14:hiddenLine xmlns:a14="http://schemas.microsoft.com/office/drawing/2010/main" xmlns="" w="9525">
                   <a:solidFill>
                     <a:srgbClr val="000000"/>
                   </a:solidFill>
@@ -5823,7 +5939,7 @@
             </a:ln>
             <a:extLst>
               <a:ext uri="{91240B29-F687-4f45-9708-019B960494DF}">
-                <a14:hiddenLine xmlns="" xmlns:a14="http://schemas.microsoft.com/office/drawing/2010/main" w="9525">
+                <a14:hiddenLine xmlns:a14="http://schemas.microsoft.com/office/drawing/2010/main" xmlns="" w="9525">
                   <a:solidFill>
                     <a:srgbClr val="000000"/>
                   </a:solidFill>
@@ -5913,7 +6029,7 @@
             </a:ln>
             <a:extLst>
               <a:ext uri="{91240B29-F687-4f45-9708-019B960494DF}">
-                <a14:hiddenLine xmlns="" xmlns:a14="http://schemas.microsoft.com/office/drawing/2010/main" w="9525">
+                <a14:hiddenLine xmlns:a14="http://schemas.microsoft.com/office/drawing/2010/main" xmlns="" w="9525">
                   <a:solidFill>
                     <a:srgbClr val="000000"/>
                   </a:solidFill>
@@ -5975,7 +6091,7 @@
             </a:ln>
             <a:extLst>
               <a:ext uri="{91240B29-F687-4f45-9708-019B960494DF}">
-                <a14:hiddenLine xmlns="" xmlns:a14="http://schemas.microsoft.com/office/drawing/2010/main" w="9525">
+                <a14:hiddenLine xmlns:a14="http://schemas.microsoft.com/office/drawing/2010/main" xmlns="" w="9525">
                   <a:solidFill>
                     <a:srgbClr val="000000"/>
                   </a:solidFill>
@@ -6065,7 +6181,7 @@
             </a:ln>
             <a:extLst>
               <a:ext uri="{91240B29-F687-4f45-9708-019B960494DF}">
-                <a14:hiddenLine xmlns="" xmlns:a14="http://schemas.microsoft.com/office/drawing/2010/main" w="9525">
+                <a14:hiddenLine xmlns:a14="http://schemas.microsoft.com/office/drawing/2010/main" xmlns="" w="9525">
                   <a:solidFill>
                     <a:srgbClr val="000000"/>
                   </a:solidFill>
@@ -6099,7 +6215,7 @@
             </a:ln>
             <a:extLst>
               <a:ext uri="{91240B29-F687-4f45-9708-019B960494DF}">
-                <a14:hiddenLine xmlns="" xmlns:a14="http://schemas.microsoft.com/office/drawing/2010/main" w="9525">
+                <a14:hiddenLine xmlns:a14="http://schemas.microsoft.com/office/drawing/2010/main" xmlns="" w="9525">
                   <a:solidFill>
                     <a:srgbClr val="000000"/>
                   </a:solidFill>
@@ -6164,7 +6280,7 @@
             </a:ln>
             <a:extLst>
               <a:ext uri="{91240B29-F687-4f45-9708-019B960494DF}">
-                <a14:hiddenLine xmlns="" xmlns:a14="http://schemas.microsoft.com/office/drawing/2010/main" w="9525">
+                <a14:hiddenLine xmlns:a14="http://schemas.microsoft.com/office/drawing/2010/main" xmlns="" w="9525">
                   <a:solidFill>
                     <a:srgbClr val="000000"/>
                   </a:solidFill>
@@ -6254,7 +6370,7 @@
             </a:ln>
             <a:extLst>
               <a:ext uri="{91240B29-F687-4f45-9708-019B960494DF}">
-                <a14:hiddenLine xmlns="" xmlns:a14="http://schemas.microsoft.com/office/drawing/2010/main" w="9525">
+                <a14:hiddenLine xmlns:a14="http://schemas.microsoft.com/office/drawing/2010/main" xmlns="" w="9525">
                   <a:solidFill>
                     <a:srgbClr val="000000"/>
                   </a:solidFill>
@@ -6316,7 +6432,7 @@
             </a:ln>
             <a:extLst>
               <a:ext uri="{91240B29-F687-4f45-9708-019B960494DF}">
-                <a14:hiddenLine xmlns="" xmlns:a14="http://schemas.microsoft.com/office/drawing/2010/main" w="9525">
+                <a14:hiddenLine xmlns:a14="http://schemas.microsoft.com/office/drawing/2010/main" xmlns="" w="9525">
                   <a:solidFill>
                     <a:srgbClr val="000000"/>
                   </a:solidFill>
@@ -6406,7 +6522,7 @@
             </a:ln>
             <a:extLst>
               <a:ext uri="{91240B29-F687-4f45-9708-019B960494DF}">
-                <a14:hiddenLine xmlns="" xmlns:a14="http://schemas.microsoft.com/office/drawing/2010/main" w="9525">
+                <a14:hiddenLine xmlns:a14="http://schemas.microsoft.com/office/drawing/2010/main" xmlns="" w="9525">
                   <a:solidFill>
                     <a:srgbClr val="000000"/>
                   </a:solidFill>
@@ -6496,7 +6612,7 @@
             </a:ln>
             <a:extLst>
               <a:ext uri="{91240B29-F687-4f45-9708-019B960494DF}">
-                <a14:hiddenLine xmlns="" xmlns:a14="http://schemas.microsoft.com/office/drawing/2010/main" w="9525">
+                <a14:hiddenLine xmlns:a14="http://schemas.microsoft.com/office/drawing/2010/main" xmlns="" w="9525">
                   <a:solidFill>
                     <a:srgbClr val="000000"/>
                   </a:solidFill>
@@ -6561,7 +6677,7 @@
             </a:ln>
             <a:extLst>
               <a:ext uri="{91240B29-F687-4f45-9708-019B960494DF}">
-                <a14:hiddenLine xmlns="" xmlns:a14="http://schemas.microsoft.com/office/drawing/2010/main" w="9525">
+                <a14:hiddenLine xmlns:a14="http://schemas.microsoft.com/office/drawing/2010/main" xmlns="" w="9525">
                   <a:solidFill>
                     <a:srgbClr val="000000"/>
                   </a:solidFill>
@@ -6623,7 +6739,7 @@
             </a:ln>
             <a:extLst>
               <a:ext uri="{91240B29-F687-4f45-9708-019B960494DF}">
-                <a14:hiddenLine xmlns="" xmlns:a14="http://schemas.microsoft.com/office/drawing/2010/main" w="9525">
+                <a14:hiddenLine xmlns:a14="http://schemas.microsoft.com/office/drawing/2010/main" xmlns="" w="9525">
                   <a:solidFill>
                     <a:srgbClr val="000000"/>
                   </a:solidFill>
@@ -6713,7 +6829,7 @@
             </a:ln>
             <a:extLst>
               <a:ext uri="{91240B29-F687-4f45-9708-019B960494DF}">
-                <a14:hiddenLine xmlns="" xmlns:a14="http://schemas.microsoft.com/office/drawing/2010/main" w="9525">
+                <a14:hiddenLine xmlns:a14="http://schemas.microsoft.com/office/drawing/2010/main" xmlns="" w="9525">
                   <a:solidFill>
                     <a:srgbClr val="000000"/>
                   </a:solidFill>
@@ -6803,7 +6919,7 @@
             </a:ln>
             <a:extLst>
               <a:ext uri="{91240B29-F687-4f45-9708-019B960494DF}">
-                <a14:hiddenLine xmlns="" xmlns:a14="http://schemas.microsoft.com/office/drawing/2010/main" w="9525">
+                <a14:hiddenLine xmlns:a14="http://schemas.microsoft.com/office/drawing/2010/main" xmlns="" w="9525">
                   <a:solidFill>
                     <a:srgbClr val="000000"/>
                   </a:solidFill>
@@ -6865,7 +6981,7 @@
             </a:ln>
             <a:extLst>
               <a:ext uri="{91240B29-F687-4f45-9708-019B960494DF}">
-                <a14:hiddenLine xmlns="" xmlns:a14="http://schemas.microsoft.com/office/drawing/2010/main" w="9525">
+                <a14:hiddenLine xmlns:a14="http://schemas.microsoft.com/office/drawing/2010/main" xmlns="" w="9525">
                   <a:solidFill>
                     <a:srgbClr val="000000"/>
                   </a:solidFill>
@@ -6985,7 +7101,7 @@
             </a:ln>
             <a:extLst>
               <a:ext uri="{91240B29-F687-4f45-9708-019B960494DF}">
-                <a14:hiddenLine xmlns="" xmlns:a14="http://schemas.microsoft.com/office/drawing/2010/main" w="9525">
+                <a14:hiddenLine xmlns:a14="http://schemas.microsoft.com/office/drawing/2010/main" xmlns="" w="9525">
                   <a:solidFill>
                     <a:srgbClr val="000000"/>
                   </a:solidFill>
@@ -7053,7 +7169,7 @@
             </a:ln>
             <a:extLst>
               <a:ext uri="{91240B29-F687-4f45-9708-019B960494DF}">
-                <a14:hiddenLine xmlns="" xmlns:a14="http://schemas.microsoft.com/office/drawing/2010/main" w="9525">
+                <a14:hiddenLine xmlns:a14="http://schemas.microsoft.com/office/drawing/2010/main" xmlns="" w="9525">
                   <a:solidFill>
                     <a:srgbClr val="000000"/>
                   </a:solidFill>
@@ -7143,7 +7259,7 @@
             </a:ln>
             <a:extLst>
               <a:ext uri="{91240B29-F687-4f45-9708-019B960494DF}">
-                <a14:hiddenLine xmlns="" xmlns:a14="http://schemas.microsoft.com/office/drawing/2010/main" w="9525">
+                <a14:hiddenLine xmlns:a14="http://schemas.microsoft.com/office/drawing/2010/main" xmlns="" w="9525">
                   <a:solidFill>
                     <a:srgbClr val="000000"/>
                   </a:solidFill>
@@ -11945,7 +12061,7 @@
           <a:noFill/>
           <a:extLst>
             <a:ext uri="{909E8E84-426E-40dd-AFC4-6F175D3DCCD1}">
-              <a14:hiddenFill xmlns="" xmlns:a14="http://schemas.microsoft.com/office/drawing/2010/main">
+              <a14:hiddenFill xmlns:a14="http://schemas.microsoft.com/office/drawing/2010/main" xmlns="">
                 <a:solidFill>
                   <a:srgbClr val="FFFFFF"/>
                 </a:solidFill>
@@ -12019,7 +12135,7 @@
               </a:ln>
               <a:extLst>
                 <a:ext uri="{91240B29-F687-4f45-9708-019B960494DF}">
-                  <a14:hiddenLine xmlns="" xmlns:a14="http://schemas.microsoft.com/office/drawing/2010/main" w="9525">
+                  <a14:hiddenLine xmlns:a14="http://schemas.microsoft.com/office/drawing/2010/main" xmlns="" w="9525">
                     <a:solidFill>
                       <a:srgbClr val="000000"/>
                     </a:solidFill>
@@ -12109,7 +12225,7 @@
               </a:ln>
               <a:extLst>
                 <a:ext uri="{91240B29-F687-4f45-9708-019B960494DF}">
-                  <a14:hiddenLine xmlns="" xmlns:a14="http://schemas.microsoft.com/office/drawing/2010/main" w="9525">
+                  <a14:hiddenLine xmlns:a14="http://schemas.microsoft.com/office/drawing/2010/main" xmlns="" w="9525">
                     <a:solidFill>
                       <a:srgbClr val="000000"/>
                     </a:solidFill>
@@ -12199,7 +12315,7 @@
               </a:ln>
               <a:extLst>
                 <a:ext uri="{91240B29-F687-4f45-9708-019B960494DF}">
-                  <a14:hiddenLine xmlns="" xmlns:a14="http://schemas.microsoft.com/office/drawing/2010/main" w="9525">
+                  <a14:hiddenLine xmlns:a14="http://schemas.microsoft.com/office/drawing/2010/main" xmlns="" w="9525">
                     <a:solidFill>
                       <a:srgbClr val="000000"/>
                     </a:solidFill>
@@ -12261,7 +12377,7 @@
               </a:ln>
               <a:extLst>
                 <a:ext uri="{91240B29-F687-4f45-9708-019B960494DF}">
-                  <a14:hiddenLine xmlns="" xmlns:a14="http://schemas.microsoft.com/office/drawing/2010/main" w="9525">
+                  <a14:hiddenLine xmlns:a14="http://schemas.microsoft.com/office/drawing/2010/main" xmlns="" w="9525">
                     <a:solidFill>
                       <a:srgbClr val="000000"/>
                     </a:solidFill>
@@ -12351,7 +12467,7 @@
               </a:ln>
               <a:extLst>
                 <a:ext uri="{91240B29-F687-4f45-9708-019B960494DF}">
-                  <a14:hiddenLine xmlns="" xmlns:a14="http://schemas.microsoft.com/office/drawing/2010/main" w="9525">
+                  <a14:hiddenLine xmlns:a14="http://schemas.microsoft.com/office/drawing/2010/main" xmlns="" w="9525">
                     <a:solidFill>
                       <a:srgbClr val="000000"/>
                     </a:solidFill>
@@ -12413,7 +12529,7 @@
               </a:ln>
               <a:extLst>
                 <a:ext uri="{91240B29-F687-4f45-9708-019B960494DF}">
-                  <a14:hiddenLine xmlns="" xmlns:a14="http://schemas.microsoft.com/office/drawing/2010/main" w="9525">
+                  <a14:hiddenLine xmlns:a14="http://schemas.microsoft.com/office/drawing/2010/main" xmlns="" w="9525">
                     <a:solidFill>
                       <a:srgbClr val="000000"/>
                     </a:solidFill>
@@ -12475,7 +12591,7 @@
               </a:ln>
               <a:extLst>
                 <a:ext uri="{91240B29-F687-4f45-9708-019B960494DF}">
-                  <a14:hiddenLine xmlns="" xmlns:a14="http://schemas.microsoft.com/office/drawing/2010/main" w="9525">
+                  <a14:hiddenLine xmlns:a14="http://schemas.microsoft.com/office/drawing/2010/main" xmlns="" w="9525">
                     <a:solidFill>
                       <a:srgbClr val="000000"/>
                     </a:solidFill>
@@ -12565,7 +12681,7 @@
               </a:ln>
               <a:extLst>
                 <a:ext uri="{91240B29-F687-4f45-9708-019B960494DF}">
-                  <a14:hiddenLine xmlns="" xmlns:a14="http://schemas.microsoft.com/office/drawing/2010/main" w="9525">
+                  <a14:hiddenLine xmlns:a14="http://schemas.microsoft.com/office/drawing/2010/main" xmlns="" w="9525">
                     <a:solidFill>
                       <a:srgbClr val="000000"/>
                     </a:solidFill>
@@ -12655,7 +12771,7 @@
               </a:ln>
               <a:extLst>
                 <a:ext uri="{91240B29-F687-4f45-9708-019B960494DF}">
-                  <a14:hiddenLine xmlns="" xmlns:a14="http://schemas.microsoft.com/office/drawing/2010/main" w="9525">
+                  <a14:hiddenLine xmlns:a14="http://schemas.microsoft.com/office/drawing/2010/main" xmlns="" w="9525">
                     <a:solidFill>
                       <a:srgbClr val="000000"/>
                     </a:solidFill>
@@ -12717,7 +12833,7 @@
               </a:ln>
               <a:extLst>
                 <a:ext uri="{91240B29-F687-4f45-9708-019B960494DF}">
-                  <a14:hiddenLine xmlns="" xmlns:a14="http://schemas.microsoft.com/office/drawing/2010/main" w="9525">
+                  <a14:hiddenLine xmlns:a14="http://schemas.microsoft.com/office/drawing/2010/main" xmlns="" w="9525">
                     <a:solidFill>
                       <a:srgbClr val="000000"/>
                     </a:solidFill>
@@ -12827,7 +12943,7 @@
               </a:ln>
               <a:extLst>
                 <a:ext uri="{91240B29-F687-4f45-9708-019B960494DF}">
-                  <a14:hiddenLine xmlns="" xmlns:a14="http://schemas.microsoft.com/office/drawing/2010/main" w="9525">
+                  <a14:hiddenLine xmlns:a14="http://schemas.microsoft.com/office/drawing/2010/main" xmlns="" w="9525">
                     <a:solidFill>
                       <a:srgbClr val="000000"/>
                     </a:solidFill>
@@ -12911,7 +13027,7 @@
               </a:ln>
               <a:extLst>
                 <a:ext uri="{91240B29-F687-4f45-9708-019B960494DF}">
-                  <a14:hiddenLine xmlns="" xmlns:a14="http://schemas.microsoft.com/office/drawing/2010/main" w="9525">
+                  <a14:hiddenLine xmlns:a14="http://schemas.microsoft.com/office/drawing/2010/main" xmlns="" w="9525">
                     <a:solidFill>
                       <a:srgbClr val="000000"/>
                     </a:solidFill>
@@ -12973,7 +13089,7 @@
               </a:ln>
               <a:extLst>
                 <a:ext uri="{91240B29-F687-4f45-9708-019B960494DF}">
-                  <a14:hiddenLine xmlns="" xmlns:a14="http://schemas.microsoft.com/office/drawing/2010/main" w="9525">
+                  <a14:hiddenLine xmlns:a14="http://schemas.microsoft.com/office/drawing/2010/main" xmlns="" w="9525">
                     <a:solidFill>
                       <a:srgbClr val="000000"/>
                     </a:solidFill>
@@ -13035,7 +13151,7 @@
               </a:ln>
               <a:extLst>
                 <a:ext uri="{91240B29-F687-4f45-9708-019B960494DF}">
-                  <a14:hiddenLine xmlns="" xmlns:a14="http://schemas.microsoft.com/office/drawing/2010/main" w="9525">
+                  <a14:hiddenLine xmlns:a14="http://schemas.microsoft.com/office/drawing/2010/main" xmlns="" w="9525">
                     <a:solidFill>
                       <a:srgbClr val="000000"/>
                     </a:solidFill>
@@ -13125,7 +13241,7 @@
               </a:ln>
               <a:extLst>
                 <a:ext uri="{91240B29-F687-4f45-9708-019B960494DF}">
-                  <a14:hiddenLine xmlns="" xmlns:a14="http://schemas.microsoft.com/office/drawing/2010/main" w="9525">
+                  <a14:hiddenLine xmlns:a14="http://schemas.microsoft.com/office/drawing/2010/main" xmlns="" w="9525">
                     <a:solidFill>
                       <a:srgbClr val="000000"/>
                     </a:solidFill>
@@ -13159,7 +13275,7 @@
               </a:ln>
               <a:extLst>
                 <a:ext uri="{91240B29-F687-4f45-9708-019B960494DF}">
-                  <a14:hiddenLine xmlns="" xmlns:a14="http://schemas.microsoft.com/office/drawing/2010/main" w="9525">
+                  <a14:hiddenLine xmlns:a14="http://schemas.microsoft.com/office/drawing/2010/main" xmlns="" w="9525">
                     <a:solidFill>
                       <a:srgbClr val="000000"/>
                     </a:solidFill>
@@ -13224,7 +13340,7 @@
               </a:ln>
               <a:extLst>
                 <a:ext uri="{91240B29-F687-4f45-9708-019B960494DF}">
-                  <a14:hiddenLine xmlns="" xmlns:a14="http://schemas.microsoft.com/office/drawing/2010/main" w="9525">
+                  <a14:hiddenLine xmlns:a14="http://schemas.microsoft.com/office/drawing/2010/main" xmlns="" w="9525">
                     <a:solidFill>
                       <a:srgbClr val="000000"/>
                     </a:solidFill>
@@ -13314,7 +13430,7 @@
               </a:ln>
               <a:extLst>
                 <a:ext uri="{91240B29-F687-4f45-9708-019B960494DF}">
-                  <a14:hiddenLine xmlns="" xmlns:a14="http://schemas.microsoft.com/office/drawing/2010/main" w="9525">
+                  <a14:hiddenLine xmlns:a14="http://schemas.microsoft.com/office/drawing/2010/main" xmlns="" w="9525">
                     <a:solidFill>
                       <a:srgbClr val="000000"/>
                     </a:solidFill>
@@ -13376,7 +13492,7 @@
               </a:ln>
               <a:extLst>
                 <a:ext uri="{91240B29-F687-4f45-9708-019B960494DF}">
-                  <a14:hiddenLine xmlns="" xmlns:a14="http://schemas.microsoft.com/office/drawing/2010/main" w="9525">
+                  <a14:hiddenLine xmlns:a14="http://schemas.microsoft.com/office/drawing/2010/main" xmlns="" w="9525">
                     <a:solidFill>
                       <a:srgbClr val="000000"/>
                     </a:solidFill>
@@ -13466,7 +13582,7 @@
               </a:ln>
               <a:extLst>
                 <a:ext uri="{91240B29-F687-4f45-9708-019B960494DF}">
-                  <a14:hiddenLine xmlns="" xmlns:a14="http://schemas.microsoft.com/office/drawing/2010/main" w="9525">
+                  <a14:hiddenLine xmlns:a14="http://schemas.microsoft.com/office/drawing/2010/main" xmlns="" w="9525">
                     <a:solidFill>
                       <a:srgbClr val="000000"/>
                     </a:solidFill>
@@ -13531,7 +13647,7 @@
               </a:ln>
               <a:extLst>
                 <a:ext uri="{91240B29-F687-4f45-9708-019B960494DF}">
-                  <a14:hiddenLine xmlns="" xmlns:a14="http://schemas.microsoft.com/office/drawing/2010/main" w="9525">
+                  <a14:hiddenLine xmlns:a14="http://schemas.microsoft.com/office/drawing/2010/main" xmlns="" w="9525">
                     <a:solidFill>
                       <a:srgbClr val="000000"/>
                     </a:solidFill>
@@ -13593,7 +13709,7 @@
               </a:ln>
               <a:extLst>
                 <a:ext uri="{91240B29-F687-4f45-9708-019B960494DF}">
-                  <a14:hiddenLine xmlns="" xmlns:a14="http://schemas.microsoft.com/office/drawing/2010/main" w="9525">
+                  <a14:hiddenLine xmlns:a14="http://schemas.microsoft.com/office/drawing/2010/main" xmlns="" w="9525">
                     <a:solidFill>
                       <a:srgbClr val="000000"/>
                     </a:solidFill>
@@ -13683,7 +13799,7 @@
               </a:ln>
               <a:extLst>
                 <a:ext uri="{91240B29-F687-4f45-9708-019B960494DF}">
-                  <a14:hiddenLine xmlns="" xmlns:a14="http://schemas.microsoft.com/office/drawing/2010/main" w="9525">
+                  <a14:hiddenLine xmlns:a14="http://schemas.microsoft.com/office/drawing/2010/main" xmlns="" w="9525">
                     <a:solidFill>
                       <a:srgbClr val="000000"/>
                     </a:solidFill>
@@ -13773,7 +13889,7 @@
               </a:ln>
               <a:extLst>
                 <a:ext uri="{91240B29-F687-4f45-9708-019B960494DF}">
-                  <a14:hiddenLine xmlns="" xmlns:a14="http://schemas.microsoft.com/office/drawing/2010/main" w="9525">
+                  <a14:hiddenLine xmlns:a14="http://schemas.microsoft.com/office/drawing/2010/main" xmlns="" w="9525">
                     <a:solidFill>
                       <a:srgbClr val="000000"/>
                     </a:solidFill>
@@ -13838,7 +13954,7 @@
               </a:ln>
               <a:extLst>
                 <a:ext uri="{91240B29-F687-4f45-9708-019B960494DF}">
-                  <a14:hiddenLine xmlns="" xmlns:a14="http://schemas.microsoft.com/office/drawing/2010/main" w="9525">
+                  <a14:hiddenLine xmlns:a14="http://schemas.microsoft.com/office/drawing/2010/main" xmlns="" w="9525">
                     <a:solidFill>
                       <a:srgbClr val="000000"/>
                     </a:solidFill>
@@ -13958,7 +14074,7 @@
               </a:ln>
               <a:extLst>
                 <a:ext uri="{91240B29-F687-4f45-9708-019B960494DF}">
-                  <a14:hiddenLine xmlns="" xmlns:a14="http://schemas.microsoft.com/office/drawing/2010/main" w="9525">
+                  <a14:hiddenLine xmlns:a14="http://schemas.microsoft.com/office/drawing/2010/main" xmlns="" w="9525">
                     <a:solidFill>
                       <a:srgbClr val="000000"/>
                     </a:solidFill>
@@ -14056,7 +14172,7 @@
               </a:ln>
               <a:extLst>
                 <a:ext uri="{91240B29-F687-4f45-9708-019B960494DF}">
-                  <a14:hiddenLine xmlns="" xmlns:a14="http://schemas.microsoft.com/office/drawing/2010/main" w="9525">
+                  <a14:hiddenLine xmlns:a14="http://schemas.microsoft.com/office/drawing/2010/main" xmlns="" w="9525">
                     <a:solidFill>
                       <a:srgbClr val="000000"/>
                     </a:solidFill>
@@ -14171,7 +14287,7 @@
               </a:ln>
               <a:extLst>
                 <a:ext uri="{91240B29-F687-4f45-9708-019B960494DF}">
-                  <a14:hiddenLine xmlns="" xmlns:a14="http://schemas.microsoft.com/office/drawing/2010/main" w="9525">
+                  <a14:hiddenLine xmlns:a14="http://schemas.microsoft.com/office/drawing/2010/main" xmlns="" w="9525">
                     <a:solidFill>
                       <a:srgbClr val="000000"/>
                     </a:solidFill>
@@ -14261,7 +14377,7 @@
               </a:ln>
               <a:extLst>
                 <a:ext uri="{91240B29-F687-4f45-9708-019B960494DF}">
-                  <a14:hiddenLine xmlns="" xmlns:a14="http://schemas.microsoft.com/office/drawing/2010/main" w="9525">
+                  <a14:hiddenLine xmlns:a14="http://schemas.microsoft.com/office/drawing/2010/main" xmlns="" w="9525">
                     <a:solidFill>
                       <a:srgbClr val="000000"/>
                     </a:solidFill>
@@ -14326,7 +14442,7 @@
               </a:ln>
               <a:extLst>
                 <a:ext uri="{91240B29-F687-4f45-9708-019B960494DF}">
-                  <a14:hiddenLine xmlns="" xmlns:a14="http://schemas.microsoft.com/office/drawing/2010/main" w="9525">
+                  <a14:hiddenLine xmlns:a14="http://schemas.microsoft.com/office/drawing/2010/main" xmlns="" w="9525">
                     <a:solidFill>
                       <a:srgbClr val="000000"/>
                     </a:solidFill>
@@ -14416,7 +14532,7 @@
               </a:ln>
               <a:extLst>
                 <a:ext uri="{91240B29-F687-4f45-9708-019B960494DF}">
-                  <a14:hiddenLine xmlns="" xmlns:a14="http://schemas.microsoft.com/office/drawing/2010/main" w="9525">
+                  <a14:hiddenLine xmlns:a14="http://schemas.microsoft.com/office/drawing/2010/main" xmlns="" w="9525">
                     <a:solidFill>
                       <a:srgbClr val="000000"/>
                     </a:solidFill>
@@ -14484,7 +14600,7 @@
               </a:ln>
               <a:extLst>
                 <a:ext uri="{91240B29-F687-4f45-9708-019B960494DF}">
-                  <a14:hiddenLine xmlns="" xmlns:a14="http://schemas.microsoft.com/office/drawing/2010/main" w="9525">
+                  <a14:hiddenLine xmlns:a14="http://schemas.microsoft.com/office/drawing/2010/main" xmlns="" w="9525">
                     <a:solidFill>
                       <a:srgbClr val="000000"/>
                     </a:solidFill>
@@ -14574,7 +14690,7 @@
               </a:ln>
               <a:extLst>
                 <a:ext uri="{91240B29-F687-4f45-9708-019B960494DF}">
-                  <a14:hiddenLine xmlns="" xmlns:a14="http://schemas.microsoft.com/office/drawing/2010/main" w="9525">
+                  <a14:hiddenLine xmlns:a14="http://schemas.microsoft.com/office/drawing/2010/main" xmlns="" w="9525">
                     <a:solidFill>
                       <a:srgbClr val="000000"/>
                     </a:solidFill>
@@ -14642,7 +14758,7 @@
               </a:ln>
               <a:extLst>
                 <a:ext uri="{91240B29-F687-4f45-9708-019B960494DF}">
-                  <a14:hiddenLine xmlns="" xmlns:a14="http://schemas.microsoft.com/office/drawing/2010/main" w="9525">
+                  <a14:hiddenLine xmlns:a14="http://schemas.microsoft.com/office/drawing/2010/main" xmlns="" w="9525">
                     <a:solidFill>
                       <a:srgbClr val="000000"/>
                     </a:solidFill>
@@ -14732,7 +14848,7 @@
               </a:ln>
               <a:extLst>
                 <a:ext uri="{91240B29-F687-4f45-9708-019B960494DF}">
-                  <a14:hiddenLine xmlns="" xmlns:a14="http://schemas.microsoft.com/office/drawing/2010/main" w="9525">
+                  <a14:hiddenLine xmlns:a14="http://schemas.microsoft.com/office/drawing/2010/main" xmlns="" w="9525">
                     <a:solidFill>
                       <a:srgbClr val="000000"/>
                     </a:solidFill>
@@ -14766,7 +14882,7 @@
               </a:ln>
               <a:extLst>
                 <a:ext uri="{91240B29-F687-4f45-9708-019B960494DF}">
-                  <a14:hiddenLine xmlns="" xmlns:a14="http://schemas.microsoft.com/office/drawing/2010/main" w="9525">
+                  <a14:hiddenLine xmlns:a14="http://schemas.microsoft.com/office/drawing/2010/main" xmlns="" w="9525">
                     <a:solidFill>
                       <a:srgbClr val="000000"/>
                     </a:solidFill>
@@ -19734,6 +19850,130 @@
           <p:cNvPr id="2" name="Title 1">
             <a:extLst>
               <a:ext uri="{FF2B5EF4-FFF2-40B4-BE49-F238E27FC236}">
+                <a16:creationId xmlns:a16="http://schemas.microsoft.com/office/drawing/2014/main" id="{E78CA1C0-9A03-47B2-BB36-8963AE4E3075}"/>
+              </a:ext>
+            </a:extLst>
+          </p:cNvPr>
+          <p:cNvSpPr>
+            <a:spLocks noGrp="1"/>
+          </p:cNvSpPr>
+          <p:nvPr>
+            <p:ph type="ctrTitle"/>
+          </p:nvPr>
+        </p:nvSpPr>
+        <p:spPr/>
+        <p:txBody>
+          <a:bodyPr/>
+          <a:lstStyle/>
+          <a:p>
+            <a:r>
+              <a:rPr lang="en-US" dirty="0"/>
+              <a:t>Thanks for your attention</a:t>
+            </a:r>
+          </a:p>
+        </p:txBody>
+      </p:sp>
+      <p:sp>
+        <p:nvSpPr>
+          <p:cNvPr id="3" name="Subtitle 2">
+            <a:extLst>
+              <a:ext uri="{FF2B5EF4-FFF2-40B4-BE49-F238E27FC236}">
+                <a16:creationId xmlns:a16="http://schemas.microsoft.com/office/drawing/2014/main" id="{A45398FB-DA7F-4A80-9C24-1955E8DFB931}"/>
+              </a:ext>
+            </a:extLst>
+          </p:cNvPr>
+          <p:cNvSpPr>
+            <a:spLocks noGrp="1"/>
+          </p:cNvSpPr>
+          <p:nvPr>
+            <p:ph type="subTitle" idx="1"/>
+          </p:nvPr>
+        </p:nvSpPr>
+        <p:spPr/>
+        <p:txBody>
+          <a:bodyPr/>
+          <a:lstStyle/>
+          <a:p>
+            <a:pPr algn="ctr"/>
+            <a:r>
+              <a:rPr lang="en-US" dirty="0"/>
+              <a:t>Questions?</a:t>
+            </a:r>
+          </a:p>
+        </p:txBody>
+      </p:sp>
+      <p:pic>
+        <p:nvPicPr>
+          <p:cNvPr id="4" name="Picture 5" descr="A picture containing drawing&#10;&#10;Description automatically generated">
+            <a:extLst>
+              <a:ext uri="{FF2B5EF4-FFF2-40B4-BE49-F238E27FC236}">
+                <a16:creationId xmlns:a16="http://schemas.microsoft.com/office/drawing/2014/main" id="{07F2CCD8-AB51-45B7-851B-159533E5878C}"/>
+              </a:ext>
+            </a:extLst>
+          </p:cNvPr>
+          <p:cNvPicPr/>
+          <p:nvPr/>
+        </p:nvPicPr>
+        <p:blipFill>
+          <a:blip r:embed="rId3" cstate="print">
+            <a:extLst>
+              <a:ext uri="{28A0092B-C50C-407E-A947-70E740481C1C}">
+                <a14:useLocalDpi xmlns:a14="http://schemas.microsoft.com/office/drawing/2010/main" val="0"/>
+              </a:ext>
+            </a:extLst>
+          </a:blip>
+          <a:stretch>
+            <a:fillRect/>
+          </a:stretch>
+        </p:blipFill>
+        <p:spPr>
+          <a:xfrm>
+            <a:off x="9924062" y="6007863"/>
+            <a:ext cx="1982032" cy="572373"/>
+          </a:xfrm>
+          <a:prstGeom prst="rect">
+            <a:avLst/>
+          </a:prstGeom>
+        </p:spPr>
+      </p:pic>
+    </p:spTree>
+    <p:extLst>
+      <p:ext uri="{BB962C8B-B14F-4D97-AF65-F5344CB8AC3E}">
+        <p14:creationId xmlns:p14="http://schemas.microsoft.com/office/powerpoint/2010/main" val="254208978"/>
+      </p:ext>
+    </p:extLst>
+  </p:cSld>
+  <p:clrMapOvr>
+    <a:masterClrMapping/>
+  </p:clrMapOvr>
+  <p:transition spd="med">
+    <p:pull/>
+  </p:transition>
+</p:sld>
+</file>
+
+<file path=ppt/slides/slide19.xml><?xml version="1.0" encoding="utf-8"?>
+<p:sld xmlns:a="http://schemas.openxmlformats.org/drawingml/2006/main" xmlns:r="http://schemas.openxmlformats.org/officeDocument/2006/relationships" xmlns:p="http://schemas.openxmlformats.org/presentationml/2006/main">
+  <p:cSld>
+    <p:spTree>
+      <p:nvGrpSpPr>
+        <p:cNvPr id="1" name=""/>
+        <p:cNvGrpSpPr/>
+        <p:nvPr/>
+      </p:nvGrpSpPr>
+      <p:grpSpPr>
+        <a:xfrm>
+          <a:off x="0" y="0"/>
+          <a:ext cx="0" cy="0"/>
+          <a:chOff x="0" y="0"/>
+          <a:chExt cx="0" cy="0"/>
+        </a:xfrm>
+      </p:grpSpPr>
+      <p:sp>
+        <p:nvSpPr>
+          <p:cNvPr id="2" name="Title 1">
+            <a:extLst>
+              <a:ext uri="{FF2B5EF4-FFF2-40B4-BE49-F238E27FC236}">
                 <a16:creationId xmlns:a16="http://schemas.microsoft.com/office/drawing/2014/main" id="{B5107FA5-1280-47C6-A7F3-56691ACA32F5}"/>
               </a:ext>
             </a:extLst>
@@ -19773,64 +20013,436 @@
             <p:ph idx="1"/>
           </p:nvPr>
         </p:nvSpPr>
-        <p:spPr/>
+        <p:spPr>
+          <a:xfrm>
+            <a:off x="1141412" y="1878419"/>
+            <a:ext cx="4557639" cy="3912782"/>
+          </a:xfrm>
+        </p:spPr>
         <p:txBody>
           <a:bodyPr>
             <a:normAutofit/>
           </a:bodyPr>
           <a:lstStyle/>
           <a:p>
+            <a:pPr>
+              <a:lnSpc>
+                <a:spcPct val="100000"/>
+              </a:lnSpc>
+            </a:pPr>
             <a:r>
               <a:rPr lang="en-GB" sz="1200" dirty="0"/>
               <a:t>https://www.geeksforgeeks.org/decision-tree/?ref=rp</a:t>
             </a:r>
           </a:p>
           <a:p>
+            <a:pPr>
+              <a:lnSpc>
+                <a:spcPct val="100000"/>
+              </a:lnSpc>
+            </a:pPr>
             <a:r>
               <a:rPr lang="en-GB" sz="1200" dirty="0"/>
               <a:t>https://www.ryanxin.cn/archives/283</a:t>
             </a:r>
           </a:p>
           <a:p>
+            <a:pPr>
+              <a:lnSpc>
+                <a:spcPct val="100000"/>
+              </a:lnSpc>
+            </a:pPr>
             <a:r>
               <a:rPr lang="en-GB" sz="1200" dirty="0"/>
               <a:t>https://www.geeksforgeeks.org/decision-tree-introduction-example/</a:t>
             </a:r>
           </a:p>
           <a:p>
+            <a:pPr>
+              <a:lnSpc>
+                <a:spcPct val="100000"/>
+              </a:lnSpc>
+            </a:pPr>
             <a:r>
               <a:rPr lang="en-GB" sz="1200" dirty="0"/>
               <a:t>https://www.geeksforgeeks.org/decision-tree-implementation-python/</a:t>
             </a:r>
           </a:p>
           <a:p>
+            <a:pPr>
+              <a:lnSpc>
+                <a:spcPct val="100000"/>
+              </a:lnSpc>
+            </a:pPr>
             <a:r>
               <a:rPr lang="en-GB" sz="1200" dirty="0"/>
               <a:t>https://zhuanlan.zhihu.com/p/30059442</a:t>
             </a:r>
           </a:p>
           <a:p>
+            <a:pPr>
+              <a:lnSpc>
+                <a:spcPct val="100000"/>
+              </a:lnSpc>
+            </a:pPr>
             <a:r>
               <a:rPr lang="en-GB" sz="1200" dirty="0"/>
               <a:t>https://www.jianshu.com/p/655d8e555494</a:t>
             </a:r>
           </a:p>
           <a:p>
+            <a:pPr>
+              <a:lnSpc>
+                <a:spcPct val="100000"/>
+              </a:lnSpc>
+            </a:pPr>
             <a:r>
               <a:rPr lang="en-GB" sz="1200" dirty="0"/>
               <a:t>https://blog.csdn.net/jiaoyangwm/article/details/79525237</a:t>
             </a:r>
           </a:p>
           <a:p>
+            <a:pPr>
+              <a:lnSpc>
+                <a:spcPct val="100000"/>
+              </a:lnSpc>
+            </a:pPr>
+            <a:r>
+              <a:rPr lang="en-GB" sz="1200" dirty="0"/>
+              <a:t>https://towardsdatascience.com/machine-learning-algorithms-in-laymans-terms-part-2-a0a74df9a9ac</a:t>
+            </a:r>
+          </a:p>
+          <a:p>
+            <a:pPr>
+              <a:lnSpc>
+                <a:spcPct val="100000"/>
+              </a:lnSpc>
+            </a:pPr>
+            <a:r>
+              <a:rPr lang="en-GB" sz="1200" dirty="0"/>
+              <a:t>https://towardsdatascience.com/decision-tree-ensembles-bagging-and-boosting-266a8ba60fd9</a:t>
+            </a:r>
+          </a:p>
+          <a:p>
+            <a:pPr>
+              <a:lnSpc>
+                <a:spcPct val="100000"/>
+              </a:lnSpc>
+            </a:pPr>
+            <a:endParaRPr lang="en-GB" sz="1200" dirty="0"/>
+          </a:p>
+        </p:txBody>
+      </p:sp>
+      <p:sp>
+        <p:nvSpPr>
+          <p:cNvPr id="4" name="Content Placeholder 2">
+            <a:extLst>
+              <a:ext uri="{FF2B5EF4-FFF2-40B4-BE49-F238E27FC236}">
+                <a16:creationId xmlns:a16="http://schemas.microsoft.com/office/drawing/2014/main" id="{F3B5C43A-4B9A-461A-9510-0BED7B2FFF70}"/>
+              </a:ext>
+            </a:extLst>
+          </p:cNvPr>
+          <p:cNvSpPr txBox="1">
+            <a:spLocks/>
+          </p:cNvSpPr>
+          <p:nvPr/>
+        </p:nvSpPr>
+        <p:spPr>
+          <a:xfrm>
+            <a:off x="5816194" y="1878419"/>
+            <a:ext cx="4557639" cy="3912782"/>
+          </a:xfrm>
+          <a:prstGeom prst="rect">
+            <a:avLst/>
+          </a:prstGeom>
+        </p:spPr>
+        <p:txBody>
+          <a:bodyPr vert="horz" lIns="91440" tIns="45720" rIns="91440" bIns="45720" rtlCol="0">
+            <a:normAutofit/>
+          </a:bodyPr>
+          <a:lstStyle>
+            <a:lvl1pPr marL="228600" indent="-228600" algn="l" defTabSz="914400" rtl="0" eaLnBrk="1" latinLnBrk="0" hangingPunct="1">
+              <a:lnSpc>
+                <a:spcPct val="120000"/>
+              </a:lnSpc>
+              <a:spcBef>
+                <a:spcPts val="1000"/>
+              </a:spcBef>
+              <a:buSzPct val="125000"/>
+              <a:buFont typeface="Arial" panose="020B0604020202020204" pitchFamily="34" charset="0"/>
+              <a:buChar char="•"/>
+              <a:defRPr sz="2400" kern="1200">
+                <a:solidFill>
+                  <a:schemeClr val="tx1"/>
+                </a:solidFill>
+                <a:latin typeface="+mn-lt"/>
+                <a:ea typeface="+mn-ea"/>
+                <a:cs typeface="+mn-cs"/>
+              </a:defRPr>
+            </a:lvl1pPr>
+            <a:lvl2pPr marL="685800" indent="-228600" algn="l" defTabSz="914400" rtl="0" eaLnBrk="1" latinLnBrk="0" hangingPunct="1">
+              <a:lnSpc>
+                <a:spcPct val="120000"/>
+              </a:lnSpc>
+              <a:spcBef>
+                <a:spcPts val="500"/>
+              </a:spcBef>
+              <a:buSzPct val="125000"/>
+              <a:buFont typeface="Arial" panose="020B0604020202020204" pitchFamily="34" charset="0"/>
+              <a:buChar char="•"/>
+              <a:defRPr sz="2000" kern="1200">
+                <a:solidFill>
+                  <a:schemeClr val="tx1"/>
+                </a:solidFill>
+                <a:latin typeface="+mn-lt"/>
+                <a:ea typeface="+mn-ea"/>
+                <a:cs typeface="+mn-cs"/>
+              </a:defRPr>
+            </a:lvl2pPr>
+            <a:lvl3pPr marL="1143000" indent="-228600" algn="l" defTabSz="914400" rtl="0" eaLnBrk="1" latinLnBrk="0" hangingPunct="1">
+              <a:lnSpc>
+                <a:spcPct val="120000"/>
+              </a:lnSpc>
+              <a:spcBef>
+                <a:spcPts val="500"/>
+              </a:spcBef>
+              <a:buSzPct val="125000"/>
+              <a:buFont typeface="Arial" panose="020B0604020202020204" pitchFamily="34" charset="0"/>
+              <a:buChar char="•"/>
+              <a:defRPr sz="1800" kern="1200">
+                <a:solidFill>
+                  <a:schemeClr val="tx1"/>
+                </a:solidFill>
+                <a:latin typeface="+mn-lt"/>
+                <a:ea typeface="+mn-ea"/>
+                <a:cs typeface="+mn-cs"/>
+              </a:defRPr>
+            </a:lvl3pPr>
+            <a:lvl4pPr marL="1600200" indent="-228600" algn="l" defTabSz="914400" rtl="0" eaLnBrk="1" latinLnBrk="0" hangingPunct="1">
+              <a:lnSpc>
+                <a:spcPct val="120000"/>
+              </a:lnSpc>
+              <a:spcBef>
+                <a:spcPts val="500"/>
+              </a:spcBef>
+              <a:buSzPct val="125000"/>
+              <a:buFont typeface="Arial" panose="020B0604020202020204" pitchFamily="34" charset="0"/>
+              <a:buChar char="•"/>
+              <a:defRPr sz="1600" kern="1200">
+                <a:solidFill>
+                  <a:schemeClr val="tx1"/>
+                </a:solidFill>
+                <a:latin typeface="+mn-lt"/>
+                <a:ea typeface="+mn-ea"/>
+                <a:cs typeface="+mn-cs"/>
+              </a:defRPr>
+            </a:lvl4pPr>
+            <a:lvl5pPr marL="2057400" indent="-228600" algn="l" defTabSz="914400" rtl="0" eaLnBrk="1" latinLnBrk="0" hangingPunct="1">
+              <a:lnSpc>
+                <a:spcPct val="120000"/>
+              </a:lnSpc>
+              <a:spcBef>
+                <a:spcPts val="500"/>
+              </a:spcBef>
+              <a:buSzPct val="125000"/>
+              <a:buFont typeface="Arial" panose="020B0604020202020204" pitchFamily="34" charset="0"/>
+              <a:buChar char="•"/>
+              <a:defRPr sz="1600" kern="1200">
+                <a:solidFill>
+                  <a:schemeClr val="tx1"/>
+                </a:solidFill>
+                <a:latin typeface="+mn-lt"/>
+                <a:ea typeface="+mn-ea"/>
+                <a:cs typeface="+mn-cs"/>
+              </a:defRPr>
+            </a:lvl5pPr>
+            <a:lvl6pPr marL="2514600" indent="-228600" algn="l" defTabSz="914400" rtl="0" eaLnBrk="1" latinLnBrk="0" hangingPunct="1">
+              <a:lnSpc>
+                <a:spcPct val="120000"/>
+              </a:lnSpc>
+              <a:spcBef>
+                <a:spcPts val="500"/>
+              </a:spcBef>
+              <a:buSzPct val="125000"/>
+              <a:buFont typeface="Arial" panose="020B0604020202020204" pitchFamily="34" charset="0"/>
+              <a:buChar char="•"/>
+              <a:defRPr sz="1400" kern="1200">
+                <a:solidFill>
+                  <a:schemeClr val="tx1"/>
+                </a:solidFill>
+                <a:latin typeface="+mn-lt"/>
+                <a:ea typeface="+mn-ea"/>
+                <a:cs typeface="+mn-cs"/>
+              </a:defRPr>
+            </a:lvl6pPr>
+            <a:lvl7pPr marL="2971800" indent="-228600" algn="l" defTabSz="914400" rtl="0" eaLnBrk="1" latinLnBrk="0" hangingPunct="1">
+              <a:lnSpc>
+                <a:spcPct val="120000"/>
+              </a:lnSpc>
+              <a:spcBef>
+                <a:spcPts val="500"/>
+              </a:spcBef>
+              <a:buSzPct val="125000"/>
+              <a:buFont typeface="Arial" panose="020B0604020202020204" pitchFamily="34" charset="0"/>
+              <a:buChar char="•"/>
+              <a:defRPr sz="1400" kern="1200">
+                <a:solidFill>
+                  <a:schemeClr val="tx1"/>
+                </a:solidFill>
+                <a:latin typeface="+mn-lt"/>
+                <a:ea typeface="+mn-ea"/>
+                <a:cs typeface="+mn-cs"/>
+              </a:defRPr>
+            </a:lvl7pPr>
+            <a:lvl8pPr marL="3429000" indent="-228600" algn="l" defTabSz="914400" rtl="0" eaLnBrk="1" latinLnBrk="0" hangingPunct="1">
+              <a:lnSpc>
+                <a:spcPct val="120000"/>
+              </a:lnSpc>
+              <a:spcBef>
+                <a:spcPts val="500"/>
+              </a:spcBef>
+              <a:buSzPct val="125000"/>
+              <a:buFont typeface="Arial" panose="020B0604020202020204" pitchFamily="34" charset="0"/>
+              <a:buChar char="•"/>
+              <a:defRPr sz="1400" kern="1200">
+                <a:solidFill>
+                  <a:schemeClr val="tx1"/>
+                </a:solidFill>
+                <a:latin typeface="+mn-lt"/>
+                <a:ea typeface="+mn-ea"/>
+                <a:cs typeface="+mn-cs"/>
+              </a:defRPr>
+            </a:lvl8pPr>
+            <a:lvl9pPr marL="3886200" indent="-228600" algn="l" defTabSz="914400" rtl="0" eaLnBrk="1" latinLnBrk="0" hangingPunct="1">
+              <a:lnSpc>
+                <a:spcPct val="120000"/>
+              </a:lnSpc>
+              <a:spcBef>
+                <a:spcPts val="500"/>
+              </a:spcBef>
+              <a:buSzPct val="125000"/>
+              <a:buFont typeface="Arial" panose="020B0604020202020204" pitchFamily="34" charset="0"/>
+              <a:buChar char="•"/>
+              <a:defRPr sz="1400" kern="1200">
+                <a:solidFill>
+                  <a:schemeClr val="tx1"/>
+                </a:solidFill>
+                <a:latin typeface="+mn-lt"/>
+                <a:ea typeface="+mn-ea"/>
+                <a:cs typeface="+mn-cs"/>
+              </a:defRPr>
+            </a:lvl9pPr>
+          </a:lstStyle>
+          <a:p>
+            <a:pPr>
+              <a:lnSpc>
+                <a:spcPct val="100000"/>
+              </a:lnSpc>
+            </a:pPr>
             <a:r>
               <a:rPr lang="en-GB" sz="1200" dirty="0"/>
               <a:t>https://www.kaggle.com/c/titanic/overview</a:t>
             </a:r>
           </a:p>
           <a:p>
+            <a:pPr>
+              <a:lnSpc>
+                <a:spcPct val="100000"/>
+              </a:lnSpc>
+            </a:pPr>
+            <a:r>
+              <a:rPr lang="en-GB" sz="1200" dirty="0"/>
+              <a:t>https://www.kaggle.com/datavoyager/titanic-random-forest</a:t>
+            </a:r>
+          </a:p>
+          <a:p>
+            <a:pPr>
+              <a:lnSpc>
+                <a:spcPct val="100000"/>
+              </a:lnSpc>
+            </a:pPr>
+            <a:r>
+              <a:rPr lang="en-GB" sz="1200" dirty="0"/>
+              <a:t>https://www.kaggle.com/zlatankr/titanic-random-forest-82-78/notebook</a:t>
+            </a:r>
+          </a:p>
+          <a:p>
+            <a:pPr>
+              <a:lnSpc>
+                <a:spcPct val="100000"/>
+              </a:lnSpc>
+            </a:pPr>
+            <a:r>
+              <a:rPr lang="en-GB" sz="1200" dirty="0"/>
+              <a:t>https://www.kaggle.com/rprkh15/titanic-survival-prediction/notebook</a:t>
+            </a:r>
+          </a:p>
+          <a:p>
+            <a:pPr>
+              <a:lnSpc>
+                <a:spcPct val="100000"/>
+              </a:lnSpc>
+            </a:pPr>
+            <a:r>
+              <a:rPr lang="en-GB" sz="1200" dirty="0"/>
+              <a:t>https://www.jianshu.com/p/655d8e555494</a:t>
+            </a:r>
+          </a:p>
+          <a:p>
+            <a:pPr>
+              <a:lnSpc>
+                <a:spcPct val="100000"/>
+              </a:lnSpc>
+            </a:pPr>
+            <a:r>
+              <a:rPr lang="en-GB" sz="1200" dirty="0"/>
+              <a:t>https://www.jianshu.com/p/28d5de57bbce</a:t>
+            </a:r>
+          </a:p>
+          <a:p>
+            <a:pPr>
+              <a:lnSpc>
+                <a:spcPct val="100000"/>
+              </a:lnSpc>
+            </a:pPr>
+            <a:r>
+              <a:rPr lang="en-GB" sz="1200" dirty="0"/>
+              <a:t>https://scikit-learn.org/stable/modules/generated/sklearn.tree.DecisionTreeClassifier.html </a:t>
+            </a:r>
+          </a:p>
+          <a:p>
+            <a:pPr>
+              <a:lnSpc>
+                <a:spcPct val="100000"/>
+              </a:lnSpc>
+            </a:pPr>
+            <a:r>
+              <a:rPr lang="en-GB" sz="1200" dirty="0"/>
+              <a:t>https://scikit-learn.org/stable/modules/generated/sklearn.ensemble.RandomForestClassifier.html </a:t>
+            </a:r>
+          </a:p>
+          <a:p>
+            <a:pPr>
+              <a:lnSpc>
+                <a:spcPct val="100000"/>
+              </a:lnSpc>
+            </a:pPr>
             <a:endParaRPr lang="en-GB" sz="1200" dirty="0"/>
           </a:p>
           <a:p>
+            <a:pPr>
+              <a:lnSpc>
+                <a:spcPct val="100000"/>
+              </a:lnSpc>
+            </a:pPr>
+            <a:endParaRPr lang="en-GB" sz="1200" dirty="0"/>
+          </a:p>
+          <a:p>
+            <a:pPr>
+              <a:lnSpc>
+                <a:spcPct val="100000"/>
+              </a:lnSpc>
+            </a:pPr>
             <a:endParaRPr lang="en-GB" sz="1200" dirty="0"/>
           </a:p>
         </p:txBody>

</xml_diff>

<commit_message>
Update ppt with sponsor logo
</commit_message>
<xml_diff>
--- a/semester-2-2021-2022/week-6-decision-tree/Decision_Tree.pptx
+++ b/semester-2-2021-2022/week-6-decision-tree/Decision_Tree.pptx
@@ -331,7 +331,7 @@
           <a:p>
             <a:fld id="{EB7DA543-F40B-4023-9892-3E6E3C6ABB89}" type="datetimeFigureOut">
               <a:rPr lang="en-GB" smtClean="0"/>
-              <a:t>01/02/2022</a:t>
+              <a:t>16/02/2022</a:t>
             </a:fld>
             <a:endParaRPr lang="en-GB"/>
           </a:p>
@@ -3173,7 +3173,7 @@
           <a:noFill/>
           <a:extLst>
             <a:ext uri="{909E8E84-426E-40dd-AFC4-6F175D3DCCD1}">
-              <a14:hiddenFill xmlns:a14="http://schemas.microsoft.com/office/drawing/2010/main" xmlns="">
+              <a14:hiddenFill xmlns="" xmlns:a14="http://schemas.microsoft.com/office/drawing/2010/main">
                 <a:solidFill>
                   <a:srgbClr val="FFFFFF"/>
                 </a:solidFill>
@@ -3233,7 +3233,7 @@
             </a:ln>
             <a:extLst>
               <a:ext uri="{91240B29-F687-4f45-9708-019B960494DF}">
-                <a14:hiddenLine xmlns:a14="http://schemas.microsoft.com/office/drawing/2010/main" xmlns="" w="9525">
+                <a14:hiddenLine xmlns="" xmlns:a14="http://schemas.microsoft.com/office/drawing/2010/main" w="9525">
                   <a:solidFill>
                     <a:srgbClr val="000000"/>
                   </a:solidFill>
@@ -3323,7 +3323,7 @@
             </a:ln>
             <a:extLst>
               <a:ext uri="{91240B29-F687-4f45-9708-019B960494DF}">
-                <a14:hiddenLine xmlns:a14="http://schemas.microsoft.com/office/drawing/2010/main" xmlns="" w="9525">
+                <a14:hiddenLine xmlns="" xmlns:a14="http://schemas.microsoft.com/office/drawing/2010/main" w="9525">
                   <a:solidFill>
                     <a:srgbClr val="000000"/>
                   </a:solidFill>
@@ -3413,7 +3413,7 @@
             </a:ln>
             <a:extLst>
               <a:ext uri="{91240B29-F687-4f45-9708-019B960494DF}">
-                <a14:hiddenLine xmlns:a14="http://schemas.microsoft.com/office/drawing/2010/main" xmlns="" w="9525">
+                <a14:hiddenLine xmlns="" xmlns:a14="http://schemas.microsoft.com/office/drawing/2010/main" w="9525">
                   <a:solidFill>
                     <a:srgbClr val="000000"/>
                   </a:solidFill>
@@ -3447,7 +3447,7 @@
             </a:ln>
             <a:extLst>
               <a:ext uri="{91240B29-F687-4f45-9708-019B960494DF}">
-                <a14:hiddenLine xmlns:a14="http://schemas.microsoft.com/office/drawing/2010/main" xmlns="" w="9525">
+                <a14:hiddenLine xmlns="" xmlns:a14="http://schemas.microsoft.com/office/drawing/2010/main" w="9525">
                   <a:solidFill>
                     <a:srgbClr val="000000"/>
                   </a:solidFill>
@@ -3537,7 +3537,7 @@
             </a:ln>
             <a:extLst>
               <a:ext uri="{91240B29-F687-4f45-9708-019B960494DF}">
-                <a14:hiddenLine xmlns:a14="http://schemas.microsoft.com/office/drawing/2010/main" xmlns="" w="9525">
+                <a14:hiddenLine xmlns="" xmlns:a14="http://schemas.microsoft.com/office/drawing/2010/main" w="9525">
                   <a:solidFill>
                     <a:srgbClr val="000000"/>
                   </a:solidFill>
@@ -3599,7 +3599,7 @@
             </a:ln>
             <a:extLst>
               <a:ext uri="{91240B29-F687-4f45-9708-019B960494DF}">
-                <a14:hiddenLine xmlns:a14="http://schemas.microsoft.com/office/drawing/2010/main" xmlns="" w="9525">
+                <a14:hiddenLine xmlns="" xmlns:a14="http://schemas.microsoft.com/office/drawing/2010/main" w="9525">
                   <a:solidFill>
                     <a:srgbClr val="000000"/>
                   </a:solidFill>
@@ -3661,7 +3661,7 @@
             </a:ln>
             <a:extLst>
               <a:ext uri="{91240B29-F687-4f45-9708-019B960494DF}">
-                <a14:hiddenLine xmlns:a14="http://schemas.microsoft.com/office/drawing/2010/main" xmlns="" w="9525">
+                <a14:hiddenLine xmlns="" xmlns:a14="http://schemas.microsoft.com/office/drawing/2010/main" w="9525">
                   <a:solidFill>
                     <a:srgbClr val="000000"/>
                   </a:solidFill>
@@ -3751,7 +3751,7 @@
             </a:ln>
             <a:extLst>
               <a:ext uri="{91240B29-F687-4f45-9708-019B960494DF}">
-                <a14:hiddenLine xmlns:a14="http://schemas.microsoft.com/office/drawing/2010/main" xmlns="" w="9525">
+                <a14:hiddenLine xmlns="" xmlns:a14="http://schemas.microsoft.com/office/drawing/2010/main" w="9525">
                   <a:solidFill>
                     <a:srgbClr val="000000"/>
                   </a:solidFill>
@@ -3813,7 +3813,7 @@
             </a:ln>
             <a:extLst>
               <a:ext uri="{91240B29-F687-4f45-9708-019B960494DF}">
-                <a14:hiddenLine xmlns:a14="http://schemas.microsoft.com/office/drawing/2010/main" xmlns="" w="9525">
+                <a14:hiddenLine xmlns="" xmlns:a14="http://schemas.microsoft.com/office/drawing/2010/main" w="9525">
                   <a:solidFill>
                     <a:srgbClr val="000000"/>
                   </a:solidFill>
@@ -3875,7 +3875,7 @@
             </a:ln>
             <a:extLst>
               <a:ext uri="{91240B29-F687-4f45-9708-019B960494DF}">
-                <a14:hiddenLine xmlns:a14="http://schemas.microsoft.com/office/drawing/2010/main" xmlns="" w="9525">
+                <a14:hiddenLine xmlns="" xmlns:a14="http://schemas.microsoft.com/office/drawing/2010/main" w="9525">
                   <a:solidFill>
                     <a:srgbClr val="000000"/>
                   </a:solidFill>
@@ -3965,7 +3965,7 @@
             </a:ln>
             <a:extLst>
               <a:ext uri="{91240B29-F687-4f45-9708-019B960494DF}">
-                <a14:hiddenLine xmlns:a14="http://schemas.microsoft.com/office/drawing/2010/main" xmlns="" w="9525">
+                <a14:hiddenLine xmlns="" xmlns:a14="http://schemas.microsoft.com/office/drawing/2010/main" w="9525">
                   <a:solidFill>
                     <a:srgbClr val="000000"/>
                   </a:solidFill>
@@ -4055,7 +4055,7 @@
             </a:ln>
             <a:extLst>
               <a:ext uri="{91240B29-F687-4f45-9708-019B960494DF}">
-                <a14:hiddenLine xmlns:a14="http://schemas.microsoft.com/office/drawing/2010/main" xmlns="" w="9525">
+                <a14:hiddenLine xmlns="" xmlns:a14="http://schemas.microsoft.com/office/drawing/2010/main" w="9525">
                   <a:solidFill>
                     <a:srgbClr val="000000"/>
                   </a:solidFill>
@@ -4117,7 +4117,7 @@
             </a:ln>
             <a:extLst>
               <a:ext uri="{91240B29-F687-4f45-9708-019B960494DF}">
-                <a14:hiddenLine xmlns:a14="http://schemas.microsoft.com/office/drawing/2010/main" xmlns="" w="9525">
+                <a14:hiddenLine xmlns="" xmlns:a14="http://schemas.microsoft.com/office/drawing/2010/main" w="9525">
                   <a:solidFill>
                     <a:srgbClr val="000000"/>
                   </a:solidFill>
@@ -4227,7 +4227,7 @@
             </a:ln>
             <a:extLst>
               <a:ext uri="{91240B29-F687-4f45-9708-019B960494DF}">
-                <a14:hiddenLine xmlns:a14="http://schemas.microsoft.com/office/drawing/2010/main" xmlns="" w="9525">
+                <a14:hiddenLine xmlns="" xmlns:a14="http://schemas.microsoft.com/office/drawing/2010/main" w="9525">
                   <a:solidFill>
                     <a:srgbClr val="000000"/>
                   </a:solidFill>
@@ -4289,7 +4289,7 @@
             </a:ln>
             <a:extLst>
               <a:ext uri="{91240B29-F687-4f45-9708-019B960494DF}">
-                <a14:hiddenLine xmlns:a14="http://schemas.microsoft.com/office/drawing/2010/main" xmlns="" w="9525">
+                <a14:hiddenLine xmlns="" xmlns:a14="http://schemas.microsoft.com/office/drawing/2010/main" w="9525">
                   <a:solidFill>
                     <a:srgbClr val="000000"/>
                   </a:solidFill>
@@ -4379,7 +4379,7 @@
             </a:ln>
             <a:extLst>
               <a:ext uri="{91240B29-F687-4f45-9708-019B960494DF}">
-                <a14:hiddenLine xmlns:a14="http://schemas.microsoft.com/office/drawing/2010/main" xmlns="" w="9525">
+                <a14:hiddenLine xmlns="" xmlns:a14="http://schemas.microsoft.com/office/drawing/2010/main" w="9525">
                   <a:solidFill>
                     <a:srgbClr val="000000"/>
                   </a:solidFill>
@@ -4469,7 +4469,7 @@
             </a:ln>
             <a:extLst>
               <a:ext uri="{91240B29-F687-4f45-9708-019B960494DF}">
-                <a14:hiddenLine xmlns:a14="http://schemas.microsoft.com/office/drawing/2010/main" xmlns="" w="9525">
+                <a14:hiddenLine xmlns="" xmlns:a14="http://schemas.microsoft.com/office/drawing/2010/main" w="9525">
                   <a:solidFill>
                     <a:srgbClr val="000000"/>
                   </a:solidFill>
@@ -4531,7 +4531,7 @@
             </a:ln>
             <a:extLst>
               <a:ext uri="{91240B29-F687-4f45-9708-019B960494DF}">
-                <a14:hiddenLine xmlns:a14="http://schemas.microsoft.com/office/drawing/2010/main" xmlns="" w="9525">
+                <a14:hiddenLine xmlns="" xmlns:a14="http://schemas.microsoft.com/office/drawing/2010/main" w="9525">
                   <a:solidFill>
                     <a:srgbClr val="000000"/>
                   </a:solidFill>
@@ -4621,7 +4621,7 @@
             </a:ln>
             <a:extLst>
               <a:ext uri="{91240B29-F687-4f45-9708-019B960494DF}">
-                <a14:hiddenLine xmlns:a14="http://schemas.microsoft.com/office/drawing/2010/main" xmlns="" w="9525">
+                <a14:hiddenLine xmlns="" xmlns:a14="http://schemas.microsoft.com/office/drawing/2010/main" w="9525">
                   <a:solidFill>
                     <a:srgbClr val="000000"/>
                   </a:solidFill>
@@ -4711,7 +4711,7 @@
             </a:ln>
             <a:extLst>
               <a:ext uri="{91240B29-F687-4f45-9708-019B960494DF}">
-                <a14:hiddenLine xmlns:a14="http://schemas.microsoft.com/office/drawing/2010/main" xmlns="" w="9525">
+                <a14:hiddenLine xmlns="" xmlns:a14="http://schemas.microsoft.com/office/drawing/2010/main" w="9525">
                   <a:solidFill>
                     <a:srgbClr val="000000"/>
                   </a:solidFill>
@@ -4767,7 +4767,7 @@
             </a:ln>
             <a:extLst>
               <a:ext uri="{91240B29-F687-4f45-9708-019B960494DF}">
-                <a14:hiddenLine xmlns:a14="http://schemas.microsoft.com/office/drawing/2010/main" xmlns="" w="9525">
+                <a14:hiddenLine xmlns="" xmlns:a14="http://schemas.microsoft.com/office/drawing/2010/main" w="9525">
                   <a:solidFill>
                     <a:srgbClr val="000000"/>
                   </a:solidFill>
@@ -4857,7 +4857,7 @@
             </a:ln>
             <a:extLst>
               <a:ext uri="{91240B29-F687-4f45-9708-019B960494DF}">
-                <a14:hiddenLine xmlns:a14="http://schemas.microsoft.com/office/drawing/2010/main" xmlns="" w="9525">
+                <a14:hiddenLine xmlns="" xmlns:a14="http://schemas.microsoft.com/office/drawing/2010/main" w="9525">
                   <a:solidFill>
                     <a:srgbClr val="000000"/>
                   </a:solidFill>
@@ -4913,7 +4913,7 @@
             </a:ln>
             <a:extLst>
               <a:ext uri="{91240B29-F687-4f45-9708-019B960494DF}">
-                <a14:hiddenLine xmlns:a14="http://schemas.microsoft.com/office/drawing/2010/main" xmlns="" w="9525">
+                <a14:hiddenLine xmlns="" xmlns:a14="http://schemas.microsoft.com/office/drawing/2010/main" w="9525">
                   <a:solidFill>
                     <a:srgbClr val="000000"/>
                   </a:solidFill>
@@ -5003,7 +5003,7 @@
             </a:ln>
             <a:extLst>
               <a:ext uri="{91240B29-F687-4f45-9708-019B960494DF}">
-                <a14:hiddenLine xmlns:a14="http://schemas.microsoft.com/office/drawing/2010/main" xmlns="" w="9525">
+                <a14:hiddenLine xmlns="" xmlns:a14="http://schemas.microsoft.com/office/drawing/2010/main" w="9525">
                   <a:solidFill>
                     <a:srgbClr val="000000"/>
                   </a:solidFill>
@@ -5071,7 +5071,7 @@
             </a:ln>
             <a:extLst>
               <a:ext uri="{91240B29-F687-4f45-9708-019B960494DF}">
-                <a14:hiddenLine xmlns:a14="http://schemas.microsoft.com/office/drawing/2010/main" xmlns="" w="9525">
+                <a14:hiddenLine xmlns="" xmlns:a14="http://schemas.microsoft.com/office/drawing/2010/main" w="9525">
                   <a:solidFill>
                     <a:srgbClr val="000000"/>
                   </a:solidFill>
@@ -5161,7 +5161,7 @@
             </a:ln>
             <a:extLst>
               <a:ext uri="{91240B29-F687-4f45-9708-019B960494DF}">
-                <a14:hiddenLine xmlns:a14="http://schemas.microsoft.com/office/drawing/2010/main" xmlns="" w="9525">
+                <a14:hiddenLine xmlns="" xmlns:a14="http://schemas.microsoft.com/office/drawing/2010/main" w="9525">
                   <a:solidFill>
                     <a:srgbClr val="000000"/>
                   </a:solidFill>
@@ -5229,7 +5229,7 @@
             </a:ln>
             <a:extLst>
               <a:ext uri="{91240B29-F687-4f45-9708-019B960494DF}">
-                <a14:hiddenLine xmlns:a14="http://schemas.microsoft.com/office/drawing/2010/main" xmlns="" w="9525">
+                <a14:hiddenLine xmlns="" xmlns:a14="http://schemas.microsoft.com/office/drawing/2010/main" w="9525">
                   <a:solidFill>
                     <a:srgbClr val="000000"/>
                   </a:solidFill>
@@ -5319,7 +5319,7 @@
             </a:ln>
             <a:extLst>
               <a:ext uri="{91240B29-F687-4f45-9708-019B960494DF}">
-                <a14:hiddenLine xmlns:a14="http://schemas.microsoft.com/office/drawing/2010/main" xmlns="" w="9525">
+                <a14:hiddenLine xmlns="" xmlns:a14="http://schemas.microsoft.com/office/drawing/2010/main" w="9525">
                   <a:solidFill>
                     <a:srgbClr val="000000"/>
                   </a:solidFill>
@@ -5353,7 +5353,7 @@
             </a:ln>
             <a:extLst>
               <a:ext uri="{91240B29-F687-4f45-9708-019B960494DF}">
-                <a14:hiddenLine xmlns:a14="http://schemas.microsoft.com/office/drawing/2010/main" xmlns="" w="9525">
+                <a14:hiddenLine xmlns="" xmlns:a14="http://schemas.microsoft.com/office/drawing/2010/main" w="9525">
                   <a:solidFill>
                     <a:srgbClr val="000000"/>
                   </a:solidFill>
@@ -5443,7 +5443,7 @@
             </a:ln>
             <a:extLst>
               <a:ext uri="{91240B29-F687-4f45-9708-019B960494DF}">
-                <a14:hiddenLine xmlns:a14="http://schemas.microsoft.com/office/drawing/2010/main" xmlns="" w="9525">
+                <a14:hiddenLine xmlns="" xmlns:a14="http://schemas.microsoft.com/office/drawing/2010/main" w="9525">
                   <a:solidFill>
                     <a:srgbClr val="000000"/>
                   </a:solidFill>
@@ -5505,7 +5505,7 @@
             </a:ln>
             <a:extLst>
               <a:ext uri="{91240B29-F687-4f45-9708-019B960494DF}">
-                <a14:hiddenLine xmlns:a14="http://schemas.microsoft.com/office/drawing/2010/main" xmlns="" w="9525">
+                <a14:hiddenLine xmlns="" xmlns:a14="http://schemas.microsoft.com/office/drawing/2010/main" w="9525">
                   <a:solidFill>
                     <a:srgbClr val="000000"/>
                   </a:solidFill>
@@ -5567,7 +5567,7 @@
             </a:ln>
             <a:extLst>
               <a:ext uri="{91240B29-F687-4f45-9708-019B960494DF}">
-                <a14:hiddenLine xmlns:a14="http://schemas.microsoft.com/office/drawing/2010/main" xmlns="" w="9525">
+                <a14:hiddenLine xmlns="" xmlns:a14="http://schemas.microsoft.com/office/drawing/2010/main" w="9525">
                   <a:solidFill>
                     <a:srgbClr val="000000"/>
                   </a:solidFill>
@@ -5657,7 +5657,7 @@
             </a:ln>
             <a:extLst>
               <a:ext uri="{91240B29-F687-4f45-9708-019B960494DF}">
-                <a14:hiddenLine xmlns:a14="http://schemas.microsoft.com/office/drawing/2010/main" xmlns="" w="9525">
+                <a14:hiddenLine xmlns="" xmlns:a14="http://schemas.microsoft.com/office/drawing/2010/main" w="9525">
                   <a:solidFill>
                     <a:srgbClr val="000000"/>
                   </a:solidFill>
@@ -5725,7 +5725,7 @@
             </a:ln>
             <a:extLst>
               <a:ext uri="{91240B29-F687-4f45-9708-019B960494DF}">
-                <a14:hiddenLine xmlns:a14="http://schemas.microsoft.com/office/drawing/2010/main" xmlns="" w="9525">
+                <a14:hiddenLine xmlns="" xmlns:a14="http://schemas.microsoft.com/office/drawing/2010/main" w="9525">
                   <a:solidFill>
                     <a:srgbClr val="000000"/>
                   </a:solidFill>
@@ -5787,7 +5787,7 @@
             </a:ln>
             <a:extLst>
               <a:ext uri="{91240B29-F687-4f45-9708-019B960494DF}">
-                <a14:hiddenLine xmlns:a14="http://schemas.microsoft.com/office/drawing/2010/main" xmlns="" w="9525">
+                <a14:hiddenLine xmlns="" xmlns:a14="http://schemas.microsoft.com/office/drawing/2010/main" w="9525">
                   <a:solidFill>
                     <a:srgbClr val="000000"/>
                   </a:solidFill>
@@ -5877,7 +5877,7 @@
             </a:ln>
             <a:extLst>
               <a:ext uri="{91240B29-F687-4f45-9708-019B960494DF}">
-                <a14:hiddenLine xmlns:a14="http://schemas.microsoft.com/office/drawing/2010/main" xmlns="" w="9525">
+                <a14:hiddenLine xmlns="" xmlns:a14="http://schemas.microsoft.com/office/drawing/2010/main" w="9525">
                   <a:solidFill>
                     <a:srgbClr val="000000"/>
                   </a:solidFill>
@@ -5939,7 +5939,7 @@
             </a:ln>
             <a:extLst>
               <a:ext uri="{91240B29-F687-4f45-9708-019B960494DF}">
-                <a14:hiddenLine xmlns:a14="http://schemas.microsoft.com/office/drawing/2010/main" xmlns="" w="9525">
+                <a14:hiddenLine xmlns="" xmlns:a14="http://schemas.microsoft.com/office/drawing/2010/main" w="9525">
                   <a:solidFill>
                     <a:srgbClr val="000000"/>
                   </a:solidFill>
@@ -6029,7 +6029,7 @@
             </a:ln>
             <a:extLst>
               <a:ext uri="{91240B29-F687-4f45-9708-019B960494DF}">
-                <a14:hiddenLine xmlns:a14="http://schemas.microsoft.com/office/drawing/2010/main" xmlns="" w="9525">
+                <a14:hiddenLine xmlns="" xmlns:a14="http://schemas.microsoft.com/office/drawing/2010/main" w="9525">
                   <a:solidFill>
                     <a:srgbClr val="000000"/>
                   </a:solidFill>
@@ -6091,7 +6091,7 @@
             </a:ln>
             <a:extLst>
               <a:ext uri="{91240B29-F687-4f45-9708-019B960494DF}">
-                <a14:hiddenLine xmlns:a14="http://schemas.microsoft.com/office/drawing/2010/main" xmlns="" w="9525">
+                <a14:hiddenLine xmlns="" xmlns:a14="http://schemas.microsoft.com/office/drawing/2010/main" w="9525">
                   <a:solidFill>
                     <a:srgbClr val="000000"/>
                   </a:solidFill>
@@ -6181,7 +6181,7 @@
             </a:ln>
             <a:extLst>
               <a:ext uri="{91240B29-F687-4f45-9708-019B960494DF}">
-                <a14:hiddenLine xmlns:a14="http://schemas.microsoft.com/office/drawing/2010/main" xmlns="" w="9525">
+                <a14:hiddenLine xmlns="" xmlns:a14="http://schemas.microsoft.com/office/drawing/2010/main" w="9525">
                   <a:solidFill>
                     <a:srgbClr val="000000"/>
                   </a:solidFill>
@@ -6215,7 +6215,7 @@
             </a:ln>
             <a:extLst>
               <a:ext uri="{91240B29-F687-4f45-9708-019B960494DF}">
-                <a14:hiddenLine xmlns:a14="http://schemas.microsoft.com/office/drawing/2010/main" xmlns="" w="9525">
+                <a14:hiddenLine xmlns="" xmlns:a14="http://schemas.microsoft.com/office/drawing/2010/main" w="9525">
                   <a:solidFill>
                     <a:srgbClr val="000000"/>
                   </a:solidFill>
@@ -6280,7 +6280,7 @@
             </a:ln>
             <a:extLst>
               <a:ext uri="{91240B29-F687-4f45-9708-019B960494DF}">
-                <a14:hiddenLine xmlns:a14="http://schemas.microsoft.com/office/drawing/2010/main" xmlns="" w="9525">
+                <a14:hiddenLine xmlns="" xmlns:a14="http://schemas.microsoft.com/office/drawing/2010/main" w="9525">
                   <a:solidFill>
                     <a:srgbClr val="000000"/>
                   </a:solidFill>
@@ -6370,7 +6370,7 @@
             </a:ln>
             <a:extLst>
               <a:ext uri="{91240B29-F687-4f45-9708-019B960494DF}">
-                <a14:hiddenLine xmlns:a14="http://schemas.microsoft.com/office/drawing/2010/main" xmlns="" w="9525">
+                <a14:hiddenLine xmlns="" xmlns:a14="http://schemas.microsoft.com/office/drawing/2010/main" w="9525">
                   <a:solidFill>
                     <a:srgbClr val="000000"/>
                   </a:solidFill>
@@ -6432,7 +6432,7 @@
             </a:ln>
             <a:extLst>
               <a:ext uri="{91240B29-F687-4f45-9708-019B960494DF}">
-                <a14:hiddenLine xmlns:a14="http://schemas.microsoft.com/office/drawing/2010/main" xmlns="" w="9525">
+                <a14:hiddenLine xmlns="" xmlns:a14="http://schemas.microsoft.com/office/drawing/2010/main" w="9525">
                   <a:solidFill>
                     <a:srgbClr val="000000"/>
                   </a:solidFill>
@@ -6522,7 +6522,7 @@
             </a:ln>
             <a:extLst>
               <a:ext uri="{91240B29-F687-4f45-9708-019B960494DF}">
-                <a14:hiddenLine xmlns:a14="http://schemas.microsoft.com/office/drawing/2010/main" xmlns="" w="9525">
+                <a14:hiddenLine xmlns="" xmlns:a14="http://schemas.microsoft.com/office/drawing/2010/main" w="9525">
                   <a:solidFill>
                     <a:srgbClr val="000000"/>
                   </a:solidFill>
@@ -6612,7 +6612,7 @@
             </a:ln>
             <a:extLst>
               <a:ext uri="{91240B29-F687-4f45-9708-019B960494DF}">
-                <a14:hiddenLine xmlns:a14="http://schemas.microsoft.com/office/drawing/2010/main" xmlns="" w="9525">
+                <a14:hiddenLine xmlns="" xmlns:a14="http://schemas.microsoft.com/office/drawing/2010/main" w="9525">
                   <a:solidFill>
                     <a:srgbClr val="000000"/>
                   </a:solidFill>
@@ -6677,7 +6677,7 @@
             </a:ln>
             <a:extLst>
               <a:ext uri="{91240B29-F687-4f45-9708-019B960494DF}">
-                <a14:hiddenLine xmlns:a14="http://schemas.microsoft.com/office/drawing/2010/main" xmlns="" w="9525">
+                <a14:hiddenLine xmlns="" xmlns:a14="http://schemas.microsoft.com/office/drawing/2010/main" w="9525">
                   <a:solidFill>
                     <a:srgbClr val="000000"/>
                   </a:solidFill>
@@ -6739,7 +6739,7 @@
             </a:ln>
             <a:extLst>
               <a:ext uri="{91240B29-F687-4f45-9708-019B960494DF}">
-                <a14:hiddenLine xmlns:a14="http://schemas.microsoft.com/office/drawing/2010/main" xmlns="" w="9525">
+                <a14:hiddenLine xmlns="" xmlns:a14="http://schemas.microsoft.com/office/drawing/2010/main" w="9525">
                   <a:solidFill>
                     <a:srgbClr val="000000"/>
                   </a:solidFill>
@@ -6829,7 +6829,7 @@
             </a:ln>
             <a:extLst>
               <a:ext uri="{91240B29-F687-4f45-9708-019B960494DF}">
-                <a14:hiddenLine xmlns:a14="http://schemas.microsoft.com/office/drawing/2010/main" xmlns="" w="9525">
+                <a14:hiddenLine xmlns="" xmlns:a14="http://schemas.microsoft.com/office/drawing/2010/main" w="9525">
                   <a:solidFill>
                     <a:srgbClr val="000000"/>
                   </a:solidFill>
@@ -6919,7 +6919,7 @@
             </a:ln>
             <a:extLst>
               <a:ext uri="{91240B29-F687-4f45-9708-019B960494DF}">
-                <a14:hiddenLine xmlns:a14="http://schemas.microsoft.com/office/drawing/2010/main" xmlns="" w="9525">
+                <a14:hiddenLine xmlns="" xmlns:a14="http://schemas.microsoft.com/office/drawing/2010/main" w="9525">
                   <a:solidFill>
                     <a:srgbClr val="000000"/>
                   </a:solidFill>
@@ -6981,7 +6981,7 @@
             </a:ln>
             <a:extLst>
               <a:ext uri="{91240B29-F687-4f45-9708-019B960494DF}">
-                <a14:hiddenLine xmlns:a14="http://schemas.microsoft.com/office/drawing/2010/main" xmlns="" w="9525">
+                <a14:hiddenLine xmlns="" xmlns:a14="http://schemas.microsoft.com/office/drawing/2010/main" w="9525">
                   <a:solidFill>
                     <a:srgbClr val="000000"/>
                   </a:solidFill>
@@ -7101,7 +7101,7 @@
             </a:ln>
             <a:extLst>
               <a:ext uri="{91240B29-F687-4f45-9708-019B960494DF}">
-                <a14:hiddenLine xmlns:a14="http://schemas.microsoft.com/office/drawing/2010/main" xmlns="" w="9525">
+                <a14:hiddenLine xmlns="" xmlns:a14="http://schemas.microsoft.com/office/drawing/2010/main" w="9525">
                   <a:solidFill>
                     <a:srgbClr val="000000"/>
                   </a:solidFill>
@@ -7169,7 +7169,7 @@
             </a:ln>
             <a:extLst>
               <a:ext uri="{91240B29-F687-4f45-9708-019B960494DF}">
-                <a14:hiddenLine xmlns:a14="http://schemas.microsoft.com/office/drawing/2010/main" xmlns="" w="9525">
+                <a14:hiddenLine xmlns="" xmlns:a14="http://schemas.microsoft.com/office/drawing/2010/main" w="9525">
                   <a:solidFill>
                     <a:srgbClr val="000000"/>
                   </a:solidFill>
@@ -7259,7 +7259,7 @@
             </a:ln>
             <a:extLst>
               <a:ext uri="{91240B29-F687-4f45-9708-019B960494DF}">
-                <a14:hiddenLine xmlns:a14="http://schemas.microsoft.com/office/drawing/2010/main" xmlns="" w="9525">
+                <a14:hiddenLine xmlns="" xmlns:a14="http://schemas.microsoft.com/office/drawing/2010/main" w="9525">
                   <a:solidFill>
                     <a:srgbClr val="000000"/>
                   </a:solidFill>
@@ -7399,7 +7399,7 @@
           <a:p>
             <a:fld id="{D0D65A25-5B34-480B-8A82-D452FDC7444D}" type="datetimeFigureOut">
               <a:rPr lang="es-ES" smtClean="0"/>
-              <a:t>01/02/2022</a:t>
+              <a:t>16/02/2022</a:t>
             </a:fld>
             <a:endParaRPr lang="es-ES" dirty="0"/>
           </a:p>
@@ -7665,7 +7665,7 @@
           <a:p>
             <a:fld id="{D0D65A25-5B34-480B-8A82-D452FDC7444D}" type="datetimeFigureOut">
               <a:rPr lang="es-ES" smtClean="0"/>
-              <a:t>01/02/2022</a:t>
+              <a:t>16/02/2022</a:t>
             </a:fld>
             <a:endParaRPr lang="es-ES" dirty="0"/>
           </a:p>
@@ -7861,7 +7861,7 @@
           <a:p>
             <a:fld id="{D0D65A25-5B34-480B-8A82-D452FDC7444D}" type="datetimeFigureOut">
               <a:rPr lang="es-ES" smtClean="0"/>
-              <a:t>01/02/2022</a:t>
+              <a:t>16/02/2022</a:t>
             </a:fld>
             <a:endParaRPr lang="es-ES" dirty="0"/>
           </a:p>
@@ -8124,7 +8124,7 @@
           <a:p>
             <a:fld id="{D0D65A25-5B34-480B-8A82-D452FDC7444D}" type="datetimeFigureOut">
               <a:rPr lang="es-ES" smtClean="0"/>
-              <a:t>01/02/2022</a:t>
+              <a:t>16/02/2022</a:t>
             </a:fld>
             <a:endParaRPr lang="es-ES" dirty="0"/>
           </a:p>
@@ -8558,7 +8558,7 @@
           <a:p>
             <a:fld id="{D0D65A25-5B34-480B-8A82-D452FDC7444D}" type="datetimeFigureOut">
               <a:rPr lang="es-ES" smtClean="0"/>
-              <a:t>01/02/2022</a:t>
+              <a:t>16/02/2022</a:t>
             </a:fld>
             <a:endParaRPr lang="es-ES" dirty="0"/>
           </a:p>
@@ -9104,7 +9104,7 @@
           <a:p>
             <a:fld id="{D0D65A25-5B34-480B-8A82-D452FDC7444D}" type="datetimeFigureOut">
               <a:rPr lang="es-ES" smtClean="0"/>
-              <a:t>01/02/2022</a:t>
+              <a:t>16/02/2022</a:t>
             </a:fld>
             <a:endParaRPr lang="es-ES" dirty="0"/>
           </a:p>
@@ -9821,7 +9821,7 @@
           <a:p>
             <a:fld id="{D0D65A25-5B34-480B-8A82-D452FDC7444D}" type="datetimeFigureOut">
               <a:rPr lang="es-ES" smtClean="0"/>
-              <a:t>01/02/2022</a:t>
+              <a:t>16/02/2022</a:t>
             </a:fld>
             <a:endParaRPr lang="es-ES" dirty="0"/>
           </a:p>
@@ -9991,7 +9991,7 @@
           <a:p>
             <a:fld id="{D0D65A25-5B34-480B-8A82-D452FDC7444D}" type="datetimeFigureOut">
               <a:rPr lang="es-ES" smtClean="0"/>
-              <a:t>01/02/2022</a:t>
+              <a:t>16/02/2022</a:t>
             </a:fld>
             <a:endParaRPr lang="es-ES" dirty="0"/>
           </a:p>
@@ -10171,7 +10171,7 @@
           <a:p>
             <a:fld id="{D0D65A25-5B34-480B-8A82-D452FDC7444D}" type="datetimeFigureOut">
               <a:rPr lang="es-ES" smtClean="0"/>
-              <a:t>01/02/2022</a:t>
+              <a:t>16/02/2022</a:t>
             </a:fld>
             <a:endParaRPr lang="es-ES" dirty="0"/>
           </a:p>
@@ -10341,7 +10341,7 @@
           <a:p>
             <a:fld id="{D0D65A25-5B34-480B-8A82-D452FDC7444D}" type="datetimeFigureOut">
               <a:rPr lang="es-ES" smtClean="0"/>
-              <a:t>01/02/2022</a:t>
+              <a:t>16/02/2022</a:t>
             </a:fld>
             <a:endParaRPr lang="es-ES" dirty="0"/>
           </a:p>
@@ -10591,7 +10591,7 @@
           <a:p>
             <a:fld id="{D0D65A25-5B34-480B-8A82-D452FDC7444D}" type="datetimeFigureOut">
               <a:rPr lang="es-ES" smtClean="0"/>
-              <a:t>01/02/2022</a:t>
+              <a:t>16/02/2022</a:t>
             </a:fld>
             <a:endParaRPr lang="es-ES" dirty="0"/>
           </a:p>
@@ -10823,7 +10823,7 @@
           <a:p>
             <a:fld id="{D0D65A25-5B34-480B-8A82-D452FDC7444D}" type="datetimeFigureOut">
               <a:rPr lang="es-ES" smtClean="0"/>
-              <a:t>01/02/2022</a:t>
+              <a:t>16/02/2022</a:t>
             </a:fld>
             <a:endParaRPr lang="es-ES" dirty="0"/>
           </a:p>
@@ -11204,7 +11204,7 @@
           <a:p>
             <a:fld id="{D0D65A25-5B34-480B-8A82-D452FDC7444D}" type="datetimeFigureOut">
               <a:rPr lang="es-ES" smtClean="0"/>
-              <a:t>01/02/2022</a:t>
+              <a:t>16/02/2022</a:t>
             </a:fld>
             <a:endParaRPr lang="es-ES" dirty="0"/>
           </a:p>
@@ -11322,7 +11322,7 @@
           <a:p>
             <a:fld id="{D0D65A25-5B34-480B-8A82-D452FDC7444D}" type="datetimeFigureOut">
               <a:rPr lang="es-ES" smtClean="0"/>
-              <a:t>01/02/2022</a:t>
+              <a:t>16/02/2022</a:t>
             </a:fld>
             <a:endParaRPr lang="es-ES" dirty="0"/>
           </a:p>
@@ -11417,7 +11417,7 @@
           <a:p>
             <a:fld id="{D0D65A25-5B34-480B-8A82-D452FDC7444D}" type="datetimeFigureOut">
               <a:rPr lang="es-ES" smtClean="0"/>
-              <a:t>01/02/2022</a:t>
+              <a:t>16/02/2022</a:t>
             </a:fld>
             <a:endParaRPr lang="es-ES" dirty="0"/>
           </a:p>
@@ -11666,7 +11666,7 @@
           <a:p>
             <a:fld id="{D0D65A25-5B34-480B-8A82-D452FDC7444D}" type="datetimeFigureOut">
               <a:rPr lang="es-ES" smtClean="0"/>
-              <a:t>01/02/2022</a:t>
+              <a:t>16/02/2022</a:t>
             </a:fld>
             <a:endParaRPr lang="es-ES" dirty="0"/>
           </a:p>
@@ -11945,7 +11945,7 @@
           <a:p>
             <a:fld id="{D0D65A25-5B34-480B-8A82-D452FDC7444D}" type="datetimeFigureOut">
               <a:rPr lang="es-ES" smtClean="0"/>
-              <a:t>01/02/2022</a:t>
+              <a:t>16/02/2022</a:t>
             </a:fld>
             <a:endParaRPr lang="es-ES" dirty="0"/>
           </a:p>
@@ -12061,7 +12061,7 @@
           <a:noFill/>
           <a:extLst>
             <a:ext uri="{909E8E84-426E-40dd-AFC4-6F175D3DCCD1}">
-              <a14:hiddenFill xmlns:a14="http://schemas.microsoft.com/office/drawing/2010/main" xmlns="">
+              <a14:hiddenFill xmlns="" xmlns:a14="http://schemas.microsoft.com/office/drawing/2010/main">
                 <a:solidFill>
                   <a:srgbClr val="FFFFFF"/>
                 </a:solidFill>
@@ -12135,7 +12135,7 @@
               </a:ln>
               <a:extLst>
                 <a:ext uri="{91240B29-F687-4f45-9708-019B960494DF}">
-                  <a14:hiddenLine xmlns:a14="http://schemas.microsoft.com/office/drawing/2010/main" xmlns="" w="9525">
+                  <a14:hiddenLine xmlns="" xmlns:a14="http://schemas.microsoft.com/office/drawing/2010/main" w="9525">
                     <a:solidFill>
                       <a:srgbClr val="000000"/>
                     </a:solidFill>
@@ -12225,7 +12225,7 @@
               </a:ln>
               <a:extLst>
                 <a:ext uri="{91240B29-F687-4f45-9708-019B960494DF}">
-                  <a14:hiddenLine xmlns:a14="http://schemas.microsoft.com/office/drawing/2010/main" xmlns="" w="9525">
+                  <a14:hiddenLine xmlns="" xmlns:a14="http://schemas.microsoft.com/office/drawing/2010/main" w="9525">
                     <a:solidFill>
                       <a:srgbClr val="000000"/>
                     </a:solidFill>
@@ -12315,7 +12315,7 @@
               </a:ln>
               <a:extLst>
                 <a:ext uri="{91240B29-F687-4f45-9708-019B960494DF}">
-                  <a14:hiddenLine xmlns:a14="http://schemas.microsoft.com/office/drawing/2010/main" xmlns="" w="9525">
+                  <a14:hiddenLine xmlns="" xmlns:a14="http://schemas.microsoft.com/office/drawing/2010/main" w="9525">
                     <a:solidFill>
                       <a:srgbClr val="000000"/>
                     </a:solidFill>
@@ -12377,7 +12377,7 @@
               </a:ln>
               <a:extLst>
                 <a:ext uri="{91240B29-F687-4f45-9708-019B960494DF}">
-                  <a14:hiddenLine xmlns:a14="http://schemas.microsoft.com/office/drawing/2010/main" xmlns="" w="9525">
+                  <a14:hiddenLine xmlns="" xmlns:a14="http://schemas.microsoft.com/office/drawing/2010/main" w="9525">
                     <a:solidFill>
                       <a:srgbClr val="000000"/>
                     </a:solidFill>
@@ -12467,7 +12467,7 @@
               </a:ln>
               <a:extLst>
                 <a:ext uri="{91240B29-F687-4f45-9708-019B960494DF}">
-                  <a14:hiddenLine xmlns:a14="http://schemas.microsoft.com/office/drawing/2010/main" xmlns="" w="9525">
+                  <a14:hiddenLine xmlns="" xmlns:a14="http://schemas.microsoft.com/office/drawing/2010/main" w="9525">
                     <a:solidFill>
                       <a:srgbClr val="000000"/>
                     </a:solidFill>
@@ -12529,7 +12529,7 @@
               </a:ln>
               <a:extLst>
                 <a:ext uri="{91240B29-F687-4f45-9708-019B960494DF}">
-                  <a14:hiddenLine xmlns:a14="http://schemas.microsoft.com/office/drawing/2010/main" xmlns="" w="9525">
+                  <a14:hiddenLine xmlns="" xmlns:a14="http://schemas.microsoft.com/office/drawing/2010/main" w="9525">
                     <a:solidFill>
                       <a:srgbClr val="000000"/>
                     </a:solidFill>
@@ -12591,7 +12591,7 @@
               </a:ln>
               <a:extLst>
                 <a:ext uri="{91240B29-F687-4f45-9708-019B960494DF}">
-                  <a14:hiddenLine xmlns:a14="http://schemas.microsoft.com/office/drawing/2010/main" xmlns="" w="9525">
+                  <a14:hiddenLine xmlns="" xmlns:a14="http://schemas.microsoft.com/office/drawing/2010/main" w="9525">
                     <a:solidFill>
                       <a:srgbClr val="000000"/>
                     </a:solidFill>
@@ -12681,7 +12681,7 @@
               </a:ln>
               <a:extLst>
                 <a:ext uri="{91240B29-F687-4f45-9708-019B960494DF}">
-                  <a14:hiddenLine xmlns:a14="http://schemas.microsoft.com/office/drawing/2010/main" xmlns="" w="9525">
+                  <a14:hiddenLine xmlns="" xmlns:a14="http://schemas.microsoft.com/office/drawing/2010/main" w="9525">
                     <a:solidFill>
                       <a:srgbClr val="000000"/>
                     </a:solidFill>
@@ -12771,7 +12771,7 @@
               </a:ln>
               <a:extLst>
                 <a:ext uri="{91240B29-F687-4f45-9708-019B960494DF}">
-                  <a14:hiddenLine xmlns:a14="http://schemas.microsoft.com/office/drawing/2010/main" xmlns="" w="9525">
+                  <a14:hiddenLine xmlns="" xmlns:a14="http://schemas.microsoft.com/office/drawing/2010/main" w="9525">
                     <a:solidFill>
                       <a:srgbClr val="000000"/>
                     </a:solidFill>
@@ -12833,7 +12833,7 @@
               </a:ln>
               <a:extLst>
                 <a:ext uri="{91240B29-F687-4f45-9708-019B960494DF}">
-                  <a14:hiddenLine xmlns:a14="http://schemas.microsoft.com/office/drawing/2010/main" xmlns="" w="9525">
+                  <a14:hiddenLine xmlns="" xmlns:a14="http://schemas.microsoft.com/office/drawing/2010/main" w="9525">
                     <a:solidFill>
                       <a:srgbClr val="000000"/>
                     </a:solidFill>
@@ -12943,7 +12943,7 @@
               </a:ln>
               <a:extLst>
                 <a:ext uri="{91240B29-F687-4f45-9708-019B960494DF}">
-                  <a14:hiddenLine xmlns:a14="http://schemas.microsoft.com/office/drawing/2010/main" xmlns="" w="9525">
+                  <a14:hiddenLine xmlns="" xmlns:a14="http://schemas.microsoft.com/office/drawing/2010/main" w="9525">
                     <a:solidFill>
                       <a:srgbClr val="000000"/>
                     </a:solidFill>
@@ -13027,7 +13027,7 @@
               </a:ln>
               <a:extLst>
                 <a:ext uri="{91240B29-F687-4f45-9708-019B960494DF}">
-                  <a14:hiddenLine xmlns:a14="http://schemas.microsoft.com/office/drawing/2010/main" xmlns="" w="9525">
+                  <a14:hiddenLine xmlns="" xmlns:a14="http://schemas.microsoft.com/office/drawing/2010/main" w="9525">
                     <a:solidFill>
                       <a:srgbClr val="000000"/>
                     </a:solidFill>
@@ -13089,7 +13089,7 @@
               </a:ln>
               <a:extLst>
                 <a:ext uri="{91240B29-F687-4f45-9708-019B960494DF}">
-                  <a14:hiddenLine xmlns:a14="http://schemas.microsoft.com/office/drawing/2010/main" xmlns="" w="9525">
+                  <a14:hiddenLine xmlns="" xmlns:a14="http://schemas.microsoft.com/office/drawing/2010/main" w="9525">
                     <a:solidFill>
                       <a:srgbClr val="000000"/>
                     </a:solidFill>
@@ -13151,7 +13151,7 @@
               </a:ln>
               <a:extLst>
                 <a:ext uri="{91240B29-F687-4f45-9708-019B960494DF}">
-                  <a14:hiddenLine xmlns:a14="http://schemas.microsoft.com/office/drawing/2010/main" xmlns="" w="9525">
+                  <a14:hiddenLine xmlns="" xmlns:a14="http://schemas.microsoft.com/office/drawing/2010/main" w="9525">
                     <a:solidFill>
                       <a:srgbClr val="000000"/>
                     </a:solidFill>
@@ -13241,7 +13241,7 @@
               </a:ln>
               <a:extLst>
                 <a:ext uri="{91240B29-F687-4f45-9708-019B960494DF}">
-                  <a14:hiddenLine xmlns:a14="http://schemas.microsoft.com/office/drawing/2010/main" xmlns="" w="9525">
+                  <a14:hiddenLine xmlns="" xmlns:a14="http://schemas.microsoft.com/office/drawing/2010/main" w="9525">
                     <a:solidFill>
                       <a:srgbClr val="000000"/>
                     </a:solidFill>
@@ -13275,7 +13275,7 @@
               </a:ln>
               <a:extLst>
                 <a:ext uri="{91240B29-F687-4f45-9708-019B960494DF}">
-                  <a14:hiddenLine xmlns:a14="http://schemas.microsoft.com/office/drawing/2010/main" xmlns="" w="9525">
+                  <a14:hiddenLine xmlns="" xmlns:a14="http://schemas.microsoft.com/office/drawing/2010/main" w="9525">
                     <a:solidFill>
                       <a:srgbClr val="000000"/>
                     </a:solidFill>
@@ -13340,7 +13340,7 @@
               </a:ln>
               <a:extLst>
                 <a:ext uri="{91240B29-F687-4f45-9708-019B960494DF}">
-                  <a14:hiddenLine xmlns:a14="http://schemas.microsoft.com/office/drawing/2010/main" xmlns="" w="9525">
+                  <a14:hiddenLine xmlns="" xmlns:a14="http://schemas.microsoft.com/office/drawing/2010/main" w="9525">
                     <a:solidFill>
                       <a:srgbClr val="000000"/>
                     </a:solidFill>
@@ -13430,7 +13430,7 @@
               </a:ln>
               <a:extLst>
                 <a:ext uri="{91240B29-F687-4f45-9708-019B960494DF}">
-                  <a14:hiddenLine xmlns:a14="http://schemas.microsoft.com/office/drawing/2010/main" xmlns="" w="9525">
+                  <a14:hiddenLine xmlns="" xmlns:a14="http://schemas.microsoft.com/office/drawing/2010/main" w="9525">
                     <a:solidFill>
                       <a:srgbClr val="000000"/>
                     </a:solidFill>
@@ -13492,7 +13492,7 @@
               </a:ln>
               <a:extLst>
                 <a:ext uri="{91240B29-F687-4f45-9708-019B960494DF}">
-                  <a14:hiddenLine xmlns:a14="http://schemas.microsoft.com/office/drawing/2010/main" xmlns="" w="9525">
+                  <a14:hiddenLine xmlns="" xmlns:a14="http://schemas.microsoft.com/office/drawing/2010/main" w="9525">
                     <a:solidFill>
                       <a:srgbClr val="000000"/>
                     </a:solidFill>
@@ -13582,7 +13582,7 @@
               </a:ln>
               <a:extLst>
                 <a:ext uri="{91240B29-F687-4f45-9708-019B960494DF}">
-                  <a14:hiddenLine xmlns:a14="http://schemas.microsoft.com/office/drawing/2010/main" xmlns="" w="9525">
+                  <a14:hiddenLine xmlns="" xmlns:a14="http://schemas.microsoft.com/office/drawing/2010/main" w="9525">
                     <a:solidFill>
                       <a:srgbClr val="000000"/>
                     </a:solidFill>
@@ -13647,7 +13647,7 @@
               </a:ln>
               <a:extLst>
                 <a:ext uri="{91240B29-F687-4f45-9708-019B960494DF}">
-                  <a14:hiddenLine xmlns:a14="http://schemas.microsoft.com/office/drawing/2010/main" xmlns="" w="9525">
+                  <a14:hiddenLine xmlns="" xmlns:a14="http://schemas.microsoft.com/office/drawing/2010/main" w="9525">
                     <a:solidFill>
                       <a:srgbClr val="000000"/>
                     </a:solidFill>
@@ -13709,7 +13709,7 @@
               </a:ln>
               <a:extLst>
                 <a:ext uri="{91240B29-F687-4f45-9708-019B960494DF}">
-                  <a14:hiddenLine xmlns:a14="http://schemas.microsoft.com/office/drawing/2010/main" xmlns="" w="9525">
+                  <a14:hiddenLine xmlns="" xmlns:a14="http://schemas.microsoft.com/office/drawing/2010/main" w="9525">
                     <a:solidFill>
                       <a:srgbClr val="000000"/>
                     </a:solidFill>
@@ -13799,7 +13799,7 @@
               </a:ln>
               <a:extLst>
                 <a:ext uri="{91240B29-F687-4f45-9708-019B960494DF}">
-                  <a14:hiddenLine xmlns:a14="http://schemas.microsoft.com/office/drawing/2010/main" xmlns="" w="9525">
+                  <a14:hiddenLine xmlns="" xmlns:a14="http://schemas.microsoft.com/office/drawing/2010/main" w="9525">
                     <a:solidFill>
                       <a:srgbClr val="000000"/>
                     </a:solidFill>
@@ -13889,7 +13889,7 @@
               </a:ln>
               <a:extLst>
                 <a:ext uri="{91240B29-F687-4f45-9708-019B960494DF}">
-                  <a14:hiddenLine xmlns:a14="http://schemas.microsoft.com/office/drawing/2010/main" xmlns="" w="9525">
+                  <a14:hiddenLine xmlns="" xmlns:a14="http://schemas.microsoft.com/office/drawing/2010/main" w="9525">
                     <a:solidFill>
                       <a:srgbClr val="000000"/>
                     </a:solidFill>
@@ -13954,7 +13954,7 @@
               </a:ln>
               <a:extLst>
                 <a:ext uri="{91240B29-F687-4f45-9708-019B960494DF}">
-                  <a14:hiddenLine xmlns:a14="http://schemas.microsoft.com/office/drawing/2010/main" xmlns="" w="9525">
+                  <a14:hiddenLine xmlns="" xmlns:a14="http://schemas.microsoft.com/office/drawing/2010/main" w="9525">
                     <a:solidFill>
                       <a:srgbClr val="000000"/>
                     </a:solidFill>
@@ -14074,7 +14074,7 @@
               </a:ln>
               <a:extLst>
                 <a:ext uri="{91240B29-F687-4f45-9708-019B960494DF}">
-                  <a14:hiddenLine xmlns:a14="http://schemas.microsoft.com/office/drawing/2010/main" xmlns="" w="9525">
+                  <a14:hiddenLine xmlns="" xmlns:a14="http://schemas.microsoft.com/office/drawing/2010/main" w="9525">
                     <a:solidFill>
                       <a:srgbClr val="000000"/>
                     </a:solidFill>
@@ -14172,7 +14172,7 @@
               </a:ln>
               <a:extLst>
                 <a:ext uri="{91240B29-F687-4f45-9708-019B960494DF}">
-                  <a14:hiddenLine xmlns:a14="http://schemas.microsoft.com/office/drawing/2010/main" xmlns="" w="9525">
+                  <a14:hiddenLine xmlns="" xmlns:a14="http://schemas.microsoft.com/office/drawing/2010/main" w="9525">
                     <a:solidFill>
                       <a:srgbClr val="000000"/>
                     </a:solidFill>
@@ -14287,7 +14287,7 @@
               </a:ln>
               <a:extLst>
                 <a:ext uri="{91240B29-F687-4f45-9708-019B960494DF}">
-                  <a14:hiddenLine xmlns:a14="http://schemas.microsoft.com/office/drawing/2010/main" xmlns="" w="9525">
+                  <a14:hiddenLine xmlns="" xmlns:a14="http://schemas.microsoft.com/office/drawing/2010/main" w="9525">
                     <a:solidFill>
                       <a:srgbClr val="000000"/>
                     </a:solidFill>
@@ -14377,7 +14377,7 @@
               </a:ln>
               <a:extLst>
                 <a:ext uri="{91240B29-F687-4f45-9708-019B960494DF}">
-                  <a14:hiddenLine xmlns:a14="http://schemas.microsoft.com/office/drawing/2010/main" xmlns="" w="9525">
+                  <a14:hiddenLine xmlns="" xmlns:a14="http://schemas.microsoft.com/office/drawing/2010/main" w="9525">
                     <a:solidFill>
                       <a:srgbClr val="000000"/>
                     </a:solidFill>
@@ -14442,7 +14442,7 @@
               </a:ln>
               <a:extLst>
                 <a:ext uri="{91240B29-F687-4f45-9708-019B960494DF}">
-                  <a14:hiddenLine xmlns:a14="http://schemas.microsoft.com/office/drawing/2010/main" xmlns="" w="9525">
+                  <a14:hiddenLine xmlns="" xmlns:a14="http://schemas.microsoft.com/office/drawing/2010/main" w="9525">
                     <a:solidFill>
                       <a:srgbClr val="000000"/>
                     </a:solidFill>
@@ -14532,7 +14532,7 @@
               </a:ln>
               <a:extLst>
                 <a:ext uri="{91240B29-F687-4f45-9708-019B960494DF}">
-                  <a14:hiddenLine xmlns:a14="http://schemas.microsoft.com/office/drawing/2010/main" xmlns="" w="9525">
+                  <a14:hiddenLine xmlns="" xmlns:a14="http://schemas.microsoft.com/office/drawing/2010/main" w="9525">
                     <a:solidFill>
                       <a:srgbClr val="000000"/>
                     </a:solidFill>
@@ -14600,7 +14600,7 @@
               </a:ln>
               <a:extLst>
                 <a:ext uri="{91240B29-F687-4f45-9708-019B960494DF}">
-                  <a14:hiddenLine xmlns:a14="http://schemas.microsoft.com/office/drawing/2010/main" xmlns="" w="9525">
+                  <a14:hiddenLine xmlns="" xmlns:a14="http://schemas.microsoft.com/office/drawing/2010/main" w="9525">
                     <a:solidFill>
                       <a:srgbClr val="000000"/>
                     </a:solidFill>
@@ -14690,7 +14690,7 @@
               </a:ln>
               <a:extLst>
                 <a:ext uri="{91240B29-F687-4f45-9708-019B960494DF}">
-                  <a14:hiddenLine xmlns:a14="http://schemas.microsoft.com/office/drawing/2010/main" xmlns="" w="9525">
+                  <a14:hiddenLine xmlns="" xmlns:a14="http://schemas.microsoft.com/office/drawing/2010/main" w="9525">
                     <a:solidFill>
                       <a:srgbClr val="000000"/>
                     </a:solidFill>
@@ -14758,7 +14758,7 @@
               </a:ln>
               <a:extLst>
                 <a:ext uri="{91240B29-F687-4f45-9708-019B960494DF}">
-                  <a14:hiddenLine xmlns:a14="http://schemas.microsoft.com/office/drawing/2010/main" xmlns="" w="9525">
+                  <a14:hiddenLine xmlns="" xmlns:a14="http://schemas.microsoft.com/office/drawing/2010/main" w="9525">
                     <a:solidFill>
                       <a:srgbClr val="000000"/>
                     </a:solidFill>
@@ -14848,7 +14848,7 @@
               </a:ln>
               <a:extLst>
                 <a:ext uri="{91240B29-F687-4f45-9708-019B960494DF}">
-                  <a14:hiddenLine xmlns:a14="http://schemas.microsoft.com/office/drawing/2010/main" xmlns="" w="9525">
+                  <a14:hiddenLine xmlns="" xmlns:a14="http://schemas.microsoft.com/office/drawing/2010/main" w="9525">
                     <a:solidFill>
                       <a:srgbClr val="000000"/>
                     </a:solidFill>
@@ -14882,7 +14882,7 @@
               </a:ln>
               <a:extLst>
                 <a:ext uri="{91240B29-F687-4f45-9708-019B960494DF}">
-                  <a14:hiddenLine xmlns:a14="http://schemas.microsoft.com/office/drawing/2010/main" xmlns="" w="9525">
+                  <a14:hiddenLine xmlns="" xmlns:a14="http://schemas.microsoft.com/office/drawing/2010/main" w="9525">
                     <a:solidFill>
                       <a:srgbClr val="000000"/>
                     </a:solidFill>
@@ -15022,7 +15022,7 @@
           <a:p>
             <a:fld id="{D0D65A25-5B34-480B-8A82-D452FDC7444D}" type="datetimeFigureOut">
               <a:rPr lang="es-ES" smtClean="0"/>
-              <a:t>01/02/2022</a:t>
+              <a:t>16/02/2022</a:t>
             </a:fld>
             <a:endParaRPr lang="es-ES" dirty="0"/>
           </a:p>
@@ -15549,6 +15549,170 @@
           <a:prstGeom prst="rect">
             <a:avLst/>
           </a:prstGeom>
+        </p:spPr>
+      </p:pic>
+      <p:pic>
+        <p:nvPicPr>
+          <p:cNvPr id="1036" name="Picture 12" descr="https://lh5.googleusercontent.com/08rS-Z5T9X2vs8iGJ6AbuE0g127A46elYss8Vh40yYvqG-Amm8_vvNwalrZ1nGFc51Y4cNTiMhsJywGPb9qdWgPsFLe-OErH2xfSJDwo-MoEMrZ1z3BxRbMObFg"/>
+          <p:cNvPicPr>
+            <a:picLocks noChangeAspect="1" noChangeArrowheads="1"/>
+          </p:cNvPicPr>
+          <p:nvPr/>
+        </p:nvPicPr>
+        <p:blipFill>
+          <a:blip r:embed="rId4">
+            <a:extLst>
+              <a:ext uri="{28A0092B-C50C-407E-A947-70E740481C1C}">
+                <a14:useLocalDpi xmlns:a14="http://schemas.microsoft.com/office/drawing/2010/main" val="0"/>
+              </a:ext>
+            </a:extLst>
+          </a:blip>
+          <a:srcRect/>
+          <a:stretch>
+            <a:fillRect/>
+          </a:stretch>
+        </p:blipFill>
+        <p:spPr bwMode="auto">
+          <a:xfrm>
+            <a:off x="9123362" y="70632"/>
+            <a:ext cx="3089274" cy="1624729"/>
+          </a:xfrm>
+          <a:prstGeom prst="rect">
+            <a:avLst/>
+          </a:prstGeom>
+          <a:noFill/>
+          <a:extLst>
+            <a:ext uri="{909E8E84-426E-40DD-AFC4-6F175D3DCCD1}">
+              <a14:hiddenFill xmlns:a14="http://schemas.microsoft.com/office/drawing/2010/main">
+                <a:solidFill>
+                  <a:srgbClr val="FFFFFF"/>
+                </a:solidFill>
+              </a14:hiddenFill>
+            </a:ext>
+          </a:extLst>
+        </p:spPr>
+      </p:pic>
+      <p:pic>
+        <p:nvPicPr>
+          <p:cNvPr id="1038" name="Picture 14" descr="https://lh5.googleusercontent.com/c1YKLSVbvvBDQ5FlIoG4SH6JvpaY5cqKWvXoiX7V8WvKjN6bb33hXX6hvUc2KXmGnCSFOjH3RKEIJz95LGbVzfGFIiFrwnORXwpKPBYsvIlJAyDZVyw_8JCGgFQ"/>
+          <p:cNvPicPr>
+            <a:picLocks noChangeAspect="1" noChangeArrowheads="1"/>
+          </p:cNvPicPr>
+          <p:nvPr/>
+        </p:nvPicPr>
+        <p:blipFill>
+          <a:blip r:embed="rId5">
+            <a:extLst>
+              <a:ext uri="{28A0092B-C50C-407E-A947-70E740481C1C}">
+                <a14:useLocalDpi xmlns:a14="http://schemas.microsoft.com/office/drawing/2010/main" val="0"/>
+              </a:ext>
+            </a:extLst>
+          </a:blip>
+          <a:srcRect/>
+          <a:stretch>
+            <a:fillRect/>
+          </a:stretch>
+        </p:blipFill>
+        <p:spPr bwMode="auto">
+          <a:xfrm>
+            <a:off x="9228857" y="1790708"/>
+            <a:ext cx="2766866" cy="1383434"/>
+          </a:xfrm>
+          <a:prstGeom prst="rect">
+            <a:avLst/>
+          </a:prstGeom>
+          <a:noFill/>
+          <a:extLst>
+            <a:ext uri="{909E8E84-426E-40DD-AFC4-6F175D3DCCD1}">
+              <a14:hiddenFill xmlns:a14="http://schemas.microsoft.com/office/drawing/2010/main">
+                <a:solidFill>
+                  <a:srgbClr val="FFFFFF"/>
+                </a:solidFill>
+              </a14:hiddenFill>
+            </a:ext>
+          </a:extLst>
+        </p:spPr>
+      </p:pic>
+      <p:pic>
+        <p:nvPicPr>
+          <p:cNvPr id="1040" name="Picture 16" descr="https://lh5.googleusercontent.com/koEOmMRm3A3c5EBG4QAXtQ44tmzgJ626HgcLNuSgsEjIomDqpEWfefE_PXm0SzIHmBTMiAsYLvlIxzMjiFMkjgn3KaQKD2042R9JrZ47MbzK_f3vVjr3wzdrpR8"/>
+          <p:cNvPicPr>
+            <a:picLocks noChangeAspect="1" noChangeArrowheads="1"/>
+          </p:cNvPicPr>
+          <p:nvPr/>
+        </p:nvPicPr>
+        <p:blipFill>
+          <a:blip r:embed="rId6">
+            <a:extLst>
+              <a:ext uri="{28A0092B-C50C-407E-A947-70E740481C1C}">
+                <a14:useLocalDpi xmlns:a14="http://schemas.microsoft.com/office/drawing/2010/main" val="0"/>
+              </a:ext>
+            </a:extLst>
+          </a:blip>
+          <a:srcRect/>
+          <a:stretch>
+            <a:fillRect/>
+          </a:stretch>
+        </p:blipFill>
+        <p:spPr bwMode="auto">
+          <a:xfrm>
+            <a:off x="9623584" y="4068615"/>
+            <a:ext cx="1986321" cy="681355"/>
+          </a:xfrm>
+          <a:prstGeom prst="rect">
+            <a:avLst/>
+          </a:prstGeom>
+          <a:noFill/>
+          <a:extLst>
+            <a:ext uri="{909E8E84-426E-40DD-AFC4-6F175D3DCCD1}">
+              <a14:hiddenFill xmlns:a14="http://schemas.microsoft.com/office/drawing/2010/main">
+                <a:solidFill>
+                  <a:srgbClr val="FFFFFF"/>
+                </a:solidFill>
+              </a14:hiddenFill>
+            </a:ext>
+          </a:extLst>
+        </p:spPr>
+      </p:pic>
+      <p:pic>
+        <p:nvPicPr>
+          <p:cNvPr id="1042" name="Picture 18" descr="https://lh5.googleusercontent.com/jOwcKeD62yxUHPHviTbr3AImKbN-wtR1mSBY6rnxQojfDWCw9wAm7Fw7Qp-XRyiGO0J3eV0zF0kExt0FjCu6Ex3jnook1cvLXV8qFUPuD1vuxaPpSJbaNnNDf9s"/>
+          <p:cNvPicPr>
+            <a:picLocks noChangeAspect="1" noChangeArrowheads="1"/>
+          </p:cNvPicPr>
+          <p:nvPr/>
+        </p:nvPicPr>
+        <p:blipFill>
+          <a:blip r:embed="rId7" cstate="hqprint">
+            <a:extLst>
+              <a:ext uri="{28A0092B-C50C-407E-A947-70E740481C1C}">
+                <a14:useLocalDpi xmlns:a14="http://schemas.microsoft.com/office/drawing/2010/main" val="0"/>
+              </a:ext>
+            </a:extLst>
+          </a:blip>
+          <a:srcRect/>
+          <a:stretch>
+            <a:fillRect/>
+          </a:stretch>
+        </p:blipFill>
+        <p:spPr bwMode="auto">
+          <a:xfrm>
+            <a:off x="9423254" y="5537034"/>
+            <a:ext cx="2489490" cy="362532"/>
+          </a:xfrm>
+          <a:prstGeom prst="rect">
+            <a:avLst/>
+          </a:prstGeom>
+          <a:noFill/>
+          <a:extLst>
+            <a:ext uri="{909E8E84-426E-40DD-AFC4-6F175D3DCCD1}">
+              <a14:hiddenFill xmlns:a14="http://schemas.microsoft.com/office/drawing/2010/main">
+                <a:solidFill>
+                  <a:srgbClr val="FFFFFF"/>
+                </a:solidFill>
+              </a14:hiddenFill>
+            </a:ext>
+          </a:extLst>
         </p:spPr>
       </p:pic>
     </p:spTree>
@@ -19915,7 +20079,7 @@
           <p:nvPr/>
         </p:nvPicPr>
         <p:blipFill>
-          <a:blip r:embed="rId3" cstate="print">
+          <a:blip r:embed="rId3" cstate="hqprint">
             <a:extLst>
               <a:ext uri="{28A0092B-C50C-407E-A947-70E740481C1C}">
                 <a14:useLocalDpi xmlns:a14="http://schemas.microsoft.com/office/drawing/2010/main" val="0"/>

</xml_diff>